<commit_message>
Api PushType & Excel Export
</commit_message>
<xml_diff>
--- a/DsDotNet/src/UnitTest/UnitTest.Model/ImportOfficeExample/exportDS/testA/testMy/my.pptx
+++ b/DsDotNet/src/UnitTest/UnitTest.Model/ImportOfficeExample/exportDS/testA/testMy/my.pptx
@@ -9,7 +9,6 @@
     <p:sldId id="257" r:id="rId3"/>
     <p:sldId id="259" r:id="rId4"/>
     <p:sldId id="261" r:id="rId5"/>
-    <p:sldId id="262" r:id="rId6"/>
   </p:sldIdLst>
   <p:sldSz cx="12192000" cy="6858000"/>
   <p:notesSz cx="6858000" cy="9144000"/>
@@ -3398,7 +3397,7 @@
 </file>
 
 <file path=ppt/slides/slide2.xml><?xml version="1.0" encoding="utf-8"?>
-<p:sld xmlns:a="http://schemas.openxmlformats.org/drawingml/2006/main" xmlns:r="http://schemas.openxmlformats.org/officeDocument/2006/relationships" xmlns:p="http://schemas.openxmlformats.org/presentationml/2006/main">
+<p:sld xmlns:a="http://schemas.openxmlformats.org/drawingml/2006/main" xmlns:r="http://schemas.openxmlformats.org/officeDocument/2006/relationships" xmlns:p="http://schemas.openxmlformats.org/presentationml/2006/main" show="0">
   <p:cSld>
     <p:spTree>
       <p:nvGrpSpPr>
@@ -4043,12 +4042,527 @@
           </a:p>
         </p:txBody>
       </p:sp>
-      <p:sp>
-        <p:nvSpPr>
-          <p:cNvPr id="18" name="내용 개체 틀 17">
-            <a:extLst>
-              <a:ext uri="{FF2B5EF4-FFF2-40B4-BE49-F238E27FC236}">
-                <a16:creationId xmlns:a16="http://schemas.microsoft.com/office/drawing/2014/main" id="{38169D36-59DD-CA7E-9C07-41007F3878DC}"/>
+      <p:grpSp>
+        <p:nvGrpSpPr>
+          <p:cNvPr id="29" name="그룹 28">
+            <a:extLst>
+              <a:ext uri="{FF2B5EF4-FFF2-40B4-BE49-F238E27FC236}">
+                <a16:creationId xmlns:a16="http://schemas.microsoft.com/office/drawing/2014/main" id="{53FA60C8-02CB-E9DF-0DE0-59EFF8B1F222}"/>
+              </a:ext>
+            </a:extLst>
+          </p:cNvPr>
+          <p:cNvGrpSpPr/>
+          <p:nvPr/>
+        </p:nvGrpSpPr>
+        <p:grpSpPr>
+          <a:xfrm>
+            <a:off x="1041400" y="1919288"/>
+            <a:ext cx="5994400" cy="4116879"/>
+            <a:chOff x="838200" y="2029920"/>
+            <a:chExt cx="5994400" cy="4116879"/>
+          </a:xfrm>
+        </p:grpSpPr>
+        <p:sp>
+          <p:nvSpPr>
+            <p:cNvPr id="13" name="직사각형 12">
+              <a:extLst>
+                <a:ext uri="{FF2B5EF4-FFF2-40B4-BE49-F238E27FC236}">
+                  <a16:creationId xmlns:a16="http://schemas.microsoft.com/office/drawing/2014/main" id="{5EC5A213-423F-05C3-41B1-56752BB443E3}"/>
+                </a:ext>
+              </a:extLst>
+            </p:cNvPr>
+            <p:cNvSpPr/>
+            <p:nvPr/>
+          </p:nvSpPr>
+          <p:spPr>
+            <a:xfrm>
+              <a:off x="838200" y="2029920"/>
+              <a:ext cx="5994400" cy="4116879"/>
+            </a:xfrm>
+            <a:prstGeom prst="rect">
+              <a:avLst/>
+            </a:prstGeom>
+          </p:spPr>
+          <p:style>
+            <a:lnRef idx="2">
+              <a:schemeClr val="accent5">
+                <a:shade val="15000"/>
+              </a:schemeClr>
+            </a:lnRef>
+            <a:fillRef idx="1">
+              <a:schemeClr val="accent5"/>
+            </a:fillRef>
+            <a:effectRef idx="0">
+              <a:schemeClr val="accent5"/>
+            </a:effectRef>
+            <a:fontRef idx="minor">
+              <a:schemeClr val="lt1"/>
+            </a:fontRef>
+          </p:style>
+          <p:txBody>
+            <a:bodyPr rtlCol="0" anchor="ctr"/>
+            <a:lstStyle/>
+            <a:p>
+              <a:pPr algn="ctr"/>
+              <a:r>
+                <a:rPr lang="en-US" altLang="ko-KR" dirty="0"/>
+                <a:t>WORK1</a:t>
+              </a:r>
+              <a:endParaRPr lang="ko-KR" altLang="en-US" dirty="0"/>
+            </a:p>
+          </p:txBody>
+        </p:sp>
+        <p:sp>
+          <p:nvSpPr>
+            <p:cNvPr id="46" name="타원 45">
+              <a:extLst>
+                <a:ext uri="{FF2B5EF4-FFF2-40B4-BE49-F238E27FC236}">
+                  <a16:creationId xmlns:a16="http://schemas.microsoft.com/office/drawing/2014/main" id="{372359AD-9A8C-5210-B8A4-166BAF7C4BFC}"/>
+                </a:ext>
+              </a:extLst>
+            </p:cNvPr>
+            <p:cNvSpPr/>
+            <p:nvPr/>
+          </p:nvSpPr>
+          <p:spPr>
+            <a:xfrm>
+              <a:off x="1048248" y="2358340"/>
+              <a:ext cx="1958634" cy="938775"/>
+            </a:xfrm>
+            <a:prstGeom prst="ellipse">
+              <a:avLst/>
+            </a:prstGeom>
+          </p:spPr>
+          <p:style>
+            <a:lnRef idx="2">
+              <a:schemeClr val="accent1">
+                <a:shade val="15000"/>
+              </a:schemeClr>
+            </a:lnRef>
+            <a:fillRef idx="1">
+              <a:schemeClr val="accent1"/>
+            </a:fillRef>
+            <a:effectRef idx="0">
+              <a:schemeClr val="accent1"/>
+            </a:effectRef>
+            <a:fontRef idx="minor">
+              <a:schemeClr val="lt1"/>
+            </a:fontRef>
+          </p:style>
+          <p:txBody>
+            <a:bodyPr rtlCol="0" anchor="ctr"/>
+            <a:lstStyle/>
+            <a:p>
+              <a:pPr algn="ctr"/>
+              <a:r>
+                <a:rPr lang="en-US" altLang="ko-KR" dirty="0"/>
+                <a:t>1.FWD[P]</a:t>
+              </a:r>
+              <a:endParaRPr lang="ko-KR" altLang="en-US" dirty="0"/>
+            </a:p>
+          </p:txBody>
+        </p:sp>
+        <p:sp>
+          <p:nvSpPr>
+            <p:cNvPr id="47" name="타원 46">
+              <a:extLst>
+                <a:ext uri="{FF2B5EF4-FFF2-40B4-BE49-F238E27FC236}">
+                  <a16:creationId xmlns:a16="http://schemas.microsoft.com/office/drawing/2014/main" id="{1379FCA7-DCCD-3FEB-40C4-10D7022062C7}"/>
+                </a:ext>
+              </a:extLst>
+            </p:cNvPr>
+            <p:cNvSpPr/>
+            <p:nvPr/>
+          </p:nvSpPr>
+          <p:spPr>
+            <a:xfrm>
+              <a:off x="3577776" y="2587291"/>
+              <a:ext cx="1236940" cy="938775"/>
+            </a:xfrm>
+            <a:prstGeom prst="ellipse">
+              <a:avLst/>
+            </a:prstGeom>
+          </p:spPr>
+          <p:style>
+            <a:lnRef idx="2">
+              <a:schemeClr val="accent1">
+                <a:shade val="15000"/>
+              </a:schemeClr>
+            </a:lnRef>
+            <a:fillRef idx="1">
+              <a:schemeClr val="accent1"/>
+            </a:fillRef>
+            <a:effectRef idx="0">
+              <a:schemeClr val="accent1"/>
+            </a:effectRef>
+            <a:fontRef idx="minor">
+              <a:schemeClr val="lt1"/>
+            </a:fontRef>
+          </p:style>
+          <p:txBody>
+            <a:bodyPr rtlCol="0" anchor="ctr"/>
+            <a:lstStyle/>
+            <a:p>
+              <a:pPr algn="ctr"/>
+              <a:r>
+                <a:rPr lang="en-US" altLang="ko-KR" dirty="0"/>
+                <a:t>1.-</a:t>
+              </a:r>
+              <a:endParaRPr lang="ko-KR" altLang="en-US" dirty="0"/>
+            </a:p>
+          </p:txBody>
+        </p:sp>
+        <p:cxnSp>
+          <p:nvCxnSpPr>
+            <p:cNvPr id="49" name="연결선: 꺾임 48">
+              <a:extLst>
+                <a:ext uri="{FF2B5EF4-FFF2-40B4-BE49-F238E27FC236}">
+                  <a16:creationId xmlns:a16="http://schemas.microsoft.com/office/drawing/2014/main" id="{061DF60F-9629-5C85-3C1D-9477895782B3}"/>
+                </a:ext>
+              </a:extLst>
+            </p:cNvPr>
+            <p:cNvCxnSpPr>
+              <a:cxnSpLocks/>
+              <a:stCxn id="46" idx="6"/>
+              <a:endCxn id="47" idx="2"/>
+            </p:cNvCxnSpPr>
+            <p:nvPr/>
+          </p:nvCxnSpPr>
+          <p:spPr>
+            <a:xfrm>
+              <a:off x="3006882" y="2827728"/>
+              <a:ext cx="570894" cy="228951"/>
+            </a:xfrm>
+            <a:prstGeom prst="bentConnector3">
+              <a:avLst>
+                <a:gd name="adj1" fmla="val 50000"/>
+              </a:avLst>
+            </a:prstGeom>
+            <a:ln>
+              <a:tailEnd type="triangle"/>
+            </a:ln>
+          </p:spPr>
+          <p:style>
+            <a:lnRef idx="1">
+              <a:schemeClr val="accent1"/>
+            </a:lnRef>
+            <a:fillRef idx="0">
+              <a:schemeClr val="accent1"/>
+            </a:fillRef>
+            <a:effectRef idx="0">
+              <a:schemeClr val="accent1"/>
+            </a:effectRef>
+            <a:fontRef idx="minor">
+              <a:schemeClr val="tx1"/>
+            </a:fontRef>
+          </p:style>
+        </p:cxnSp>
+        <p:sp>
+          <p:nvSpPr>
+            <p:cNvPr id="9" name="타원 8">
+              <a:extLst>
+                <a:ext uri="{FF2B5EF4-FFF2-40B4-BE49-F238E27FC236}">
+                  <a16:creationId xmlns:a16="http://schemas.microsoft.com/office/drawing/2014/main" id="{46888E4C-42DB-ABC9-C132-71CA4AD80CEE}"/>
+                </a:ext>
+              </a:extLst>
+            </p:cNvPr>
+            <p:cNvSpPr/>
+            <p:nvPr/>
+          </p:nvSpPr>
+          <p:spPr>
+            <a:xfrm>
+              <a:off x="3089930" y="4230147"/>
+              <a:ext cx="1236940" cy="938775"/>
+            </a:xfrm>
+            <a:prstGeom prst="ellipse">
+              <a:avLst/>
+            </a:prstGeom>
+          </p:spPr>
+          <p:style>
+            <a:lnRef idx="2">
+              <a:schemeClr val="accent1">
+                <a:shade val="15000"/>
+              </a:schemeClr>
+            </a:lnRef>
+            <a:fillRef idx="1">
+              <a:schemeClr val="accent1"/>
+            </a:fillRef>
+            <a:effectRef idx="0">
+              <a:schemeClr val="accent1"/>
+            </a:effectRef>
+            <a:fontRef idx="minor">
+              <a:schemeClr val="lt1"/>
+            </a:fontRef>
+          </p:style>
+          <p:txBody>
+            <a:bodyPr rtlCol="0" anchor="ctr"/>
+            <a:lstStyle/>
+            <a:p>
+              <a:pPr algn="ctr"/>
+              <a:r>
+                <a:rPr lang="en-US" altLang="ko-KR"/>
+                <a:t>2.+</a:t>
+              </a:r>
+              <a:endParaRPr lang="ko-KR" altLang="en-US" dirty="0"/>
+            </a:p>
+          </p:txBody>
+        </p:sp>
+        <p:sp>
+          <p:nvSpPr>
+            <p:cNvPr id="10" name="타원 9">
+              <a:extLst>
+                <a:ext uri="{FF2B5EF4-FFF2-40B4-BE49-F238E27FC236}">
+                  <a16:creationId xmlns:a16="http://schemas.microsoft.com/office/drawing/2014/main" id="{41DDADBD-54A9-2989-E4C9-30546B088469}"/>
+                </a:ext>
+              </a:extLst>
+            </p:cNvPr>
+            <p:cNvSpPr/>
+            <p:nvPr/>
+          </p:nvSpPr>
+          <p:spPr>
+            <a:xfrm>
+              <a:off x="4859060" y="4699534"/>
+              <a:ext cx="1236940" cy="938775"/>
+            </a:xfrm>
+            <a:prstGeom prst="ellipse">
+              <a:avLst/>
+            </a:prstGeom>
+          </p:spPr>
+          <p:style>
+            <a:lnRef idx="2">
+              <a:schemeClr val="accent1">
+                <a:shade val="15000"/>
+              </a:schemeClr>
+            </a:lnRef>
+            <a:fillRef idx="1">
+              <a:schemeClr val="accent1"/>
+            </a:fillRef>
+            <a:effectRef idx="0">
+              <a:schemeClr val="accent1"/>
+            </a:effectRef>
+            <a:fontRef idx="minor">
+              <a:schemeClr val="lt1"/>
+            </a:fontRef>
+          </p:style>
+          <p:txBody>
+            <a:bodyPr rtlCol="0" anchor="ctr"/>
+            <a:lstStyle/>
+            <a:p>
+              <a:pPr algn="ctr"/>
+              <a:r>
+                <a:rPr lang="en-US" altLang="ko-KR" dirty="0"/>
+                <a:t>2.-</a:t>
+              </a:r>
+              <a:endParaRPr lang="ko-KR" altLang="en-US" dirty="0"/>
+            </a:p>
+          </p:txBody>
+        </p:sp>
+        <p:cxnSp>
+          <p:nvCxnSpPr>
+            <p:cNvPr id="11" name="연결선: 꺾임 10">
+              <a:extLst>
+                <a:ext uri="{FF2B5EF4-FFF2-40B4-BE49-F238E27FC236}">
+                  <a16:creationId xmlns:a16="http://schemas.microsoft.com/office/drawing/2014/main" id="{D2D1A329-ABA6-73C1-36EB-C59DE4C8ADBA}"/>
+                </a:ext>
+              </a:extLst>
+            </p:cNvPr>
+            <p:cNvCxnSpPr>
+              <a:cxnSpLocks/>
+              <a:stCxn id="46" idx="4"/>
+              <a:endCxn id="9" idx="2"/>
+            </p:cNvCxnSpPr>
+            <p:nvPr/>
+          </p:nvCxnSpPr>
+          <p:spPr>
+            <a:xfrm rot="16200000" flipH="1">
+              <a:off x="1857537" y="3467142"/>
+              <a:ext cx="1402420" cy="1062365"/>
+            </a:xfrm>
+            <a:prstGeom prst="bentConnector2">
+              <a:avLst/>
+            </a:prstGeom>
+            <a:ln>
+              <a:tailEnd type="triangle"/>
+            </a:ln>
+          </p:spPr>
+          <p:style>
+            <a:lnRef idx="1">
+              <a:schemeClr val="accent1"/>
+            </a:lnRef>
+            <a:fillRef idx="0">
+              <a:schemeClr val="accent1"/>
+            </a:fillRef>
+            <a:effectRef idx="0">
+              <a:schemeClr val="accent1"/>
+            </a:effectRef>
+            <a:fontRef idx="minor">
+              <a:schemeClr val="tx1"/>
+            </a:fontRef>
+          </p:style>
+        </p:cxnSp>
+        <p:cxnSp>
+          <p:nvCxnSpPr>
+            <p:cNvPr id="20" name="연결선: 꺾임 19">
+              <a:extLst>
+                <a:ext uri="{FF2B5EF4-FFF2-40B4-BE49-F238E27FC236}">
+                  <a16:creationId xmlns:a16="http://schemas.microsoft.com/office/drawing/2014/main" id="{842E0B22-6800-3D03-85EE-B99A55FC321E}"/>
+                </a:ext>
+              </a:extLst>
+            </p:cNvPr>
+            <p:cNvCxnSpPr>
+              <a:cxnSpLocks/>
+              <a:stCxn id="47" idx="6"/>
+              <a:endCxn id="10" idx="0"/>
+            </p:cNvCxnSpPr>
+            <p:nvPr/>
+          </p:nvCxnSpPr>
+          <p:spPr>
+            <a:xfrm>
+              <a:off x="4814716" y="3056679"/>
+              <a:ext cx="662814" cy="1642855"/>
+            </a:xfrm>
+            <a:prstGeom prst="bentConnector2">
+              <a:avLst/>
+            </a:prstGeom>
+            <a:ln>
+              <a:tailEnd type="triangle"/>
+            </a:ln>
+          </p:spPr>
+          <p:style>
+            <a:lnRef idx="1">
+              <a:schemeClr val="accent1"/>
+            </a:lnRef>
+            <a:fillRef idx="0">
+              <a:schemeClr val="accent1"/>
+            </a:fillRef>
+            <a:effectRef idx="0">
+              <a:schemeClr val="accent1"/>
+            </a:effectRef>
+            <a:fontRef idx="minor">
+              <a:schemeClr val="tx1"/>
+            </a:fontRef>
+          </p:style>
+        </p:cxnSp>
+        <p:cxnSp>
+          <p:nvCxnSpPr>
+            <p:cNvPr id="21" name="연결선: 꺾임 20">
+              <a:extLst>
+                <a:ext uri="{FF2B5EF4-FFF2-40B4-BE49-F238E27FC236}">
+                  <a16:creationId xmlns:a16="http://schemas.microsoft.com/office/drawing/2014/main" id="{2D69A2BA-A12B-066A-E9D0-7D0EA79EBCBC}"/>
+                </a:ext>
+              </a:extLst>
+            </p:cNvPr>
+            <p:cNvCxnSpPr>
+              <a:cxnSpLocks/>
+              <a:stCxn id="9" idx="6"/>
+              <a:endCxn id="10" idx="2"/>
+            </p:cNvCxnSpPr>
+            <p:nvPr/>
+          </p:nvCxnSpPr>
+          <p:spPr>
+            <a:xfrm>
+              <a:off x="4326870" y="4699535"/>
+              <a:ext cx="532190" cy="469387"/>
+            </a:xfrm>
+            <a:prstGeom prst="bentConnector3">
+              <a:avLst>
+                <a:gd name="adj1" fmla="val 50000"/>
+              </a:avLst>
+            </a:prstGeom>
+            <a:ln>
+              <a:tailEnd type="triangle"/>
+            </a:ln>
+          </p:spPr>
+          <p:style>
+            <a:lnRef idx="1">
+              <a:schemeClr val="accent1"/>
+            </a:lnRef>
+            <a:fillRef idx="0">
+              <a:schemeClr val="accent1"/>
+            </a:fillRef>
+            <a:effectRef idx="0">
+              <a:schemeClr val="accent1"/>
+            </a:effectRef>
+            <a:fontRef idx="minor">
+              <a:schemeClr val="tx1"/>
+            </a:fontRef>
+          </p:style>
+        </p:cxnSp>
+      </p:grpSp>
+    </p:spTree>
+    <p:extLst>
+      <p:ext uri="{BB962C8B-B14F-4D97-AF65-F5344CB8AC3E}">
+        <p14:creationId xmlns:p14="http://schemas.microsoft.com/office/powerpoint/2010/main" val="2589817974"/>
+      </p:ext>
+    </p:extLst>
+  </p:cSld>
+  <p:clrMapOvr>
+    <a:masterClrMapping/>
+  </p:clrMapOvr>
+</p:sld>
+</file>
+
+<file path=ppt/slides/slide4.xml><?xml version="1.0" encoding="utf-8"?>
+<p:sld xmlns:a="http://schemas.openxmlformats.org/drawingml/2006/main" xmlns:r="http://schemas.openxmlformats.org/officeDocument/2006/relationships" xmlns:p="http://schemas.openxmlformats.org/presentationml/2006/main" show="0">
+  <p:cSld>
+    <p:spTree>
+      <p:nvGrpSpPr>
+        <p:cNvPr id="1" name=""/>
+        <p:cNvGrpSpPr/>
+        <p:nvPr/>
+      </p:nvGrpSpPr>
+      <p:grpSpPr>
+        <a:xfrm>
+          <a:off x="0" y="0"/>
+          <a:ext cx="0" cy="0"/>
+          <a:chOff x="0" y="0"/>
+          <a:chExt cx="0" cy="0"/>
+        </a:xfrm>
+      </p:grpSpPr>
+      <p:sp>
+        <p:nvSpPr>
+          <p:cNvPr id="2" name="제목 1">
+            <a:extLst>
+              <a:ext uri="{FF2B5EF4-FFF2-40B4-BE49-F238E27FC236}">
+                <a16:creationId xmlns:a16="http://schemas.microsoft.com/office/drawing/2014/main" id="{1A69DDD8-5545-A829-82DF-051DB1771928}"/>
+              </a:ext>
+            </a:extLst>
+          </p:cNvPr>
+          <p:cNvSpPr>
+            <a:spLocks noGrp="1"/>
+          </p:cNvSpPr>
+          <p:nvPr>
+            <p:ph type="title"/>
+          </p:nvPr>
+        </p:nvSpPr>
+        <p:spPr>
+          <a:xfrm>
+            <a:off x="838200" y="365125"/>
+            <a:ext cx="10515600" cy="1325563"/>
+          </a:xfrm>
+        </p:spPr>
+        <p:txBody>
+          <a:bodyPr/>
+          <a:lstStyle/>
+          <a:p>
+            <a:r>
+              <a:rPr lang="en-US" altLang="ko-KR" dirty="0"/>
+              <a:t>STN01</a:t>
+            </a:r>
+            <a:r>
+              <a:rPr lang="en-US" altLang="ko-KR"/>
+              <a:t>_UsingLIB2</a:t>
+            </a:r>
+            <a:endParaRPr lang="ko-KR" altLang="en-US" dirty="0"/>
+          </a:p>
+        </p:txBody>
+      </p:sp>
+      <p:sp>
+        <p:nvSpPr>
+          <p:cNvPr id="24" name="내용 개체 틀 23">
+            <a:extLst>
+              <a:ext uri="{FF2B5EF4-FFF2-40B4-BE49-F238E27FC236}">
+                <a16:creationId xmlns:a16="http://schemas.microsoft.com/office/drawing/2014/main" id="{5328F27B-751C-120A-8A48-BFBAC2FE53D6}"/>
               </a:ext>
             </a:extLst>
           </p:cNvPr>
@@ -4514,545 +5028,6 @@
           </p:style>
         </p:cxnSp>
       </p:grpSp>
-    </p:spTree>
-    <p:extLst>
-      <p:ext uri="{BB962C8B-B14F-4D97-AF65-F5344CB8AC3E}">
-        <p14:creationId xmlns:p14="http://schemas.microsoft.com/office/powerpoint/2010/main" val="2589817974"/>
-      </p:ext>
-    </p:extLst>
-  </p:cSld>
-  <p:clrMapOvr>
-    <a:masterClrMapping/>
-  </p:clrMapOvr>
-</p:sld>
-</file>
-
-<file path=ppt/slides/slide4.xml><?xml version="1.0" encoding="utf-8"?>
-<p:sld xmlns:a="http://schemas.openxmlformats.org/drawingml/2006/main" xmlns:r="http://schemas.openxmlformats.org/officeDocument/2006/relationships" xmlns:p="http://schemas.openxmlformats.org/presentationml/2006/main">
-  <p:cSld>
-    <p:spTree>
-      <p:nvGrpSpPr>
-        <p:cNvPr id="1" name=""/>
-        <p:cNvGrpSpPr/>
-        <p:nvPr/>
-      </p:nvGrpSpPr>
-      <p:grpSpPr>
-        <a:xfrm>
-          <a:off x="0" y="0"/>
-          <a:ext cx="0" cy="0"/>
-          <a:chOff x="0" y="0"/>
-          <a:chExt cx="0" cy="0"/>
-        </a:xfrm>
-      </p:grpSpPr>
-      <p:sp>
-        <p:nvSpPr>
-          <p:cNvPr id="2" name="제목 1">
-            <a:extLst>
-              <a:ext uri="{FF2B5EF4-FFF2-40B4-BE49-F238E27FC236}">
-                <a16:creationId xmlns:a16="http://schemas.microsoft.com/office/drawing/2014/main" id="{1A69DDD8-5545-A829-82DF-051DB1771928}"/>
-              </a:ext>
-            </a:extLst>
-          </p:cNvPr>
-          <p:cNvSpPr>
-            <a:spLocks noGrp="1"/>
-          </p:cNvSpPr>
-          <p:nvPr>
-            <p:ph type="title"/>
-          </p:nvPr>
-        </p:nvSpPr>
-        <p:spPr>
-          <a:xfrm>
-            <a:off x="838200" y="365125"/>
-            <a:ext cx="10515600" cy="1325563"/>
-          </a:xfrm>
-        </p:spPr>
-        <p:txBody>
-          <a:bodyPr/>
-          <a:lstStyle/>
-          <a:p>
-            <a:r>
-              <a:rPr lang="en-US" altLang="ko-KR" dirty="0"/>
-              <a:t>STN01</a:t>
-            </a:r>
-            <a:r>
-              <a:rPr lang="en-US" altLang="ko-KR"/>
-              <a:t>_UsingLIB2</a:t>
-            </a:r>
-            <a:endParaRPr lang="ko-KR" altLang="en-US" dirty="0"/>
-          </a:p>
-        </p:txBody>
-      </p:sp>
-      <p:sp>
-        <p:nvSpPr>
-          <p:cNvPr id="24" name="내용 개체 틀 23">
-            <a:extLst>
-              <a:ext uri="{FF2B5EF4-FFF2-40B4-BE49-F238E27FC236}">
-                <a16:creationId xmlns:a16="http://schemas.microsoft.com/office/drawing/2014/main" id="{5328F27B-751C-120A-8A48-BFBAC2FE53D6}"/>
-              </a:ext>
-            </a:extLst>
-          </p:cNvPr>
-          <p:cNvSpPr>
-            <a:spLocks noGrp="1"/>
-          </p:cNvSpPr>
-          <p:nvPr>
-            <p:ph idx="1"/>
-          </p:nvPr>
-        </p:nvSpPr>
-        <p:spPr/>
-        <p:txBody>
-          <a:bodyPr/>
-          <a:lstStyle/>
-          <a:p>
-            <a:endParaRPr lang="ko-KR" altLang="en-US"/>
-          </a:p>
-        </p:txBody>
-      </p:sp>
-      <p:grpSp>
-        <p:nvGrpSpPr>
-          <p:cNvPr id="29" name="그룹 28">
-            <a:extLst>
-              <a:ext uri="{FF2B5EF4-FFF2-40B4-BE49-F238E27FC236}">
-                <a16:creationId xmlns:a16="http://schemas.microsoft.com/office/drawing/2014/main" id="{53FA60C8-02CB-E9DF-0DE0-59EFF8B1F222}"/>
-              </a:ext>
-            </a:extLst>
-          </p:cNvPr>
-          <p:cNvGrpSpPr/>
-          <p:nvPr/>
-        </p:nvGrpSpPr>
-        <p:grpSpPr>
-          <a:xfrm>
-            <a:off x="1041400" y="1919288"/>
-            <a:ext cx="5994400" cy="4116879"/>
-            <a:chOff x="838200" y="2029920"/>
-            <a:chExt cx="5994400" cy="4116879"/>
-          </a:xfrm>
-        </p:grpSpPr>
-        <p:sp>
-          <p:nvSpPr>
-            <p:cNvPr id="13" name="직사각형 12">
-              <a:extLst>
-                <a:ext uri="{FF2B5EF4-FFF2-40B4-BE49-F238E27FC236}">
-                  <a16:creationId xmlns:a16="http://schemas.microsoft.com/office/drawing/2014/main" id="{5EC5A213-423F-05C3-41B1-56752BB443E3}"/>
-                </a:ext>
-              </a:extLst>
-            </p:cNvPr>
-            <p:cNvSpPr/>
-            <p:nvPr/>
-          </p:nvSpPr>
-          <p:spPr>
-            <a:xfrm>
-              <a:off x="838200" y="2029920"/>
-              <a:ext cx="5994400" cy="4116879"/>
-            </a:xfrm>
-            <a:prstGeom prst="rect">
-              <a:avLst/>
-            </a:prstGeom>
-          </p:spPr>
-          <p:style>
-            <a:lnRef idx="2">
-              <a:schemeClr val="accent5">
-                <a:shade val="15000"/>
-              </a:schemeClr>
-            </a:lnRef>
-            <a:fillRef idx="1">
-              <a:schemeClr val="accent5"/>
-            </a:fillRef>
-            <a:effectRef idx="0">
-              <a:schemeClr val="accent5"/>
-            </a:effectRef>
-            <a:fontRef idx="minor">
-              <a:schemeClr val="lt1"/>
-            </a:fontRef>
-          </p:style>
-          <p:txBody>
-            <a:bodyPr rtlCol="0" anchor="ctr"/>
-            <a:lstStyle/>
-            <a:p>
-              <a:pPr algn="ctr"/>
-              <a:r>
-                <a:rPr lang="en-US" altLang="ko-KR" dirty="0"/>
-                <a:t>WORK1</a:t>
-              </a:r>
-              <a:endParaRPr lang="ko-KR" altLang="en-US" dirty="0"/>
-            </a:p>
-          </p:txBody>
-        </p:sp>
-        <p:sp>
-          <p:nvSpPr>
-            <p:cNvPr id="46" name="타원 45">
-              <a:extLst>
-                <a:ext uri="{FF2B5EF4-FFF2-40B4-BE49-F238E27FC236}">
-                  <a16:creationId xmlns:a16="http://schemas.microsoft.com/office/drawing/2014/main" id="{372359AD-9A8C-5210-B8A4-166BAF7C4BFC}"/>
-                </a:ext>
-              </a:extLst>
-            </p:cNvPr>
-            <p:cNvSpPr/>
-            <p:nvPr/>
-          </p:nvSpPr>
-          <p:spPr>
-            <a:xfrm>
-              <a:off x="1292217" y="2490225"/>
-              <a:ext cx="1236940" cy="938775"/>
-            </a:xfrm>
-            <a:prstGeom prst="ellipse">
-              <a:avLst/>
-            </a:prstGeom>
-          </p:spPr>
-          <p:style>
-            <a:lnRef idx="2">
-              <a:schemeClr val="accent1">
-                <a:shade val="15000"/>
-              </a:schemeClr>
-            </a:lnRef>
-            <a:fillRef idx="1">
-              <a:schemeClr val="accent1"/>
-            </a:fillRef>
-            <a:effectRef idx="0">
-              <a:schemeClr val="accent1"/>
-            </a:effectRef>
-            <a:fontRef idx="minor">
-              <a:schemeClr val="lt1"/>
-            </a:fontRef>
-          </p:style>
-          <p:txBody>
-            <a:bodyPr rtlCol="0" anchor="ctr"/>
-            <a:lstStyle/>
-            <a:p>
-              <a:pPr algn="ctr"/>
-              <a:r>
-                <a:rPr lang="en-US" altLang="ko-KR" dirty="0"/>
-                <a:t>1.+</a:t>
-              </a:r>
-              <a:endParaRPr lang="ko-KR" altLang="en-US" dirty="0"/>
-            </a:p>
-          </p:txBody>
-        </p:sp>
-        <p:sp>
-          <p:nvSpPr>
-            <p:cNvPr id="47" name="타원 46">
-              <a:extLst>
-                <a:ext uri="{FF2B5EF4-FFF2-40B4-BE49-F238E27FC236}">
-                  <a16:creationId xmlns:a16="http://schemas.microsoft.com/office/drawing/2014/main" id="{1379FCA7-DCCD-3FEB-40C4-10D7022062C7}"/>
-                </a:ext>
-              </a:extLst>
-            </p:cNvPr>
-            <p:cNvSpPr/>
-            <p:nvPr/>
-          </p:nvSpPr>
-          <p:spPr>
-            <a:xfrm>
-              <a:off x="3216930" y="2660646"/>
-              <a:ext cx="1236940" cy="938775"/>
-            </a:xfrm>
-            <a:prstGeom prst="ellipse">
-              <a:avLst/>
-            </a:prstGeom>
-          </p:spPr>
-          <p:style>
-            <a:lnRef idx="2">
-              <a:schemeClr val="accent1">
-                <a:shade val="15000"/>
-              </a:schemeClr>
-            </a:lnRef>
-            <a:fillRef idx="1">
-              <a:schemeClr val="accent1"/>
-            </a:fillRef>
-            <a:effectRef idx="0">
-              <a:schemeClr val="accent1"/>
-            </a:effectRef>
-            <a:fontRef idx="minor">
-              <a:schemeClr val="lt1"/>
-            </a:fontRef>
-          </p:style>
-          <p:txBody>
-            <a:bodyPr rtlCol="0" anchor="ctr"/>
-            <a:lstStyle/>
-            <a:p>
-              <a:pPr algn="ctr"/>
-              <a:r>
-                <a:rPr lang="en-US" altLang="ko-KR" dirty="0"/>
-                <a:t>1.-</a:t>
-              </a:r>
-              <a:endParaRPr lang="ko-KR" altLang="en-US" dirty="0"/>
-            </a:p>
-          </p:txBody>
-        </p:sp>
-        <p:cxnSp>
-          <p:nvCxnSpPr>
-            <p:cNvPr id="49" name="연결선: 꺾임 48">
-              <a:extLst>
-                <a:ext uri="{FF2B5EF4-FFF2-40B4-BE49-F238E27FC236}">
-                  <a16:creationId xmlns:a16="http://schemas.microsoft.com/office/drawing/2014/main" id="{061DF60F-9629-5C85-3C1D-9477895782B3}"/>
-                </a:ext>
-              </a:extLst>
-            </p:cNvPr>
-            <p:cNvCxnSpPr>
-              <a:stCxn id="46" idx="6"/>
-              <a:endCxn id="47" idx="2"/>
-            </p:cNvCxnSpPr>
-            <p:nvPr/>
-          </p:nvCxnSpPr>
-          <p:spPr>
-            <a:xfrm>
-              <a:off x="2529157" y="2959613"/>
-              <a:ext cx="687773" cy="170421"/>
-            </a:xfrm>
-            <a:prstGeom prst="bentConnector3">
-              <a:avLst>
-                <a:gd name="adj1" fmla="val 50000"/>
-              </a:avLst>
-            </a:prstGeom>
-            <a:ln>
-              <a:tailEnd type="triangle"/>
-            </a:ln>
-          </p:spPr>
-          <p:style>
-            <a:lnRef idx="1">
-              <a:schemeClr val="accent1"/>
-            </a:lnRef>
-            <a:fillRef idx="0">
-              <a:schemeClr val="accent1"/>
-            </a:fillRef>
-            <a:effectRef idx="0">
-              <a:schemeClr val="accent1"/>
-            </a:effectRef>
-            <a:fontRef idx="minor">
-              <a:schemeClr val="tx1"/>
-            </a:fontRef>
-          </p:style>
-        </p:cxnSp>
-        <p:sp>
-          <p:nvSpPr>
-            <p:cNvPr id="9" name="타원 8">
-              <a:extLst>
-                <a:ext uri="{FF2B5EF4-FFF2-40B4-BE49-F238E27FC236}">
-                  <a16:creationId xmlns:a16="http://schemas.microsoft.com/office/drawing/2014/main" id="{46888E4C-42DB-ABC9-C132-71CA4AD80CEE}"/>
-                </a:ext>
-              </a:extLst>
-            </p:cNvPr>
-            <p:cNvSpPr/>
-            <p:nvPr/>
-          </p:nvSpPr>
-          <p:spPr>
-            <a:xfrm>
-              <a:off x="3089930" y="4230147"/>
-              <a:ext cx="1236940" cy="938775"/>
-            </a:xfrm>
-            <a:prstGeom prst="ellipse">
-              <a:avLst/>
-            </a:prstGeom>
-          </p:spPr>
-          <p:style>
-            <a:lnRef idx="2">
-              <a:schemeClr val="accent1">
-                <a:shade val="15000"/>
-              </a:schemeClr>
-            </a:lnRef>
-            <a:fillRef idx="1">
-              <a:schemeClr val="accent1"/>
-            </a:fillRef>
-            <a:effectRef idx="0">
-              <a:schemeClr val="accent1"/>
-            </a:effectRef>
-            <a:fontRef idx="minor">
-              <a:schemeClr val="lt1"/>
-            </a:fontRef>
-          </p:style>
-          <p:txBody>
-            <a:bodyPr rtlCol="0" anchor="ctr"/>
-            <a:lstStyle/>
-            <a:p>
-              <a:pPr algn="ctr"/>
-              <a:r>
-                <a:rPr lang="en-US" altLang="ko-KR"/>
-                <a:t>2.+</a:t>
-              </a:r>
-              <a:endParaRPr lang="ko-KR" altLang="en-US" dirty="0"/>
-            </a:p>
-          </p:txBody>
-        </p:sp>
-        <p:sp>
-          <p:nvSpPr>
-            <p:cNvPr id="10" name="타원 9">
-              <a:extLst>
-                <a:ext uri="{FF2B5EF4-FFF2-40B4-BE49-F238E27FC236}">
-                  <a16:creationId xmlns:a16="http://schemas.microsoft.com/office/drawing/2014/main" id="{41DDADBD-54A9-2989-E4C9-30546B088469}"/>
-                </a:ext>
-              </a:extLst>
-            </p:cNvPr>
-            <p:cNvSpPr/>
-            <p:nvPr/>
-          </p:nvSpPr>
-          <p:spPr>
-            <a:xfrm>
-              <a:off x="4859060" y="4699534"/>
-              <a:ext cx="1236940" cy="938775"/>
-            </a:xfrm>
-            <a:prstGeom prst="ellipse">
-              <a:avLst/>
-            </a:prstGeom>
-          </p:spPr>
-          <p:style>
-            <a:lnRef idx="2">
-              <a:schemeClr val="accent1">
-                <a:shade val="15000"/>
-              </a:schemeClr>
-            </a:lnRef>
-            <a:fillRef idx="1">
-              <a:schemeClr val="accent1"/>
-            </a:fillRef>
-            <a:effectRef idx="0">
-              <a:schemeClr val="accent1"/>
-            </a:effectRef>
-            <a:fontRef idx="minor">
-              <a:schemeClr val="lt1"/>
-            </a:fontRef>
-          </p:style>
-          <p:txBody>
-            <a:bodyPr rtlCol="0" anchor="ctr"/>
-            <a:lstStyle/>
-            <a:p>
-              <a:pPr algn="ctr"/>
-              <a:r>
-                <a:rPr lang="en-US" altLang="ko-KR" dirty="0"/>
-                <a:t>2.-</a:t>
-              </a:r>
-              <a:endParaRPr lang="ko-KR" altLang="en-US" dirty="0"/>
-            </a:p>
-          </p:txBody>
-        </p:sp>
-        <p:cxnSp>
-          <p:nvCxnSpPr>
-            <p:cNvPr id="11" name="연결선: 꺾임 10">
-              <a:extLst>
-                <a:ext uri="{FF2B5EF4-FFF2-40B4-BE49-F238E27FC236}">
-                  <a16:creationId xmlns:a16="http://schemas.microsoft.com/office/drawing/2014/main" id="{D2D1A329-ABA6-73C1-36EB-C59DE4C8ADBA}"/>
-                </a:ext>
-              </a:extLst>
-            </p:cNvPr>
-            <p:cNvCxnSpPr>
-              <a:cxnSpLocks/>
-              <a:stCxn id="46" idx="4"/>
-              <a:endCxn id="9" idx="2"/>
-            </p:cNvCxnSpPr>
-            <p:nvPr/>
-          </p:nvCxnSpPr>
-          <p:spPr>
-            <a:xfrm rot="16200000" flipH="1">
-              <a:off x="1865041" y="3474645"/>
-              <a:ext cx="1270535" cy="1179243"/>
-            </a:xfrm>
-            <a:prstGeom prst="bentConnector2">
-              <a:avLst/>
-            </a:prstGeom>
-            <a:ln>
-              <a:tailEnd type="triangle"/>
-            </a:ln>
-          </p:spPr>
-          <p:style>
-            <a:lnRef idx="1">
-              <a:schemeClr val="accent1"/>
-            </a:lnRef>
-            <a:fillRef idx="0">
-              <a:schemeClr val="accent1"/>
-            </a:fillRef>
-            <a:effectRef idx="0">
-              <a:schemeClr val="accent1"/>
-            </a:effectRef>
-            <a:fontRef idx="minor">
-              <a:schemeClr val="tx1"/>
-            </a:fontRef>
-          </p:style>
-        </p:cxnSp>
-        <p:cxnSp>
-          <p:nvCxnSpPr>
-            <p:cNvPr id="20" name="연결선: 꺾임 19">
-              <a:extLst>
-                <a:ext uri="{FF2B5EF4-FFF2-40B4-BE49-F238E27FC236}">
-                  <a16:creationId xmlns:a16="http://schemas.microsoft.com/office/drawing/2014/main" id="{842E0B22-6800-3D03-85EE-B99A55FC321E}"/>
-                </a:ext>
-              </a:extLst>
-            </p:cNvPr>
-            <p:cNvCxnSpPr>
-              <a:cxnSpLocks/>
-              <a:stCxn id="47" idx="6"/>
-              <a:endCxn id="10" idx="0"/>
-            </p:cNvCxnSpPr>
-            <p:nvPr/>
-          </p:nvCxnSpPr>
-          <p:spPr>
-            <a:xfrm>
-              <a:off x="4453870" y="3130034"/>
-              <a:ext cx="1023660" cy="1569500"/>
-            </a:xfrm>
-            <a:prstGeom prst="bentConnector2">
-              <a:avLst/>
-            </a:prstGeom>
-            <a:ln>
-              <a:tailEnd type="triangle"/>
-            </a:ln>
-          </p:spPr>
-          <p:style>
-            <a:lnRef idx="1">
-              <a:schemeClr val="accent1"/>
-            </a:lnRef>
-            <a:fillRef idx="0">
-              <a:schemeClr val="accent1"/>
-            </a:fillRef>
-            <a:effectRef idx="0">
-              <a:schemeClr val="accent1"/>
-            </a:effectRef>
-            <a:fontRef idx="minor">
-              <a:schemeClr val="tx1"/>
-            </a:fontRef>
-          </p:style>
-        </p:cxnSp>
-        <p:cxnSp>
-          <p:nvCxnSpPr>
-            <p:cNvPr id="21" name="연결선: 꺾임 20">
-              <a:extLst>
-                <a:ext uri="{FF2B5EF4-FFF2-40B4-BE49-F238E27FC236}">
-                  <a16:creationId xmlns:a16="http://schemas.microsoft.com/office/drawing/2014/main" id="{2D69A2BA-A12B-066A-E9D0-7D0EA79EBCBC}"/>
-                </a:ext>
-              </a:extLst>
-            </p:cNvPr>
-            <p:cNvCxnSpPr>
-              <a:cxnSpLocks/>
-              <a:stCxn id="9" idx="6"/>
-              <a:endCxn id="10" idx="2"/>
-            </p:cNvCxnSpPr>
-            <p:nvPr/>
-          </p:nvCxnSpPr>
-          <p:spPr>
-            <a:xfrm>
-              <a:off x="4326870" y="4699535"/>
-              <a:ext cx="532190" cy="469387"/>
-            </a:xfrm>
-            <a:prstGeom prst="bentConnector3">
-              <a:avLst>
-                <a:gd name="adj1" fmla="val 50000"/>
-              </a:avLst>
-            </a:prstGeom>
-            <a:ln>
-              <a:tailEnd type="triangle"/>
-            </a:ln>
-          </p:spPr>
-          <p:style>
-            <a:lnRef idx="1">
-              <a:schemeClr val="accent1"/>
-            </a:lnRef>
-            <a:fillRef idx="0">
-              <a:schemeClr val="accent1"/>
-            </a:fillRef>
-            <a:effectRef idx="0">
-              <a:schemeClr val="accent1"/>
-            </a:effectRef>
-            <a:fontRef idx="minor">
-              <a:schemeClr val="tx1"/>
-            </a:fontRef>
-          </p:style>
-        </p:cxnSp>
-      </p:grpSp>
       <p:grpSp>
         <p:nvGrpSpPr>
           <p:cNvPr id="4" name="그룹 3">
@@ -5592,2450 +5567,6 @@
     <p:extLst>
       <p:ext uri="{BB962C8B-B14F-4D97-AF65-F5344CB8AC3E}">
         <p14:creationId xmlns:p14="http://schemas.microsoft.com/office/powerpoint/2010/main" val="3209872182"/>
-      </p:ext>
-    </p:extLst>
-  </p:cSld>
-  <p:clrMapOvr>
-    <a:masterClrMapping/>
-  </p:clrMapOvr>
-</p:sld>
-</file>
-
-<file path=ppt/slides/slide5.xml><?xml version="1.0" encoding="utf-8"?>
-<p:sld xmlns:a="http://schemas.openxmlformats.org/drawingml/2006/main" xmlns:r="http://schemas.openxmlformats.org/officeDocument/2006/relationships" xmlns:p="http://schemas.openxmlformats.org/presentationml/2006/main">
-  <p:cSld>
-    <p:bg>
-      <p:bgPr>
-        <a:solidFill>
-          <a:srgbClr val="FFFFFF"/>
-        </a:solidFill>
-        <a:effectLst/>
-      </p:bgPr>
-    </p:bg>
-    <p:spTree>
-      <p:nvGrpSpPr>
-        <p:cNvPr id="1" name=""/>
-        <p:cNvGrpSpPr/>
-        <p:nvPr/>
-      </p:nvGrpSpPr>
-      <p:grpSpPr>
-        <a:xfrm>
-          <a:off x="0" y="0"/>
-          <a:ext cx="0" cy="0"/>
-          <a:chOff x="0" y="0"/>
-          <a:chExt cx="0" cy="0"/>
-        </a:xfrm>
-      </p:grpSpPr>
-      <p:sp>
-        <p:nvSpPr>
-          <p:cNvPr id="2" name="TextBox 1">
-            <a:extLst>
-              <a:ext uri="{FF2B5EF4-FFF2-40B4-BE49-F238E27FC236}">
-                <a16:creationId xmlns:a16="http://schemas.microsoft.com/office/drawing/2014/main" id="{F50FE34A-D366-D82D-74CE-D43D28E59C89}"/>
-              </a:ext>
-            </a:extLst>
-          </p:cNvPr>
-          <p:cNvSpPr txBox="1"/>
-          <p:nvPr/>
-        </p:nvSpPr>
-        <p:spPr>
-          <a:xfrm>
-            <a:off x="254000" y="254000"/>
-            <a:ext cx="1270000" cy="381000"/>
-          </a:xfrm>
-          <a:prstGeom prst="rect">
-            <a:avLst/>
-          </a:prstGeom>
-          <a:noFill/>
-        </p:spPr>
-        <p:txBody>
-          <a:bodyPr vert="horz" rtlCol="0">
-            <a:spAutoFit/>
-          </a:bodyPr>
-          <a:lstStyle/>
-          <a:p>
-            <a:r>
-              <a:rPr lang="en-US" altLang="ko-KR"/>
-              <a:t>IO TABLE</a:t>
-            </a:r>
-            <a:endParaRPr lang="ko-KR" altLang="en-US"/>
-          </a:p>
-        </p:txBody>
-      </p:sp>
-      <p:graphicFrame>
-        <p:nvGraphicFramePr>
-          <p:cNvPr id="3" name="표 2">
-            <a:extLst>
-              <a:ext uri="{FF2B5EF4-FFF2-40B4-BE49-F238E27FC236}">
-                <a16:creationId xmlns:a16="http://schemas.microsoft.com/office/drawing/2014/main" id="{595220C8-7B6B-8E6F-EDC7-2E5ACC812CE4}"/>
-              </a:ext>
-            </a:extLst>
-          </p:cNvPr>
-          <p:cNvGraphicFramePr>
-            <a:graphicFrameLocks noGrp="1"/>
-          </p:cNvGraphicFramePr>
-          <p:nvPr>
-            <p:extLst>
-              <p:ext uri="{D42A27DB-BD31-4B8C-83A1-F6EECF244321}">
-                <p14:modId xmlns:p14="http://schemas.microsoft.com/office/powerpoint/2010/main" val="1934127975"/>
-              </p:ext>
-            </p:extLst>
-          </p:nvPr>
-        </p:nvGraphicFramePr>
-        <p:xfrm>
-          <a:off x="254000" y="635000"/>
-          <a:ext cx="11684001" cy="5958840"/>
-        </p:xfrm>
-        <a:graphic>
-          <a:graphicData uri="http://schemas.openxmlformats.org/drawingml/2006/table">
-            <a:tbl>
-              <a:tblPr firstRow="1" bandRow="1">
-                <a:tableStyleId>{5C22544A-7EE6-4342-B048-85BDC9FD1C3A}</a:tableStyleId>
-              </a:tblPr>
-              <a:tblGrid>
-                <a:gridCol w="1669143">
-                  <a:extLst>
-                    <a:ext uri="{9D8B030D-6E8A-4147-A177-3AD203B41FA5}">
-                      <a16:colId xmlns:a16="http://schemas.microsoft.com/office/drawing/2014/main" val="4253551241"/>
-                    </a:ext>
-                  </a:extLst>
-                </a:gridCol>
-                <a:gridCol w="1669143">
-                  <a:extLst>
-                    <a:ext uri="{9D8B030D-6E8A-4147-A177-3AD203B41FA5}">
-                      <a16:colId xmlns:a16="http://schemas.microsoft.com/office/drawing/2014/main" val="481098657"/>
-                    </a:ext>
-                  </a:extLst>
-                </a:gridCol>
-                <a:gridCol w="1669143">
-                  <a:extLst>
-                    <a:ext uri="{9D8B030D-6E8A-4147-A177-3AD203B41FA5}">
-                      <a16:colId xmlns:a16="http://schemas.microsoft.com/office/drawing/2014/main" val="2092958625"/>
-                    </a:ext>
-                  </a:extLst>
-                </a:gridCol>
-                <a:gridCol w="1669143">
-                  <a:extLst>
-                    <a:ext uri="{9D8B030D-6E8A-4147-A177-3AD203B41FA5}">
-                      <a16:colId xmlns:a16="http://schemas.microsoft.com/office/drawing/2014/main" val="2194983168"/>
-                    </a:ext>
-                  </a:extLst>
-                </a:gridCol>
-                <a:gridCol w="1669143">
-                  <a:extLst>
-                    <a:ext uri="{9D8B030D-6E8A-4147-A177-3AD203B41FA5}">
-                      <a16:colId xmlns:a16="http://schemas.microsoft.com/office/drawing/2014/main" val="364633610"/>
-                    </a:ext>
-                  </a:extLst>
-                </a:gridCol>
-                <a:gridCol w="1669143">
-                  <a:extLst>
-                    <a:ext uri="{9D8B030D-6E8A-4147-A177-3AD203B41FA5}">
-                      <a16:colId xmlns:a16="http://schemas.microsoft.com/office/drawing/2014/main" val="315359961"/>
-                    </a:ext>
-                  </a:extLst>
-                </a:gridCol>
-                <a:gridCol w="1669143">
-                  <a:extLst>
-                    <a:ext uri="{9D8B030D-6E8A-4147-A177-3AD203B41FA5}">
-                      <a16:colId xmlns:a16="http://schemas.microsoft.com/office/drawing/2014/main" val="1491305179"/>
-                    </a:ext>
-                  </a:extLst>
-                </a:gridCol>
-              </a:tblGrid>
-              <a:tr h="0">
-                <a:tc>
-                  <a:txBody>
-                    <a:bodyPr/>
-                    <a:lstStyle/>
-                    <a:p>
-                      <a:pPr latinLnBrk="1"/>
-                      <a:r>
-                        <a:rPr lang="en-US" altLang="ko-KR" sz="1100"/>
-                        <a:t>Case</a:t>
-                      </a:r>
-                      <a:endParaRPr lang="ko-KR" altLang="en-US" sz="1100"/>
-                    </a:p>
-                  </a:txBody>
-                  <a:tcPr/>
-                </a:tc>
-                <a:tc>
-                  <a:txBody>
-                    <a:bodyPr/>
-                    <a:lstStyle/>
-                    <a:p>
-                      <a:pPr latinLnBrk="1"/>
-                      <a:r>
-                        <a:rPr lang="en-US" altLang="ko-KR" sz="1100"/>
-                        <a:t>Name</a:t>
-                      </a:r>
-                      <a:endParaRPr lang="ko-KR" altLang="en-US" sz="1100"/>
-                    </a:p>
-                  </a:txBody>
-                  <a:tcPr/>
-                </a:tc>
-                <a:tc>
-                  <a:txBody>
-                    <a:bodyPr/>
-                    <a:lstStyle/>
-                    <a:p>
-                      <a:pPr latinLnBrk="1"/>
-                      <a:r>
-                        <a:rPr lang="en-US" altLang="ko-KR" sz="1100"/>
-                        <a:t>DataType</a:t>
-                      </a:r>
-                      <a:endParaRPr lang="ko-KR" altLang="en-US" sz="1100"/>
-                    </a:p>
-                  </a:txBody>
-                  <a:tcPr/>
-                </a:tc>
-                <a:tc>
-                  <a:txBody>
-                    <a:bodyPr/>
-                    <a:lstStyle/>
-                    <a:p>
-                      <a:pPr latinLnBrk="1"/>
-                      <a:r>
-                        <a:rPr lang="en-US" altLang="ko-KR" sz="1100"/>
-                        <a:t>Input</a:t>
-                      </a:r>
-                      <a:endParaRPr lang="ko-KR" altLang="en-US" sz="1100"/>
-                    </a:p>
-                  </a:txBody>
-                  <a:tcPr/>
-                </a:tc>
-                <a:tc>
-                  <a:txBody>
-                    <a:bodyPr/>
-                    <a:lstStyle/>
-                    <a:p>
-                      <a:pPr latinLnBrk="1"/>
-                      <a:r>
-                        <a:rPr lang="en-US" altLang="ko-KR" sz="1100"/>
-                        <a:t>Output</a:t>
-                      </a:r>
-                      <a:endParaRPr lang="ko-KR" altLang="en-US" sz="1100"/>
-                    </a:p>
-                  </a:txBody>
-                  <a:tcPr/>
-                </a:tc>
-                <a:tc>
-                  <a:txBody>
-                    <a:bodyPr/>
-                    <a:lstStyle/>
-                    <a:p>
-                      <a:pPr latinLnBrk="1"/>
-                      <a:r>
-                        <a:rPr lang="en-US" altLang="ko-KR" sz="1100"/>
-                        <a:t>Job</a:t>
-                      </a:r>
-                      <a:endParaRPr lang="ko-KR" altLang="en-US" sz="1100"/>
-                    </a:p>
-                  </a:txBody>
-                  <a:tcPr/>
-                </a:tc>
-                <a:tc>
-                  <a:txBody>
-                    <a:bodyPr/>
-                    <a:lstStyle/>
-                    <a:p>
-                      <a:pPr latinLnBrk="1"/>
-                      <a:r>
-                        <a:rPr lang="en-US" altLang="ko-KR" sz="1100" dirty="0"/>
-                        <a:t>Func</a:t>
-                      </a:r>
-                      <a:endParaRPr lang="ko-KR" altLang="en-US" sz="1100" dirty="0"/>
-                    </a:p>
-                  </a:txBody>
-                  <a:tcPr/>
-                </a:tc>
-                <a:extLst>
-                  <a:ext uri="{0D108BD9-81ED-4DB2-BD59-A6C34878D82A}">
-                    <a16:rowId xmlns:a16="http://schemas.microsoft.com/office/drawing/2014/main" val="2432878939"/>
-                  </a:ext>
-                </a:extLst>
-              </a:tr>
-              <a:tr h="0">
-                <a:tc>
-                  <a:txBody>
-                    <a:bodyPr/>
-                    <a:lstStyle/>
-                    <a:p>
-                      <a:pPr latinLnBrk="1"/>
-                      <a:r>
-                        <a:rPr lang="ko-KR" altLang="en-US" sz="1100"/>
-                        <a:t>외부주소</a:t>
-                      </a:r>
-                    </a:p>
-                  </a:txBody>
-                  <a:tcPr/>
-                </a:tc>
-                <a:tc>
-                  <a:txBody>
-                    <a:bodyPr/>
-                    <a:lstStyle/>
-                    <a:p>
-                      <a:pPr latinLnBrk="1"/>
-                      <a:r>
-                        <a:rPr lang="en-US" altLang="ko-KR" sz="1100"/>
-                        <a:t>STN01_Pin."+"</a:t>
-                      </a:r>
-                      <a:endParaRPr lang="ko-KR" altLang="en-US" sz="1100"/>
-                    </a:p>
-                  </a:txBody>
-                  <a:tcPr/>
-                </a:tc>
-                <a:tc>
-                  <a:txBody>
-                    <a:bodyPr/>
-                    <a:lstStyle/>
-                    <a:p>
-                      <a:pPr latinLnBrk="1"/>
-                      <a:r>
-                        <a:rPr lang="en-US" altLang="ko-KR" sz="1100"/>
-                        <a:t>bool</a:t>
-                      </a:r>
-                      <a:endParaRPr lang="ko-KR" altLang="en-US" sz="1100"/>
-                    </a:p>
-                  </a:txBody>
-                  <a:tcPr/>
-                </a:tc>
-                <a:tc>
-                  <a:txBody>
-                    <a:bodyPr/>
-                    <a:lstStyle/>
-                    <a:p>
-                      <a:pPr latinLnBrk="1"/>
-                      <a:r>
-                        <a:rPr lang="en-US" altLang="ko-KR" sz="1100"/>
-                        <a:t>I625.1</a:t>
-                      </a:r>
-                      <a:endParaRPr lang="ko-KR" altLang="en-US" sz="1100"/>
-                    </a:p>
-                  </a:txBody>
-                  <a:tcPr/>
-                </a:tc>
-                <a:tc>
-                  <a:txBody>
-                    <a:bodyPr/>
-                    <a:lstStyle/>
-                    <a:p>
-                      <a:pPr latinLnBrk="1"/>
-                      <a:r>
-                        <a:rPr lang="en-US" altLang="ko-KR" sz="1100"/>
-                        <a:t>O625.1</a:t>
-                      </a:r>
-                      <a:endParaRPr lang="ko-KR" altLang="en-US" sz="1100"/>
-                    </a:p>
-                  </a:txBody>
-                  <a:tcPr/>
-                </a:tc>
-                <a:tc>
-                  <a:txBody>
-                    <a:bodyPr/>
-                    <a:lstStyle/>
-                    <a:p>
-                      <a:pPr latinLnBrk="1"/>
-                      <a:r>
-                        <a:rPr lang="en-US" altLang="ko-KR" sz="1100"/>
-                        <a:t>STN01_Pin_+</a:t>
-                      </a:r>
-                      <a:endParaRPr lang="ko-KR" altLang="en-US" sz="1100"/>
-                    </a:p>
-                  </a:txBody>
-                  <a:tcPr/>
-                </a:tc>
-                <a:tc>
-                  <a:txBody>
-                    <a:bodyPr/>
-                    <a:lstStyle/>
-                    <a:p>
-                      <a:pPr latinLnBrk="1"/>
-                      <a:endParaRPr lang="ko-KR" altLang="en-US" sz="1100" dirty="0"/>
-                    </a:p>
-                  </a:txBody>
-                  <a:tcPr/>
-                </a:tc>
-                <a:extLst>
-                  <a:ext uri="{0D108BD9-81ED-4DB2-BD59-A6C34878D82A}">
-                    <a16:rowId xmlns:a16="http://schemas.microsoft.com/office/drawing/2014/main" val="820117659"/>
-                  </a:ext>
-                </a:extLst>
-              </a:tr>
-              <a:tr h="0">
-                <a:tc>
-                  <a:txBody>
-                    <a:bodyPr/>
-                    <a:lstStyle/>
-                    <a:p>
-                      <a:pPr latinLnBrk="1"/>
-                      <a:r>
-                        <a:rPr lang="ko-KR" altLang="en-US" sz="1100"/>
-                        <a:t>외부주소</a:t>
-                      </a:r>
-                    </a:p>
-                  </a:txBody>
-                  <a:tcPr/>
-                </a:tc>
-                <a:tc>
-                  <a:txBody>
-                    <a:bodyPr/>
-                    <a:lstStyle/>
-                    <a:p>
-                      <a:pPr latinLnBrk="1"/>
-                      <a:r>
-                        <a:rPr lang="en-US" altLang="ko-KR" sz="1100"/>
-                        <a:t>STN01_Pin."-"</a:t>
-                      </a:r>
-                      <a:endParaRPr lang="ko-KR" altLang="en-US" sz="1100"/>
-                    </a:p>
-                  </a:txBody>
-                  <a:tcPr/>
-                </a:tc>
-                <a:tc>
-                  <a:txBody>
-                    <a:bodyPr/>
-                    <a:lstStyle/>
-                    <a:p>
-                      <a:pPr latinLnBrk="1"/>
-                      <a:r>
-                        <a:rPr lang="en-US" altLang="ko-KR" sz="1100"/>
-                        <a:t>bool</a:t>
-                      </a:r>
-                      <a:endParaRPr lang="ko-KR" altLang="en-US" sz="1100"/>
-                    </a:p>
-                  </a:txBody>
-                  <a:tcPr/>
-                </a:tc>
-                <a:tc>
-                  <a:txBody>
-                    <a:bodyPr/>
-                    <a:lstStyle/>
-                    <a:p>
-                      <a:pPr latinLnBrk="1"/>
-                      <a:r>
-                        <a:rPr lang="en-US" altLang="ko-KR" sz="1100"/>
-                        <a:t>I625.2</a:t>
-                      </a:r>
-                      <a:endParaRPr lang="ko-KR" altLang="en-US" sz="1100"/>
-                    </a:p>
-                  </a:txBody>
-                  <a:tcPr/>
-                </a:tc>
-                <a:tc>
-                  <a:txBody>
-                    <a:bodyPr/>
-                    <a:lstStyle/>
-                    <a:p>
-                      <a:pPr latinLnBrk="1"/>
-                      <a:r>
-                        <a:rPr lang="en-US" altLang="ko-KR" sz="1100"/>
-                        <a:t>O625.2</a:t>
-                      </a:r>
-                      <a:endParaRPr lang="ko-KR" altLang="en-US" sz="1100"/>
-                    </a:p>
-                  </a:txBody>
-                  <a:tcPr/>
-                </a:tc>
-                <a:tc>
-                  <a:txBody>
-                    <a:bodyPr/>
-                    <a:lstStyle/>
-                    <a:p>
-                      <a:pPr latinLnBrk="1"/>
-                      <a:r>
-                        <a:rPr lang="en-US" altLang="ko-KR" sz="1100"/>
-                        <a:t>STN01_Pin_-</a:t>
-                      </a:r>
-                      <a:endParaRPr lang="ko-KR" altLang="en-US" sz="1100"/>
-                    </a:p>
-                  </a:txBody>
-                  <a:tcPr/>
-                </a:tc>
-                <a:tc>
-                  <a:txBody>
-                    <a:bodyPr/>
-                    <a:lstStyle/>
-                    <a:p>
-                      <a:pPr latinLnBrk="1"/>
-                      <a:endParaRPr lang="ko-KR" altLang="en-US" sz="1100"/>
-                    </a:p>
-                  </a:txBody>
-                  <a:tcPr/>
-                </a:tc>
-                <a:extLst>
-                  <a:ext uri="{0D108BD9-81ED-4DB2-BD59-A6C34878D82A}">
-                    <a16:rowId xmlns:a16="http://schemas.microsoft.com/office/drawing/2014/main" val="3811160959"/>
-                  </a:ext>
-                </a:extLst>
-              </a:tr>
-              <a:tr h="0">
-                <a:tc>
-                  <a:txBody>
-                    <a:bodyPr/>
-                    <a:lstStyle/>
-                    <a:p>
-                      <a:pPr latinLnBrk="1"/>
-                      <a:r>
-                        <a:rPr lang="ko-KR" altLang="en-US" sz="1100" dirty="0"/>
-                        <a:t>외부주소</a:t>
-                      </a:r>
-                    </a:p>
-                  </a:txBody>
-                  <a:tcPr/>
-                </a:tc>
-                <a:tc>
-                  <a:txBody>
-                    <a:bodyPr/>
-                    <a:lstStyle/>
-                    <a:p>
-                      <a:pPr latinLnBrk="1"/>
-                      <a:r>
-                        <a:rPr lang="en-US" altLang="ko-KR" sz="1100"/>
-                        <a:t>STN01_UsingLIB2_1."+"</a:t>
-                      </a:r>
-                      <a:endParaRPr lang="ko-KR" altLang="en-US" sz="1100"/>
-                    </a:p>
-                  </a:txBody>
-                  <a:tcPr/>
-                </a:tc>
-                <a:tc>
-                  <a:txBody>
-                    <a:bodyPr/>
-                    <a:lstStyle/>
-                    <a:p>
-                      <a:pPr latinLnBrk="1"/>
-                      <a:r>
-                        <a:rPr lang="en-US" altLang="ko-KR" sz="1100"/>
-                        <a:t>bool</a:t>
-                      </a:r>
-                      <a:endParaRPr lang="ko-KR" altLang="en-US" sz="1100"/>
-                    </a:p>
-                  </a:txBody>
-                  <a:tcPr/>
-                </a:tc>
-                <a:tc>
-                  <a:txBody>
-                    <a:bodyPr/>
-                    <a:lstStyle/>
-                    <a:p>
-                      <a:pPr latinLnBrk="1"/>
-                      <a:r>
-                        <a:rPr lang="en-US" altLang="ko-KR" sz="1100"/>
-                        <a:t>I625.3</a:t>
-                      </a:r>
-                      <a:endParaRPr lang="ko-KR" altLang="en-US" sz="1100"/>
-                    </a:p>
-                  </a:txBody>
-                  <a:tcPr/>
-                </a:tc>
-                <a:tc>
-                  <a:txBody>
-                    <a:bodyPr/>
-                    <a:lstStyle/>
-                    <a:p>
-                      <a:pPr latinLnBrk="1"/>
-                      <a:r>
-                        <a:rPr lang="en-US" altLang="ko-KR" sz="1100"/>
-                        <a:t>O625.3</a:t>
-                      </a:r>
-                      <a:endParaRPr lang="ko-KR" altLang="en-US" sz="1100"/>
-                    </a:p>
-                  </a:txBody>
-                  <a:tcPr/>
-                </a:tc>
-                <a:tc>
-                  <a:txBody>
-                    <a:bodyPr/>
-                    <a:lstStyle/>
-                    <a:p>
-                      <a:pPr latinLnBrk="1"/>
-                      <a:r>
-                        <a:rPr lang="en-US" altLang="ko-KR" sz="1100"/>
-                        <a:t>STN01_UsingLIB2_1_+</a:t>
-                      </a:r>
-                      <a:endParaRPr lang="ko-KR" altLang="en-US" sz="1100"/>
-                    </a:p>
-                  </a:txBody>
-                  <a:tcPr/>
-                </a:tc>
-                <a:tc>
-                  <a:txBody>
-                    <a:bodyPr/>
-                    <a:lstStyle/>
-                    <a:p>
-                      <a:pPr latinLnBrk="1"/>
-                      <a:endParaRPr lang="ko-KR" altLang="en-US" sz="1100"/>
-                    </a:p>
-                  </a:txBody>
-                  <a:tcPr/>
-                </a:tc>
-                <a:extLst>
-                  <a:ext uri="{0D108BD9-81ED-4DB2-BD59-A6C34878D82A}">
-                    <a16:rowId xmlns:a16="http://schemas.microsoft.com/office/drawing/2014/main" val="2747721206"/>
-                  </a:ext>
-                </a:extLst>
-              </a:tr>
-              <a:tr h="0">
-                <a:tc>
-                  <a:txBody>
-                    <a:bodyPr/>
-                    <a:lstStyle/>
-                    <a:p>
-                      <a:pPr latinLnBrk="1"/>
-                      <a:r>
-                        <a:rPr lang="ko-KR" altLang="en-US" sz="1100"/>
-                        <a:t>외부주소</a:t>
-                      </a:r>
-                    </a:p>
-                  </a:txBody>
-                  <a:tcPr/>
-                </a:tc>
-                <a:tc>
-                  <a:txBody>
-                    <a:bodyPr/>
-                    <a:lstStyle/>
-                    <a:p>
-                      <a:pPr latinLnBrk="1"/>
-                      <a:r>
-                        <a:rPr lang="en-US" altLang="ko-KR" sz="1100"/>
-                        <a:t>STN01_UsingLIB2_1."-"</a:t>
-                      </a:r>
-                      <a:endParaRPr lang="ko-KR" altLang="en-US" sz="1100"/>
-                    </a:p>
-                  </a:txBody>
-                  <a:tcPr/>
-                </a:tc>
-                <a:tc>
-                  <a:txBody>
-                    <a:bodyPr/>
-                    <a:lstStyle/>
-                    <a:p>
-                      <a:pPr latinLnBrk="1"/>
-                      <a:r>
-                        <a:rPr lang="en-US" altLang="ko-KR" sz="1100"/>
-                        <a:t>bool</a:t>
-                      </a:r>
-                      <a:endParaRPr lang="ko-KR" altLang="en-US" sz="1100"/>
-                    </a:p>
-                  </a:txBody>
-                  <a:tcPr/>
-                </a:tc>
-                <a:tc>
-                  <a:txBody>
-                    <a:bodyPr/>
-                    <a:lstStyle/>
-                    <a:p>
-                      <a:pPr latinLnBrk="1"/>
-                      <a:r>
-                        <a:rPr lang="en-US" altLang="ko-KR" sz="1100"/>
-                        <a:t>I625.4</a:t>
-                      </a:r>
-                      <a:endParaRPr lang="ko-KR" altLang="en-US" sz="1100"/>
-                    </a:p>
-                  </a:txBody>
-                  <a:tcPr/>
-                </a:tc>
-                <a:tc>
-                  <a:txBody>
-                    <a:bodyPr/>
-                    <a:lstStyle/>
-                    <a:p>
-                      <a:pPr latinLnBrk="1"/>
-                      <a:r>
-                        <a:rPr lang="en-US" altLang="ko-KR" sz="1100"/>
-                        <a:t>O625.4</a:t>
-                      </a:r>
-                      <a:endParaRPr lang="ko-KR" altLang="en-US" sz="1100"/>
-                    </a:p>
-                  </a:txBody>
-                  <a:tcPr/>
-                </a:tc>
-                <a:tc>
-                  <a:txBody>
-                    <a:bodyPr/>
-                    <a:lstStyle/>
-                    <a:p>
-                      <a:pPr latinLnBrk="1"/>
-                      <a:r>
-                        <a:rPr lang="en-US" altLang="ko-KR" sz="1100"/>
-                        <a:t>STN01_UsingLIB2_1_-</a:t>
-                      </a:r>
-                      <a:endParaRPr lang="ko-KR" altLang="en-US" sz="1100"/>
-                    </a:p>
-                  </a:txBody>
-                  <a:tcPr/>
-                </a:tc>
-                <a:tc>
-                  <a:txBody>
-                    <a:bodyPr/>
-                    <a:lstStyle/>
-                    <a:p>
-                      <a:pPr latinLnBrk="1"/>
-                      <a:endParaRPr lang="ko-KR" altLang="en-US" sz="1100"/>
-                    </a:p>
-                  </a:txBody>
-                  <a:tcPr/>
-                </a:tc>
-                <a:extLst>
-                  <a:ext uri="{0D108BD9-81ED-4DB2-BD59-A6C34878D82A}">
-                    <a16:rowId xmlns:a16="http://schemas.microsoft.com/office/drawing/2014/main" val="545596359"/>
-                  </a:ext>
-                </a:extLst>
-              </a:tr>
-              <a:tr h="0">
-                <a:tc>
-                  <a:txBody>
-                    <a:bodyPr/>
-                    <a:lstStyle/>
-                    <a:p>
-                      <a:pPr latinLnBrk="1"/>
-                      <a:r>
-                        <a:rPr lang="ko-KR" altLang="en-US" sz="1100"/>
-                        <a:t>외부주소</a:t>
-                      </a:r>
-                    </a:p>
-                  </a:txBody>
-                  <a:tcPr/>
-                </a:tc>
-                <a:tc>
-                  <a:txBody>
-                    <a:bodyPr/>
-                    <a:lstStyle/>
-                    <a:p>
-                      <a:pPr latinLnBrk="1"/>
-                      <a:r>
-                        <a:rPr lang="en-US" altLang="ko-KR" sz="1100"/>
-                        <a:t>STN01_UsingLIB2_2."+"</a:t>
-                      </a:r>
-                      <a:endParaRPr lang="ko-KR" altLang="en-US" sz="1100"/>
-                    </a:p>
-                  </a:txBody>
-                  <a:tcPr/>
-                </a:tc>
-                <a:tc>
-                  <a:txBody>
-                    <a:bodyPr/>
-                    <a:lstStyle/>
-                    <a:p>
-                      <a:pPr latinLnBrk="1"/>
-                      <a:r>
-                        <a:rPr lang="en-US" altLang="ko-KR" sz="1100"/>
-                        <a:t>bool</a:t>
-                      </a:r>
-                      <a:endParaRPr lang="ko-KR" altLang="en-US" sz="1100"/>
-                    </a:p>
-                  </a:txBody>
-                  <a:tcPr/>
-                </a:tc>
-                <a:tc>
-                  <a:txBody>
-                    <a:bodyPr/>
-                    <a:lstStyle/>
-                    <a:p>
-                      <a:pPr latinLnBrk="1"/>
-                      <a:r>
-                        <a:rPr lang="en-US" altLang="ko-KR" sz="1100"/>
-                        <a:t>I625.5</a:t>
-                      </a:r>
-                      <a:endParaRPr lang="ko-KR" altLang="en-US" sz="1100"/>
-                    </a:p>
-                  </a:txBody>
-                  <a:tcPr/>
-                </a:tc>
-                <a:tc>
-                  <a:txBody>
-                    <a:bodyPr/>
-                    <a:lstStyle/>
-                    <a:p>
-                      <a:pPr latinLnBrk="1"/>
-                      <a:r>
-                        <a:rPr lang="en-US" altLang="ko-KR" sz="1100"/>
-                        <a:t>O625.5</a:t>
-                      </a:r>
-                      <a:endParaRPr lang="ko-KR" altLang="en-US" sz="1100"/>
-                    </a:p>
-                  </a:txBody>
-                  <a:tcPr/>
-                </a:tc>
-                <a:tc>
-                  <a:txBody>
-                    <a:bodyPr/>
-                    <a:lstStyle/>
-                    <a:p>
-                      <a:pPr latinLnBrk="1"/>
-                      <a:r>
-                        <a:rPr lang="en-US" altLang="ko-KR" sz="1100"/>
-                        <a:t>STN01_UsingLIB2_2_+</a:t>
-                      </a:r>
-                      <a:endParaRPr lang="ko-KR" altLang="en-US" sz="1100"/>
-                    </a:p>
-                  </a:txBody>
-                  <a:tcPr/>
-                </a:tc>
-                <a:tc>
-                  <a:txBody>
-                    <a:bodyPr/>
-                    <a:lstStyle/>
-                    <a:p>
-                      <a:pPr latinLnBrk="1"/>
-                      <a:endParaRPr lang="ko-KR" altLang="en-US" sz="1100"/>
-                    </a:p>
-                  </a:txBody>
-                  <a:tcPr/>
-                </a:tc>
-                <a:extLst>
-                  <a:ext uri="{0D108BD9-81ED-4DB2-BD59-A6C34878D82A}">
-                    <a16:rowId xmlns:a16="http://schemas.microsoft.com/office/drawing/2014/main" val="87791120"/>
-                  </a:ext>
-                </a:extLst>
-              </a:tr>
-              <a:tr h="0">
-                <a:tc>
-                  <a:txBody>
-                    <a:bodyPr/>
-                    <a:lstStyle/>
-                    <a:p>
-                      <a:pPr latinLnBrk="1"/>
-                      <a:r>
-                        <a:rPr lang="ko-KR" altLang="en-US" sz="1100"/>
-                        <a:t>외부주소</a:t>
-                      </a:r>
-                    </a:p>
-                  </a:txBody>
-                  <a:tcPr/>
-                </a:tc>
-                <a:tc>
-                  <a:txBody>
-                    <a:bodyPr/>
-                    <a:lstStyle/>
-                    <a:p>
-                      <a:pPr latinLnBrk="1"/>
-                      <a:r>
-                        <a:rPr lang="en-US" altLang="ko-KR" sz="1100"/>
-                        <a:t>STN01_UsingLIB2_2."-"</a:t>
-                      </a:r>
-                      <a:endParaRPr lang="ko-KR" altLang="en-US" sz="1100"/>
-                    </a:p>
-                  </a:txBody>
-                  <a:tcPr/>
-                </a:tc>
-                <a:tc>
-                  <a:txBody>
-                    <a:bodyPr/>
-                    <a:lstStyle/>
-                    <a:p>
-                      <a:pPr latinLnBrk="1"/>
-                      <a:r>
-                        <a:rPr lang="en-US" altLang="ko-KR" sz="1100"/>
-                        <a:t>bool</a:t>
-                      </a:r>
-                      <a:endParaRPr lang="ko-KR" altLang="en-US" sz="1100"/>
-                    </a:p>
-                  </a:txBody>
-                  <a:tcPr/>
-                </a:tc>
-                <a:tc>
-                  <a:txBody>
-                    <a:bodyPr/>
-                    <a:lstStyle/>
-                    <a:p>
-                      <a:pPr latinLnBrk="1"/>
-                      <a:r>
-                        <a:rPr lang="en-US" altLang="ko-KR" sz="1100"/>
-                        <a:t>I625.6</a:t>
-                      </a:r>
-                      <a:endParaRPr lang="ko-KR" altLang="en-US" sz="1100"/>
-                    </a:p>
-                  </a:txBody>
-                  <a:tcPr/>
-                </a:tc>
-                <a:tc>
-                  <a:txBody>
-                    <a:bodyPr/>
-                    <a:lstStyle/>
-                    <a:p>
-                      <a:pPr latinLnBrk="1"/>
-                      <a:r>
-                        <a:rPr lang="en-US" altLang="ko-KR" sz="1100"/>
-                        <a:t>O625.6</a:t>
-                      </a:r>
-                      <a:endParaRPr lang="ko-KR" altLang="en-US" sz="1100"/>
-                    </a:p>
-                  </a:txBody>
-                  <a:tcPr/>
-                </a:tc>
-                <a:tc>
-                  <a:txBody>
-                    <a:bodyPr/>
-                    <a:lstStyle/>
-                    <a:p>
-                      <a:pPr latinLnBrk="1"/>
-                      <a:r>
-                        <a:rPr lang="en-US" altLang="ko-KR" sz="1100"/>
-                        <a:t>STN01_UsingLIB2_2_-</a:t>
-                      </a:r>
-                      <a:endParaRPr lang="ko-KR" altLang="en-US" sz="1100"/>
-                    </a:p>
-                  </a:txBody>
-                  <a:tcPr/>
-                </a:tc>
-                <a:tc>
-                  <a:txBody>
-                    <a:bodyPr/>
-                    <a:lstStyle/>
-                    <a:p>
-                      <a:pPr latinLnBrk="1"/>
-                      <a:endParaRPr lang="ko-KR" altLang="en-US" sz="1100"/>
-                    </a:p>
-                  </a:txBody>
-                  <a:tcPr/>
-                </a:tc>
-                <a:extLst>
-                  <a:ext uri="{0D108BD9-81ED-4DB2-BD59-A6C34878D82A}">
-                    <a16:rowId xmlns:a16="http://schemas.microsoft.com/office/drawing/2014/main" val="229330752"/>
-                  </a:ext>
-                </a:extLst>
-              </a:tr>
-              <a:tr h="0">
-                <a:tc>
-                  <a:txBody>
-                    <a:bodyPr/>
-                    <a:lstStyle/>
-                    <a:p>
-                      <a:pPr latinLnBrk="1"/>
-                      <a:r>
-                        <a:rPr lang="ko-KR" altLang="en-US" sz="1100"/>
-                        <a:t>외부주소</a:t>
-                      </a:r>
-                    </a:p>
-                  </a:txBody>
-                  <a:tcPr/>
-                </a:tc>
-                <a:tc>
-                  <a:txBody>
-                    <a:bodyPr/>
-                    <a:lstStyle/>
-                    <a:p>
-                      <a:pPr latinLnBrk="1"/>
-                      <a:r>
-                        <a:rPr lang="en-US" altLang="ko-KR" sz="1100" dirty="0"/>
-                        <a:t>STN01_UsingLIB2_3."+"</a:t>
-                      </a:r>
-                      <a:endParaRPr lang="ko-KR" altLang="en-US" sz="1100" dirty="0"/>
-                    </a:p>
-                  </a:txBody>
-                  <a:tcPr/>
-                </a:tc>
-                <a:tc>
-                  <a:txBody>
-                    <a:bodyPr/>
-                    <a:lstStyle/>
-                    <a:p>
-                      <a:pPr latinLnBrk="1"/>
-                      <a:r>
-                        <a:rPr lang="en-US" altLang="ko-KR" sz="1100"/>
-                        <a:t>bool</a:t>
-                      </a:r>
-                      <a:endParaRPr lang="ko-KR" altLang="en-US" sz="1100"/>
-                    </a:p>
-                  </a:txBody>
-                  <a:tcPr/>
-                </a:tc>
-                <a:tc>
-                  <a:txBody>
-                    <a:bodyPr/>
-                    <a:lstStyle/>
-                    <a:p>
-                      <a:pPr latinLnBrk="1"/>
-                      <a:r>
-                        <a:rPr lang="en-US" altLang="ko-KR" sz="1100"/>
-                        <a:t>I625.7</a:t>
-                      </a:r>
-                      <a:endParaRPr lang="ko-KR" altLang="en-US" sz="1100"/>
-                    </a:p>
-                  </a:txBody>
-                  <a:tcPr/>
-                </a:tc>
-                <a:tc>
-                  <a:txBody>
-                    <a:bodyPr/>
-                    <a:lstStyle/>
-                    <a:p>
-                      <a:pPr latinLnBrk="1"/>
-                      <a:r>
-                        <a:rPr lang="en-US" altLang="ko-KR" sz="1100"/>
-                        <a:t>O625.7</a:t>
-                      </a:r>
-                      <a:endParaRPr lang="ko-KR" altLang="en-US" sz="1100"/>
-                    </a:p>
-                  </a:txBody>
-                  <a:tcPr/>
-                </a:tc>
-                <a:tc>
-                  <a:txBody>
-                    <a:bodyPr/>
-                    <a:lstStyle/>
-                    <a:p>
-                      <a:pPr latinLnBrk="1"/>
-                      <a:r>
-                        <a:rPr lang="en-US" altLang="ko-KR" sz="1100"/>
-                        <a:t>STN01_UsingLIB2_3_+</a:t>
-                      </a:r>
-                      <a:endParaRPr lang="ko-KR" altLang="en-US" sz="1100"/>
-                    </a:p>
-                  </a:txBody>
-                  <a:tcPr/>
-                </a:tc>
-                <a:tc>
-                  <a:txBody>
-                    <a:bodyPr/>
-                    <a:lstStyle/>
-                    <a:p>
-                      <a:pPr latinLnBrk="1"/>
-                      <a:endParaRPr lang="ko-KR" altLang="en-US" sz="1100"/>
-                    </a:p>
-                  </a:txBody>
-                  <a:tcPr/>
-                </a:tc>
-                <a:extLst>
-                  <a:ext uri="{0D108BD9-81ED-4DB2-BD59-A6C34878D82A}">
-                    <a16:rowId xmlns:a16="http://schemas.microsoft.com/office/drawing/2014/main" val="1353888088"/>
-                  </a:ext>
-                </a:extLst>
-              </a:tr>
-              <a:tr h="0">
-                <a:tc>
-                  <a:txBody>
-                    <a:bodyPr/>
-                    <a:lstStyle/>
-                    <a:p>
-                      <a:pPr latinLnBrk="1"/>
-                      <a:r>
-                        <a:rPr lang="ko-KR" altLang="en-US" sz="1100"/>
-                        <a:t>외부주소</a:t>
-                      </a:r>
-                    </a:p>
-                  </a:txBody>
-                  <a:tcPr/>
-                </a:tc>
-                <a:tc>
-                  <a:txBody>
-                    <a:bodyPr/>
-                    <a:lstStyle/>
-                    <a:p>
-                      <a:pPr latinLnBrk="1"/>
-                      <a:r>
-                        <a:rPr lang="en-US" altLang="ko-KR" sz="1100"/>
-                        <a:t>STN01_UsingLIB2_3."-"</a:t>
-                      </a:r>
-                      <a:endParaRPr lang="ko-KR" altLang="en-US" sz="1100"/>
-                    </a:p>
-                  </a:txBody>
-                  <a:tcPr/>
-                </a:tc>
-                <a:tc>
-                  <a:txBody>
-                    <a:bodyPr/>
-                    <a:lstStyle/>
-                    <a:p>
-                      <a:pPr latinLnBrk="1"/>
-                      <a:r>
-                        <a:rPr lang="en-US" altLang="ko-KR" sz="1100"/>
-                        <a:t>bool</a:t>
-                      </a:r>
-                      <a:endParaRPr lang="ko-KR" altLang="en-US" sz="1100"/>
-                    </a:p>
-                  </a:txBody>
-                  <a:tcPr/>
-                </a:tc>
-                <a:tc>
-                  <a:txBody>
-                    <a:bodyPr/>
-                    <a:lstStyle/>
-                    <a:p>
-                      <a:pPr latinLnBrk="1"/>
-                      <a:r>
-                        <a:rPr lang="en-US" altLang="ko-KR" sz="1100"/>
-                        <a:t>I625.8</a:t>
-                      </a:r>
-                      <a:endParaRPr lang="ko-KR" altLang="en-US" sz="1100"/>
-                    </a:p>
-                  </a:txBody>
-                  <a:tcPr/>
-                </a:tc>
-                <a:tc>
-                  <a:txBody>
-                    <a:bodyPr/>
-                    <a:lstStyle/>
-                    <a:p>
-                      <a:pPr latinLnBrk="1"/>
-                      <a:r>
-                        <a:rPr lang="en-US" altLang="ko-KR" sz="1100"/>
-                        <a:t>O625.8</a:t>
-                      </a:r>
-                      <a:endParaRPr lang="ko-KR" altLang="en-US" sz="1100"/>
-                    </a:p>
-                  </a:txBody>
-                  <a:tcPr/>
-                </a:tc>
-                <a:tc>
-                  <a:txBody>
-                    <a:bodyPr/>
-                    <a:lstStyle/>
-                    <a:p>
-                      <a:pPr latinLnBrk="1"/>
-                      <a:r>
-                        <a:rPr lang="en-US" altLang="ko-KR" sz="1100"/>
-                        <a:t>STN01_UsingLIB2_3_-</a:t>
-                      </a:r>
-                      <a:endParaRPr lang="ko-KR" altLang="en-US" sz="1100"/>
-                    </a:p>
-                  </a:txBody>
-                  <a:tcPr/>
-                </a:tc>
-                <a:tc>
-                  <a:txBody>
-                    <a:bodyPr/>
-                    <a:lstStyle/>
-                    <a:p>
-                      <a:pPr latinLnBrk="1"/>
-                      <a:endParaRPr lang="ko-KR" altLang="en-US" sz="1100"/>
-                    </a:p>
-                  </a:txBody>
-                  <a:tcPr/>
-                </a:tc>
-                <a:extLst>
-                  <a:ext uri="{0D108BD9-81ED-4DB2-BD59-A6C34878D82A}">
-                    <a16:rowId xmlns:a16="http://schemas.microsoft.com/office/drawing/2014/main" val="2231971222"/>
-                  </a:ext>
-                </a:extLst>
-              </a:tr>
-              <a:tr h="0">
-                <a:tc>
-                  <a:txBody>
-                    <a:bodyPr/>
-                    <a:lstStyle/>
-                    <a:p>
-                      <a:pPr latinLnBrk="1"/>
-                      <a:r>
-                        <a:rPr lang="ko-KR" altLang="en-US" sz="1100"/>
-                        <a:t>외부주소</a:t>
-                      </a:r>
-                    </a:p>
-                  </a:txBody>
-                  <a:tcPr/>
-                </a:tc>
-                <a:tc>
-                  <a:txBody>
-                    <a:bodyPr/>
-                    <a:lstStyle/>
-                    <a:p>
-                      <a:pPr latinLnBrk="1"/>
-                      <a:r>
-                        <a:rPr lang="en-US" altLang="ko-KR" sz="1100"/>
-                        <a:t>STN01_UsingLIB2_4."+"</a:t>
-                      </a:r>
-                      <a:endParaRPr lang="ko-KR" altLang="en-US" sz="1100"/>
-                    </a:p>
-                  </a:txBody>
-                  <a:tcPr/>
-                </a:tc>
-                <a:tc>
-                  <a:txBody>
-                    <a:bodyPr/>
-                    <a:lstStyle/>
-                    <a:p>
-                      <a:pPr latinLnBrk="1"/>
-                      <a:r>
-                        <a:rPr lang="en-US" altLang="ko-KR" sz="1100"/>
-                        <a:t>bool</a:t>
-                      </a:r>
-                      <a:endParaRPr lang="ko-KR" altLang="en-US" sz="1100"/>
-                    </a:p>
-                  </a:txBody>
-                  <a:tcPr/>
-                </a:tc>
-                <a:tc>
-                  <a:txBody>
-                    <a:bodyPr/>
-                    <a:lstStyle/>
-                    <a:p>
-                      <a:pPr latinLnBrk="1"/>
-                      <a:r>
-                        <a:rPr lang="en-US" altLang="ko-KR" sz="1100"/>
-                        <a:t>I625.9</a:t>
-                      </a:r>
-                      <a:endParaRPr lang="ko-KR" altLang="en-US" sz="1100"/>
-                    </a:p>
-                  </a:txBody>
-                  <a:tcPr/>
-                </a:tc>
-                <a:tc>
-                  <a:txBody>
-                    <a:bodyPr/>
-                    <a:lstStyle/>
-                    <a:p>
-                      <a:pPr latinLnBrk="1"/>
-                      <a:r>
-                        <a:rPr lang="en-US" altLang="ko-KR" sz="1100"/>
-                        <a:t>O625.9</a:t>
-                      </a:r>
-                      <a:endParaRPr lang="ko-KR" altLang="en-US" sz="1100"/>
-                    </a:p>
-                  </a:txBody>
-                  <a:tcPr/>
-                </a:tc>
-                <a:tc>
-                  <a:txBody>
-                    <a:bodyPr/>
-                    <a:lstStyle/>
-                    <a:p>
-                      <a:pPr latinLnBrk="1"/>
-                      <a:r>
-                        <a:rPr lang="en-US" altLang="ko-KR" sz="1100"/>
-                        <a:t>STN01_UsingLIB2_4_+</a:t>
-                      </a:r>
-                      <a:endParaRPr lang="ko-KR" altLang="en-US" sz="1100"/>
-                    </a:p>
-                  </a:txBody>
-                  <a:tcPr/>
-                </a:tc>
-                <a:tc>
-                  <a:txBody>
-                    <a:bodyPr/>
-                    <a:lstStyle/>
-                    <a:p>
-                      <a:pPr latinLnBrk="1"/>
-                      <a:endParaRPr lang="ko-KR" altLang="en-US" sz="1100"/>
-                    </a:p>
-                  </a:txBody>
-                  <a:tcPr/>
-                </a:tc>
-                <a:extLst>
-                  <a:ext uri="{0D108BD9-81ED-4DB2-BD59-A6C34878D82A}">
-                    <a16:rowId xmlns:a16="http://schemas.microsoft.com/office/drawing/2014/main" val="767962007"/>
-                  </a:ext>
-                </a:extLst>
-              </a:tr>
-              <a:tr h="0">
-                <a:tc>
-                  <a:txBody>
-                    <a:bodyPr/>
-                    <a:lstStyle/>
-                    <a:p>
-                      <a:pPr latinLnBrk="1"/>
-                      <a:r>
-                        <a:rPr lang="ko-KR" altLang="en-US" sz="1100"/>
-                        <a:t>외부주소</a:t>
-                      </a:r>
-                    </a:p>
-                  </a:txBody>
-                  <a:tcPr/>
-                </a:tc>
-                <a:tc>
-                  <a:txBody>
-                    <a:bodyPr/>
-                    <a:lstStyle/>
-                    <a:p>
-                      <a:pPr latinLnBrk="1"/>
-                      <a:r>
-                        <a:rPr lang="en-US" altLang="ko-KR" sz="1100"/>
-                        <a:t>STN01_UsingLIB2_4."-"</a:t>
-                      </a:r>
-                      <a:endParaRPr lang="ko-KR" altLang="en-US" sz="1100"/>
-                    </a:p>
-                  </a:txBody>
-                  <a:tcPr/>
-                </a:tc>
-                <a:tc>
-                  <a:txBody>
-                    <a:bodyPr/>
-                    <a:lstStyle/>
-                    <a:p>
-                      <a:pPr latinLnBrk="1"/>
-                      <a:r>
-                        <a:rPr lang="en-US" altLang="ko-KR" sz="1100"/>
-                        <a:t>bool</a:t>
-                      </a:r>
-                      <a:endParaRPr lang="ko-KR" altLang="en-US" sz="1100"/>
-                    </a:p>
-                  </a:txBody>
-                  <a:tcPr/>
-                </a:tc>
-                <a:tc>
-                  <a:txBody>
-                    <a:bodyPr/>
-                    <a:lstStyle/>
-                    <a:p>
-                      <a:pPr latinLnBrk="1"/>
-                      <a:r>
-                        <a:rPr lang="en-US" altLang="ko-KR" sz="1100"/>
-                        <a:t>I625.10</a:t>
-                      </a:r>
-                      <a:endParaRPr lang="ko-KR" altLang="en-US" sz="1100"/>
-                    </a:p>
-                  </a:txBody>
-                  <a:tcPr/>
-                </a:tc>
-                <a:tc>
-                  <a:txBody>
-                    <a:bodyPr/>
-                    <a:lstStyle/>
-                    <a:p>
-                      <a:pPr latinLnBrk="1"/>
-                      <a:r>
-                        <a:rPr lang="en-US" altLang="ko-KR" sz="1100"/>
-                        <a:t>O625.10</a:t>
-                      </a:r>
-                      <a:endParaRPr lang="ko-KR" altLang="en-US" sz="1100"/>
-                    </a:p>
-                  </a:txBody>
-                  <a:tcPr/>
-                </a:tc>
-                <a:tc>
-                  <a:txBody>
-                    <a:bodyPr/>
-                    <a:lstStyle/>
-                    <a:p>
-                      <a:pPr latinLnBrk="1"/>
-                      <a:r>
-                        <a:rPr lang="en-US" altLang="ko-KR" sz="1100"/>
-                        <a:t>STN01_UsingLIB2_4_-</a:t>
-                      </a:r>
-                      <a:endParaRPr lang="ko-KR" altLang="en-US" sz="1100"/>
-                    </a:p>
-                  </a:txBody>
-                  <a:tcPr/>
-                </a:tc>
-                <a:tc>
-                  <a:txBody>
-                    <a:bodyPr/>
-                    <a:lstStyle/>
-                    <a:p>
-                      <a:pPr latinLnBrk="1"/>
-                      <a:endParaRPr lang="ko-KR" altLang="en-US" sz="1100"/>
-                    </a:p>
-                  </a:txBody>
-                  <a:tcPr/>
-                </a:tc>
-                <a:extLst>
-                  <a:ext uri="{0D108BD9-81ED-4DB2-BD59-A6C34878D82A}">
-                    <a16:rowId xmlns:a16="http://schemas.microsoft.com/office/drawing/2014/main" val="3885855682"/>
-                  </a:ext>
-                </a:extLst>
-              </a:tr>
-              <a:tr h="0">
-                <a:tc>
-                  <a:txBody>
-                    <a:bodyPr/>
-                    <a:lstStyle/>
-                    <a:p>
-                      <a:pPr latinLnBrk="1"/>
-                      <a:r>
-                        <a:rPr lang="ko-KR" altLang="en-US" sz="1100"/>
-                        <a:t>외부주소</a:t>
-                      </a:r>
-                    </a:p>
-                  </a:txBody>
-                  <a:tcPr/>
-                </a:tc>
-                <a:tc>
-                  <a:txBody>
-                    <a:bodyPr/>
-                    <a:lstStyle/>
-                    <a:p>
-                      <a:pPr latinLnBrk="1"/>
-                      <a:r>
-                        <a:rPr lang="en-US" altLang="ko-KR" sz="1100"/>
-                        <a:t>STN01_UsingLIB_1."+"</a:t>
-                      </a:r>
-                      <a:endParaRPr lang="ko-KR" altLang="en-US" sz="1100"/>
-                    </a:p>
-                  </a:txBody>
-                  <a:tcPr/>
-                </a:tc>
-                <a:tc>
-                  <a:txBody>
-                    <a:bodyPr/>
-                    <a:lstStyle/>
-                    <a:p>
-                      <a:pPr latinLnBrk="1"/>
-                      <a:r>
-                        <a:rPr lang="en-US" altLang="ko-KR" sz="1100"/>
-                        <a:t>bool</a:t>
-                      </a:r>
-                      <a:endParaRPr lang="ko-KR" altLang="en-US" sz="1100"/>
-                    </a:p>
-                  </a:txBody>
-                  <a:tcPr/>
-                </a:tc>
-                <a:tc>
-                  <a:txBody>
-                    <a:bodyPr/>
-                    <a:lstStyle/>
-                    <a:p>
-                      <a:pPr latinLnBrk="1"/>
-                      <a:r>
-                        <a:rPr lang="en-US" altLang="ko-KR" sz="1100"/>
-                        <a:t>I625.11</a:t>
-                      </a:r>
-                      <a:endParaRPr lang="ko-KR" altLang="en-US" sz="1100"/>
-                    </a:p>
-                  </a:txBody>
-                  <a:tcPr/>
-                </a:tc>
-                <a:tc>
-                  <a:txBody>
-                    <a:bodyPr/>
-                    <a:lstStyle/>
-                    <a:p>
-                      <a:pPr latinLnBrk="1"/>
-                      <a:r>
-                        <a:rPr lang="en-US" altLang="ko-KR" sz="1100"/>
-                        <a:t>O625.11</a:t>
-                      </a:r>
-                      <a:endParaRPr lang="ko-KR" altLang="en-US" sz="1100"/>
-                    </a:p>
-                  </a:txBody>
-                  <a:tcPr/>
-                </a:tc>
-                <a:tc>
-                  <a:txBody>
-                    <a:bodyPr/>
-                    <a:lstStyle/>
-                    <a:p>
-                      <a:pPr latinLnBrk="1"/>
-                      <a:r>
-                        <a:rPr lang="en-US" altLang="ko-KR" sz="1100"/>
-                        <a:t>STN01_UsingLIB_1_+</a:t>
-                      </a:r>
-                      <a:endParaRPr lang="ko-KR" altLang="en-US" sz="1100"/>
-                    </a:p>
-                  </a:txBody>
-                  <a:tcPr/>
-                </a:tc>
-                <a:tc>
-                  <a:txBody>
-                    <a:bodyPr/>
-                    <a:lstStyle/>
-                    <a:p>
-                      <a:pPr latinLnBrk="1"/>
-                      <a:endParaRPr lang="ko-KR" altLang="en-US" sz="1100"/>
-                    </a:p>
-                  </a:txBody>
-                  <a:tcPr/>
-                </a:tc>
-                <a:extLst>
-                  <a:ext uri="{0D108BD9-81ED-4DB2-BD59-A6C34878D82A}">
-                    <a16:rowId xmlns:a16="http://schemas.microsoft.com/office/drawing/2014/main" val="3254289481"/>
-                  </a:ext>
-                </a:extLst>
-              </a:tr>
-              <a:tr h="0">
-                <a:tc>
-                  <a:txBody>
-                    <a:bodyPr/>
-                    <a:lstStyle/>
-                    <a:p>
-                      <a:pPr latinLnBrk="1"/>
-                      <a:r>
-                        <a:rPr lang="ko-KR" altLang="en-US" sz="1100"/>
-                        <a:t>외부주소</a:t>
-                      </a:r>
-                    </a:p>
-                  </a:txBody>
-                  <a:tcPr/>
-                </a:tc>
-                <a:tc>
-                  <a:txBody>
-                    <a:bodyPr/>
-                    <a:lstStyle/>
-                    <a:p>
-                      <a:pPr latinLnBrk="1"/>
-                      <a:r>
-                        <a:rPr lang="en-US" altLang="ko-KR" sz="1100"/>
-                        <a:t>STN01_UsingLIB_1."-"</a:t>
-                      </a:r>
-                      <a:endParaRPr lang="ko-KR" altLang="en-US" sz="1100"/>
-                    </a:p>
-                  </a:txBody>
-                  <a:tcPr/>
-                </a:tc>
-                <a:tc>
-                  <a:txBody>
-                    <a:bodyPr/>
-                    <a:lstStyle/>
-                    <a:p>
-                      <a:pPr latinLnBrk="1"/>
-                      <a:r>
-                        <a:rPr lang="en-US" altLang="ko-KR" sz="1100" dirty="0"/>
-                        <a:t>bool</a:t>
-                      </a:r>
-                      <a:endParaRPr lang="ko-KR" altLang="en-US" sz="1100" dirty="0"/>
-                    </a:p>
-                  </a:txBody>
-                  <a:tcPr/>
-                </a:tc>
-                <a:tc>
-                  <a:txBody>
-                    <a:bodyPr/>
-                    <a:lstStyle/>
-                    <a:p>
-                      <a:pPr latinLnBrk="1"/>
-                      <a:r>
-                        <a:rPr lang="en-US" altLang="ko-KR" sz="1100"/>
-                        <a:t>I625.12</a:t>
-                      </a:r>
-                      <a:endParaRPr lang="ko-KR" altLang="en-US" sz="1100"/>
-                    </a:p>
-                  </a:txBody>
-                  <a:tcPr/>
-                </a:tc>
-                <a:tc>
-                  <a:txBody>
-                    <a:bodyPr/>
-                    <a:lstStyle/>
-                    <a:p>
-                      <a:pPr latinLnBrk="1"/>
-                      <a:r>
-                        <a:rPr lang="en-US" altLang="ko-KR" sz="1100"/>
-                        <a:t>O625.12</a:t>
-                      </a:r>
-                      <a:endParaRPr lang="ko-KR" altLang="en-US" sz="1100"/>
-                    </a:p>
-                  </a:txBody>
-                  <a:tcPr/>
-                </a:tc>
-                <a:tc>
-                  <a:txBody>
-                    <a:bodyPr/>
-                    <a:lstStyle/>
-                    <a:p>
-                      <a:pPr latinLnBrk="1"/>
-                      <a:r>
-                        <a:rPr lang="en-US" altLang="ko-KR" sz="1100"/>
-                        <a:t>STN01_UsingLIB_1_-</a:t>
-                      </a:r>
-                      <a:endParaRPr lang="ko-KR" altLang="en-US" sz="1100"/>
-                    </a:p>
-                  </a:txBody>
-                  <a:tcPr/>
-                </a:tc>
-                <a:tc>
-                  <a:txBody>
-                    <a:bodyPr/>
-                    <a:lstStyle/>
-                    <a:p>
-                      <a:pPr latinLnBrk="1"/>
-                      <a:endParaRPr lang="ko-KR" altLang="en-US" sz="1100"/>
-                    </a:p>
-                  </a:txBody>
-                  <a:tcPr/>
-                </a:tc>
-                <a:extLst>
-                  <a:ext uri="{0D108BD9-81ED-4DB2-BD59-A6C34878D82A}">
-                    <a16:rowId xmlns:a16="http://schemas.microsoft.com/office/drawing/2014/main" val="2492755005"/>
-                  </a:ext>
-                </a:extLst>
-              </a:tr>
-              <a:tr h="0">
-                <a:tc>
-                  <a:txBody>
-                    <a:bodyPr/>
-                    <a:lstStyle/>
-                    <a:p>
-                      <a:pPr latinLnBrk="1"/>
-                      <a:r>
-                        <a:rPr lang="ko-KR" altLang="en-US" sz="1100"/>
-                        <a:t>외부주소</a:t>
-                      </a:r>
-                    </a:p>
-                  </a:txBody>
-                  <a:tcPr/>
-                </a:tc>
-                <a:tc>
-                  <a:txBody>
-                    <a:bodyPr/>
-                    <a:lstStyle/>
-                    <a:p>
-                      <a:pPr latinLnBrk="1"/>
-                      <a:r>
-                        <a:rPr lang="en-US" altLang="ko-KR" sz="1100"/>
-                        <a:t>STN01_UsingLIB_2."+"</a:t>
-                      </a:r>
-                      <a:endParaRPr lang="ko-KR" altLang="en-US" sz="1100"/>
-                    </a:p>
-                  </a:txBody>
-                  <a:tcPr/>
-                </a:tc>
-                <a:tc>
-                  <a:txBody>
-                    <a:bodyPr/>
-                    <a:lstStyle/>
-                    <a:p>
-                      <a:pPr latinLnBrk="1"/>
-                      <a:r>
-                        <a:rPr lang="en-US" altLang="ko-KR" sz="1100"/>
-                        <a:t>bool</a:t>
-                      </a:r>
-                      <a:endParaRPr lang="ko-KR" altLang="en-US" sz="1100"/>
-                    </a:p>
-                  </a:txBody>
-                  <a:tcPr/>
-                </a:tc>
-                <a:tc>
-                  <a:txBody>
-                    <a:bodyPr/>
-                    <a:lstStyle/>
-                    <a:p>
-                      <a:pPr latinLnBrk="1"/>
-                      <a:r>
-                        <a:rPr lang="en-US" altLang="ko-KR" sz="1100"/>
-                        <a:t>I625.13</a:t>
-                      </a:r>
-                      <a:endParaRPr lang="ko-KR" altLang="en-US" sz="1100"/>
-                    </a:p>
-                  </a:txBody>
-                  <a:tcPr/>
-                </a:tc>
-                <a:tc>
-                  <a:txBody>
-                    <a:bodyPr/>
-                    <a:lstStyle/>
-                    <a:p>
-                      <a:pPr latinLnBrk="1"/>
-                      <a:r>
-                        <a:rPr lang="en-US" altLang="ko-KR" sz="1100"/>
-                        <a:t>O625.13</a:t>
-                      </a:r>
-                      <a:endParaRPr lang="ko-KR" altLang="en-US" sz="1100"/>
-                    </a:p>
-                  </a:txBody>
-                  <a:tcPr/>
-                </a:tc>
-                <a:tc>
-                  <a:txBody>
-                    <a:bodyPr/>
-                    <a:lstStyle/>
-                    <a:p>
-                      <a:pPr latinLnBrk="1"/>
-                      <a:r>
-                        <a:rPr lang="en-US" altLang="ko-KR" sz="1100"/>
-                        <a:t>STN01_UsingLIB_2_+</a:t>
-                      </a:r>
-                      <a:endParaRPr lang="ko-KR" altLang="en-US" sz="1100"/>
-                    </a:p>
-                  </a:txBody>
-                  <a:tcPr/>
-                </a:tc>
-                <a:tc>
-                  <a:txBody>
-                    <a:bodyPr/>
-                    <a:lstStyle/>
-                    <a:p>
-                      <a:pPr latinLnBrk="1"/>
-                      <a:endParaRPr lang="ko-KR" altLang="en-US" sz="1100"/>
-                    </a:p>
-                  </a:txBody>
-                  <a:tcPr/>
-                </a:tc>
-                <a:extLst>
-                  <a:ext uri="{0D108BD9-81ED-4DB2-BD59-A6C34878D82A}">
-                    <a16:rowId xmlns:a16="http://schemas.microsoft.com/office/drawing/2014/main" val="1941799077"/>
-                  </a:ext>
-                </a:extLst>
-              </a:tr>
-              <a:tr h="0">
-                <a:tc>
-                  <a:txBody>
-                    <a:bodyPr/>
-                    <a:lstStyle/>
-                    <a:p>
-                      <a:pPr latinLnBrk="1"/>
-                      <a:r>
-                        <a:rPr lang="ko-KR" altLang="en-US" sz="1100"/>
-                        <a:t>외부주소</a:t>
-                      </a:r>
-                    </a:p>
-                  </a:txBody>
-                  <a:tcPr/>
-                </a:tc>
-                <a:tc>
-                  <a:txBody>
-                    <a:bodyPr/>
-                    <a:lstStyle/>
-                    <a:p>
-                      <a:pPr latinLnBrk="1"/>
-                      <a:r>
-                        <a:rPr lang="en-US" altLang="ko-KR" sz="1100"/>
-                        <a:t>STN01_UsingLIB_2."-"</a:t>
-                      </a:r>
-                      <a:endParaRPr lang="ko-KR" altLang="en-US" sz="1100"/>
-                    </a:p>
-                  </a:txBody>
-                  <a:tcPr/>
-                </a:tc>
-                <a:tc>
-                  <a:txBody>
-                    <a:bodyPr/>
-                    <a:lstStyle/>
-                    <a:p>
-                      <a:pPr latinLnBrk="1"/>
-                      <a:r>
-                        <a:rPr lang="en-US" altLang="ko-KR" sz="1100"/>
-                        <a:t>bool</a:t>
-                      </a:r>
-                      <a:endParaRPr lang="ko-KR" altLang="en-US" sz="1100"/>
-                    </a:p>
-                  </a:txBody>
-                  <a:tcPr/>
-                </a:tc>
-                <a:tc>
-                  <a:txBody>
-                    <a:bodyPr/>
-                    <a:lstStyle/>
-                    <a:p>
-                      <a:pPr latinLnBrk="1"/>
-                      <a:r>
-                        <a:rPr lang="en-US" altLang="ko-KR" sz="1100"/>
-                        <a:t>I625.14</a:t>
-                      </a:r>
-                      <a:endParaRPr lang="ko-KR" altLang="en-US" sz="1100"/>
-                    </a:p>
-                  </a:txBody>
-                  <a:tcPr/>
-                </a:tc>
-                <a:tc>
-                  <a:txBody>
-                    <a:bodyPr/>
-                    <a:lstStyle/>
-                    <a:p>
-                      <a:pPr latinLnBrk="1"/>
-                      <a:r>
-                        <a:rPr lang="en-US" altLang="ko-KR" sz="1100"/>
-                        <a:t>O625.14</a:t>
-                      </a:r>
-                      <a:endParaRPr lang="ko-KR" altLang="en-US" sz="1100"/>
-                    </a:p>
-                  </a:txBody>
-                  <a:tcPr/>
-                </a:tc>
-                <a:tc>
-                  <a:txBody>
-                    <a:bodyPr/>
-                    <a:lstStyle/>
-                    <a:p>
-                      <a:pPr latinLnBrk="1"/>
-                      <a:r>
-                        <a:rPr lang="en-US" altLang="ko-KR" sz="1100"/>
-                        <a:t>STN01_UsingLIB_2_-</a:t>
-                      </a:r>
-                      <a:endParaRPr lang="ko-KR" altLang="en-US" sz="1100"/>
-                    </a:p>
-                  </a:txBody>
-                  <a:tcPr/>
-                </a:tc>
-                <a:tc>
-                  <a:txBody>
-                    <a:bodyPr/>
-                    <a:lstStyle/>
-                    <a:p>
-                      <a:pPr latinLnBrk="1"/>
-                      <a:endParaRPr lang="ko-KR" altLang="en-US" sz="1100"/>
-                    </a:p>
-                  </a:txBody>
-                  <a:tcPr/>
-                </a:tc>
-                <a:extLst>
-                  <a:ext uri="{0D108BD9-81ED-4DB2-BD59-A6C34878D82A}">
-                    <a16:rowId xmlns:a16="http://schemas.microsoft.com/office/drawing/2014/main" val="1333376853"/>
-                  </a:ext>
-                </a:extLst>
-              </a:tr>
-              <a:tr h="0">
-                <a:tc>
-                  <a:txBody>
-                    <a:bodyPr/>
-                    <a:lstStyle/>
-                    <a:p>
-                      <a:pPr latinLnBrk="1"/>
-                      <a:endParaRPr lang="ko-KR" altLang="en-US" sz="1100"/>
-                    </a:p>
-                  </a:txBody>
-                  <a:tcPr/>
-                </a:tc>
-                <a:tc>
-                  <a:txBody>
-                    <a:bodyPr/>
-                    <a:lstStyle/>
-                    <a:p>
-                      <a:pPr latinLnBrk="1"/>
-                      <a:endParaRPr lang="ko-KR" altLang="en-US" sz="1100"/>
-                    </a:p>
-                  </a:txBody>
-                  <a:tcPr/>
-                </a:tc>
-                <a:tc>
-                  <a:txBody>
-                    <a:bodyPr/>
-                    <a:lstStyle/>
-                    <a:p>
-                      <a:pPr latinLnBrk="1"/>
-                      <a:endParaRPr lang="ko-KR" altLang="en-US" sz="1100"/>
-                    </a:p>
-                  </a:txBody>
-                  <a:tcPr/>
-                </a:tc>
-                <a:tc>
-                  <a:txBody>
-                    <a:bodyPr/>
-                    <a:lstStyle/>
-                    <a:p>
-                      <a:pPr latinLnBrk="1"/>
-                      <a:endParaRPr lang="ko-KR" altLang="en-US" sz="1100"/>
-                    </a:p>
-                  </a:txBody>
-                  <a:tcPr/>
-                </a:tc>
-                <a:tc>
-                  <a:txBody>
-                    <a:bodyPr/>
-                    <a:lstStyle/>
-                    <a:p>
-                      <a:pPr latinLnBrk="1"/>
-                      <a:endParaRPr lang="ko-KR" altLang="en-US" sz="1100"/>
-                    </a:p>
-                  </a:txBody>
-                  <a:tcPr/>
-                </a:tc>
-                <a:tc>
-                  <a:txBody>
-                    <a:bodyPr/>
-                    <a:lstStyle/>
-                    <a:p>
-                      <a:pPr latinLnBrk="1"/>
-                      <a:endParaRPr lang="ko-KR" altLang="en-US" sz="1100"/>
-                    </a:p>
-                  </a:txBody>
-                  <a:tcPr/>
-                </a:tc>
-                <a:tc>
-                  <a:txBody>
-                    <a:bodyPr/>
-                    <a:lstStyle/>
-                    <a:p>
-                      <a:pPr latinLnBrk="1"/>
-                      <a:endParaRPr lang="ko-KR" altLang="en-US" sz="1100"/>
-                    </a:p>
-                  </a:txBody>
-                  <a:tcPr/>
-                </a:tc>
-                <a:extLst>
-                  <a:ext uri="{0D108BD9-81ED-4DB2-BD59-A6C34878D82A}">
-                    <a16:rowId xmlns:a16="http://schemas.microsoft.com/office/drawing/2014/main" val="389928861"/>
-                  </a:ext>
-                </a:extLst>
-              </a:tr>
-              <a:tr h="0">
-                <a:tc>
-                  <a:txBody>
-                    <a:bodyPr/>
-                    <a:lstStyle/>
-                    <a:p>
-                      <a:pPr latinLnBrk="1"/>
-                      <a:endParaRPr lang="ko-KR" altLang="en-US" sz="1100"/>
-                    </a:p>
-                  </a:txBody>
-                  <a:tcPr/>
-                </a:tc>
-                <a:tc>
-                  <a:txBody>
-                    <a:bodyPr/>
-                    <a:lstStyle/>
-                    <a:p>
-                      <a:pPr latinLnBrk="1"/>
-                      <a:endParaRPr lang="ko-KR" altLang="en-US" sz="1100"/>
-                    </a:p>
-                  </a:txBody>
-                  <a:tcPr/>
-                </a:tc>
-                <a:tc>
-                  <a:txBody>
-                    <a:bodyPr/>
-                    <a:lstStyle/>
-                    <a:p>
-                      <a:pPr latinLnBrk="1"/>
-                      <a:endParaRPr lang="ko-KR" altLang="en-US" sz="1100"/>
-                    </a:p>
-                  </a:txBody>
-                  <a:tcPr/>
-                </a:tc>
-                <a:tc>
-                  <a:txBody>
-                    <a:bodyPr/>
-                    <a:lstStyle/>
-                    <a:p>
-                      <a:pPr latinLnBrk="1"/>
-                      <a:endParaRPr lang="ko-KR" altLang="en-US" sz="1100"/>
-                    </a:p>
-                  </a:txBody>
-                  <a:tcPr/>
-                </a:tc>
-                <a:tc>
-                  <a:txBody>
-                    <a:bodyPr/>
-                    <a:lstStyle/>
-                    <a:p>
-                      <a:pPr latinLnBrk="1"/>
-                      <a:endParaRPr lang="ko-KR" altLang="en-US" sz="1100"/>
-                    </a:p>
-                  </a:txBody>
-                  <a:tcPr/>
-                </a:tc>
-                <a:tc>
-                  <a:txBody>
-                    <a:bodyPr/>
-                    <a:lstStyle/>
-                    <a:p>
-                      <a:pPr latinLnBrk="1"/>
-                      <a:endParaRPr lang="ko-KR" altLang="en-US" sz="1100"/>
-                    </a:p>
-                  </a:txBody>
-                  <a:tcPr/>
-                </a:tc>
-                <a:tc>
-                  <a:txBody>
-                    <a:bodyPr/>
-                    <a:lstStyle/>
-                    <a:p>
-                      <a:pPr latinLnBrk="1"/>
-                      <a:endParaRPr lang="ko-KR" altLang="en-US" sz="1100"/>
-                    </a:p>
-                  </a:txBody>
-                  <a:tcPr/>
-                </a:tc>
-                <a:extLst>
-                  <a:ext uri="{0D108BD9-81ED-4DB2-BD59-A6C34878D82A}">
-                    <a16:rowId xmlns:a16="http://schemas.microsoft.com/office/drawing/2014/main" val="3504586823"/>
-                  </a:ext>
-                </a:extLst>
-              </a:tr>
-              <a:tr h="0">
-                <a:tc>
-                  <a:txBody>
-                    <a:bodyPr/>
-                    <a:lstStyle/>
-                    <a:p>
-                      <a:pPr latinLnBrk="1"/>
-                      <a:endParaRPr lang="ko-KR" altLang="en-US" sz="1100"/>
-                    </a:p>
-                  </a:txBody>
-                  <a:tcPr/>
-                </a:tc>
-                <a:tc>
-                  <a:txBody>
-                    <a:bodyPr/>
-                    <a:lstStyle/>
-                    <a:p>
-                      <a:pPr latinLnBrk="1"/>
-                      <a:endParaRPr lang="ko-KR" altLang="en-US" sz="1100"/>
-                    </a:p>
-                  </a:txBody>
-                  <a:tcPr/>
-                </a:tc>
-                <a:tc>
-                  <a:txBody>
-                    <a:bodyPr/>
-                    <a:lstStyle/>
-                    <a:p>
-                      <a:pPr latinLnBrk="1"/>
-                      <a:endParaRPr lang="ko-KR" altLang="en-US" sz="1100"/>
-                    </a:p>
-                  </a:txBody>
-                  <a:tcPr/>
-                </a:tc>
-                <a:tc>
-                  <a:txBody>
-                    <a:bodyPr/>
-                    <a:lstStyle/>
-                    <a:p>
-                      <a:pPr latinLnBrk="1"/>
-                      <a:endParaRPr lang="ko-KR" altLang="en-US" sz="1100"/>
-                    </a:p>
-                  </a:txBody>
-                  <a:tcPr/>
-                </a:tc>
-                <a:tc>
-                  <a:txBody>
-                    <a:bodyPr/>
-                    <a:lstStyle/>
-                    <a:p>
-                      <a:pPr latinLnBrk="1"/>
-                      <a:endParaRPr lang="ko-KR" altLang="en-US" sz="1100"/>
-                    </a:p>
-                  </a:txBody>
-                  <a:tcPr/>
-                </a:tc>
-                <a:tc>
-                  <a:txBody>
-                    <a:bodyPr/>
-                    <a:lstStyle/>
-                    <a:p>
-                      <a:pPr latinLnBrk="1"/>
-                      <a:endParaRPr lang="ko-KR" altLang="en-US" sz="1100"/>
-                    </a:p>
-                  </a:txBody>
-                  <a:tcPr/>
-                </a:tc>
-                <a:tc>
-                  <a:txBody>
-                    <a:bodyPr/>
-                    <a:lstStyle/>
-                    <a:p>
-                      <a:pPr latinLnBrk="1"/>
-                      <a:endParaRPr lang="ko-KR" altLang="en-US" sz="1100"/>
-                    </a:p>
-                  </a:txBody>
-                  <a:tcPr/>
-                </a:tc>
-                <a:extLst>
-                  <a:ext uri="{0D108BD9-81ED-4DB2-BD59-A6C34878D82A}">
-                    <a16:rowId xmlns:a16="http://schemas.microsoft.com/office/drawing/2014/main" val="2985985298"/>
-                  </a:ext>
-                </a:extLst>
-              </a:tr>
-              <a:tr h="0">
-                <a:tc>
-                  <a:txBody>
-                    <a:bodyPr/>
-                    <a:lstStyle/>
-                    <a:p>
-                      <a:pPr latinLnBrk="1"/>
-                      <a:endParaRPr lang="ko-KR" altLang="en-US" sz="1100"/>
-                    </a:p>
-                  </a:txBody>
-                  <a:tcPr/>
-                </a:tc>
-                <a:tc>
-                  <a:txBody>
-                    <a:bodyPr/>
-                    <a:lstStyle/>
-                    <a:p>
-                      <a:pPr latinLnBrk="1"/>
-                      <a:endParaRPr lang="ko-KR" altLang="en-US" sz="1100"/>
-                    </a:p>
-                  </a:txBody>
-                  <a:tcPr/>
-                </a:tc>
-                <a:tc>
-                  <a:txBody>
-                    <a:bodyPr/>
-                    <a:lstStyle/>
-                    <a:p>
-                      <a:pPr latinLnBrk="1"/>
-                      <a:endParaRPr lang="ko-KR" altLang="en-US" sz="1100"/>
-                    </a:p>
-                  </a:txBody>
-                  <a:tcPr/>
-                </a:tc>
-                <a:tc>
-                  <a:txBody>
-                    <a:bodyPr/>
-                    <a:lstStyle/>
-                    <a:p>
-                      <a:pPr latinLnBrk="1"/>
-                      <a:endParaRPr lang="ko-KR" altLang="en-US" sz="1100"/>
-                    </a:p>
-                  </a:txBody>
-                  <a:tcPr/>
-                </a:tc>
-                <a:tc>
-                  <a:txBody>
-                    <a:bodyPr/>
-                    <a:lstStyle/>
-                    <a:p>
-                      <a:pPr latinLnBrk="1"/>
-                      <a:endParaRPr lang="ko-KR" altLang="en-US" sz="1100"/>
-                    </a:p>
-                  </a:txBody>
-                  <a:tcPr/>
-                </a:tc>
-                <a:tc>
-                  <a:txBody>
-                    <a:bodyPr/>
-                    <a:lstStyle/>
-                    <a:p>
-                      <a:pPr latinLnBrk="1"/>
-                      <a:endParaRPr lang="ko-KR" altLang="en-US" sz="1100"/>
-                    </a:p>
-                  </a:txBody>
-                  <a:tcPr/>
-                </a:tc>
-                <a:tc>
-                  <a:txBody>
-                    <a:bodyPr/>
-                    <a:lstStyle/>
-                    <a:p>
-                      <a:pPr latinLnBrk="1"/>
-                      <a:endParaRPr lang="ko-KR" altLang="en-US" sz="1100"/>
-                    </a:p>
-                  </a:txBody>
-                  <a:tcPr/>
-                </a:tc>
-                <a:extLst>
-                  <a:ext uri="{0D108BD9-81ED-4DB2-BD59-A6C34878D82A}">
-                    <a16:rowId xmlns:a16="http://schemas.microsoft.com/office/drawing/2014/main" val="1096835016"/>
-                  </a:ext>
-                </a:extLst>
-              </a:tr>
-              <a:tr h="0">
-                <a:tc>
-                  <a:txBody>
-                    <a:bodyPr/>
-                    <a:lstStyle/>
-                    <a:p>
-                      <a:pPr latinLnBrk="1"/>
-                      <a:endParaRPr lang="ko-KR" altLang="en-US" sz="1100"/>
-                    </a:p>
-                  </a:txBody>
-                  <a:tcPr/>
-                </a:tc>
-                <a:tc>
-                  <a:txBody>
-                    <a:bodyPr/>
-                    <a:lstStyle/>
-                    <a:p>
-                      <a:pPr latinLnBrk="1"/>
-                      <a:endParaRPr lang="ko-KR" altLang="en-US" sz="1100"/>
-                    </a:p>
-                  </a:txBody>
-                  <a:tcPr/>
-                </a:tc>
-                <a:tc>
-                  <a:txBody>
-                    <a:bodyPr/>
-                    <a:lstStyle/>
-                    <a:p>
-                      <a:pPr latinLnBrk="1"/>
-                      <a:endParaRPr lang="ko-KR" altLang="en-US" sz="1100"/>
-                    </a:p>
-                  </a:txBody>
-                  <a:tcPr/>
-                </a:tc>
-                <a:tc>
-                  <a:txBody>
-                    <a:bodyPr/>
-                    <a:lstStyle/>
-                    <a:p>
-                      <a:pPr latinLnBrk="1"/>
-                      <a:endParaRPr lang="ko-KR" altLang="en-US" sz="1100"/>
-                    </a:p>
-                  </a:txBody>
-                  <a:tcPr/>
-                </a:tc>
-                <a:tc>
-                  <a:txBody>
-                    <a:bodyPr/>
-                    <a:lstStyle/>
-                    <a:p>
-                      <a:pPr latinLnBrk="1"/>
-                      <a:endParaRPr lang="ko-KR" altLang="en-US" sz="1100"/>
-                    </a:p>
-                  </a:txBody>
-                  <a:tcPr/>
-                </a:tc>
-                <a:tc>
-                  <a:txBody>
-                    <a:bodyPr/>
-                    <a:lstStyle/>
-                    <a:p>
-                      <a:pPr latinLnBrk="1"/>
-                      <a:endParaRPr lang="ko-KR" altLang="en-US" sz="1100"/>
-                    </a:p>
-                  </a:txBody>
-                  <a:tcPr/>
-                </a:tc>
-                <a:tc>
-                  <a:txBody>
-                    <a:bodyPr/>
-                    <a:lstStyle/>
-                    <a:p>
-                      <a:pPr latinLnBrk="1"/>
-                      <a:endParaRPr lang="ko-KR" altLang="en-US" sz="1100"/>
-                    </a:p>
-                  </a:txBody>
-                  <a:tcPr/>
-                </a:tc>
-                <a:extLst>
-                  <a:ext uri="{0D108BD9-81ED-4DB2-BD59-A6C34878D82A}">
-                    <a16:rowId xmlns:a16="http://schemas.microsoft.com/office/drawing/2014/main" val="2274652905"/>
-                  </a:ext>
-                </a:extLst>
-              </a:tr>
-              <a:tr h="0">
-                <a:tc>
-                  <a:txBody>
-                    <a:bodyPr/>
-                    <a:lstStyle/>
-                    <a:p>
-                      <a:pPr latinLnBrk="1"/>
-                      <a:endParaRPr lang="ko-KR" altLang="en-US" sz="1100"/>
-                    </a:p>
-                  </a:txBody>
-                  <a:tcPr/>
-                </a:tc>
-                <a:tc>
-                  <a:txBody>
-                    <a:bodyPr/>
-                    <a:lstStyle/>
-                    <a:p>
-                      <a:pPr latinLnBrk="1"/>
-                      <a:endParaRPr lang="ko-KR" altLang="en-US" sz="1100"/>
-                    </a:p>
-                  </a:txBody>
-                  <a:tcPr/>
-                </a:tc>
-                <a:tc>
-                  <a:txBody>
-                    <a:bodyPr/>
-                    <a:lstStyle/>
-                    <a:p>
-                      <a:pPr latinLnBrk="1"/>
-                      <a:endParaRPr lang="ko-KR" altLang="en-US" sz="1100"/>
-                    </a:p>
-                  </a:txBody>
-                  <a:tcPr/>
-                </a:tc>
-                <a:tc>
-                  <a:txBody>
-                    <a:bodyPr/>
-                    <a:lstStyle/>
-                    <a:p>
-                      <a:pPr latinLnBrk="1"/>
-                      <a:endParaRPr lang="ko-KR" altLang="en-US" sz="1100"/>
-                    </a:p>
-                  </a:txBody>
-                  <a:tcPr/>
-                </a:tc>
-                <a:tc>
-                  <a:txBody>
-                    <a:bodyPr/>
-                    <a:lstStyle/>
-                    <a:p>
-                      <a:pPr latinLnBrk="1"/>
-                      <a:endParaRPr lang="ko-KR" altLang="en-US" sz="1100"/>
-                    </a:p>
-                  </a:txBody>
-                  <a:tcPr/>
-                </a:tc>
-                <a:tc>
-                  <a:txBody>
-                    <a:bodyPr/>
-                    <a:lstStyle/>
-                    <a:p>
-                      <a:pPr latinLnBrk="1"/>
-                      <a:endParaRPr lang="ko-KR" altLang="en-US" sz="1100"/>
-                    </a:p>
-                  </a:txBody>
-                  <a:tcPr/>
-                </a:tc>
-                <a:tc>
-                  <a:txBody>
-                    <a:bodyPr/>
-                    <a:lstStyle/>
-                    <a:p>
-                      <a:pPr latinLnBrk="1"/>
-                      <a:endParaRPr lang="ko-KR" altLang="en-US" sz="1100"/>
-                    </a:p>
-                  </a:txBody>
-                  <a:tcPr/>
-                </a:tc>
-                <a:extLst>
-                  <a:ext uri="{0D108BD9-81ED-4DB2-BD59-A6C34878D82A}">
-                    <a16:rowId xmlns:a16="http://schemas.microsoft.com/office/drawing/2014/main" val="2110456893"/>
-                  </a:ext>
-                </a:extLst>
-              </a:tr>
-              <a:tr h="0">
-                <a:tc>
-                  <a:txBody>
-                    <a:bodyPr/>
-                    <a:lstStyle/>
-                    <a:p>
-                      <a:pPr latinLnBrk="1"/>
-                      <a:r>
-                        <a:rPr lang="ko-KR" altLang="en-US" sz="1100"/>
-                        <a:t>내부변수</a:t>
-                      </a:r>
-                    </a:p>
-                  </a:txBody>
-                  <a:tcPr/>
-                </a:tc>
-                <a:tc>
-                  <a:txBody>
-                    <a:bodyPr/>
-                    <a:lstStyle/>
-                    <a:p>
-                      <a:pPr latinLnBrk="1"/>
-                      <a:endParaRPr lang="ko-KR" altLang="en-US" sz="1100"/>
-                    </a:p>
-                  </a:txBody>
-                  <a:tcPr/>
-                </a:tc>
-                <a:tc>
-                  <a:txBody>
-                    <a:bodyPr/>
-                    <a:lstStyle/>
-                    <a:p>
-                      <a:pPr latinLnBrk="1"/>
-                      <a:endParaRPr lang="ko-KR" altLang="en-US" sz="1100"/>
-                    </a:p>
-                  </a:txBody>
-                  <a:tcPr/>
-                </a:tc>
-                <a:tc>
-                  <a:txBody>
-                    <a:bodyPr/>
-                    <a:lstStyle/>
-                    <a:p>
-                      <a:pPr latinLnBrk="1"/>
-                      <a:endParaRPr lang="ko-KR" altLang="en-US" sz="1100"/>
-                    </a:p>
-                  </a:txBody>
-                  <a:tcPr/>
-                </a:tc>
-                <a:tc>
-                  <a:txBody>
-                    <a:bodyPr/>
-                    <a:lstStyle/>
-                    <a:p>
-                      <a:pPr latinLnBrk="1"/>
-                      <a:endParaRPr lang="ko-KR" altLang="en-US" sz="1100"/>
-                    </a:p>
-                  </a:txBody>
-                  <a:tcPr/>
-                </a:tc>
-                <a:tc>
-                  <a:txBody>
-                    <a:bodyPr/>
-                    <a:lstStyle/>
-                    <a:p>
-                      <a:pPr latinLnBrk="1"/>
-                      <a:endParaRPr lang="ko-KR" altLang="en-US" sz="1100"/>
-                    </a:p>
-                  </a:txBody>
-                  <a:tcPr/>
-                </a:tc>
-                <a:tc>
-                  <a:txBody>
-                    <a:bodyPr/>
-                    <a:lstStyle/>
-                    <a:p>
-                      <a:pPr latinLnBrk="1"/>
-                      <a:endParaRPr lang="ko-KR" altLang="en-US" sz="1100"/>
-                    </a:p>
-                  </a:txBody>
-                  <a:tcPr/>
-                </a:tc>
-                <a:extLst>
-                  <a:ext uri="{0D108BD9-81ED-4DB2-BD59-A6C34878D82A}">
-                    <a16:rowId xmlns:a16="http://schemas.microsoft.com/office/drawing/2014/main" val="328689863"/>
-                  </a:ext>
-                </a:extLst>
-              </a:tr>
-              <a:tr h="0">
-                <a:tc>
-                  <a:txBody>
-                    <a:bodyPr/>
-                    <a:lstStyle/>
-                    <a:p>
-                      <a:pPr latinLnBrk="1"/>
-                      <a:endParaRPr lang="ko-KR" altLang="en-US" sz="1100"/>
-                    </a:p>
-                  </a:txBody>
-                  <a:tcPr/>
-                </a:tc>
-                <a:tc>
-                  <a:txBody>
-                    <a:bodyPr/>
-                    <a:lstStyle/>
-                    <a:p>
-                      <a:pPr latinLnBrk="1"/>
-                      <a:endParaRPr lang="ko-KR" altLang="en-US" sz="1100"/>
-                    </a:p>
-                  </a:txBody>
-                  <a:tcPr/>
-                </a:tc>
-                <a:tc>
-                  <a:txBody>
-                    <a:bodyPr/>
-                    <a:lstStyle/>
-                    <a:p>
-                      <a:pPr latinLnBrk="1"/>
-                      <a:endParaRPr lang="ko-KR" altLang="en-US" sz="1100"/>
-                    </a:p>
-                  </a:txBody>
-                  <a:tcPr/>
-                </a:tc>
-                <a:tc>
-                  <a:txBody>
-                    <a:bodyPr/>
-                    <a:lstStyle/>
-                    <a:p>
-                      <a:pPr latinLnBrk="1"/>
-                      <a:endParaRPr lang="ko-KR" altLang="en-US" sz="1100"/>
-                    </a:p>
-                  </a:txBody>
-                  <a:tcPr/>
-                </a:tc>
-                <a:tc>
-                  <a:txBody>
-                    <a:bodyPr/>
-                    <a:lstStyle/>
-                    <a:p>
-                      <a:pPr latinLnBrk="1"/>
-                      <a:endParaRPr lang="ko-KR" altLang="en-US" sz="1100"/>
-                    </a:p>
-                  </a:txBody>
-                  <a:tcPr/>
-                </a:tc>
-                <a:tc>
-                  <a:txBody>
-                    <a:bodyPr/>
-                    <a:lstStyle/>
-                    <a:p>
-                      <a:pPr latinLnBrk="1"/>
-                      <a:endParaRPr lang="ko-KR" altLang="en-US" sz="1100"/>
-                    </a:p>
-                  </a:txBody>
-                  <a:tcPr/>
-                </a:tc>
-                <a:tc>
-                  <a:txBody>
-                    <a:bodyPr/>
-                    <a:lstStyle/>
-                    <a:p>
-                      <a:pPr latinLnBrk="1"/>
-                      <a:endParaRPr lang="ko-KR" altLang="en-US" sz="1100" dirty="0"/>
-                    </a:p>
-                  </a:txBody>
-                  <a:tcPr/>
-                </a:tc>
-                <a:extLst>
-                  <a:ext uri="{0D108BD9-81ED-4DB2-BD59-A6C34878D82A}">
-                    <a16:rowId xmlns:a16="http://schemas.microsoft.com/office/drawing/2014/main" val="2906129826"/>
-                  </a:ext>
-                </a:extLst>
-              </a:tr>
-            </a:tbl>
-          </a:graphicData>
-        </a:graphic>
-      </p:graphicFrame>
-    </p:spTree>
-    <p:extLst>
-      <p:ext uri="{BB962C8B-B14F-4D97-AF65-F5344CB8AC3E}">
-        <p14:creationId xmlns:p14="http://schemas.microsoft.com/office/powerpoint/2010/main" val="3776002970"/>
       </p:ext>
     </p:extLst>
   </p:cSld>

</xml_diff>

<commit_message>
btn lamp 샘플 추가
</commit_message>
<xml_diff>
--- a/DsDotNet/src/UnitTest/UnitTest.Model/ImportOfficeExample/exportDS/testA/testMy/my.pptx
+++ b/DsDotNet/src/UnitTest/UnitTest.Model/ImportOfficeExample/exportDS/testA/testMy/my.pptx
@@ -265,7 +265,7 @@
           <a:p>
             <a:fld id="{E31A602F-9409-4B9A-9D14-798E704D8577}" type="datetimeFigureOut">
               <a:rPr lang="ko-KR" altLang="en-US" smtClean="0"/>
-              <a:t>2023-11-16</a:t>
+              <a:t>2023-11-17</a:t>
             </a:fld>
             <a:endParaRPr lang="ko-KR" altLang="en-US"/>
           </a:p>
@@ -463,7 +463,7 @@
           <a:p>
             <a:fld id="{E31A602F-9409-4B9A-9D14-798E704D8577}" type="datetimeFigureOut">
               <a:rPr lang="ko-KR" altLang="en-US" smtClean="0"/>
-              <a:t>2023-11-16</a:t>
+              <a:t>2023-11-17</a:t>
             </a:fld>
             <a:endParaRPr lang="ko-KR" altLang="en-US"/>
           </a:p>
@@ -671,7 +671,7 @@
           <a:p>
             <a:fld id="{E31A602F-9409-4B9A-9D14-798E704D8577}" type="datetimeFigureOut">
               <a:rPr lang="ko-KR" altLang="en-US" smtClean="0"/>
-              <a:t>2023-11-16</a:t>
+              <a:t>2023-11-17</a:t>
             </a:fld>
             <a:endParaRPr lang="ko-KR" altLang="en-US"/>
           </a:p>
@@ -869,7 +869,7 @@
           <a:p>
             <a:fld id="{E31A602F-9409-4B9A-9D14-798E704D8577}" type="datetimeFigureOut">
               <a:rPr lang="ko-KR" altLang="en-US" smtClean="0"/>
-              <a:t>2023-11-16</a:t>
+              <a:t>2023-11-17</a:t>
             </a:fld>
             <a:endParaRPr lang="ko-KR" altLang="en-US"/>
           </a:p>
@@ -1144,7 +1144,7 @@
           <a:p>
             <a:fld id="{E31A602F-9409-4B9A-9D14-798E704D8577}" type="datetimeFigureOut">
               <a:rPr lang="ko-KR" altLang="en-US" smtClean="0"/>
-              <a:t>2023-11-16</a:t>
+              <a:t>2023-11-17</a:t>
             </a:fld>
             <a:endParaRPr lang="ko-KR" altLang="en-US"/>
           </a:p>
@@ -1409,7 +1409,7 @@
           <a:p>
             <a:fld id="{E31A602F-9409-4B9A-9D14-798E704D8577}" type="datetimeFigureOut">
               <a:rPr lang="ko-KR" altLang="en-US" smtClean="0"/>
-              <a:t>2023-11-16</a:t>
+              <a:t>2023-11-17</a:t>
             </a:fld>
             <a:endParaRPr lang="ko-KR" altLang="en-US"/>
           </a:p>
@@ -1821,7 +1821,7 @@
           <a:p>
             <a:fld id="{E31A602F-9409-4B9A-9D14-798E704D8577}" type="datetimeFigureOut">
               <a:rPr lang="ko-KR" altLang="en-US" smtClean="0"/>
-              <a:t>2023-11-16</a:t>
+              <a:t>2023-11-17</a:t>
             </a:fld>
             <a:endParaRPr lang="ko-KR" altLang="en-US"/>
           </a:p>
@@ -1962,7 +1962,7 @@
           <a:p>
             <a:fld id="{E31A602F-9409-4B9A-9D14-798E704D8577}" type="datetimeFigureOut">
               <a:rPr lang="ko-KR" altLang="en-US" smtClean="0"/>
-              <a:t>2023-11-16</a:t>
+              <a:t>2023-11-17</a:t>
             </a:fld>
             <a:endParaRPr lang="ko-KR" altLang="en-US"/>
           </a:p>
@@ -2075,7 +2075,7 @@
           <a:p>
             <a:fld id="{E31A602F-9409-4B9A-9D14-798E704D8577}" type="datetimeFigureOut">
               <a:rPr lang="ko-KR" altLang="en-US" smtClean="0"/>
-              <a:t>2023-11-16</a:t>
+              <a:t>2023-11-17</a:t>
             </a:fld>
             <a:endParaRPr lang="ko-KR" altLang="en-US"/>
           </a:p>
@@ -2386,7 +2386,7 @@
           <a:p>
             <a:fld id="{E31A602F-9409-4B9A-9D14-798E704D8577}" type="datetimeFigureOut">
               <a:rPr lang="ko-KR" altLang="en-US" smtClean="0"/>
-              <a:t>2023-11-16</a:t>
+              <a:t>2023-11-17</a:t>
             </a:fld>
             <a:endParaRPr lang="ko-KR" altLang="en-US"/>
           </a:p>
@@ -2674,7 +2674,7 @@
           <a:p>
             <a:fld id="{E31A602F-9409-4B9A-9D14-798E704D8577}" type="datetimeFigureOut">
               <a:rPr lang="ko-KR" altLang="en-US" smtClean="0"/>
-              <a:t>2023-11-16</a:t>
+              <a:t>2023-11-17</a:t>
             </a:fld>
             <a:endParaRPr lang="ko-KR" altLang="en-US"/>
           </a:p>
@@ -2915,7 +2915,7 @@
           <a:p>
             <a:fld id="{E31A602F-9409-4B9A-9D14-798E704D8577}" type="datetimeFigureOut">
               <a:rPr lang="ko-KR" altLang="en-US" smtClean="0"/>
-              <a:t>2023-11-16</a:t>
+              <a:t>2023-11-17</a:t>
             </a:fld>
             <a:endParaRPr lang="ko-KR" altLang="en-US"/>
           </a:p>
@@ -3977,6 +3977,159 @@
           </p:style>
         </p:cxnSp>
       </p:grpSp>
+      <p:sp>
+        <p:nvSpPr>
+          <p:cNvPr id="3" name="사각형: 빗면 2">
+            <a:extLst>
+              <a:ext uri="{FF2B5EF4-FFF2-40B4-BE49-F238E27FC236}">
+                <a16:creationId xmlns:a16="http://schemas.microsoft.com/office/drawing/2014/main" id="{6CF2A28C-0E53-97DA-48FB-6A68E4377E52}"/>
+              </a:ext>
+            </a:extLst>
+          </p:cNvPr>
+          <p:cNvSpPr/>
+          <p:nvPr/>
+        </p:nvSpPr>
+        <p:spPr>
+          <a:xfrm>
+            <a:off x="4452912" y="-76661"/>
+            <a:ext cx="3591555" cy="3534697"/>
+          </a:xfrm>
+          <a:prstGeom prst="bevel">
+            <a:avLst>
+              <a:gd name="adj" fmla="val 16754"/>
+            </a:avLst>
+          </a:prstGeom>
+          <a:ln>
+            <a:solidFill>
+              <a:schemeClr val="tx1"/>
+            </a:solidFill>
+          </a:ln>
+        </p:spPr>
+        <p:style>
+          <a:lnRef idx="2">
+            <a:schemeClr val="accent1">
+              <a:shade val="50000"/>
+            </a:schemeClr>
+          </a:lnRef>
+          <a:fillRef idx="1">
+            <a:schemeClr val="accent1"/>
+          </a:fillRef>
+          <a:effectRef idx="0">
+            <a:schemeClr val="accent1"/>
+          </a:effectRef>
+          <a:fontRef idx="minor">
+            <a:schemeClr val="lt1"/>
+          </a:fontRef>
+        </p:style>
+        <p:txBody>
+          <a:bodyPr rtlCol="0" anchor="ctr"/>
+          <a:lstStyle/>
+          <a:p>
+            <a:pPr algn="ctr"/>
+            <a:r>
+              <a:rPr lang="en-US" altLang="ko-KR" sz="1400" dirty="0">
+                <a:solidFill>
+                  <a:schemeClr val="bg2"/>
+                </a:solidFill>
+              </a:rPr>
+              <a:t>[A]autoSTN01_02</a:t>
+            </a:r>
+          </a:p>
+          <a:p>
+            <a:pPr algn="ctr"/>
+            <a:r>
+              <a:rPr lang="en-US" altLang="ko-KR" sz="1400" dirty="0">
+                <a:solidFill>
+                  <a:schemeClr val="bg2"/>
+                </a:solidFill>
+              </a:rPr>
+              <a:t>[M]manualSTN01_02</a:t>
+            </a:r>
+          </a:p>
+          <a:p>
+            <a:pPr algn="ctr"/>
+            <a:r>
+              <a:rPr lang="en-US" altLang="ko-KR" sz="1400" dirty="0">
+                <a:solidFill>
+                  <a:schemeClr val="bg2"/>
+                </a:solidFill>
+              </a:rPr>
+              <a:t>[D] driveSTN01_02</a:t>
+            </a:r>
+          </a:p>
+          <a:p>
+            <a:pPr algn="ctr"/>
+            <a:r>
+              <a:rPr lang="en-US" altLang="ko-KR" sz="1400" dirty="0">
+                <a:solidFill>
+                  <a:schemeClr val="bg2"/>
+                </a:solidFill>
+              </a:rPr>
+              <a:t>[S]stopSTN01_02</a:t>
+            </a:r>
+          </a:p>
+          <a:p>
+            <a:pPr algn="ctr"/>
+            <a:r>
+              <a:rPr lang="en-US" altLang="ko-KR" sz="1400" dirty="0">
+                <a:solidFill>
+                  <a:schemeClr val="bg2"/>
+                </a:solidFill>
+              </a:rPr>
+              <a:t>[E] emgSTN01_02</a:t>
+            </a:r>
+          </a:p>
+          <a:p>
+            <a:pPr algn="ctr"/>
+            <a:r>
+              <a:rPr lang="en-US" altLang="ko-KR" sz="1400" dirty="0">
+                <a:solidFill>
+                  <a:schemeClr val="bg2"/>
+                </a:solidFill>
+              </a:rPr>
+              <a:t>[T] testrunSTN01_02</a:t>
+            </a:r>
+          </a:p>
+          <a:p>
+            <a:pPr algn="ctr"/>
+            <a:r>
+              <a:rPr lang="en-US" altLang="ko-KR" sz="1400" dirty="0">
+                <a:solidFill>
+                  <a:schemeClr val="bg2"/>
+                </a:solidFill>
+              </a:rPr>
+              <a:t>[R] readySTN01_02</a:t>
+            </a:r>
+          </a:p>
+          <a:p>
+            <a:pPr algn="ctr"/>
+            <a:r>
+              <a:rPr lang="en-US" altLang="ko-KR" sz="1400" dirty="0">
+                <a:solidFill>
+                  <a:schemeClr val="bg2"/>
+                </a:solidFill>
+              </a:rPr>
+              <a:t>[C] clearSTN01_02</a:t>
+            </a:r>
+          </a:p>
+          <a:p>
+            <a:pPr algn="ctr"/>
+            <a:r>
+              <a:rPr lang="en-US" altLang="ko-KR" sz="1400" dirty="0">
+                <a:solidFill>
+                  <a:schemeClr val="bg2"/>
+                </a:solidFill>
+              </a:rPr>
+              <a:t>[H] homeSTN01_02</a:t>
+            </a:r>
+            <a:endParaRPr lang="en-US" altLang="ko-KR" sz="1100" dirty="0">
+              <a:solidFill>
+                <a:schemeClr val="bg2"/>
+              </a:solidFill>
+            </a:endParaRPr>
+          </a:p>
+        </p:txBody>
+      </p:sp>
     </p:spTree>
     <p:extLst>
       <p:ext uri="{BB962C8B-B14F-4D97-AF65-F5344CB8AC3E}">
@@ -4568,6 +4721,159 @@
           </p:style>
         </p:cxnSp>
       </p:grpSp>
+      <p:sp>
+        <p:nvSpPr>
+          <p:cNvPr id="5" name="사각형: 빗면 4">
+            <a:extLst>
+              <a:ext uri="{FF2B5EF4-FFF2-40B4-BE49-F238E27FC236}">
+                <a16:creationId xmlns:a16="http://schemas.microsoft.com/office/drawing/2014/main" id="{1BD24E4E-4BE5-D026-6F45-DA6C48BD80EF}"/>
+              </a:ext>
+            </a:extLst>
+          </p:cNvPr>
+          <p:cNvSpPr/>
+          <p:nvPr/>
+        </p:nvSpPr>
+        <p:spPr>
+          <a:xfrm>
+            <a:off x="4452912" y="-76661"/>
+            <a:ext cx="3591555" cy="3534697"/>
+          </a:xfrm>
+          <a:prstGeom prst="bevel">
+            <a:avLst>
+              <a:gd name="adj" fmla="val 16754"/>
+            </a:avLst>
+          </a:prstGeom>
+          <a:ln>
+            <a:solidFill>
+              <a:schemeClr val="tx1"/>
+            </a:solidFill>
+          </a:ln>
+        </p:spPr>
+        <p:style>
+          <a:lnRef idx="2">
+            <a:schemeClr val="accent1">
+              <a:shade val="50000"/>
+            </a:schemeClr>
+          </a:lnRef>
+          <a:fillRef idx="1">
+            <a:schemeClr val="accent1"/>
+          </a:fillRef>
+          <a:effectRef idx="0">
+            <a:schemeClr val="accent1"/>
+          </a:effectRef>
+          <a:fontRef idx="minor">
+            <a:schemeClr val="lt1"/>
+          </a:fontRef>
+        </p:style>
+        <p:txBody>
+          <a:bodyPr rtlCol="0" anchor="ctr"/>
+          <a:lstStyle/>
+          <a:p>
+            <a:pPr algn="ctr"/>
+            <a:r>
+              <a:rPr lang="en-US" altLang="ko-KR" sz="1400" dirty="0">
+                <a:solidFill>
+                  <a:schemeClr val="bg2"/>
+                </a:solidFill>
+              </a:rPr>
+              <a:t>[A]autoSTN01_02</a:t>
+            </a:r>
+          </a:p>
+          <a:p>
+            <a:pPr algn="ctr"/>
+            <a:r>
+              <a:rPr lang="en-US" altLang="ko-KR" sz="1400" dirty="0">
+                <a:solidFill>
+                  <a:schemeClr val="bg2"/>
+                </a:solidFill>
+              </a:rPr>
+              <a:t>[M]manualSTN01_02</a:t>
+            </a:r>
+          </a:p>
+          <a:p>
+            <a:pPr algn="ctr"/>
+            <a:r>
+              <a:rPr lang="en-US" altLang="ko-KR" sz="1400" dirty="0">
+                <a:solidFill>
+                  <a:schemeClr val="bg2"/>
+                </a:solidFill>
+              </a:rPr>
+              <a:t>[D] driveSTN01_02</a:t>
+            </a:r>
+          </a:p>
+          <a:p>
+            <a:pPr algn="ctr"/>
+            <a:r>
+              <a:rPr lang="en-US" altLang="ko-KR" sz="1400" dirty="0">
+                <a:solidFill>
+                  <a:schemeClr val="bg2"/>
+                </a:solidFill>
+              </a:rPr>
+              <a:t>[S]stopSTN01_02</a:t>
+            </a:r>
+          </a:p>
+          <a:p>
+            <a:pPr algn="ctr"/>
+            <a:r>
+              <a:rPr lang="en-US" altLang="ko-KR" sz="1400" dirty="0">
+                <a:solidFill>
+                  <a:schemeClr val="bg2"/>
+                </a:solidFill>
+              </a:rPr>
+              <a:t>[E] emgSTN01_02</a:t>
+            </a:r>
+          </a:p>
+          <a:p>
+            <a:pPr algn="ctr"/>
+            <a:r>
+              <a:rPr lang="en-US" altLang="ko-KR" sz="1400" dirty="0">
+                <a:solidFill>
+                  <a:schemeClr val="bg2"/>
+                </a:solidFill>
+              </a:rPr>
+              <a:t>[T] testrunSTN01_02</a:t>
+            </a:r>
+          </a:p>
+          <a:p>
+            <a:pPr algn="ctr"/>
+            <a:r>
+              <a:rPr lang="en-US" altLang="ko-KR" sz="1400" dirty="0">
+                <a:solidFill>
+                  <a:schemeClr val="bg2"/>
+                </a:solidFill>
+              </a:rPr>
+              <a:t>[R] readySTN01_02</a:t>
+            </a:r>
+          </a:p>
+          <a:p>
+            <a:pPr algn="ctr"/>
+            <a:r>
+              <a:rPr lang="en-US" altLang="ko-KR" sz="1400" dirty="0">
+                <a:solidFill>
+                  <a:schemeClr val="bg2"/>
+                </a:solidFill>
+              </a:rPr>
+              <a:t>[C] clearSTN01_02</a:t>
+            </a:r>
+          </a:p>
+          <a:p>
+            <a:pPr algn="ctr"/>
+            <a:r>
+              <a:rPr lang="en-US" altLang="ko-KR" sz="1400" dirty="0">
+                <a:solidFill>
+                  <a:schemeClr val="bg2"/>
+                </a:solidFill>
+              </a:rPr>
+              <a:t>[H] homeSTN01_02</a:t>
+            </a:r>
+            <a:endParaRPr lang="en-US" altLang="ko-KR" sz="1100" dirty="0">
+              <a:solidFill>
+                <a:schemeClr val="bg2"/>
+              </a:solidFill>
+            </a:endParaRPr>
+          </a:p>
+        </p:txBody>
+      </p:sp>
     </p:spTree>
     <p:extLst>
       <p:ext uri="{BB962C8B-B14F-4D97-AF65-F5344CB8AC3E}">
@@ -5670,6 +5976,258 @@
           </p:style>
         </p:cxnSp>
       </p:grpSp>
+      <p:sp>
+        <p:nvSpPr>
+          <p:cNvPr id="4" name="사각형: 빗면 3">
+            <a:extLst>
+              <a:ext uri="{FF2B5EF4-FFF2-40B4-BE49-F238E27FC236}">
+                <a16:creationId xmlns:a16="http://schemas.microsoft.com/office/drawing/2014/main" id="{08E12982-EC35-05A3-E0B2-35103A61E666}"/>
+              </a:ext>
+            </a:extLst>
+          </p:cNvPr>
+          <p:cNvSpPr/>
+          <p:nvPr/>
+        </p:nvSpPr>
+        <p:spPr>
+          <a:xfrm>
+            <a:off x="7174086" y="821833"/>
+            <a:ext cx="3831194" cy="2489903"/>
+          </a:xfrm>
+          <a:prstGeom prst="bevel">
+            <a:avLst>
+              <a:gd name="adj" fmla="val 0"/>
+            </a:avLst>
+          </a:prstGeom>
+          <a:ln>
+            <a:solidFill>
+              <a:schemeClr val="tx1"/>
+            </a:solidFill>
+          </a:ln>
+        </p:spPr>
+        <p:style>
+          <a:lnRef idx="2">
+            <a:schemeClr val="accent1">
+              <a:shade val="50000"/>
+            </a:schemeClr>
+          </a:lnRef>
+          <a:fillRef idx="1">
+            <a:schemeClr val="accent1"/>
+          </a:fillRef>
+          <a:effectRef idx="0">
+            <a:schemeClr val="accent1"/>
+          </a:effectRef>
+          <a:fontRef idx="minor">
+            <a:schemeClr val="lt1"/>
+          </a:fontRef>
+        </p:style>
+        <p:txBody>
+          <a:bodyPr rtlCol="0" anchor="ctr"/>
+          <a:lstStyle/>
+          <a:p>
+            <a:pPr algn="ctr"/>
+            <a:r>
+              <a:rPr lang="en-US" altLang="ko-KR" dirty="0">
+                <a:solidFill>
+                  <a:schemeClr val="bg2"/>
+                </a:solidFill>
+              </a:rPr>
+              <a:t>[A] </a:t>
+            </a:r>
+            <a:r>
+              <a:rPr lang="en-US" altLang="ko-KR" dirty="0" err="1">
+                <a:solidFill>
+                  <a:schemeClr val="bg2"/>
+                </a:solidFill>
+              </a:rPr>
+              <a:t>autoLamp</a:t>
+            </a:r>
+            <a:endParaRPr lang="en-US" altLang="ko-KR" dirty="0">
+              <a:solidFill>
+                <a:schemeClr val="bg2"/>
+              </a:solidFill>
+            </a:endParaRPr>
+          </a:p>
+          <a:p>
+            <a:pPr algn="ctr"/>
+            <a:r>
+              <a:rPr lang="en-US" altLang="ko-KR" dirty="0">
+                <a:solidFill>
+                  <a:schemeClr val="bg2"/>
+                </a:solidFill>
+              </a:rPr>
+              <a:t>[M] </a:t>
+            </a:r>
+            <a:r>
+              <a:rPr lang="en-US" altLang="ko-KR" dirty="0" err="1">
+                <a:solidFill>
+                  <a:schemeClr val="bg2"/>
+                </a:solidFill>
+              </a:rPr>
+              <a:t>manualLamp</a:t>
+            </a:r>
+            <a:endParaRPr lang="en-US" altLang="ko-KR" dirty="0">
+              <a:solidFill>
+                <a:schemeClr val="bg2"/>
+              </a:solidFill>
+            </a:endParaRPr>
+          </a:p>
+          <a:p>
+            <a:pPr algn="ctr"/>
+            <a:r>
+              <a:rPr lang="en-US" altLang="ko-KR" dirty="0">
+                <a:solidFill>
+                  <a:schemeClr val="bg2"/>
+                </a:solidFill>
+              </a:rPr>
+              <a:t>[D] </a:t>
+            </a:r>
+            <a:r>
+              <a:rPr lang="en-US" altLang="ko-KR" dirty="0" err="1">
+                <a:solidFill>
+                  <a:schemeClr val="bg2"/>
+                </a:solidFill>
+              </a:rPr>
+              <a:t>driveLamp</a:t>
+            </a:r>
+            <a:endParaRPr lang="en-US" altLang="ko-KR" dirty="0">
+              <a:solidFill>
+                <a:schemeClr val="bg2"/>
+              </a:solidFill>
+            </a:endParaRPr>
+          </a:p>
+          <a:p>
+            <a:pPr algn="ctr"/>
+            <a:r>
+              <a:rPr lang="en-US" altLang="ko-KR" dirty="0">
+                <a:solidFill>
+                  <a:schemeClr val="bg2"/>
+                </a:solidFill>
+              </a:rPr>
+              <a:t>[S] </a:t>
+            </a:r>
+            <a:r>
+              <a:rPr lang="en-US" altLang="ko-KR" dirty="0" err="1">
+                <a:solidFill>
+                  <a:schemeClr val="bg2"/>
+                </a:solidFill>
+              </a:rPr>
+              <a:t>stopLamp</a:t>
+            </a:r>
+            <a:r>
+              <a:rPr lang="en-US" altLang="ko-KR" dirty="0">
+                <a:solidFill>
+                  <a:schemeClr val="bg2"/>
+                </a:solidFill>
+              </a:rPr>
+              <a:t> </a:t>
+            </a:r>
+          </a:p>
+          <a:p>
+            <a:pPr algn="ctr"/>
+            <a:r>
+              <a:rPr lang="en-US" altLang="ko-KR" dirty="0">
+                <a:solidFill>
+                  <a:schemeClr val="bg2"/>
+                </a:solidFill>
+              </a:rPr>
+              <a:t>[E] </a:t>
+            </a:r>
+            <a:r>
+              <a:rPr lang="en-US" altLang="ko-KR" dirty="0" err="1">
+                <a:solidFill>
+                  <a:schemeClr val="bg2"/>
+                </a:solidFill>
+              </a:rPr>
+              <a:t>emgLamp</a:t>
+            </a:r>
+            <a:endParaRPr lang="en-US" altLang="ko-KR" dirty="0">
+              <a:solidFill>
+                <a:schemeClr val="bg2"/>
+              </a:solidFill>
+            </a:endParaRPr>
+          </a:p>
+          <a:p>
+            <a:pPr algn="ctr"/>
+            <a:r>
+              <a:rPr lang="en-US" altLang="ko-KR" dirty="0">
+                <a:solidFill>
+                  <a:schemeClr val="bg2"/>
+                </a:solidFill>
+              </a:rPr>
+              <a:t>[T] </a:t>
+            </a:r>
+            <a:r>
+              <a:rPr lang="en-US" altLang="ko-KR" dirty="0" err="1">
+                <a:solidFill>
+                  <a:schemeClr val="bg2"/>
+                </a:solidFill>
+              </a:rPr>
+              <a:t>testrunLamp</a:t>
+            </a:r>
+            <a:endParaRPr lang="en-US" altLang="ko-KR" dirty="0">
+              <a:solidFill>
+                <a:schemeClr val="bg2"/>
+              </a:solidFill>
+            </a:endParaRPr>
+          </a:p>
+          <a:p>
+            <a:pPr algn="ctr"/>
+            <a:r>
+              <a:rPr lang="en-US" altLang="ko-KR" dirty="0">
+                <a:solidFill>
+                  <a:schemeClr val="bg2"/>
+                </a:solidFill>
+              </a:rPr>
+              <a:t>[R] </a:t>
+            </a:r>
+            <a:r>
+              <a:rPr lang="en-US" altLang="ko-KR" dirty="0" err="1">
+                <a:solidFill>
+                  <a:schemeClr val="bg2"/>
+                </a:solidFill>
+              </a:rPr>
+              <a:t>readyLamp</a:t>
+            </a:r>
+            <a:endParaRPr lang="en-US" altLang="ko-KR" dirty="0">
+              <a:solidFill>
+                <a:schemeClr val="bg2"/>
+              </a:solidFill>
+            </a:endParaRPr>
+          </a:p>
+          <a:p>
+            <a:pPr algn="ctr"/>
+            <a:r>
+              <a:rPr lang="en-US" altLang="ko-KR" dirty="0">
+                <a:solidFill>
+                  <a:schemeClr val="bg2"/>
+                </a:solidFill>
+              </a:rPr>
+              <a:t>[I] </a:t>
+            </a:r>
+            <a:r>
+              <a:rPr lang="en-US" altLang="ko-KR" dirty="0" err="1">
+                <a:solidFill>
+                  <a:schemeClr val="bg2"/>
+                </a:solidFill>
+              </a:rPr>
+              <a:t>idleLamp</a:t>
+            </a:r>
+            <a:endParaRPr lang="en-US" altLang="ko-KR" dirty="0">
+              <a:solidFill>
+                <a:schemeClr val="bg2"/>
+              </a:solidFill>
+            </a:endParaRPr>
+          </a:p>
+          <a:p>
+            <a:pPr algn="ctr"/>
+            <a:endParaRPr lang="en-US" altLang="ko-KR" dirty="0">
+              <a:solidFill>
+                <a:schemeClr val="bg2"/>
+              </a:solidFill>
+            </a:endParaRPr>
+          </a:p>
+        </p:txBody>
+      </p:sp>
     </p:spTree>
     <p:extLst>
       <p:ext uri="{BB962C8B-B14F-4D97-AF65-F5344CB8AC3E}">
@@ -6787,7 +7345,7 @@
           <p:cNvPr id="2" name="TextBox 1">
             <a:extLst>
               <a:ext uri="{FF2B5EF4-FFF2-40B4-BE49-F238E27FC236}">
-                <a16:creationId xmlns:a16="http://schemas.microsoft.com/office/drawing/2014/main" id="{0779F18A-54A8-85B0-C1D7-E0BE9F4C9DB9}"/>
+                <a16:creationId xmlns:a16="http://schemas.microsoft.com/office/drawing/2014/main" id="{5D81B133-158A-D4F7-EB04-221C00289E33}"/>
               </a:ext>
             </a:extLst>
           </p:cNvPr>
@@ -6823,7 +7381,7 @@
           <p:cNvPr id="3" name="표 2">
             <a:extLst>
               <a:ext uri="{FF2B5EF4-FFF2-40B4-BE49-F238E27FC236}">
-                <a16:creationId xmlns:a16="http://schemas.microsoft.com/office/drawing/2014/main" id="{84CAD0D1-799A-9174-F0AE-4585AB466FFB}"/>
+                <a16:creationId xmlns:a16="http://schemas.microsoft.com/office/drawing/2014/main" id="{4303EC4C-3CF5-8F05-6B6B-0280B22C47A5}"/>
               </a:ext>
             </a:extLst>
           </p:cNvPr>
@@ -6833,14 +7391,14 @@
           <p:nvPr>
             <p:extLst>
               <p:ext uri="{D42A27DB-BD31-4B8C-83A1-F6EECF244321}">
-                <p14:modId xmlns:p14="http://schemas.microsoft.com/office/powerpoint/2010/main" val="3064604648"/>
+                <p14:modId xmlns:p14="http://schemas.microsoft.com/office/powerpoint/2010/main" val="4274237101"/>
               </p:ext>
             </p:extLst>
           </p:nvPr>
         </p:nvGraphicFramePr>
         <p:xfrm>
-          <a:off x="254000" y="635000"/>
-          <a:ext cx="11684001" cy="7162800"/>
+          <a:off x="254000" y="634999"/>
+          <a:ext cx="11684001" cy="11308080"/>
         </p:xfrm>
         <a:graphic>
           <a:graphicData uri="http://schemas.openxmlformats.org/drawingml/2006/table">
@@ -6852,54 +7410,54 @@
                 <a:gridCol w="1669143">
                   <a:extLst>
                     <a:ext uri="{9D8B030D-6E8A-4147-A177-3AD203B41FA5}">
-                      <a16:colId xmlns:a16="http://schemas.microsoft.com/office/drawing/2014/main" val="1989807507"/>
+                      <a16:colId xmlns:a16="http://schemas.microsoft.com/office/drawing/2014/main" val="2038811983"/>
                     </a:ext>
                   </a:extLst>
                 </a:gridCol>
                 <a:gridCol w="1669143">
                   <a:extLst>
                     <a:ext uri="{9D8B030D-6E8A-4147-A177-3AD203B41FA5}">
-                      <a16:colId xmlns:a16="http://schemas.microsoft.com/office/drawing/2014/main" val="2241129589"/>
+                      <a16:colId xmlns:a16="http://schemas.microsoft.com/office/drawing/2014/main" val="2561100211"/>
                     </a:ext>
                   </a:extLst>
                 </a:gridCol>
                 <a:gridCol w="1669143">
                   <a:extLst>
                     <a:ext uri="{9D8B030D-6E8A-4147-A177-3AD203B41FA5}">
-                      <a16:colId xmlns:a16="http://schemas.microsoft.com/office/drawing/2014/main" val="731983540"/>
+                      <a16:colId xmlns:a16="http://schemas.microsoft.com/office/drawing/2014/main" val="3831195407"/>
                     </a:ext>
                   </a:extLst>
                 </a:gridCol>
                 <a:gridCol w="1669143">
                   <a:extLst>
                     <a:ext uri="{9D8B030D-6E8A-4147-A177-3AD203B41FA5}">
-                      <a16:colId xmlns:a16="http://schemas.microsoft.com/office/drawing/2014/main" val="811258764"/>
+                      <a16:colId xmlns:a16="http://schemas.microsoft.com/office/drawing/2014/main" val="2215095967"/>
                     </a:ext>
                   </a:extLst>
                 </a:gridCol>
                 <a:gridCol w="1669143">
                   <a:extLst>
                     <a:ext uri="{9D8B030D-6E8A-4147-A177-3AD203B41FA5}">
-                      <a16:colId xmlns:a16="http://schemas.microsoft.com/office/drawing/2014/main" val="943663082"/>
+                      <a16:colId xmlns:a16="http://schemas.microsoft.com/office/drawing/2014/main" val="1606623354"/>
                     </a:ext>
                   </a:extLst>
                 </a:gridCol>
                 <a:gridCol w="1669143">
                   <a:extLst>
                     <a:ext uri="{9D8B030D-6E8A-4147-A177-3AD203B41FA5}">
-                      <a16:colId xmlns:a16="http://schemas.microsoft.com/office/drawing/2014/main" val="1066635922"/>
+                      <a16:colId xmlns:a16="http://schemas.microsoft.com/office/drawing/2014/main" val="245280265"/>
                     </a:ext>
                   </a:extLst>
                 </a:gridCol>
                 <a:gridCol w="1669143">
                   <a:extLst>
                     <a:ext uri="{9D8B030D-6E8A-4147-A177-3AD203B41FA5}">
-                      <a16:colId xmlns:a16="http://schemas.microsoft.com/office/drawing/2014/main" val="2331691743"/>
+                      <a16:colId xmlns:a16="http://schemas.microsoft.com/office/drawing/2014/main" val="3009386370"/>
                     </a:ext>
                   </a:extLst>
                 </a:gridCol>
               </a:tblGrid>
-              <a:tr h="0">
+              <a:tr h="138814">
                 <a:tc>
                   <a:txBody>
                     <a:bodyPr/>
@@ -7007,11 +7565,11 @@
                 </a:tc>
                 <a:extLst>
                   <a:ext uri="{0D108BD9-81ED-4DB2-BD59-A6C34878D82A}">
-                    <a16:rowId xmlns:a16="http://schemas.microsoft.com/office/drawing/2014/main" val="3155242808"/>
+                    <a16:rowId xmlns:a16="http://schemas.microsoft.com/office/drawing/2014/main" val="812397399"/>
                   </a:ext>
                 </a:extLst>
               </a:tr>
-              <a:tr h="0">
+              <a:tr h="138814">
                 <a:tc>
                   <a:txBody>
                     <a:bodyPr/>
@@ -7064,22 +7622,22 @@
                       <a:pPr latinLnBrk="1"/>
                       <a:r>
                         <a:rPr lang="en-US" altLang="ko-KR" sz="1100"/>
-                        <a:t>I625.1</a:t>
-                      </a:r>
-                      <a:endParaRPr lang="ko-KR" altLang="en-US" sz="1100"/>
-                    </a:p>
-                  </a:txBody>
-                  <a:tcPr/>
-                </a:tc>
-                <a:tc>
-                  <a:txBody>
-                    <a:bodyPr/>
-                    <a:lstStyle/>
-                    <a:p>
-                      <a:pPr latinLnBrk="1"/>
-                      <a:r>
-                        <a:rPr lang="en-US" altLang="ko-KR" sz="1100"/>
-                        <a:t>O625.1</a:t>
+                        <a:t>%IX0.0.0</a:t>
+                      </a:r>
+                      <a:endParaRPr lang="ko-KR" altLang="en-US" sz="1100"/>
+                    </a:p>
+                  </a:txBody>
+                  <a:tcPr/>
+                </a:tc>
+                <a:tc>
+                  <a:txBody>
+                    <a:bodyPr/>
+                    <a:lstStyle/>
+                    <a:p>
+                      <a:pPr latinLnBrk="1"/>
+                      <a:r>
+                        <a:rPr lang="en-US" altLang="ko-KR" sz="1100"/>
+                        <a:t>%QX0.1.0</a:t>
                       </a:r>
                       <a:endParaRPr lang="ko-KR" altLang="en-US" sz="1100"/>
                     </a:p>
@@ -7114,11 +7672,11 @@
                 </a:tc>
                 <a:extLst>
                   <a:ext uri="{0D108BD9-81ED-4DB2-BD59-A6C34878D82A}">
-                    <a16:rowId xmlns:a16="http://schemas.microsoft.com/office/drawing/2014/main" val="1917690284"/>
+                    <a16:rowId xmlns:a16="http://schemas.microsoft.com/office/drawing/2014/main" val="4270558751"/>
                   </a:ext>
                 </a:extLst>
               </a:tr>
-              <a:tr h="0">
+              <a:tr h="138814">
                 <a:tc>
                   <a:txBody>
                     <a:bodyPr/>
@@ -7171,22 +7729,22 @@
                       <a:pPr latinLnBrk="1"/>
                       <a:r>
                         <a:rPr lang="en-US" altLang="ko-KR" sz="1100"/>
-                        <a:t>I625.2</a:t>
-                      </a:r>
-                      <a:endParaRPr lang="ko-KR" altLang="en-US" sz="1100"/>
-                    </a:p>
-                  </a:txBody>
-                  <a:tcPr/>
-                </a:tc>
-                <a:tc>
-                  <a:txBody>
-                    <a:bodyPr/>
-                    <a:lstStyle/>
-                    <a:p>
-                      <a:pPr latinLnBrk="1"/>
-                      <a:r>
-                        <a:rPr lang="en-US" altLang="ko-KR" sz="1100"/>
-                        <a:t>O625.2</a:t>
+                        <a:t>%IX0.0.1</a:t>
+                      </a:r>
+                      <a:endParaRPr lang="ko-KR" altLang="en-US" sz="1100"/>
+                    </a:p>
+                  </a:txBody>
+                  <a:tcPr/>
+                </a:tc>
+                <a:tc>
+                  <a:txBody>
+                    <a:bodyPr/>
+                    <a:lstStyle/>
+                    <a:p>
+                      <a:pPr latinLnBrk="1"/>
+                      <a:r>
+                        <a:rPr lang="en-US" altLang="ko-KR" sz="1100"/>
+                        <a:t>%QX0.1.1</a:t>
                       </a:r>
                       <a:endParaRPr lang="ko-KR" altLang="en-US" sz="1100"/>
                     </a:p>
@@ -7221,11 +7779,11 @@
                 </a:tc>
                 <a:extLst>
                   <a:ext uri="{0D108BD9-81ED-4DB2-BD59-A6C34878D82A}">
-                    <a16:rowId xmlns:a16="http://schemas.microsoft.com/office/drawing/2014/main" val="1400202190"/>
+                    <a16:rowId xmlns:a16="http://schemas.microsoft.com/office/drawing/2014/main" val="1906562655"/>
                   </a:ext>
                 </a:extLst>
               </a:tr>
-              <a:tr h="0">
+              <a:tr h="138814">
                 <a:tc>
                   <a:txBody>
                     <a:bodyPr/>
@@ -7278,22 +7836,22 @@
                       <a:pPr latinLnBrk="1"/>
                       <a:r>
                         <a:rPr lang="en-US" altLang="ko-KR" sz="1100"/>
-                        <a:t>I625.3</a:t>
-                      </a:r>
-                      <a:endParaRPr lang="ko-KR" altLang="en-US" sz="1100"/>
-                    </a:p>
-                  </a:txBody>
-                  <a:tcPr/>
-                </a:tc>
-                <a:tc>
-                  <a:txBody>
-                    <a:bodyPr/>
-                    <a:lstStyle/>
-                    <a:p>
-                      <a:pPr latinLnBrk="1"/>
-                      <a:r>
-                        <a:rPr lang="en-US" altLang="ko-KR" sz="1100"/>
-                        <a:t>O625.3</a:t>
+                        <a:t>%IX0.0.2</a:t>
+                      </a:r>
+                      <a:endParaRPr lang="ko-KR" altLang="en-US" sz="1100"/>
+                    </a:p>
+                  </a:txBody>
+                  <a:tcPr/>
+                </a:tc>
+                <a:tc>
+                  <a:txBody>
+                    <a:bodyPr/>
+                    <a:lstStyle/>
+                    <a:p>
+                      <a:pPr latinLnBrk="1"/>
+                      <a:r>
+                        <a:rPr lang="en-US" altLang="ko-KR" sz="1100"/>
+                        <a:t>%QX0.1.2</a:t>
                       </a:r>
                       <a:endParaRPr lang="ko-KR" altLang="en-US" sz="1100"/>
                     </a:p>
@@ -7328,11 +7886,11 @@
                 </a:tc>
                 <a:extLst>
                   <a:ext uri="{0D108BD9-81ED-4DB2-BD59-A6C34878D82A}">
-                    <a16:rowId xmlns:a16="http://schemas.microsoft.com/office/drawing/2014/main" val="2739910703"/>
+                    <a16:rowId xmlns:a16="http://schemas.microsoft.com/office/drawing/2014/main" val="2986716199"/>
                   </a:ext>
                 </a:extLst>
               </a:tr>
-              <a:tr h="0">
+              <a:tr h="138814">
                 <a:tc>
                   <a:txBody>
                     <a:bodyPr/>
@@ -7385,22 +7943,22 @@
                       <a:pPr latinLnBrk="1"/>
                       <a:r>
                         <a:rPr lang="en-US" altLang="ko-KR" sz="1100"/>
-                        <a:t>I625.4</a:t>
-                      </a:r>
-                      <a:endParaRPr lang="ko-KR" altLang="en-US" sz="1100"/>
-                    </a:p>
-                  </a:txBody>
-                  <a:tcPr/>
-                </a:tc>
-                <a:tc>
-                  <a:txBody>
-                    <a:bodyPr/>
-                    <a:lstStyle/>
-                    <a:p>
-                      <a:pPr latinLnBrk="1"/>
-                      <a:r>
-                        <a:rPr lang="en-US" altLang="ko-KR" sz="1100"/>
-                        <a:t>O625.4</a:t>
+                        <a:t>%IX0.0.3</a:t>
+                      </a:r>
+                      <a:endParaRPr lang="ko-KR" altLang="en-US" sz="1100"/>
+                    </a:p>
+                  </a:txBody>
+                  <a:tcPr/>
+                </a:tc>
+                <a:tc>
+                  <a:txBody>
+                    <a:bodyPr/>
+                    <a:lstStyle/>
+                    <a:p>
+                      <a:pPr latinLnBrk="1"/>
+                      <a:r>
+                        <a:rPr lang="en-US" altLang="ko-KR" sz="1100"/>
+                        <a:t>%QX0.1.3</a:t>
                       </a:r>
                       <a:endParaRPr lang="ko-KR" altLang="en-US" sz="1100"/>
                     </a:p>
@@ -7435,11 +7993,11 @@
                 </a:tc>
                 <a:extLst>
                   <a:ext uri="{0D108BD9-81ED-4DB2-BD59-A6C34878D82A}">
-                    <a16:rowId xmlns:a16="http://schemas.microsoft.com/office/drawing/2014/main" val="2382959734"/>
+                    <a16:rowId xmlns:a16="http://schemas.microsoft.com/office/drawing/2014/main" val="3589375858"/>
                   </a:ext>
                 </a:extLst>
               </a:tr>
-              <a:tr h="0">
+              <a:tr h="138814">
                 <a:tc>
                   <a:txBody>
                     <a:bodyPr/>
@@ -7492,22 +8050,22 @@
                       <a:pPr latinLnBrk="1"/>
                       <a:r>
                         <a:rPr lang="en-US" altLang="ko-KR" sz="1100"/>
-                        <a:t>I625.5</a:t>
-                      </a:r>
-                      <a:endParaRPr lang="ko-KR" altLang="en-US" sz="1100"/>
-                    </a:p>
-                  </a:txBody>
-                  <a:tcPr/>
-                </a:tc>
-                <a:tc>
-                  <a:txBody>
-                    <a:bodyPr/>
-                    <a:lstStyle/>
-                    <a:p>
-                      <a:pPr latinLnBrk="1"/>
-                      <a:r>
-                        <a:rPr lang="en-US" altLang="ko-KR" sz="1100"/>
-                        <a:t>O625.5</a:t>
+                        <a:t>%IX0.0.4</a:t>
+                      </a:r>
+                      <a:endParaRPr lang="ko-KR" altLang="en-US" sz="1100"/>
+                    </a:p>
+                  </a:txBody>
+                  <a:tcPr/>
+                </a:tc>
+                <a:tc>
+                  <a:txBody>
+                    <a:bodyPr/>
+                    <a:lstStyle/>
+                    <a:p>
+                      <a:pPr latinLnBrk="1"/>
+                      <a:r>
+                        <a:rPr lang="en-US" altLang="ko-KR" sz="1100"/>
+                        <a:t>%QX0.1.4</a:t>
                       </a:r>
                       <a:endParaRPr lang="ko-KR" altLang="en-US" sz="1100"/>
                     </a:p>
@@ -7542,11 +8100,11 @@
                 </a:tc>
                 <a:extLst>
                   <a:ext uri="{0D108BD9-81ED-4DB2-BD59-A6C34878D82A}">
-                    <a16:rowId xmlns:a16="http://schemas.microsoft.com/office/drawing/2014/main" val="787595547"/>
+                    <a16:rowId xmlns:a16="http://schemas.microsoft.com/office/drawing/2014/main" val="4058582815"/>
                   </a:ext>
                 </a:extLst>
               </a:tr>
-              <a:tr h="0">
+              <a:tr h="138814">
                 <a:tc>
                   <a:txBody>
                     <a:bodyPr/>
@@ -7599,22 +8157,22 @@
                       <a:pPr latinLnBrk="1"/>
                       <a:r>
                         <a:rPr lang="en-US" altLang="ko-KR" sz="1100"/>
-                        <a:t>I625.6</a:t>
-                      </a:r>
-                      <a:endParaRPr lang="ko-KR" altLang="en-US" sz="1100"/>
-                    </a:p>
-                  </a:txBody>
-                  <a:tcPr/>
-                </a:tc>
-                <a:tc>
-                  <a:txBody>
-                    <a:bodyPr/>
-                    <a:lstStyle/>
-                    <a:p>
-                      <a:pPr latinLnBrk="1"/>
-                      <a:r>
-                        <a:rPr lang="en-US" altLang="ko-KR" sz="1100"/>
-                        <a:t>O625.6</a:t>
+                        <a:t>%IX0.0.5</a:t>
+                      </a:r>
+                      <a:endParaRPr lang="ko-KR" altLang="en-US" sz="1100"/>
+                    </a:p>
+                  </a:txBody>
+                  <a:tcPr/>
+                </a:tc>
+                <a:tc>
+                  <a:txBody>
+                    <a:bodyPr/>
+                    <a:lstStyle/>
+                    <a:p>
+                      <a:pPr latinLnBrk="1"/>
+                      <a:r>
+                        <a:rPr lang="en-US" altLang="ko-KR" sz="1100"/>
+                        <a:t>%QX0.1.5</a:t>
                       </a:r>
                       <a:endParaRPr lang="ko-KR" altLang="en-US" sz="1100"/>
                     </a:p>
@@ -7649,11 +8207,11 @@
                 </a:tc>
                 <a:extLst>
                   <a:ext uri="{0D108BD9-81ED-4DB2-BD59-A6C34878D82A}">
-                    <a16:rowId xmlns:a16="http://schemas.microsoft.com/office/drawing/2014/main" val="635399833"/>
+                    <a16:rowId xmlns:a16="http://schemas.microsoft.com/office/drawing/2014/main" val="937170838"/>
                   </a:ext>
                 </a:extLst>
               </a:tr>
-              <a:tr h="0">
+              <a:tr h="138814">
                 <a:tc>
                   <a:txBody>
                     <a:bodyPr/>
@@ -7706,22 +8264,22 @@
                       <a:pPr latinLnBrk="1"/>
                       <a:r>
                         <a:rPr lang="en-US" altLang="ko-KR" sz="1100"/>
-                        <a:t>I625.7</a:t>
-                      </a:r>
-                      <a:endParaRPr lang="ko-KR" altLang="en-US" sz="1100"/>
-                    </a:p>
-                  </a:txBody>
-                  <a:tcPr/>
-                </a:tc>
-                <a:tc>
-                  <a:txBody>
-                    <a:bodyPr/>
-                    <a:lstStyle/>
-                    <a:p>
-                      <a:pPr latinLnBrk="1"/>
-                      <a:r>
-                        <a:rPr lang="en-US" altLang="ko-KR" sz="1100"/>
-                        <a:t>O625.7</a:t>
+                        <a:t>%IX0.0.6</a:t>
+                      </a:r>
+                      <a:endParaRPr lang="ko-KR" altLang="en-US" sz="1100"/>
+                    </a:p>
+                  </a:txBody>
+                  <a:tcPr/>
+                </a:tc>
+                <a:tc>
+                  <a:txBody>
+                    <a:bodyPr/>
+                    <a:lstStyle/>
+                    <a:p>
+                      <a:pPr latinLnBrk="1"/>
+                      <a:r>
+                        <a:rPr lang="en-US" altLang="ko-KR" sz="1100"/>
+                        <a:t>%QX0.1.6</a:t>
                       </a:r>
                       <a:endParaRPr lang="ko-KR" altLang="en-US" sz="1100"/>
                     </a:p>
@@ -7756,11 +8314,11 @@
                 </a:tc>
                 <a:extLst>
                   <a:ext uri="{0D108BD9-81ED-4DB2-BD59-A6C34878D82A}">
-                    <a16:rowId xmlns:a16="http://schemas.microsoft.com/office/drawing/2014/main" val="3498566371"/>
+                    <a16:rowId xmlns:a16="http://schemas.microsoft.com/office/drawing/2014/main" val="1668104212"/>
                   </a:ext>
                 </a:extLst>
               </a:tr>
-              <a:tr h="0">
+              <a:tr h="138814">
                 <a:tc>
                   <a:txBody>
                     <a:bodyPr/>
@@ -7813,22 +8371,22 @@
                       <a:pPr latinLnBrk="1"/>
                       <a:r>
                         <a:rPr lang="en-US" altLang="ko-KR" sz="1100"/>
-                        <a:t>I625.8</a:t>
-                      </a:r>
-                      <a:endParaRPr lang="ko-KR" altLang="en-US" sz="1100"/>
-                    </a:p>
-                  </a:txBody>
-                  <a:tcPr/>
-                </a:tc>
-                <a:tc>
-                  <a:txBody>
-                    <a:bodyPr/>
-                    <a:lstStyle/>
-                    <a:p>
-                      <a:pPr latinLnBrk="1"/>
-                      <a:r>
-                        <a:rPr lang="en-US" altLang="ko-KR" sz="1100"/>
-                        <a:t>O625.8</a:t>
+                        <a:t>%IX0.0.7</a:t>
+                      </a:r>
+                      <a:endParaRPr lang="ko-KR" altLang="en-US" sz="1100"/>
+                    </a:p>
+                  </a:txBody>
+                  <a:tcPr/>
+                </a:tc>
+                <a:tc>
+                  <a:txBody>
+                    <a:bodyPr/>
+                    <a:lstStyle/>
+                    <a:p>
+                      <a:pPr latinLnBrk="1"/>
+                      <a:r>
+                        <a:rPr lang="en-US" altLang="ko-KR" sz="1100"/>
+                        <a:t>%QX0.1.7</a:t>
                       </a:r>
                       <a:endParaRPr lang="ko-KR" altLang="en-US" sz="1100"/>
                     </a:p>
@@ -7863,11 +8421,11 @@
                 </a:tc>
                 <a:extLst>
                   <a:ext uri="{0D108BD9-81ED-4DB2-BD59-A6C34878D82A}">
-                    <a16:rowId xmlns:a16="http://schemas.microsoft.com/office/drawing/2014/main" val="4237126868"/>
+                    <a16:rowId xmlns:a16="http://schemas.microsoft.com/office/drawing/2014/main" val="3443340355"/>
                   </a:ext>
                 </a:extLst>
               </a:tr>
-              <a:tr h="0">
+              <a:tr h="138814">
                 <a:tc>
                   <a:txBody>
                     <a:bodyPr/>
@@ -7920,22 +8478,22 @@
                       <a:pPr latinLnBrk="1"/>
                       <a:r>
                         <a:rPr lang="en-US" altLang="ko-KR" sz="1100"/>
-                        <a:t>I625.9</a:t>
-                      </a:r>
-                      <a:endParaRPr lang="ko-KR" altLang="en-US" sz="1100"/>
-                    </a:p>
-                  </a:txBody>
-                  <a:tcPr/>
-                </a:tc>
-                <a:tc>
-                  <a:txBody>
-                    <a:bodyPr/>
-                    <a:lstStyle/>
-                    <a:p>
-                      <a:pPr latinLnBrk="1"/>
-                      <a:r>
-                        <a:rPr lang="en-US" altLang="ko-KR" sz="1100"/>
-                        <a:t>O625.9</a:t>
+                        <a:t>%IX0.0.8</a:t>
+                      </a:r>
+                      <a:endParaRPr lang="ko-KR" altLang="en-US" sz="1100"/>
+                    </a:p>
+                  </a:txBody>
+                  <a:tcPr/>
+                </a:tc>
+                <a:tc>
+                  <a:txBody>
+                    <a:bodyPr/>
+                    <a:lstStyle/>
+                    <a:p>
+                      <a:pPr latinLnBrk="1"/>
+                      <a:r>
+                        <a:rPr lang="en-US" altLang="ko-KR" sz="1100"/>
+                        <a:t>%QX0.1.8</a:t>
                       </a:r>
                       <a:endParaRPr lang="ko-KR" altLang="en-US" sz="1100"/>
                     </a:p>
@@ -7970,11 +8528,11 @@
                 </a:tc>
                 <a:extLst>
                   <a:ext uri="{0D108BD9-81ED-4DB2-BD59-A6C34878D82A}">
-                    <a16:rowId xmlns:a16="http://schemas.microsoft.com/office/drawing/2014/main" val="899030615"/>
+                    <a16:rowId xmlns:a16="http://schemas.microsoft.com/office/drawing/2014/main" val="600427208"/>
                   </a:ext>
                 </a:extLst>
               </a:tr>
-              <a:tr h="0">
+              <a:tr h="138814">
                 <a:tc>
                   <a:txBody>
                     <a:bodyPr/>
@@ -8027,22 +8585,22 @@
                       <a:pPr latinLnBrk="1"/>
                       <a:r>
                         <a:rPr lang="en-US" altLang="ko-KR" sz="1100"/>
-                        <a:t>I625.10</a:t>
-                      </a:r>
-                      <a:endParaRPr lang="ko-KR" altLang="en-US" sz="1100"/>
-                    </a:p>
-                  </a:txBody>
-                  <a:tcPr/>
-                </a:tc>
-                <a:tc>
-                  <a:txBody>
-                    <a:bodyPr/>
-                    <a:lstStyle/>
-                    <a:p>
-                      <a:pPr latinLnBrk="1"/>
-                      <a:r>
-                        <a:rPr lang="en-US" altLang="ko-KR" sz="1100"/>
-                        <a:t>O625.10</a:t>
+                        <a:t>%IX0.0.9</a:t>
+                      </a:r>
+                      <a:endParaRPr lang="ko-KR" altLang="en-US" sz="1100"/>
+                    </a:p>
+                  </a:txBody>
+                  <a:tcPr/>
+                </a:tc>
+                <a:tc>
+                  <a:txBody>
+                    <a:bodyPr/>
+                    <a:lstStyle/>
+                    <a:p>
+                      <a:pPr latinLnBrk="1"/>
+                      <a:r>
+                        <a:rPr lang="en-US" altLang="ko-KR" sz="1100"/>
+                        <a:t>%QX0.1.9</a:t>
                       </a:r>
                       <a:endParaRPr lang="ko-KR" altLang="en-US" sz="1100"/>
                     </a:p>
@@ -8077,11 +8635,11 @@
                 </a:tc>
                 <a:extLst>
                   <a:ext uri="{0D108BD9-81ED-4DB2-BD59-A6C34878D82A}">
-                    <a16:rowId xmlns:a16="http://schemas.microsoft.com/office/drawing/2014/main" val="3790352410"/>
+                    <a16:rowId xmlns:a16="http://schemas.microsoft.com/office/drawing/2014/main" val="3294686593"/>
                   </a:ext>
                 </a:extLst>
               </a:tr>
-              <a:tr h="0">
+              <a:tr h="138814">
                 <a:tc>
                   <a:txBody>
                     <a:bodyPr/>
@@ -8134,22 +8692,22 @@
                       <a:pPr latinLnBrk="1"/>
                       <a:r>
                         <a:rPr lang="en-US" altLang="ko-KR" sz="1100"/>
-                        <a:t>I625.11</a:t>
-                      </a:r>
-                      <a:endParaRPr lang="ko-KR" altLang="en-US" sz="1100"/>
-                    </a:p>
-                  </a:txBody>
-                  <a:tcPr/>
-                </a:tc>
-                <a:tc>
-                  <a:txBody>
-                    <a:bodyPr/>
-                    <a:lstStyle/>
-                    <a:p>
-                      <a:pPr latinLnBrk="1"/>
-                      <a:r>
-                        <a:rPr lang="en-US" altLang="ko-KR" sz="1100"/>
-                        <a:t>O625.11</a:t>
+                        <a:t>%IX0.0.10</a:t>
+                      </a:r>
+                      <a:endParaRPr lang="ko-KR" altLang="en-US" sz="1100"/>
+                    </a:p>
+                  </a:txBody>
+                  <a:tcPr/>
+                </a:tc>
+                <a:tc>
+                  <a:txBody>
+                    <a:bodyPr/>
+                    <a:lstStyle/>
+                    <a:p>
+                      <a:pPr latinLnBrk="1"/>
+                      <a:r>
+                        <a:rPr lang="en-US" altLang="ko-KR" sz="1100"/>
+                        <a:t>%QX0.1.10</a:t>
                       </a:r>
                       <a:endParaRPr lang="ko-KR" altLang="en-US" sz="1100"/>
                     </a:p>
@@ -8184,11 +8742,11 @@
                 </a:tc>
                 <a:extLst>
                   <a:ext uri="{0D108BD9-81ED-4DB2-BD59-A6C34878D82A}">
-                    <a16:rowId xmlns:a16="http://schemas.microsoft.com/office/drawing/2014/main" val="58257006"/>
+                    <a16:rowId xmlns:a16="http://schemas.microsoft.com/office/drawing/2014/main" val="3286884880"/>
                   </a:ext>
                 </a:extLst>
               </a:tr>
-              <a:tr h="0">
+              <a:tr h="138814">
                 <a:tc>
                   <a:txBody>
                     <a:bodyPr/>
@@ -8241,22 +8799,22 @@
                       <a:pPr latinLnBrk="1"/>
                       <a:r>
                         <a:rPr lang="en-US" altLang="ko-KR" sz="1100"/>
-                        <a:t>I625.12</a:t>
-                      </a:r>
-                      <a:endParaRPr lang="ko-KR" altLang="en-US" sz="1100"/>
-                    </a:p>
-                  </a:txBody>
-                  <a:tcPr/>
-                </a:tc>
-                <a:tc>
-                  <a:txBody>
-                    <a:bodyPr/>
-                    <a:lstStyle/>
-                    <a:p>
-                      <a:pPr latinLnBrk="1"/>
-                      <a:r>
-                        <a:rPr lang="en-US" altLang="ko-KR" sz="1100"/>
-                        <a:t>O625.12</a:t>
+                        <a:t>%IX0.0.11</a:t>
+                      </a:r>
+                      <a:endParaRPr lang="ko-KR" altLang="en-US" sz="1100"/>
+                    </a:p>
+                  </a:txBody>
+                  <a:tcPr/>
+                </a:tc>
+                <a:tc>
+                  <a:txBody>
+                    <a:bodyPr/>
+                    <a:lstStyle/>
+                    <a:p>
+                      <a:pPr latinLnBrk="1"/>
+                      <a:r>
+                        <a:rPr lang="en-US" altLang="ko-KR" sz="1100"/>
+                        <a:t>%QX0.1.11</a:t>
                       </a:r>
                       <a:endParaRPr lang="ko-KR" altLang="en-US" sz="1100"/>
                     </a:p>
@@ -8291,11 +8849,11 @@
                 </a:tc>
                 <a:extLst>
                   <a:ext uri="{0D108BD9-81ED-4DB2-BD59-A6C34878D82A}">
-                    <a16:rowId xmlns:a16="http://schemas.microsoft.com/office/drawing/2014/main" val="3022948316"/>
+                    <a16:rowId xmlns:a16="http://schemas.microsoft.com/office/drawing/2014/main" val="3438685920"/>
                   </a:ext>
                 </a:extLst>
               </a:tr>
-              <a:tr h="0">
+              <a:tr h="138814">
                 <a:tc>
                   <a:txBody>
                     <a:bodyPr/>
@@ -8348,22 +8906,22 @@
                       <a:pPr latinLnBrk="1"/>
                       <a:r>
                         <a:rPr lang="en-US" altLang="ko-KR" sz="1100"/>
-                        <a:t>I625.13</a:t>
-                      </a:r>
-                      <a:endParaRPr lang="ko-KR" altLang="en-US" sz="1100"/>
-                    </a:p>
-                  </a:txBody>
-                  <a:tcPr/>
-                </a:tc>
-                <a:tc>
-                  <a:txBody>
-                    <a:bodyPr/>
-                    <a:lstStyle/>
-                    <a:p>
-                      <a:pPr latinLnBrk="1"/>
-                      <a:r>
-                        <a:rPr lang="en-US" altLang="ko-KR" sz="1100"/>
-                        <a:t>O625.13</a:t>
+                        <a:t>%IX0.0.12</a:t>
+                      </a:r>
+                      <a:endParaRPr lang="ko-KR" altLang="en-US" sz="1100"/>
+                    </a:p>
+                  </a:txBody>
+                  <a:tcPr/>
+                </a:tc>
+                <a:tc>
+                  <a:txBody>
+                    <a:bodyPr/>
+                    <a:lstStyle/>
+                    <a:p>
+                      <a:pPr latinLnBrk="1"/>
+                      <a:r>
+                        <a:rPr lang="en-US" altLang="ko-KR" sz="1100"/>
+                        <a:t>%QX0.1.12</a:t>
                       </a:r>
                       <a:endParaRPr lang="ko-KR" altLang="en-US" sz="1100"/>
                     </a:p>
@@ -8398,11 +8956,11 @@
                 </a:tc>
                 <a:extLst>
                   <a:ext uri="{0D108BD9-81ED-4DB2-BD59-A6C34878D82A}">
-                    <a16:rowId xmlns:a16="http://schemas.microsoft.com/office/drawing/2014/main" val="1579520016"/>
+                    <a16:rowId xmlns:a16="http://schemas.microsoft.com/office/drawing/2014/main" val="3403601550"/>
                   </a:ext>
                 </a:extLst>
               </a:tr>
-              <a:tr h="0">
+              <a:tr h="138814">
                 <a:tc>
                   <a:txBody>
                     <a:bodyPr/>
@@ -8455,22 +9013,22 @@
                       <a:pPr latinLnBrk="1"/>
                       <a:r>
                         <a:rPr lang="en-US" altLang="ko-KR" sz="1100"/>
-                        <a:t>I625.14</a:t>
-                      </a:r>
-                      <a:endParaRPr lang="ko-KR" altLang="en-US" sz="1100"/>
-                    </a:p>
-                  </a:txBody>
-                  <a:tcPr/>
-                </a:tc>
-                <a:tc>
-                  <a:txBody>
-                    <a:bodyPr/>
-                    <a:lstStyle/>
-                    <a:p>
-                      <a:pPr latinLnBrk="1"/>
-                      <a:r>
-                        <a:rPr lang="en-US" altLang="ko-KR" sz="1100"/>
-                        <a:t>O625.14</a:t>
+                        <a:t>%IX0.0.13</a:t>
+                      </a:r>
+                      <a:endParaRPr lang="ko-KR" altLang="en-US" sz="1100"/>
+                    </a:p>
+                  </a:txBody>
+                  <a:tcPr/>
+                </a:tc>
+                <a:tc>
+                  <a:txBody>
+                    <a:bodyPr/>
+                    <a:lstStyle/>
+                    <a:p>
+                      <a:pPr latinLnBrk="1"/>
+                      <a:r>
+                        <a:rPr lang="en-US" altLang="ko-KR" sz="1100"/>
+                        <a:t>%QX0.1.13</a:t>
                       </a:r>
                       <a:endParaRPr lang="ko-KR" altLang="en-US" sz="1100"/>
                     </a:p>
@@ -8505,11 +9063,11 @@
                 </a:tc>
                 <a:extLst>
                   <a:ext uri="{0D108BD9-81ED-4DB2-BD59-A6C34878D82A}">
-                    <a16:rowId xmlns:a16="http://schemas.microsoft.com/office/drawing/2014/main" val="2992647607"/>
+                    <a16:rowId xmlns:a16="http://schemas.microsoft.com/office/drawing/2014/main" val="1666460496"/>
                   </a:ext>
                 </a:extLst>
               </a:tr>
-              <a:tr h="0">
+              <a:tr h="138814">
                 <a:tc>
                   <a:txBody>
                     <a:bodyPr/>
@@ -8562,22 +9120,22 @@
                       <a:pPr latinLnBrk="1"/>
                       <a:r>
                         <a:rPr lang="en-US" altLang="ko-KR" sz="1100"/>
-                        <a:t>I625.15</a:t>
-                      </a:r>
-                      <a:endParaRPr lang="ko-KR" altLang="en-US" sz="1100"/>
-                    </a:p>
-                  </a:txBody>
-                  <a:tcPr/>
-                </a:tc>
-                <a:tc>
-                  <a:txBody>
-                    <a:bodyPr/>
-                    <a:lstStyle/>
-                    <a:p>
-                      <a:pPr latinLnBrk="1"/>
-                      <a:r>
-                        <a:rPr lang="en-US" altLang="ko-KR" sz="1100"/>
-                        <a:t>O625.15</a:t>
+                        <a:t>%IX0.0.14</a:t>
+                      </a:r>
+                      <a:endParaRPr lang="ko-KR" altLang="en-US" sz="1100"/>
+                    </a:p>
+                  </a:txBody>
+                  <a:tcPr/>
+                </a:tc>
+                <a:tc>
+                  <a:txBody>
+                    <a:bodyPr/>
+                    <a:lstStyle/>
+                    <a:p>
+                      <a:pPr latinLnBrk="1"/>
+                      <a:r>
+                        <a:rPr lang="en-US" altLang="ko-KR" sz="1100"/>
+                        <a:t>%QX0.1.14</a:t>
                       </a:r>
                       <a:endParaRPr lang="ko-KR" altLang="en-US" sz="1100"/>
                     </a:p>
@@ -8612,11 +9170,11 @@
                 </a:tc>
                 <a:extLst>
                   <a:ext uri="{0D108BD9-81ED-4DB2-BD59-A6C34878D82A}">
-                    <a16:rowId xmlns:a16="http://schemas.microsoft.com/office/drawing/2014/main" val="2054088725"/>
+                    <a16:rowId xmlns:a16="http://schemas.microsoft.com/office/drawing/2014/main" val="2123559909"/>
                   </a:ext>
                 </a:extLst>
               </a:tr>
-              <a:tr h="0">
+              <a:tr h="138814">
                 <a:tc>
                   <a:txBody>
                     <a:bodyPr/>
@@ -8669,22 +9227,22 @@
                       <a:pPr latinLnBrk="1"/>
                       <a:r>
                         <a:rPr lang="en-US" altLang="ko-KR" sz="1100"/>
-                        <a:t>I626.0</a:t>
-                      </a:r>
-                      <a:endParaRPr lang="ko-KR" altLang="en-US" sz="1100"/>
-                    </a:p>
-                  </a:txBody>
-                  <a:tcPr/>
-                </a:tc>
-                <a:tc>
-                  <a:txBody>
-                    <a:bodyPr/>
-                    <a:lstStyle/>
-                    <a:p>
-                      <a:pPr latinLnBrk="1"/>
-                      <a:r>
-                        <a:rPr lang="en-US" altLang="ko-KR" sz="1100"/>
-                        <a:t>O626.0</a:t>
+                        <a:t>%IX0.0.15</a:t>
+                      </a:r>
+                      <a:endParaRPr lang="ko-KR" altLang="en-US" sz="1100"/>
+                    </a:p>
+                  </a:txBody>
+                  <a:tcPr/>
+                </a:tc>
+                <a:tc>
+                  <a:txBody>
+                    <a:bodyPr/>
+                    <a:lstStyle/>
+                    <a:p>
+                      <a:pPr latinLnBrk="1"/>
+                      <a:r>
+                        <a:rPr lang="en-US" altLang="ko-KR" sz="1100"/>
+                        <a:t>%QX0.1.15</a:t>
                       </a:r>
                       <a:endParaRPr lang="ko-KR" altLang="en-US" sz="1100"/>
                     </a:p>
@@ -8719,11 +9277,11 @@
                 </a:tc>
                 <a:extLst>
                   <a:ext uri="{0D108BD9-81ED-4DB2-BD59-A6C34878D82A}">
-                    <a16:rowId xmlns:a16="http://schemas.microsoft.com/office/drawing/2014/main" val="783359852"/>
+                    <a16:rowId xmlns:a16="http://schemas.microsoft.com/office/drawing/2014/main" val="939270184"/>
                   </a:ext>
                 </a:extLst>
               </a:tr>
-              <a:tr h="0">
+              <a:tr h="138814">
                 <a:tc>
                   <a:txBody>
                     <a:bodyPr/>
@@ -8776,22 +9334,22 @@
                       <a:pPr latinLnBrk="1"/>
                       <a:r>
                         <a:rPr lang="en-US" altLang="ko-KR" sz="1100"/>
-                        <a:t>I626.1</a:t>
-                      </a:r>
-                      <a:endParaRPr lang="ko-KR" altLang="en-US" sz="1100"/>
-                    </a:p>
-                  </a:txBody>
-                  <a:tcPr/>
-                </a:tc>
-                <a:tc>
-                  <a:txBody>
-                    <a:bodyPr/>
-                    <a:lstStyle/>
-                    <a:p>
-                      <a:pPr latinLnBrk="1"/>
-                      <a:r>
-                        <a:rPr lang="en-US" altLang="ko-KR" sz="1100"/>
-                        <a:t>O626.1</a:t>
+                        <a:t>%IX0.0.16</a:t>
+                      </a:r>
+                      <a:endParaRPr lang="ko-KR" altLang="en-US" sz="1100"/>
+                    </a:p>
+                  </a:txBody>
+                  <a:tcPr/>
+                </a:tc>
+                <a:tc>
+                  <a:txBody>
+                    <a:bodyPr/>
+                    <a:lstStyle/>
+                    <a:p>
+                      <a:pPr latinLnBrk="1"/>
+                      <a:r>
+                        <a:rPr lang="en-US" altLang="ko-KR" sz="1100"/>
+                        <a:t>%QX0.1.16</a:t>
                       </a:r>
                       <a:endParaRPr lang="ko-KR" altLang="en-US" sz="1100"/>
                     </a:p>
@@ -8826,11 +9384,11 @@
                 </a:tc>
                 <a:extLst>
                   <a:ext uri="{0D108BD9-81ED-4DB2-BD59-A6C34878D82A}">
-                    <a16:rowId xmlns:a16="http://schemas.microsoft.com/office/drawing/2014/main" val="1102675528"/>
+                    <a16:rowId xmlns:a16="http://schemas.microsoft.com/office/drawing/2014/main" val="682822100"/>
                   </a:ext>
                 </a:extLst>
               </a:tr>
-              <a:tr h="0">
+              <a:tr h="138814">
                 <a:tc>
                   <a:txBody>
                     <a:bodyPr/>
@@ -8883,22 +9441,22 @@
                       <a:pPr latinLnBrk="1"/>
                       <a:r>
                         <a:rPr lang="en-US" altLang="ko-KR" sz="1100"/>
-                        <a:t>I626.2</a:t>
-                      </a:r>
-                      <a:endParaRPr lang="ko-KR" altLang="en-US" sz="1100"/>
-                    </a:p>
-                  </a:txBody>
-                  <a:tcPr/>
-                </a:tc>
-                <a:tc>
-                  <a:txBody>
-                    <a:bodyPr/>
-                    <a:lstStyle/>
-                    <a:p>
-                      <a:pPr latinLnBrk="1"/>
-                      <a:r>
-                        <a:rPr lang="en-US" altLang="ko-KR" sz="1100"/>
-                        <a:t>O626.2</a:t>
+                        <a:t>%IX0.0.17</a:t>
+                      </a:r>
+                      <a:endParaRPr lang="ko-KR" altLang="en-US" sz="1100"/>
+                    </a:p>
+                  </a:txBody>
+                  <a:tcPr/>
+                </a:tc>
+                <a:tc>
+                  <a:txBody>
+                    <a:bodyPr/>
+                    <a:lstStyle/>
+                    <a:p>
+                      <a:pPr latinLnBrk="1"/>
+                      <a:r>
+                        <a:rPr lang="en-US" altLang="ko-KR" sz="1100"/>
+                        <a:t>%QX0.1.17</a:t>
                       </a:r>
                       <a:endParaRPr lang="ko-KR" altLang="en-US" sz="1100"/>
                     </a:p>
@@ -8933,11 +9491,11 @@
                 </a:tc>
                 <a:extLst>
                   <a:ext uri="{0D108BD9-81ED-4DB2-BD59-A6C34878D82A}">
-                    <a16:rowId xmlns:a16="http://schemas.microsoft.com/office/drawing/2014/main" val="3130169193"/>
+                    <a16:rowId xmlns:a16="http://schemas.microsoft.com/office/drawing/2014/main" val="4129773005"/>
                   </a:ext>
                 </a:extLst>
               </a:tr>
-              <a:tr h="0">
+              <a:tr h="138814">
                 <a:tc>
                   <a:txBody>
                     <a:bodyPr/>
@@ -9017,11 +9575,11 @@
                 </a:tc>
                 <a:extLst>
                   <a:ext uri="{0D108BD9-81ED-4DB2-BD59-A6C34878D82A}">
-                    <a16:rowId xmlns:a16="http://schemas.microsoft.com/office/drawing/2014/main" val="3965509972"/>
+                    <a16:rowId xmlns:a16="http://schemas.microsoft.com/office/drawing/2014/main" val="3635401287"/>
                   </a:ext>
                 </a:extLst>
               </a:tr>
-              <a:tr h="0">
+              <a:tr h="138814">
                 <a:tc>
                   <a:txBody>
                     <a:bodyPr/>
@@ -9101,61 +9659,80 @@
                 </a:tc>
                 <a:extLst>
                   <a:ext uri="{0D108BD9-81ED-4DB2-BD59-A6C34878D82A}">
-                    <a16:rowId xmlns:a16="http://schemas.microsoft.com/office/drawing/2014/main" val="416719521"/>
+                    <a16:rowId xmlns:a16="http://schemas.microsoft.com/office/drawing/2014/main" val="1979443432"/>
                   </a:ext>
                 </a:extLst>
               </a:tr>
-              <a:tr h="0">
-                <a:tc>
-                  <a:txBody>
-                    <a:bodyPr/>
-                    <a:lstStyle/>
-                    <a:p>
-                      <a:pPr latinLnBrk="1"/>
-                      <a:endParaRPr lang="ko-KR" altLang="en-US" sz="1100"/>
-                    </a:p>
-                  </a:txBody>
-                  <a:tcPr/>
-                </a:tc>
-                <a:tc>
-                  <a:txBody>
-                    <a:bodyPr/>
-                    <a:lstStyle/>
-                    <a:p>
-                      <a:pPr latinLnBrk="1"/>
-                      <a:endParaRPr lang="ko-KR" altLang="en-US" sz="1100"/>
-                    </a:p>
-                  </a:txBody>
-                  <a:tcPr/>
-                </a:tc>
-                <a:tc>
-                  <a:txBody>
-                    <a:bodyPr/>
-                    <a:lstStyle/>
-                    <a:p>
-                      <a:pPr latinLnBrk="1"/>
-                      <a:endParaRPr lang="ko-KR" altLang="en-US" sz="1100"/>
-                    </a:p>
-                  </a:txBody>
-                  <a:tcPr/>
-                </a:tc>
-                <a:tc>
-                  <a:txBody>
-                    <a:bodyPr/>
-                    <a:lstStyle/>
-                    <a:p>
-                      <a:pPr latinLnBrk="1"/>
-                      <a:endParaRPr lang="ko-KR" altLang="en-US" sz="1100"/>
-                    </a:p>
-                  </a:txBody>
-                  <a:tcPr/>
-                </a:tc>
-                <a:tc>
-                  <a:txBody>
-                    <a:bodyPr/>
-                    <a:lstStyle/>
-                    <a:p>
-                      <a:pPr latinLnBrk="1"/>
+              <a:tr h="138814">
+                <a:tc>
+                  <a:txBody>
+                    <a:bodyPr/>
+                    <a:lstStyle/>
+                    <a:p>
+                      <a:pPr latinLnBrk="1"/>
+                      <a:r>
+                        <a:rPr lang="ko-KR" altLang="en-US" sz="1100"/>
+                        <a:t>자동선택</a:t>
+                      </a:r>
+                    </a:p>
+                  </a:txBody>
+                  <a:tcPr/>
+                </a:tc>
+                <a:tc>
+                  <a:txBody>
+                    <a:bodyPr/>
+                    <a:lstStyle/>
+                    <a:p>
+                      <a:pPr latinLnBrk="1"/>
+                      <a:r>
+                        <a:rPr lang="en-US" altLang="ko-KR" sz="1100"/>
+                        <a:t>autoSTN01_02</a:t>
+                      </a:r>
+                      <a:endParaRPr lang="ko-KR" altLang="en-US" sz="1100"/>
+                    </a:p>
+                  </a:txBody>
+                  <a:tcPr/>
+                </a:tc>
+                <a:tc>
+                  <a:txBody>
+                    <a:bodyPr/>
+                    <a:lstStyle/>
+                    <a:p>
+                      <a:pPr latinLnBrk="1"/>
+                      <a:r>
+                        <a:rPr lang="en-US" altLang="ko-KR" sz="1100"/>
+                        <a:t>bool</a:t>
+                      </a:r>
+                      <a:endParaRPr lang="ko-KR" altLang="en-US" sz="1100"/>
+                    </a:p>
+                  </a:txBody>
+                  <a:tcPr/>
+                </a:tc>
+                <a:tc>
+                  <a:txBody>
+                    <a:bodyPr/>
+                    <a:lstStyle/>
+                    <a:p>
+                      <a:pPr latinLnBrk="1"/>
+                      <a:r>
+                        <a:rPr lang="en-US" altLang="ko-KR" sz="1100"/>
+                        <a:t>%IX0.0.18</a:t>
+                      </a:r>
+                      <a:endParaRPr lang="ko-KR" altLang="en-US" sz="1100"/>
+                    </a:p>
+                  </a:txBody>
+                  <a:tcPr/>
+                </a:tc>
+                <a:tc>
+                  <a:txBody>
+                    <a:bodyPr/>
+                    <a:lstStyle/>
+                    <a:p>
+                      <a:pPr latinLnBrk="1"/>
+                      <a:r>
+                        <a:rPr lang="en-US" altLang="ko-KR" sz="1100"/>
+                        <a:t>%QX0.1.18</a:t>
+                      </a:r>
                       <a:endParaRPr lang="ko-KR" altLang="en-US" sz="1100"/>
                     </a:p>
                   </a:txBody>
@@ -9185,61 +9762,80 @@
                 </a:tc>
                 <a:extLst>
                   <a:ext uri="{0D108BD9-81ED-4DB2-BD59-A6C34878D82A}">
-                    <a16:rowId xmlns:a16="http://schemas.microsoft.com/office/drawing/2014/main" val="16820631"/>
+                    <a16:rowId xmlns:a16="http://schemas.microsoft.com/office/drawing/2014/main" val="3056882574"/>
                   </a:ext>
                 </a:extLst>
               </a:tr>
-              <a:tr h="0">
-                <a:tc>
-                  <a:txBody>
-                    <a:bodyPr/>
-                    <a:lstStyle/>
-                    <a:p>
-                      <a:pPr latinLnBrk="1"/>
-                      <a:endParaRPr lang="ko-KR" altLang="en-US" sz="1100"/>
-                    </a:p>
-                  </a:txBody>
-                  <a:tcPr/>
-                </a:tc>
-                <a:tc>
-                  <a:txBody>
-                    <a:bodyPr/>
-                    <a:lstStyle/>
-                    <a:p>
-                      <a:pPr latinLnBrk="1"/>
-                      <a:endParaRPr lang="ko-KR" altLang="en-US" sz="1100"/>
-                    </a:p>
-                  </a:txBody>
-                  <a:tcPr/>
-                </a:tc>
-                <a:tc>
-                  <a:txBody>
-                    <a:bodyPr/>
-                    <a:lstStyle/>
-                    <a:p>
-                      <a:pPr latinLnBrk="1"/>
-                      <a:endParaRPr lang="ko-KR" altLang="en-US" sz="1100"/>
-                    </a:p>
-                  </a:txBody>
-                  <a:tcPr/>
-                </a:tc>
-                <a:tc>
-                  <a:txBody>
-                    <a:bodyPr/>
-                    <a:lstStyle/>
-                    <a:p>
-                      <a:pPr latinLnBrk="1"/>
-                      <a:endParaRPr lang="ko-KR" altLang="en-US" sz="1100"/>
-                    </a:p>
-                  </a:txBody>
-                  <a:tcPr/>
-                </a:tc>
-                <a:tc>
-                  <a:txBody>
-                    <a:bodyPr/>
-                    <a:lstStyle/>
-                    <a:p>
-                      <a:pPr latinLnBrk="1"/>
+              <a:tr h="138814">
+                <a:tc>
+                  <a:txBody>
+                    <a:bodyPr/>
+                    <a:lstStyle/>
+                    <a:p>
+                      <a:pPr latinLnBrk="1"/>
+                      <a:r>
+                        <a:rPr lang="ko-KR" altLang="en-US" sz="1100"/>
+                        <a:t>수동선택</a:t>
+                      </a:r>
+                    </a:p>
+                  </a:txBody>
+                  <a:tcPr/>
+                </a:tc>
+                <a:tc>
+                  <a:txBody>
+                    <a:bodyPr/>
+                    <a:lstStyle/>
+                    <a:p>
+                      <a:pPr latinLnBrk="1"/>
+                      <a:r>
+                        <a:rPr lang="en-US" altLang="ko-KR" sz="1100"/>
+                        <a:t>manualSTN01_02</a:t>
+                      </a:r>
+                      <a:endParaRPr lang="ko-KR" altLang="en-US" sz="1100"/>
+                    </a:p>
+                  </a:txBody>
+                  <a:tcPr/>
+                </a:tc>
+                <a:tc>
+                  <a:txBody>
+                    <a:bodyPr/>
+                    <a:lstStyle/>
+                    <a:p>
+                      <a:pPr latinLnBrk="1"/>
+                      <a:r>
+                        <a:rPr lang="en-US" altLang="ko-KR" sz="1100"/>
+                        <a:t>bool</a:t>
+                      </a:r>
+                      <a:endParaRPr lang="ko-KR" altLang="en-US" sz="1100"/>
+                    </a:p>
+                  </a:txBody>
+                  <a:tcPr/>
+                </a:tc>
+                <a:tc>
+                  <a:txBody>
+                    <a:bodyPr/>
+                    <a:lstStyle/>
+                    <a:p>
+                      <a:pPr latinLnBrk="1"/>
+                      <a:r>
+                        <a:rPr lang="en-US" altLang="ko-KR" sz="1100"/>
+                        <a:t>%IX0.0.19</a:t>
+                      </a:r>
+                      <a:endParaRPr lang="ko-KR" altLang="en-US" sz="1100"/>
+                    </a:p>
+                  </a:txBody>
+                  <a:tcPr/>
+                </a:tc>
+                <a:tc>
+                  <a:txBody>
+                    <a:bodyPr/>
+                    <a:lstStyle/>
+                    <a:p>
+                      <a:pPr latinLnBrk="1"/>
+                      <a:r>
+                        <a:rPr lang="en-US" altLang="ko-KR" sz="1100"/>
+                        <a:t>%QX0.1.19</a:t>
+                      </a:r>
                       <a:endParaRPr lang="ko-KR" altLang="en-US" sz="1100"/>
                     </a:p>
                   </a:txBody>
@@ -9269,61 +9865,80 @@
                 </a:tc>
                 <a:extLst>
                   <a:ext uri="{0D108BD9-81ED-4DB2-BD59-A6C34878D82A}">
-                    <a16:rowId xmlns:a16="http://schemas.microsoft.com/office/drawing/2014/main" val="2334881841"/>
+                    <a16:rowId xmlns:a16="http://schemas.microsoft.com/office/drawing/2014/main" val="4089045705"/>
                   </a:ext>
                 </a:extLst>
               </a:tr>
-              <a:tr h="0">
-                <a:tc>
-                  <a:txBody>
-                    <a:bodyPr/>
-                    <a:lstStyle/>
-                    <a:p>
-                      <a:pPr latinLnBrk="1"/>
-                      <a:endParaRPr lang="ko-KR" altLang="en-US" sz="1100"/>
-                    </a:p>
-                  </a:txBody>
-                  <a:tcPr/>
-                </a:tc>
-                <a:tc>
-                  <a:txBody>
-                    <a:bodyPr/>
-                    <a:lstStyle/>
-                    <a:p>
-                      <a:pPr latinLnBrk="1"/>
-                      <a:endParaRPr lang="ko-KR" altLang="en-US" sz="1100"/>
-                    </a:p>
-                  </a:txBody>
-                  <a:tcPr/>
-                </a:tc>
-                <a:tc>
-                  <a:txBody>
-                    <a:bodyPr/>
-                    <a:lstStyle/>
-                    <a:p>
-                      <a:pPr latinLnBrk="1"/>
-                      <a:endParaRPr lang="ko-KR" altLang="en-US" sz="1100"/>
-                    </a:p>
-                  </a:txBody>
-                  <a:tcPr/>
-                </a:tc>
-                <a:tc>
-                  <a:txBody>
-                    <a:bodyPr/>
-                    <a:lstStyle/>
-                    <a:p>
-                      <a:pPr latinLnBrk="1"/>
-                      <a:endParaRPr lang="ko-KR" altLang="en-US" sz="1100"/>
-                    </a:p>
-                  </a:txBody>
-                  <a:tcPr/>
-                </a:tc>
-                <a:tc>
-                  <a:txBody>
-                    <a:bodyPr/>
-                    <a:lstStyle/>
-                    <a:p>
-                      <a:pPr latinLnBrk="1"/>
+              <a:tr h="138814">
+                <a:tc>
+                  <a:txBody>
+                    <a:bodyPr/>
+                    <a:lstStyle/>
+                    <a:p>
+                      <a:pPr latinLnBrk="1"/>
+                      <a:r>
+                        <a:rPr lang="ko-KR" altLang="en-US" sz="1100"/>
+                        <a:t>운전푸쉬</a:t>
+                      </a:r>
+                    </a:p>
+                  </a:txBody>
+                  <a:tcPr/>
+                </a:tc>
+                <a:tc>
+                  <a:txBody>
+                    <a:bodyPr/>
+                    <a:lstStyle/>
+                    <a:p>
+                      <a:pPr latinLnBrk="1"/>
+                      <a:r>
+                        <a:rPr lang="en-US" altLang="ko-KR" sz="1100"/>
+                        <a:t>driveSTN01_02</a:t>
+                      </a:r>
+                      <a:endParaRPr lang="ko-KR" altLang="en-US" sz="1100"/>
+                    </a:p>
+                  </a:txBody>
+                  <a:tcPr/>
+                </a:tc>
+                <a:tc>
+                  <a:txBody>
+                    <a:bodyPr/>
+                    <a:lstStyle/>
+                    <a:p>
+                      <a:pPr latinLnBrk="1"/>
+                      <a:r>
+                        <a:rPr lang="en-US" altLang="ko-KR" sz="1100"/>
+                        <a:t>bool</a:t>
+                      </a:r>
+                      <a:endParaRPr lang="ko-KR" altLang="en-US" sz="1100"/>
+                    </a:p>
+                  </a:txBody>
+                  <a:tcPr/>
+                </a:tc>
+                <a:tc>
+                  <a:txBody>
+                    <a:bodyPr/>
+                    <a:lstStyle/>
+                    <a:p>
+                      <a:pPr latinLnBrk="1"/>
+                      <a:r>
+                        <a:rPr lang="en-US" altLang="ko-KR" sz="1100"/>
+                        <a:t>%IX0.0.20</a:t>
+                      </a:r>
+                      <a:endParaRPr lang="ko-KR" altLang="en-US" sz="1100"/>
+                    </a:p>
+                  </a:txBody>
+                  <a:tcPr/>
+                </a:tc>
+                <a:tc>
+                  <a:txBody>
+                    <a:bodyPr/>
+                    <a:lstStyle/>
+                    <a:p>
+                      <a:pPr latinLnBrk="1"/>
+                      <a:r>
+                        <a:rPr lang="en-US" altLang="ko-KR" sz="1100"/>
+                        <a:t>%QX0.1.20</a:t>
+                      </a:r>
                       <a:endParaRPr lang="ko-KR" altLang="en-US" sz="1100"/>
                     </a:p>
                   </a:txBody>
@@ -9353,61 +9968,80 @@
                 </a:tc>
                 <a:extLst>
                   <a:ext uri="{0D108BD9-81ED-4DB2-BD59-A6C34878D82A}">
-                    <a16:rowId xmlns:a16="http://schemas.microsoft.com/office/drawing/2014/main" val="1909010680"/>
+                    <a16:rowId xmlns:a16="http://schemas.microsoft.com/office/drawing/2014/main" val="2046383628"/>
                   </a:ext>
                 </a:extLst>
               </a:tr>
-              <a:tr h="0">
-                <a:tc>
-                  <a:txBody>
-                    <a:bodyPr/>
-                    <a:lstStyle/>
-                    <a:p>
-                      <a:pPr latinLnBrk="1"/>
-                      <a:endParaRPr lang="ko-KR" altLang="en-US" sz="1100"/>
-                    </a:p>
-                  </a:txBody>
-                  <a:tcPr/>
-                </a:tc>
-                <a:tc>
-                  <a:txBody>
-                    <a:bodyPr/>
-                    <a:lstStyle/>
-                    <a:p>
-                      <a:pPr latinLnBrk="1"/>
-                      <a:endParaRPr lang="ko-KR" altLang="en-US" sz="1100"/>
-                    </a:p>
-                  </a:txBody>
-                  <a:tcPr/>
-                </a:tc>
-                <a:tc>
-                  <a:txBody>
-                    <a:bodyPr/>
-                    <a:lstStyle/>
-                    <a:p>
-                      <a:pPr latinLnBrk="1"/>
-                      <a:endParaRPr lang="ko-KR" altLang="en-US" sz="1100"/>
-                    </a:p>
-                  </a:txBody>
-                  <a:tcPr/>
-                </a:tc>
-                <a:tc>
-                  <a:txBody>
-                    <a:bodyPr/>
-                    <a:lstStyle/>
-                    <a:p>
-                      <a:pPr latinLnBrk="1"/>
-                      <a:endParaRPr lang="ko-KR" altLang="en-US" sz="1100"/>
-                    </a:p>
-                  </a:txBody>
-                  <a:tcPr/>
-                </a:tc>
-                <a:tc>
-                  <a:txBody>
-                    <a:bodyPr/>
-                    <a:lstStyle/>
-                    <a:p>
-                      <a:pPr latinLnBrk="1"/>
+              <a:tr h="138814">
+                <a:tc>
+                  <a:txBody>
+                    <a:bodyPr/>
+                    <a:lstStyle/>
+                    <a:p>
+                      <a:pPr latinLnBrk="1"/>
+                      <a:r>
+                        <a:rPr lang="ko-KR" altLang="en-US" sz="1100"/>
+                        <a:t>정지푸쉬</a:t>
+                      </a:r>
+                    </a:p>
+                  </a:txBody>
+                  <a:tcPr/>
+                </a:tc>
+                <a:tc>
+                  <a:txBody>
+                    <a:bodyPr/>
+                    <a:lstStyle/>
+                    <a:p>
+                      <a:pPr latinLnBrk="1"/>
+                      <a:r>
+                        <a:rPr lang="en-US" altLang="ko-KR" sz="1100"/>
+                        <a:t>stopSTN01_02</a:t>
+                      </a:r>
+                      <a:endParaRPr lang="ko-KR" altLang="en-US" sz="1100"/>
+                    </a:p>
+                  </a:txBody>
+                  <a:tcPr/>
+                </a:tc>
+                <a:tc>
+                  <a:txBody>
+                    <a:bodyPr/>
+                    <a:lstStyle/>
+                    <a:p>
+                      <a:pPr latinLnBrk="1"/>
+                      <a:r>
+                        <a:rPr lang="en-US" altLang="ko-KR" sz="1100"/>
+                        <a:t>bool</a:t>
+                      </a:r>
+                      <a:endParaRPr lang="ko-KR" altLang="en-US" sz="1100"/>
+                    </a:p>
+                  </a:txBody>
+                  <a:tcPr/>
+                </a:tc>
+                <a:tc>
+                  <a:txBody>
+                    <a:bodyPr/>
+                    <a:lstStyle/>
+                    <a:p>
+                      <a:pPr latinLnBrk="1"/>
+                      <a:r>
+                        <a:rPr lang="en-US" altLang="ko-KR" sz="1100"/>
+                        <a:t>%IX0.0.21</a:t>
+                      </a:r>
+                      <a:endParaRPr lang="ko-KR" altLang="en-US" sz="1100"/>
+                    </a:p>
+                  </a:txBody>
+                  <a:tcPr/>
+                </a:tc>
+                <a:tc>
+                  <a:txBody>
+                    <a:bodyPr/>
+                    <a:lstStyle/>
+                    <a:p>
+                      <a:pPr latinLnBrk="1"/>
+                      <a:r>
+                        <a:rPr lang="en-US" altLang="ko-KR" sz="1100"/>
+                        <a:t>%QX0.1.21</a:t>
+                      </a:r>
                       <a:endParaRPr lang="ko-KR" altLang="en-US" sz="1100"/>
                     </a:p>
                   </a:txBody>
@@ -9437,11 +10071,11 @@
                 </a:tc>
                 <a:extLst>
                   <a:ext uri="{0D108BD9-81ED-4DB2-BD59-A6C34878D82A}">
-                    <a16:rowId xmlns:a16="http://schemas.microsoft.com/office/drawing/2014/main" val="1153600402"/>
+                    <a16:rowId xmlns:a16="http://schemas.microsoft.com/office/drawing/2014/main" val="831549969"/>
                   </a:ext>
                 </a:extLst>
               </a:tr>
-              <a:tr h="0">
+              <a:tr h="138814">
                 <a:tc>
                   <a:txBody>
                     <a:bodyPr/>
@@ -9450,51 +10084,67 @@
                       <a:pPr latinLnBrk="1"/>
                       <a:r>
                         <a:rPr lang="ko-KR" altLang="en-US" sz="1100"/>
-                        <a:t>내부변수</a:t>
-                      </a:r>
-                    </a:p>
-                  </a:txBody>
-                  <a:tcPr/>
-                </a:tc>
-                <a:tc>
-                  <a:txBody>
-                    <a:bodyPr/>
-                    <a:lstStyle/>
-                    <a:p>
-                      <a:pPr latinLnBrk="1"/>
-                      <a:endParaRPr lang="ko-KR" altLang="en-US" sz="1100"/>
-                    </a:p>
-                  </a:txBody>
-                  <a:tcPr/>
-                </a:tc>
-                <a:tc>
-                  <a:txBody>
-                    <a:bodyPr/>
-                    <a:lstStyle/>
-                    <a:p>
-                      <a:pPr latinLnBrk="1"/>
-                      <a:endParaRPr lang="ko-KR" altLang="en-US" sz="1100"/>
-                    </a:p>
-                  </a:txBody>
-                  <a:tcPr/>
-                </a:tc>
-                <a:tc>
-                  <a:txBody>
-                    <a:bodyPr/>
-                    <a:lstStyle/>
-                    <a:p>
-                      <a:pPr latinLnBrk="1"/>
-                      <a:endParaRPr lang="ko-KR" altLang="en-US" sz="1100"/>
-                    </a:p>
-                  </a:txBody>
-                  <a:tcPr/>
-                </a:tc>
-                <a:tc>
-                  <a:txBody>
-                    <a:bodyPr/>
-                    <a:lstStyle/>
-                    <a:p>
-                      <a:pPr latinLnBrk="1"/>
+                        <a:t>비상푸쉬</a:t>
+                      </a:r>
+                    </a:p>
+                  </a:txBody>
+                  <a:tcPr/>
+                </a:tc>
+                <a:tc>
+                  <a:txBody>
+                    <a:bodyPr/>
+                    <a:lstStyle/>
+                    <a:p>
+                      <a:pPr latinLnBrk="1"/>
+                      <a:r>
+                        <a:rPr lang="en-US" altLang="ko-KR" sz="1100"/>
+                        <a:t>emgSTN01_02</a:t>
+                      </a:r>
+                      <a:endParaRPr lang="ko-KR" altLang="en-US" sz="1100"/>
+                    </a:p>
+                  </a:txBody>
+                  <a:tcPr/>
+                </a:tc>
+                <a:tc>
+                  <a:txBody>
+                    <a:bodyPr/>
+                    <a:lstStyle/>
+                    <a:p>
+                      <a:pPr latinLnBrk="1"/>
+                      <a:r>
+                        <a:rPr lang="en-US" altLang="ko-KR" sz="1100"/>
+                        <a:t>bool</a:t>
+                      </a:r>
+                      <a:endParaRPr lang="ko-KR" altLang="en-US" sz="1100"/>
+                    </a:p>
+                  </a:txBody>
+                  <a:tcPr/>
+                </a:tc>
+                <a:tc>
+                  <a:txBody>
+                    <a:bodyPr/>
+                    <a:lstStyle/>
+                    <a:p>
+                      <a:pPr latinLnBrk="1"/>
+                      <a:r>
+                        <a:rPr lang="en-US" altLang="ko-KR" sz="1100"/>
+                        <a:t>%IX0.0.22</a:t>
+                      </a:r>
+                      <a:endParaRPr lang="ko-KR" altLang="en-US" sz="1100"/>
+                    </a:p>
+                  </a:txBody>
+                  <a:tcPr/>
+                </a:tc>
+                <a:tc>
+                  <a:txBody>
+                    <a:bodyPr/>
+                    <a:lstStyle/>
+                    <a:p>
+                      <a:pPr latinLnBrk="1"/>
+                      <a:r>
+                        <a:rPr lang="en-US" altLang="ko-KR" sz="1100"/>
+                        <a:t>%QX0.1.22</a:t>
+                      </a:r>
                       <a:endParaRPr lang="ko-KR" altLang="en-US" sz="1100"/>
                     </a:p>
                   </a:txBody>
@@ -9524,61 +10174,80 @@
                 </a:tc>
                 <a:extLst>
                   <a:ext uri="{0D108BD9-81ED-4DB2-BD59-A6C34878D82A}">
-                    <a16:rowId xmlns:a16="http://schemas.microsoft.com/office/drawing/2014/main" val="1394497521"/>
+                    <a16:rowId xmlns:a16="http://schemas.microsoft.com/office/drawing/2014/main" val="2222945011"/>
                   </a:ext>
                 </a:extLst>
               </a:tr>
-              <a:tr h="0">
-                <a:tc>
-                  <a:txBody>
-                    <a:bodyPr/>
-                    <a:lstStyle/>
-                    <a:p>
-                      <a:pPr latinLnBrk="1"/>
-                      <a:endParaRPr lang="ko-KR" altLang="en-US" sz="1100"/>
-                    </a:p>
-                  </a:txBody>
-                  <a:tcPr/>
-                </a:tc>
-                <a:tc>
-                  <a:txBody>
-                    <a:bodyPr/>
-                    <a:lstStyle/>
-                    <a:p>
-                      <a:pPr latinLnBrk="1"/>
-                      <a:endParaRPr lang="ko-KR" altLang="en-US" sz="1100"/>
-                    </a:p>
-                  </a:txBody>
-                  <a:tcPr/>
-                </a:tc>
-                <a:tc>
-                  <a:txBody>
-                    <a:bodyPr/>
-                    <a:lstStyle/>
-                    <a:p>
-                      <a:pPr latinLnBrk="1"/>
-                      <a:endParaRPr lang="ko-KR" altLang="en-US" sz="1100"/>
-                    </a:p>
-                  </a:txBody>
-                  <a:tcPr/>
-                </a:tc>
-                <a:tc>
-                  <a:txBody>
-                    <a:bodyPr/>
-                    <a:lstStyle/>
-                    <a:p>
-                      <a:pPr latinLnBrk="1"/>
-                      <a:endParaRPr lang="ko-KR" altLang="en-US" sz="1100"/>
-                    </a:p>
-                  </a:txBody>
-                  <a:tcPr/>
-                </a:tc>
-                <a:tc>
-                  <a:txBody>
-                    <a:bodyPr/>
-                    <a:lstStyle/>
-                    <a:p>
-                      <a:pPr latinLnBrk="1"/>
+              <a:tr h="138814">
+                <a:tc>
+                  <a:txBody>
+                    <a:bodyPr/>
+                    <a:lstStyle/>
+                    <a:p>
+                      <a:pPr latinLnBrk="1"/>
+                      <a:r>
+                        <a:rPr lang="ko-KR" altLang="en-US" sz="1100"/>
+                        <a:t>시운전푸쉬</a:t>
+                      </a:r>
+                    </a:p>
+                  </a:txBody>
+                  <a:tcPr/>
+                </a:tc>
+                <a:tc>
+                  <a:txBody>
+                    <a:bodyPr/>
+                    <a:lstStyle/>
+                    <a:p>
+                      <a:pPr latinLnBrk="1"/>
+                      <a:r>
+                        <a:rPr lang="en-US" altLang="ko-KR" sz="1100"/>
+                        <a:t>testrunSTN01_02</a:t>
+                      </a:r>
+                      <a:endParaRPr lang="ko-KR" altLang="en-US" sz="1100"/>
+                    </a:p>
+                  </a:txBody>
+                  <a:tcPr/>
+                </a:tc>
+                <a:tc>
+                  <a:txBody>
+                    <a:bodyPr/>
+                    <a:lstStyle/>
+                    <a:p>
+                      <a:pPr latinLnBrk="1"/>
+                      <a:r>
+                        <a:rPr lang="en-US" altLang="ko-KR" sz="1100"/>
+                        <a:t>bool</a:t>
+                      </a:r>
+                      <a:endParaRPr lang="ko-KR" altLang="en-US" sz="1100"/>
+                    </a:p>
+                  </a:txBody>
+                  <a:tcPr/>
+                </a:tc>
+                <a:tc>
+                  <a:txBody>
+                    <a:bodyPr/>
+                    <a:lstStyle/>
+                    <a:p>
+                      <a:pPr latinLnBrk="1"/>
+                      <a:r>
+                        <a:rPr lang="en-US" altLang="ko-KR" sz="1100"/>
+                        <a:t>%IX0.0.23</a:t>
+                      </a:r>
+                      <a:endParaRPr lang="ko-KR" altLang="en-US" sz="1100"/>
+                    </a:p>
+                  </a:txBody>
+                  <a:tcPr/>
+                </a:tc>
+                <a:tc>
+                  <a:txBody>
+                    <a:bodyPr/>
+                    <a:lstStyle/>
+                    <a:p>
+                      <a:pPr latinLnBrk="1"/>
+                      <a:r>
+                        <a:rPr lang="en-US" altLang="ko-KR" sz="1100"/>
+                        <a:t>%QX0.1.23</a:t>
+                      </a:r>
                       <a:endParaRPr lang="ko-KR" altLang="en-US" sz="1100"/>
                     </a:p>
                   </a:txBody>
@@ -9608,7 +10277,1513 @@
                 </a:tc>
                 <a:extLst>
                   <a:ext uri="{0D108BD9-81ED-4DB2-BD59-A6C34878D82A}">
-                    <a16:rowId xmlns:a16="http://schemas.microsoft.com/office/drawing/2014/main" val="3431537967"/>
+                    <a16:rowId xmlns:a16="http://schemas.microsoft.com/office/drawing/2014/main" val="1831564440"/>
+                  </a:ext>
+                </a:extLst>
+              </a:tr>
+              <a:tr h="138814">
+                <a:tc>
+                  <a:txBody>
+                    <a:bodyPr/>
+                    <a:lstStyle/>
+                    <a:p>
+                      <a:pPr latinLnBrk="1"/>
+                      <a:r>
+                        <a:rPr lang="ko-KR" altLang="en-US" sz="1100" dirty="0" err="1"/>
+                        <a:t>해지푸쉬</a:t>
+                      </a:r>
+                      <a:endParaRPr lang="ko-KR" altLang="en-US" sz="1100" dirty="0"/>
+                    </a:p>
+                  </a:txBody>
+                  <a:tcPr/>
+                </a:tc>
+                <a:tc>
+                  <a:txBody>
+                    <a:bodyPr/>
+                    <a:lstStyle/>
+                    <a:p>
+                      <a:pPr latinLnBrk="1"/>
+                      <a:r>
+                        <a:rPr lang="en-US" altLang="ko-KR" sz="1100"/>
+                        <a:t>clearSTN01_02</a:t>
+                      </a:r>
+                      <a:endParaRPr lang="ko-KR" altLang="en-US" sz="1100"/>
+                    </a:p>
+                  </a:txBody>
+                  <a:tcPr/>
+                </a:tc>
+                <a:tc>
+                  <a:txBody>
+                    <a:bodyPr/>
+                    <a:lstStyle/>
+                    <a:p>
+                      <a:pPr latinLnBrk="1"/>
+                      <a:r>
+                        <a:rPr lang="en-US" altLang="ko-KR" sz="1100"/>
+                        <a:t>bool</a:t>
+                      </a:r>
+                      <a:endParaRPr lang="ko-KR" altLang="en-US" sz="1100"/>
+                    </a:p>
+                  </a:txBody>
+                  <a:tcPr/>
+                </a:tc>
+                <a:tc>
+                  <a:txBody>
+                    <a:bodyPr/>
+                    <a:lstStyle/>
+                    <a:p>
+                      <a:pPr latinLnBrk="1"/>
+                      <a:r>
+                        <a:rPr lang="en-US" altLang="ko-KR" sz="1100"/>
+                        <a:t>%IX0.0.24</a:t>
+                      </a:r>
+                      <a:endParaRPr lang="ko-KR" altLang="en-US" sz="1100"/>
+                    </a:p>
+                  </a:txBody>
+                  <a:tcPr/>
+                </a:tc>
+                <a:tc>
+                  <a:txBody>
+                    <a:bodyPr/>
+                    <a:lstStyle/>
+                    <a:p>
+                      <a:pPr latinLnBrk="1"/>
+                      <a:r>
+                        <a:rPr lang="en-US" altLang="ko-KR" sz="1100"/>
+                        <a:t>%QX0.1.24</a:t>
+                      </a:r>
+                      <a:endParaRPr lang="ko-KR" altLang="en-US" sz="1100"/>
+                    </a:p>
+                  </a:txBody>
+                  <a:tcPr/>
+                </a:tc>
+                <a:tc>
+                  <a:txBody>
+                    <a:bodyPr/>
+                    <a:lstStyle/>
+                    <a:p>
+                      <a:pPr latinLnBrk="1"/>
+                      <a:endParaRPr lang="ko-KR" altLang="en-US" sz="1100"/>
+                    </a:p>
+                  </a:txBody>
+                  <a:tcPr/>
+                </a:tc>
+                <a:tc>
+                  <a:txBody>
+                    <a:bodyPr/>
+                    <a:lstStyle/>
+                    <a:p>
+                      <a:pPr latinLnBrk="1"/>
+                      <a:endParaRPr lang="ko-KR" altLang="en-US" sz="1100"/>
+                    </a:p>
+                  </a:txBody>
+                  <a:tcPr/>
+                </a:tc>
+                <a:extLst>
+                  <a:ext uri="{0D108BD9-81ED-4DB2-BD59-A6C34878D82A}">
+                    <a16:rowId xmlns:a16="http://schemas.microsoft.com/office/drawing/2014/main" val="3490263719"/>
+                  </a:ext>
+                </a:extLst>
+              </a:tr>
+              <a:tr h="138814">
+                <a:tc>
+                  <a:txBody>
+                    <a:bodyPr/>
+                    <a:lstStyle/>
+                    <a:p>
+                      <a:pPr latinLnBrk="1"/>
+                      <a:r>
+                        <a:rPr lang="ko-KR" altLang="en-US" sz="1100"/>
+                        <a:t>복귀푸쉬</a:t>
+                      </a:r>
+                    </a:p>
+                  </a:txBody>
+                  <a:tcPr/>
+                </a:tc>
+                <a:tc>
+                  <a:txBody>
+                    <a:bodyPr/>
+                    <a:lstStyle/>
+                    <a:p>
+                      <a:pPr latinLnBrk="1"/>
+                      <a:r>
+                        <a:rPr lang="en-US" altLang="ko-KR" sz="1100"/>
+                        <a:t>homeSTN01_02</a:t>
+                      </a:r>
+                      <a:endParaRPr lang="ko-KR" altLang="en-US" sz="1100"/>
+                    </a:p>
+                  </a:txBody>
+                  <a:tcPr/>
+                </a:tc>
+                <a:tc>
+                  <a:txBody>
+                    <a:bodyPr/>
+                    <a:lstStyle/>
+                    <a:p>
+                      <a:pPr latinLnBrk="1"/>
+                      <a:r>
+                        <a:rPr lang="en-US" altLang="ko-KR" sz="1100"/>
+                        <a:t>bool</a:t>
+                      </a:r>
+                      <a:endParaRPr lang="ko-KR" altLang="en-US" sz="1100"/>
+                    </a:p>
+                  </a:txBody>
+                  <a:tcPr/>
+                </a:tc>
+                <a:tc>
+                  <a:txBody>
+                    <a:bodyPr/>
+                    <a:lstStyle/>
+                    <a:p>
+                      <a:pPr latinLnBrk="1"/>
+                      <a:r>
+                        <a:rPr lang="en-US" altLang="ko-KR" sz="1100"/>
+                        <a:t>%IX0.0.25</a:t>
+                      </a:r>
+                      <a:endParaRPr lang="ko-KR" altLang="en-US" sz="1100"/>
+                    </a:p>
+                  </a:txBody>
+                  <a:tcPr/>
+                </a:tc>
+                <a:tc>
+                  <a:txBody>
+                    <a:bodyPr/>
+                    <a:lstStyle/>
+                    <a:p>
+                      <a:pPr latinLnBrk="1"/>
+                      <a:r>
+                        <a:rPr lang="en-US" altLang="ko-KR" sz="1100"/>
+                        <a:t>%QX0.1.25</a:t>
+                      </a:r>
+                      <a:endParaRPr lang="ko-KR" altLang="en-US" sz="1100"/>
+                    </a:p>
+                  </a:txBody>
+                  <a:tcPr/>
+                </a:tc>
+                <a:tc>
+                  <a:txBody>
+                    <a:bodyPr/>
+                    <a:lstStyle/>
+                    <a:p>
+                      <a:pPr latinLnBrk="1"/>
+                      <a:endParaRPr lang="ko-KR" altLang="en-US" sz="1100"/>
+                    </a:p>
+                  </a:txBody>
+                  <a:tcPr/>
+                </a:tc>
+                <a:tc>
+                  <a:txBody>
+                    <a:bodyPr/>
+                    <a:lstStyle/>
+                    <a:p>
+                      <a:pPr latinLnBrk="1"/>
+                      <a:endParaRPr lang="ko-KR" altLang="en-US" sz="1100"/>
+                    </a:p>
+                  </a:txBody>
+                  <a:tcPr/>
+                </a:tc>
+                <a:extLst>
+                  <a:ext uri="{0D108BD9-81ED-4DB2-BD59-A6C34878D82A}">
+                    <a16:rowId xmlns:a16="http://schemas.microsoft.com/office/drawing/2014/main" val="1074727233"/>
+                  </a:ext>
+                </a:extLst>
+              </a:tr>
+              <a:tr h="138814">
+                <a:tc>
+                  <a:txBody>
+                    <a:bodyPr/>
+                    <a:lstStyle/>
+                    <a:p>
+                      <a:pPr latinLnBrk="1"/>
+                      <a:endParaRPr lang="ko-KR" altLang="en-US" sz="1100"/>
+                    </a:p>
+                  </a:txBody>
+                  <a:tcPr/>
+                </a:tc>
+                <a:tc>
+                  <a:txBody>
+                    <a:bodyPr/>
+                    <a:lstStyle/>
+                    <a:p>
+                      <a:pPr latinLnBrk="1"/>
+                      <a:endParaRPr lang="ko-KR" altLang="en-US" sz="1100"/>
+                    </a:p>
+                  </a:txBody>
+                  <a:tcPr/>
+                </a:tc>
+                <a:tc>
+                  <a:txBody>
+                    <a:bodyPr/>
+                    <a:lstStyle/>
+                    <a:p>
+                      <a:pPr latinLnBrk="1"/>
+                      <a:endParaRPr lang="ko-KR" altLang="en-US" sz="1100"/>
+                    </a:p>
+                  </a:txBody>
+                  <a:tcPr/>
+                </a:tc>
+                <a:tc>
+                  <a:txBody>
+                    <a:bodyPr/>
+                    <a:lstStyle/>
+                    <a:p>
+                      <a:pPr latinLnBrk="1"/>
+                      <a:endParaRPr lang="ko-KR" altLang="en-US" sz="1100"/>
+                    </a:p>
+                  </a:txBody>
+                  <a:tcPr/>
+                </a:tc>
+                <a:tc>
+                  <a:txBody>
+                    <a:bodyPr/>
+                    <a:lstStyle/>
+                    <a:p>
+                      <a:pPr latinLnBrk="1"/>
+                      <a:endParaRPr lang="ko-KR" altLang="en-US" sz="1100"/>
+                    </a:p>
+                  </a:txBody>
+                  <a:tcPr/>
+                </a:tc>
+                <a:tc>
+                  <a:txBody>
+                    <a:bodyPr/>
+                    <a:lstStyle/>
+                    <a:p>
+                      <a:pPr latinLnBrk="1"/>
+                      <a:endParaRPr lang="ko-KR" altLang="en-US" sz="1100"/>
+                    </a:p>
+                  </a:txBody>
+                  <a:tcPr/>
+                </a:tc>
+                <a:tc>
+                  <a:txBody>
+                    <a:bodyPr/>
+                    <a:lstStyle/>
+                    <a:p>
+                      <a:pPr latinLnBrk="1"/>
+                      <a:endParaRPr lang="ko-KR" altLang="en-US" sz="1100"/>
+                    </a:p>
+                  </a:txBody>
+                  <a:tcPr/>
+                </a:tc>
+                <a:extLst>
+                  <a:ext uri="{0D108BD9-81ED-4DB2-BD59-A6C34878D82A}">
+                    <a16:rowId xmlns:a16="http://schemas.microsoft.com/office/drawing/2014/main" val="1792484229"/>
+                  </a:ext>
+                </a:extLst>
+              </a:tr>
+              <a:tr h="138814">
+                <a:tc>
+                  <a:txBody>
+                    <a:bodyPr/>
+                    <a:lstStyle/>
+                    <a:p>
+                      <a:pPr latinLnBrk="1"/>
+                      <a:endParaRPr lang="ko-KR" altLang="en-US" sz="1100"/>
+                    </a:p>
+                  </a:txBody>
+                  <a:tcPr/>
+                </a:tc>
+                <a:tc>
+                  <a:txBody>
+                    <a:bodyPr/>
+                    <a:lstStyle/>
+                    <a:p>
+                      <a:pPr latinLnBrk="1"/>
+                      <a:endParaRPr lang="ko-KR" altLang="en-US" sz="1100"/>
+                    </a:p>
+                  </a:txBody>
+                  <a:tcPr/>
+                </a:tc>
+                <a:tc>
+                  <a:txBody>
+                    <a:bodyPr/>
+                    <a:lstStyle/>
+                    <a:p>
+                      <a:pPr latinLnBrk="1"/>
+                      <a:endParaRPr lang="ko-KR" altLang="en-US" sz="1100"/>
+                    </a:p>
+                  </a:txBody>
+                  <a:tcPr/>
+                </a:tc>
+                <a:tc>
+                  <a:txBody>
+                    <a:bodyPr/>
+                    <a:lstStyle/>
+                    <a:p>
+                      <a:pPr latinLnBrk="1"/>
+                      <a:endParaRPr lang="ko-KR" altLang="en-US" sz="1100"/>
+                    </a:p>
+                  </a:txBody>
+                  <a:tcPr/>
+                </a:tc>
+                <a:tc>
+                  <a:txBody>
+                    <a:bodyPr/>
+                    <a:lstStyle/>
+                    <a:p>
+                      <a:pPr latinLnBrk="1"/>
+                      <a:endParaRPr lang="ko-KR" altLang="en-US" sz="1100"/>
+                    </a:p>
+                  </a:txBody>
+                  <a:tcPr/>
+                </a:tc>
+                <a:tc>
+                  <a:txBody>
+                    <a:bodyPr/>
+                    <a:lstStyle/>
+                    <a:p>
+                      <a:pPr latinLnBrk="1"/>
+                      <a:endParaRPr lang="ko-KR" altLang="en-US" sz="1100"/>
+                    </a:p>
+                  </a:txBody>
+                  <a:tcPr/>
+                </a:tc>
+                <a:tc>
+                  <a:txBody>
+                    <a:bodyPr/>
+                    <a:lstStyle/>
+                    <a:p>
+                      <a:pPr latinLnBrk="1"/>
+                      <a:endParaRPr lang="ko-KR" altLang="en-US" sz="1100"/>
+                    </a:p>
+                  </a:txBody>
+                  <a:tcPr/>
+                </a:tc>
+                <a:extLst>
+                  <a:ext uri="{0D108BD9-81ED-4DB2-BD59-A6C34878D82A}">
+                    <a16:rowId xmlns:a16="http://schemas.microsoft.com/office/drawing/2014/main" val="1730575481"/>
+                  </a:ext>
+                </a:extLst>
+              </a:tr>
+              <a:tr h="138814">
+                <a:tc>
+                  <a:txBody>
+                    <a:bodyPr/>
+                    <a:lstStyle/>
+                    <a:p>
+                      <a:pPr latinLnBrk="1"/>
+                      <a:r>
+                        <a:rPr lang="ko-KR" altLang="en-US" sz="1100"/>
+                        <a:t>운전램프</a:t>
+                      </a:r>
+                    </a:p>
+                  </a:txBody>
+                  <a:tcPr/>
+                </a:tc>
+                <a:tc>
+                  <a:txBody>
+                    <a:bodyPr/>
+                    <a:lstStyle/>
+                    <a:p>
+                      <a:pPr latinLnBrk="1"/>
+                      <a:r>
+                        <a:rPr lang="en-US" altLang="ko-KR" sz="1100"/>
+                        <a:t>driveLamp</a:t>
+                      </a:r>
+                      <a:endParaRPr lang="ko-KR" altLang="en-US" sz="1100"/>
+                    </a:p>
+                  </a:txBody>
+                  <a:tcPr/>
+                </a:tc>
+                <a:tc>
+                  <a:txBody>
+                    <a:bodyPr/>
+                    <a:lstStyle/>
+                    <a:p>
+                      <a:pPr latinLnBrk="1"/>
+                      <a:r>
+                        <a:rPr lang="en-US" altLang="ko-KR" sz="1100"/>
+                        <a:t>bool</a:t>
+                      </a:r>
+                      <a:endParaRPr lang="ko-KR" altLang="en-US" sz="1100"/>
+                    </a:p>
+                  </a:txBody>
+                  <a:tcPr/>
+                </a:tc>
+                <a:tc>
+                  <a:txBody>
+                    <a:bodyPr/>
+                    <a:lstStyle/>
+                    <a:p>
+                      <a:pPr latinLnBrk="1"/>
+                      <a:endParaRPr lang="ko-KR" altLang="en-US" sz="1100"/>
+                    </a:p>
+                  </a:txBody>
+                  <a:tcPr/>
+                </a:tc>
+                <a:tc>
+                  <a:txBody>
+                    <a:bodyPr/>
+                    <a:lstStyle/>
+                    <a:p>
+                      <a:pPr latinLnBrk="1"/>
+                      <a:r>
+                        <a:rPr lang="en-US" altLang="ko-KR" sz="1100"/>
+                        <a:t>%QX0.1.26</a:t>
+                      </a:r>
+                      <a:endParaRPr lang="ko-KR" altLang="en-US" sz="1100"/>
+                    </a:p>
+                  </a:txBody>
+                  <a:tcPr/>
+                </a:tc>
+                <a:tc>
+                  <a:txBody>
+                    <a:bodyPr/>
+                    <a:lstStyle/>
+                    <a:p>
+                      <a:pPr latinLnBrk="1"/>
+                      <a:endParaRPr lang="ko-KR" altLang="en-US" sz="1100"/>
+                    </a:p>
+                  </a:txBody>
+                  <a:tcPr/>
+                </a:tc>
+                <a:tc>
+                  <a:txBody>
+                    <a:bodyPr/>
+                    <a:lstStyle/>
+                    <a:p>
+                      <a:pPr latinLnBrk="1"/>
+                      <a:endParaRPr lang="ko-KR" altLang="en-US" sz="1100"/>
+                    </a:p>
+                  </a:txBody>
+                  <a:tcPr/>
+                </a:tc>
+                <a:extLst>
+                  <a:ext uri="{0D108BD9-81ED-4DB2-BD59-A6C34878D82A}">
+                    <a16:rowId xmlns:a16="http://schemas.microsoft.com/office/drawing/2014/main" val="818321908"/>
+                  </a:ext>
+                </a:extLst>
+              </a:tr>
+              <a:tr h="138814">
+                <a:tc>
+                  <a:txBody>
+                    <a:bodyPr/>
+                    <a:lstStyle/>
+                    <a:p>
+                      <a:pPr latinLnBrk="1"/>
+                      <a:r>
+                        <a:rPr lang="ko-KR" altLang="en-US" sz="1100"/>
+                        <a:t>자동램프</a:t>
+                      </a:r>
+                    </a:p>
+                  </a:txBody>
+                  <a:tcPr/>
+                </a:tc>
+                <a:tc>
+                  <a:txBody>
+                    <a:bodyPr/>
+                    <a:lstStyle/>
+                    <a:p>
+                      <a:pPr latinLnBrk="1"/>
+                      <a:r>
+                        <a:rPr lang="en-US" altLang="ko-KR" sz="1100"/>
+                        <a:t>autoLamp</a:t>
+                      </a:r>
+                      <a:endParaRPr lang="ko-KR" altLang="en-US" sz="1100"/>
+                    </a:p>
+                  </a:txBody>
+                  <a:tcPr/>
+                </a:tc>
+                <a:tc>
+                  <a:txBody>
+                    <a:bodyPr/>
+                    <a:lstStyle/>
+                    <a:p>
+                      <a:pPr latinLnBrk="1"/>
+                      <a:r>
+                        <a:rPr lang="en-US" altLang="ko-KR" sz="1100"/>
+                        <a:t>bool</a:t>
+                      </a:r>
+                      <a:endParaRPr lang="ko-KR" altLang="en-US" sz="1100"/>
+                    </a:p>
+                  </a:txBody>
+                  <a:tcPr/>
+                </a:tc>
+                <a:tc>
+                  <a:txBody>
+                    <a:bodyPr/>
+                    <a:lstStyle/>
+                    <a:p>
+                      <a:pPr latinLnBrk="1"/>
+                      <a:endParaRPr lang="ko-KR" altLang="en-US" sz="1100"/>
+                    </a:p>
+                  </a:txBody>
+                  <a:tcPr/>
+                </a:tc>
+                <a:tc>
+                  <a:txBody>
+                    <a:bodyPr/>
+                    <a:lstStyle/>
+                    <a:p>
+                      <a:pPr latinLnBrk="1"/>
+                      <a:r>
+                        <a:rPr lang="en-US" altLang="ko-KR" sz="1100"/>
+                        <a:t>%QX0.1.27</a:t>
+                      </a:r>
+                      <a:endParaRPr lang="ko-KR" altLang="en-US" sz="1100"/>
+                    </a:p>
+                  </a:txBody>
+                  <a:tcPr/>
+                </a:tc>
+                <a:tc>
+                  <a:txBody>
+                    <a:bodyPr/>
+                    <a:lstStyle/>
+                    <a:p>
+                      <a:pPr latinLnBrk="1"/>
+                      <a:endParaRPr lang="ko-KR" altLang="en-US" sz="1100"/>
+                    </a:p>
+                  </a:txBody>
+                  <a:tcPr/>
+                </a:tc>
+                <a:tc>
+                  <a:txBody>
+                    <a:bodyPr/>
+                    <a:lstStyle/>
+                    <a:p>
+                      <a:pPr latinLnBrk="1"/>
+                      <a:endParaRPr lang="ko-KR" altLang="en-US" sz="1100"/>
+                    </a:p>
+                  </a:txBody>
+                  <a:tcPr/>
+                </a:tc>
+                <a:extLst>
+                  <a:ext uri="{0D108BD9-81ED-4DB2-BD59-A6C34878D82A}">
+                    <a16:rowId xmlns:a16="http://schemas.microsoft.com/office/drawing/2014/main" val="3194479050"/>
+                  </a:ext>
+                </a:extLst>
+              </a:tr>
+              <a:tr h="138814">
+                <a:tc>
+                  <a:txBody>
+                    <a:bodyPr/>
+                    <a:lstStyle/>
+                    <a:p>
+                      <a:pPr latinLnBrk="1"/>
+                      <a:r>
+                        <a:rPr lang="ko-KR" altLang="en-US" sz="1100"/>
+                        <a:t>수동램프</a:t>
+                      </a:r>
+                    </a:p>
+                  </a:txBody>
+                  <a:tcPr/>
+                </a:tc>
+                <a:tc>
+                  <a:txBody>
+                    <a:bodyPr/>
+                    <a:lstStyle/>
+                    <a:p>
+                      <a:pPr latinLnBrk="1"/>
+                      <a:r>
+                        <a:rPr lang="en-US" altLang="ko-KR" sz="1100"/>
+                        <a:t>manualLamp</a:t>
+                      </a:r>
+                      <a:endParaRPr lang="ko-KR" altLang="en-US" sz="1100"/>
+                    </a:p>
+                  </a:txBody>
+                  <a:tcPr/>
+                </a:tc>
+                <a:tc>
+                  <a:txBody>
+                    <a:bodyPr/>
+                    <a:lstStyle/>
+                    <a:p>
+                      <a:pPr latinLnBrk="1"/>
+                      <a:r>
+                        <a:rPr lang="en-US" altLang="ko-KR" sz="1100"/>
+                        <a:t>bool</a:t>
+                      </a:r>
+                      <a:endParaRPr lang="ko-KR" altLang="en-US" sz="1100"/>
+                    </a:p>
+                  </a:txBody>
+                  <a:tcPr/>
+                </a:tc>
+                <a:tc>
+                  <a:txBody>
+                    <a:bodyPr/>
+                    <a:lstStyle/>
+                    <a:p>
+                      <a:pPr latinLnBrk="1"/>
+                      <a:endParaRPr lang="ko-KR" altLang="en-US" sz="1100"/>
+                    </a:p>
+                  </a:txBody>
+                  <a:tcPr/>
+                </a:tc>
+                <a:tc>
+                  <a:txBody>
+                    <a:bodyPr/>
+                    <a:lstStyle/>
+                    <a:p>
+                      <a:pPr latinLnBrk="1"/>
+                      <a:r>
+                        <a:rPr lang="en-US" altLang="ko-KR" sz="1100"/>
+                        <a:t>%QX0.1.28</a:t>
+                      </a:r>
+                      <a:endParaRPr lang="ko-KR" altLang="en-US" sz="1100"/>
+                    </a:p>
+                  </a:txBody>
+                  <a:tcPr/>
+                </a:tc>
+                <a:tc>
+                  <a:txBody>
+                    <a:bodyPr/>
+                    <a:lstStyle/>
+                    <a:p>
+                      <a:pPr latinLnBrk="1"/>
+                      <a:endParaRPr lang="ko-KR" altLang="en-US" sz="1100"/>
+                    </a:p>
+                  </a:txBody>
+                  <a:tcPr/>
+                </a:tc>
+                <a:tc>
+                  <a:txBody>
+                    <a:bodyPr/>
+                    <a:lstStyle/>
+                    <a:p>
+                      <a:pPr latinLnBrk="1"/>
+                      <a:endParaRPr lang="ko-KR" altLang="en-US" sz="1100"/>
+                    </a:p>
+                  </a:txBody>
+                  <a:tcPr/>
+                </a:tc>
+                <a:extLst>
+                  <a:ext uri="{0D108BD9-81ED-4DB2-BD59-A6C34878D82A}">
+                    <a16:rowId xmlns:a16="http://schemas.microsoft.com/office/drawing/2014/main" val="555306716"/>
+                  </a:ext>
+                </a:extLst>
+              </a:tr>
+              <a:tr h="138814">
+                <a:tc>
+                  <a:txBody>
+                    <a:bodyPr/>
+                    <a:lstStyle/>
+                    <a:p>
+                      <a:pPr latinLnBrk="1"/>
+                      <a:r>
+                        <a:rPr lang="ko-KR" altLang="en-US" sz="1100"/>
+                        <a:t>시운전램프</a:t>
+                      </a:r>
+                    </a:p>
+                  </a:txBody>
+                  <a:tcPr/>
+                </a:tc>
+                <a:tc>
+                  <a:txBody>
+                    <a:bodyPr/>
+                    <a:lstStyle/>
+                    <a:p>
+                      <a:pPr latinLnBrk="1"/>
+                      <a:r>
+                        <a:rPr lang="en-US" altLang="ko-KR" sz="1100"/>
+                        <a:t>testrunLamp</a:t>
+                      </a:r>
+                      <a:endParaRPr lang="ko-KR" altLang="en-US" sz="1100"/>
+                    </a:p>
+                  </a:txBody>
+                  <a:tcPr/>
+                </a:tc>
+                <a:tc>
+                  <a:txBody>
+                    <a:bodyPr/>
+                    <a:lstStyle/>
+                    <a:p>
+                      <a:pPr latinLnBrk="1"/>
+                      <a:r>
+                        <a:rPr lang="en-US" altLang="ko-KR" sz="1100"/>
+                        <a:t>bool</a:t>
+                      </a:r>
+                      <a:endParaRPr lang="ko-KR" altLang="en-US" sz="1100"/>
+                    </a:p>
+                  </a:txBody>
+                  <a:tcPr/>
+                </a:tc>
+                <a:tc>
+                  <a:txBody>
+                    <a:bodyPr/>
+                    <a:lstStyle/>
+                    <a:p>
+                      <a:pPr latinLnBrk="1"/>
+                      <a:endParaRPr lang="ko-KR" altLang="en-US" sz="1100"/>
+                    </a:p>
+                  </a:txBody>
+                  <a:tcPr/>
+                </a:tc>
+                <a:tc>
+                  <a:txBody>
+                    <a:bodyPr/>
+                    <a:lstStyle/>
+                    <a:p>
+                      <a:pPr latinLnBrk="1"/>
+                      <a:r>
+                        <a:rPr lang="en-US" altLang="ko-KR" sz="1100"/>
+                        <a:t>%QX0.1.29</a:t>
+                      </a:r>
+                      <a:endParaRPr lang="ko-KR" altLang="en-US" sz="1100"/>
+                    </a:p>
+                  </a:txBody>
+                  <a:tcPr/>
+                </a:tc>
+                <a:tc>
+                  <a:txBody>
+                    <a:bodyPr/>
+                    <a:lstStyle/>
+                    <a:p>
+                      <a:pPr latinLnBrk="1"/>
+                      <a:endParaRPr lang="ko-KR" altLang="en-US" sz="1100"/>
+                    </a:p>
+                  </a:txBody>
+                  <a:tcPr/>
+                </a:tc>
+                <a:tc>
+                  <a:txBody>
+                    <a:bodyPr/>
+                    <a:lstStyle/>
+                    <a:p>
+                      <a:pPr latinLnBrk="1"/>
+                      <a:endParaRPr lang="ko-KR" altLang="en-US" sz="1100"/>
+                    </a:p>
+                  </a:txBody>
+                  <a:tcPr/>
+                </a:tc>
+                <a:extLst>
+                  <a:ext uri="{0D108BD9-81ED-4DB2-BD59-A6C34878D82A}">
+                    <a16:rowId xmlns:a16="http://schemas.microsoft.com/office/drawing/2014/main" val="2398931908"/>
+                  </a:ext>
+                </a:extLst>
+              </a:tr>
+              <a:tr h="138814">
+                <a:tc>
+                  <a:txBody>
+                    <a:bodyPr/>
+                    <a:lstStyle/>
+                    <a:p>
+                      <a:pPr latinLnBrk="1"/>
+                      <a:r>
+                        <a:rPr lang="ko-KR" altLang="en-US" sz="1100"/>
+                        <a:t>정지램프</a:t>
+                      </a:r>
+                    </a:p>
+                  </a:txBody>
+                  <a:tcPr/>
+                </a:tc>
+                <a:tc>
+                  <a:txBody>
+                    <a:bodyPr/>
+                    <a:lstStyle/>
+                    <a:p>
+                      <a:pPr latinLnBrk="1"/>
+                      <a:r>
+                        <a:rPr lang="en-US" altLang="ko-KR" sz="1100"/>
+                        <a:t>stopLamp</a:t>
+                      </a:r>
+                      <a:endParaRPr lang="ko-KR" altLang="en-US" sz="1100"/>
+                    </a:p>
+                  </a:txBody>
+                  <a:tcPr/>
+                </a:tc>
+                <a:tc>
+                  <a:txBody>
+                    <a:bodyPr/>
+                    <a:lstStyle/>
+                    <a:p>
+                      <a:pPr latinLnBrk="1"/>
+                      <a:r>
+                        <a:rPr lang="en-US" altLang="ko-KR" sz="1100"/>
+                        <a:t>bool</a:t>
+                      </a:r>
+                      <a:endParaRPr lang="ko-KR" altLang="en-US" sz="1100"/>
+                    </a:p>
+                  </a:txBody>
+                  <a:tcPr/>
+                </a:tc>
+                <a:tc>
+                  <a:txBody>
+                    <a:bodyPr/>
+                    <a:lstStyle/>
+                    <a:p>
+                      <a:pPr latinLnBrk="1"/>
+                      <a:endParaRPr lang="ko-KR" altLang="en-US" sz="1100"/>
+                    </a:p>
+                  </a:txBody>
+                  <a:tcPr/>
+                </a:tc>
+                <a:tc>
+                  <a:txBody>
+                    <a:bodyPr/>
+                    <a:lstStyle/>
+                    <a:p>
+                      <a:pPr latinLnBrk="1"/>
+                      <a:r>
+                        <a:rPr lang="en-US" altLang="ko-KR" sz="1100"/>
+                        <a:t>%QX0.1.30</a:t>
+                      </a:r>
+                      <a:endParaRPr lang="ko-KR" altLang="en-US" sz="1100"/>
+                    </a:p>
+                  </a:txBody>
+                  <a:tcPr/>
+                </a:tc>
+                <a:tc>
+                  <a:txBody>
+                    <a:bodyPr/>
+                    <a:lstStyle/>
+                    <a:p>
+                      <a:pPr latinLnBrk="1"/>
+                      <a:endParaRPr lang="ko-KR" altLang="en-US" sz="1100"/>
+                    </a:p>
+                  </a:txBody>
+                  <a:tcPr/>
+                </a:tc>
+                <a:tc>
+                  <a:txBody>
+                    <a:bodyPr/>
+                    <a:lstStyle/>
+                    <a:p>
+                      <a:pPr latinLnBrk="1"/>
+                      <a:endParaRPr lang="ko-KR" altLang="en-US" sz="1100"/>
+                    </a:p>
+                  </a:txBody>
+                  <a:tcPr/>
+                </a:tc>
+                <a:extLst>
+                  <a:ext uri="{0D108BD9-81ED-4DB2-BD59-A6C34878D82A}">
+                    <a16:rowId xmlns:a16="http://schemas.microsoft.com/office/drawing/2014/main" val="2205839795"/>
+                  </a:ext>
+                </a:extLst>
+              </a:tr>
+              <a:tr h="138814">
+                <a:tc>
+                  <a:txBody>
+                    <a:bodyPr/>
+                    <a:lstStyle/>
+                    <a:p>
+                      <a:pPr latinLnBrk="1"/>
+                      <a:r>
+                        <a:rPr lang="ko-KR" altLang="en-US" sz="1100"/>
+                        <a:t>준비램프</a:t>
+                      </a:r>
+                    </a:p>
+                  </a:txBody>
+                  <a:tcPr/>
+                </a:tc>
+                <a:tc>
+                  <a:txBody>
+                    <a:bodyPr/>
+                    <a:lstStyle/>
+                    <a:p>
+                      <a:pPr latinLnBrk="1"/>
+                      <a:r>
+                        <a:rPr lang="en-US" altLang="ko-KR" sz="1100"/>
+                        <a:t>readyLamp</a:t>
+                      </a:r>
+                      <a:endParaRPr lang="ko-KR" altLang="en-US" sz="1100"/>
+                    </a:p>
+                  </a:txBody>
+                  <a:tcPr/>
+                </a:tc>
+                <a:tc>
+                  <a:txBody>
+                    <a:bodyPr/>
+                    <a:lstStyle/>
+                    <a:p>
+                      <a:pPr latinLnBrk="1"/>
+                      <a:r>
+                        <a:rPr lang="en-US" altLang="ko-KR" sz="1100"/>
+                        <a:t>bool</a:t>
+                      </a:r>
+                      <a:endParaRPr lang="ko-KR" altLang="en-US" sz="1100"/>
+                    </a:p>
+                  </a:txBody>
+                  <a:tcPr/>
+                </a:tc>
+                <a:tc>
+                  <a:txBody>
+                    <a:bodyPr/>
+                    <a:lstStyle/>
+                    <a:p>
+                      <a:pPr latinLnBrk="1"/>
+                      <a:endParaRPr lang="ko-KR" altLang="en-US" sz="1100"/>
+                    </a:p>
+                  </a:txBody>
+                  <a:tcPr/>
+                </a:tc>
+                <a:tc>
+                  <a:txBody>
+                    <a:bodyPr/>
+                    <a:lstStyle/>
+                    <a:p>
+                      <a:pPr latinLnBrk="1"/>
+                      <a:r>
+                        <a:rPr lang="en-US" altLang="ko-KR" sz="1100"/>
+                        <a:t>%QX0.1.31</a:t>
+                      </a:r>
+                      <a:endParaRPr lang="ko-KR" altLang="en-US" sz="1100"/>
+                    </a:p>
+                  </a:txBody>
+                  <a:tcPr/>
+                </a:tc>
+                <a:tc>
+                  <a:txBody>
+                    <a:bodyPr/>
+                    <a:lstStyle/>
+                    <a:p>
+                      <a:pPr latinLnBrk="1"/>
+                      <a:endParaRPr lang="ko-KR" altLang="en-US" sz="1100"/>
+                    </a:p>
+                  </a:txBody>
+                  <a:tcPr/>
+                </a:tc>
+                <a:tc>
+                  <a:txBody>
+                    <a:bodyPr/>
+                    <a:lstStyle/>
+                    <a:p>
+                      <a:pPr latinLnBrk="1"/>
+                      <a:endParaRPr lang="ko-KR" altLang="en-US" sz="1100"/>
+                    </a:p>
+                  </a:txBody>
+                  <a:tcPr/>
+                </a:tc>
+                <a:extLst>
+                  <a:ext uri="{0D108BD9-81ED-4DB2-BD59-A6C34878D82A}">
+                    <a16:rowId xmlns:a16="http://schemas.microsoft.com/office/drawing/2014/main" val="761613937"/>
+                  </a:ext>
+                </a:extLst>
+              </a:tr>
+              <a:tr h="138814">
+                <a:tc>
+                  <a:txBody>
+                    <a:bodyPr/>
+                    <a:lstStyle/>
+                    <a:p>
+                      <a:pPr latinLnBrk="1"/>
+                      <a:r>
+                        <a:rPr lang="ko-KR" altLang="en-US" sz="1100"/>
+                        <a:t>대기램프</a:t>
+                      </a:r>
+                    </a:p>
+                  </a:txBody>
+                  <a:tcPr/>
+                </a:tc>
+                <a:tc>
+                  <a:txBody>
+                    <a:bodyPr/>
+                    <a:lstStyle/>
+                    <a:p>
+                      <a:pPr latinLnBrk="1"/>
+                      <a:r>
+                        <a:rPr lang="en-US" altLang="ko-KR" sz="1100"/>
+                        <a:t>idleLamp</a:t>
+                      </a:r>
+                      <a:endParaRPr lang="ko-KR" altLang="en-US" sz="1100"/>
+                    </a:p>
+                  </a:txBody>
+                  <a:tcPr/>
+                </a:tc>
+                <a:tc>
+                  <a:txBody>
+                    <a:bodyPr/>
+                    <a:lstStyle/>
+                    <a:p>
+                      <a:pPr latinLnBrk="1"/>
+                      <a:r>
+                        <a:rPr lang="en-US" altLang="ko-KR" sz="1100"/>
+                        <a:t>bool</a:t>
+                      </a:r>
+                      <a:endParaRPr lang="ko-KR" altLang="en-US" sz="1100"/>
+                    </a:p>
+                  </a:txBody>
+                  <a:tcPr/>
+                </a:tc>
+                <a:tc>
+                  <a:txBody>
+                    <a:bodyPr/>
+                    <a:lstStyle/>
+                    <a:p>
+                      <a:pPr latinLnBrk="1"/>
+                      <a:endParaRPr lang="ko-KR" altLang="en-US" sz="1100"/>
+                    </a:p>
+                  </a:txBody>
+                  <a:tcPr/>
+                </a:tc>
+                <a:tc>
+                  <a:txBody>
+                    <a:bodyPr/>
+                    <a:lstStyle/>
+                    <a:p>
+                      <a:pPr latinLnBrk="1"/>
+                      <a:r>
+                        <a:rPr lang="en-US" altLang="ko-KR" sz="1100"/>
+                        <a:t>%QX0.1.32</a:t>
+                      </a:r>
+                      <a:endParaRPr lang="ko-KR" altLang="en-US" sz="1100"/>
+                    </a:p>
+                  </a:txBody>
+                  <a:tcPr/>
+                </a:tc>
+                <a:tc>
+                  <a:txBody>
+                    <a:bodyPr/>
+                    <a:lstStyle/>
+                    <a:p>
+                      <a:pPr latinLnBrk="1"/>
+                      <a:endParaRPr lang="ko-KR" altLang="en-US" sz="1100"/>
+                    </a:p>
+                  </a:txBody>
+                  <a:tcPr/>
+                </a:tc>
+                <a:tc>
+                  <a:txBody>
+                    <a:bodyPr/>
+                    <a:lstStyle/>
+                    <a:p>
+                      <a:pPr latinLnBrk="1"/>
+                      <a:endParaRPr lang="ko-KR" altLang="en-US" sz="1100"/>
+                    </a:p>
+                  </a:txBody>
+                  <a:tcPr/>
+                </a:tc>
+                <a:extLst>
+                  <a:ext uri="{0D108BD9-81ED-4DB2-BD59-A6C34878D82A}">
+                    <a16:rowId xmlns:a16="http://schemas.microsoft.com/office/drawing/2014/main" val="1356383543"/>
+                  </a:ext>
+                </a:extLst>
+              </a:tr>
+              <a:tr h="138814">
+                <a:tc>
+                  <a:txBody>
+                    <a:bodyPr/>
+                    <a:lstStyle/>
+                    <a:p>
+                      <a:pPr latinLnBrk="1"/>
+                      <a:r>
+                        <a:rPr lang="ko-KR" altLang="en-US" sz="1100"/>
+                        <a:t>비상램프</a:t>
+                      </a:r>
+                    </a:p>
+                  </a:txBody>
+                  <a:tcPr/>
+                </a:tc>
+                <a:tc>
+                  <a:txBody>
+                    <a:bodyPr/>
+                    <a:lstStyle/>
+                    <a:p>
+                      <a:pPr latinLnBrk="1"/>
+                      <a:r>
+                        <a:rPr lang="en-US" altLang="ko-KR" sz="1100"/>
+                        <a:t>emgLamp</a:t>
+                      </a:r>
+                      <a:endParaRPr lang="ko-KR" altLang="en-US" sz="1100"/>
+                    </a:p>
+                  </a:txBody>
+                  <a:tcPr/>
+                </a:tc>
+                <a:tc>
+                  <a:txBody>
+                    <a:bodyPr/>
+                    <a:lstStyle/>
+                    <a:p>
+                      <a:pPr latinLnBrk="1"/>
+                      <a:r>
+                        <a:rPr lang="en-US" altLang="ko-KR" sz="1100"/>
+                        <a:t>bool</a:t>
+                      </a:r>
+                      <a:endParaRPr lang="ko-KR" altLang="en-US" sz="1100"/>
+                    </a:p>
+                  </a:txBody>
+                  <a:tcPr/>
+                </a:tc>
+                <a:tc>
+                  <a:txBody>
+                    <a:bodyPr/>
+                    <a:lstStyle/>
+                    <a:p>
+                      <a:pPr latinLnBrk="1"/>
+                      <a:endParaRPr lang="ko-KR" altLang="en-US" sz="1100"/>
+                    </a:p>
+                  </a:txBody>
+                  <a:tcPr/>
+                </a:tc>
+                <a:tc>
+                  <a:txBody>
+                    <a:bodyPr/>
+                    <a:lstStyle/>
+                    <a:p>
+                      <a:pPr latinLnBrk="1"/>
+                      <a:r>
+                        <a:rPr lang="en-US" altLang="ko-KR" sz="1100"/>
+                        <a:t>%QX0.1.33</a:t>
+                      </a:r>
+                      <a:endParaRPr lang="ko-KR" altLang="en-US" sz="1100"/>
+                    </a:p>
+                  </a:txBody>
+                  <a:tcPr/>
+                </a:tc>
+                <a:tc>
+                  <a:txBody>
+                    <a:bodyPr/>
+                    <a:lstStyle/>
+                    <a:p>
+                      <a:pPr latinLnBrk="1"/>
+                      <a:endParaRPr lang="ko-KR" altLang="en-US" sz="1100"/>
+                    </a:p>
+                  </a:txBody>
+                  <a:tcPr/>
+                </a:tc>
+                <a:tc>
+                  <a:txBody>
+                    <a:bodyPr/>
+                    <a:lstStyle/>
+                    <a:p>
+                      <a:pPr latinLnBrk="1"/>
+                      <a:endParaRPr lang="ko-KR" altLang="en-US" sz="1100"/>
+                    </a:p>
+                  </a:txBody>
+                  <a:tcPr/>
+                </a:tc>
+                <a:extLst>
+                  <a:ext uri="{0D108BD9-81ED-4DB2-BD59-A6C34878D82A}">
+                    <a16:rowId xmlns:a16="http://schemas.microsoft.com/office/drawing/2014/main" val="1426315911"/>
+                  </a:ext>
+                </a:extLst>
+              </a:tr>
+              <a:tr h="138814">
+                <a:tc>
+                  <a:txBody>
+                    <a:bodyPr/>
+                    <a:lstStyle/>
+                    <a:p>
+                      <a:pPr latinLnBrk="1"/>
+                      <a:endParaRPr lang="ko-KR" altLang="en-US" sz="1100"/>
+                    </a:p>
+                  </a:txBody>
+                  <a:tcPr/>
+                </a:tc>
+                <a:tc>
+                  <a:txBody>
+                    <a:bodyPr/>
+                    <a:lstStyle/>
+                    <a:p>
+                      <a:pPr latinLnBrk="1"/>
+                      <a:endParaRPr lang="ko-KR" altLang="en-US" sz="1100"/>
+                    </a:p>
+                  </a:txBody>
+                  <a:tcPr/>
+                </a:tc>
+                <a:tc>
+                  <a:txBody>
+                    <a:bodyPr/>
+                    <a:lstStyle/>
+                    <a:p>
+                      <a:pPr latinLnBrk="1"/>
+                      <a:endParaRPr lang="ko-KR" altLang="en-US" sz="1100"/>
+                    </a:p>
+                  </a:txBody>
+                  <a:tcPr/>
+                </a:tc>
+                <a:tc>
+                  <a:txBody>
+                    <a:bodyPr/>
+                    <a:lstStyle/>
+                    <a:p>
+                      <a:pPr latinLnBrk="1"/>
+                      <a:endParaRPr lang="ko-KR" altLang="en-US" sz="1100"/>
+                    </a:p>
+                  </a:txBody>
+                  <a:tcPr/>
+                </a:tc>
+                <a:tc>
+                  <a:txBody>
+                    <a:bodyPr/>
+                    <a:lstStyle/>
+                    <a:p>
+                      <a:pPr latinLnBrk="1"/>
+                      <a:endParaRPr lang="ko-KR" altLang="en-US" sz="1100"/>
+                    </a:p>
+                  </a:txBody>
+                  <a:tcPr/>
+                </a:tc>
+                <a:tc>
+                  <a:txBody>
+                    <a:bodyPr/>
+                    <a:lstStyle/>
+                    <a:p>
+                      <a:pPr latinLnBrk="1"/>
+                      <a:endParaRPr lang="ko-KR" altLang="en-US" sz="1100"/>
+                    </a:p>
+                  </a:txBody>
+                  <a:tcPr/>
+                </a:tc>
+                <a:tc>
+                  <a:txBody>
+                    <a:bodyPr/>
+                    <a:lstStyle/>
+                    <a:p>
+                      <a:pPr latinLnBrk="1"/>
+                      <a:endParaRPr lang="ko-KR" altLang="en-US" sz="1100"/>
+                    </a:p>
+                  </a:txBody>
+                  <a:tcPr/>
+                </a:tc>
+                <a:extLst>
+                  <a:ext uri="{0D108BD9-81ED-4DB2-BD59-A6C34878D82A}">
+                    <a16:rowId xmlns:a16="http://schemas.microsoft.com/office/drawing/2014/main" val="2818206697"/>
+                  </a:ext>
+                </a:extLst>
+              </a:tr>
+              <a:tr h="138814">
+                <a:tc>
+                  <a:txBody>
+                    <a:bodyPr/>
+                    <a:lstStyle/>
+                    <a:p>
+                      <a:pPr latinLnBrk="1"/>
+                      <a:endParaRPr lang="ko-KR" altLang="en-US" sz="1100"/>
+                    </a:p>
+                  </a:txBody>
+                  <a:tcPr/>
+                </a:tc>
+                <a:tc>
+                  <a:txBody>
+                    <a:bodyPr/>
+                    <a:lstStyle/>
+                    <a:p>
+                      <a:pPr latinLnBrk="1"/>
+                      <a:endParaRPr lang="ko-KR" altLang="en-US" sz="1100"/>
+                    </a:p>
+                  </a:txBody>
+                  <a:tcPr/>
+                </a:tc>
+                <a:tc>
+                  <a:txBody>
+                    <a:bodyPr/>
+                    <a:lstStyle/>
+                    <a:p>
+                      <a:pPr latinLnBrk="1"/>
+                      <a:endParaRPr lang="ko-KR" altLang="en-US" sz="1100"/>
+                    </a:p>
+                  </a:txBody>
+                  <a:tcPr/>
+                </a:tc>
+                <a:tc>
+                  <a:txBody>
+                    <a:bodyPr/>
+                    <a:lstStyle/>
+                    <a:p>
+                      <a:pPr latinLnBrk="1"/>
+                      <a:endParaRPr lang="ko-KR" altLang="en-US" sz="1100"/>
+                    </a:p>
+                  </a:txBody>
+                  <a:tcPr/>
+                </a:tc>
+                <a:tc>
+                  <a:txBody>
+                    <a:bodyPr/>
+                    <a:lstStyle/>
+                    <a:p>
+                      <a:pPr latinLnBrk="1"/>
+                      <a:endParaRPr lang="ko-KR" altLang="en-US" sz="1100"/>
+                    </a:p>
+                  </a:txBody>
+                  <a:tcPr/>
+                </a:tc>
+                <a:tc>
+                  <a:txBody>
+                    <a:bodyPr/>
+                    <a:lstStyle/>
+                    <a:p>
+                      <a:pPr latinLnBrk="1"/>
+                      <a:endParaRPr lang="ko-KR" altLang="en-US" sz="1100"/>
+                    </a:p>
+                  </a:txBody>
+                  <a:tcPr/>
+                </a:tc>
+                <a:tc>
+                  <a:txBody>
+                    <a:bodyPr/>
+                    <a:lstStyle/>
+                    <a:p>
+                      <a:pPr latinLnBrk="1"/>
+                      <a:endParaRPr lang="ko-KR" altLang="en-US" sz="1100"/>
+                    </a:p>
+                  </a:txBody>
+                  <a:tcPr/>
+                </a:tc>
+                <a:extLst>
+                  <a:ext uri="{0D108BD9-81ED-4DB2-BD59-A6C34878D82A}">
+                    <a16:rowId xmlns:a16="http://schemas.microsoft.com/office/drawing/2014/main" val="3014727132"/>
+                  </a:ext>
+                </a:extLst>
+              </a:tr>
+              <a:tr h="138814">
+                <a:tc>
+                  <a:txBody>
+                    <a:bodyPr/>
+                    <a:lstStyle/>
+                    <a:p>
+                      <a:pPr latinLnBrk="1"/>
+                      <a:r>
+                        <a:rPr lang="ko-KR" altLang="en-US" sz="1100"/>
+                        <a:t>내부변수</a:t>
+                      </a:r>
+                    </a:p>
+                  </a:txBody>
+                  <a:tcPr/>
+                </a:tc>
+                <a:tc>
+                  <a:txBody>
+                    <a:bodyPr/>
+                    <a:lstStyle/>
+                    <a:p>
+                      <a:pPr latinLnBrk="1"/>
+                      <a:endParaRPr lang="ko-KR" altLang="en-US" sz="1100"/>
+                    </a:p>
+                  </a:txBody>
+                  <a:tcPr/>
+                </a:tc>
+                <a:tc>
+                  <a:txBody>
+                    <a:bodyPr/>
+                    <a:lstStyle/>
+                    <a:p>
+                      <a:pPr latinLnBrk="1"/>
+                      <a:endParaRPr lang="ko-KR" altLang="en-US" sz="1100"/>
+                    </a:p>
+                  </a:txBody>
+                  <a:tcPr/>
+                </a:tc>
+                <a:tc>
+                  <a:txBody>
+                    <a:bodyPr/>
+                    <a:lstStyle/>
+                    <a:p>
+                      <a:pPr latinLnBrk="1"/>
+                      <a:endParaRPr lang="ko-KR" altLang="en-US" sz="1100"/>
+                    </a:p>
+                  </a:txBody>
+                  <a:tcPr/>
+                </a:tc>
+                <a:tc>
+                  <a:txBody>
+                    <a:bodyPr/>
+                    <a:lstStyle/>
+                    <a:p>
+                      <a:pPr latinLnBrk="1"/>
+                      <a:endParaRPr lang="ko-KR" altLang="en-US" sz="1100"/>
+                    </a:p>
+                  </a:txBody>
+                  <a:tcPr/>
+                </a:tc>
+                <a:tc>
+                  <a:txBody>
+                    <a:bodyPr/>
+                    <a:lstStyle/>
+                    <a:p>
+                      <a:pPr latinLnBrk="1"/>
+                      <a:endParaRPr lang="ko-KR" altLang="en-US" sz="1100"/>
+                    </a:p>
+                  </a:txBody>
+                  <a:tcPr/>
+                </a:tc>
+                <a:tc>
+                  <a:txBody>
+                    <a:bodyPr/>
+                    <a:lstStyle/>
+                    <a:p>
+                      <a:pPr latinLnBrk="1"/>
+                      <a:endParaRPr lang="ko-KR" altLang="en-US" sz="1100"/>
+                    </a:p>
+                  </a:txBody>
+                  <a:tcPr/>
+                </a:tc>
+                <a:extLst>
+                  <a:ext uri="{0D108BD9-81ED-4DB2-BD59-A6C34878D82A}">
+                    <a16:rowId xmlns:a16="http://schemas.microsoft.com/office/drawing/2014/main" val="266361049"/>
+                  </a:ext>
+                </a:extLst>
+              </a:tr>
+              <a:tr h="138814">
+                <a:tc>
+                  <a:txBody>
+                    <a:bodyPr/>
+                    <a:lstStyle/>
+                    <a:p>
+                      <a:pPr latinLnBrk="1"/>
+                      <a:endParaRPr lang="ko-KR" altLang="en-US" sz="1100"/>
+                    </a:p>
+                  </a:txBody>
+                  <a:tcPr/>
+                </a:tc>
+                <a:tc>
+                  <a:txBody>
+                    <a:bodyPr/>
+                    <a:lstStyle/>
+                    <a:p>
+                      <a:pPr latinLnBrk="1"/>
+                      <a:endParaRPr lang="ko-KR" altLang="en-US" sz="1100"/>
+                    </a:p>
+                  </a:txBody>
+                  <a:tcPr/>
+                </a:tc>
+                <a:tc>
+                  <a:txBody>
+                    <a:bodyPr/>
+                    <a:lstStyle/>
+                    <a:p>
+                      <a:pPr latinLnBrk="1"/>
+                      <a:endParaRPr lang="ko-KR" altLang="en-US" sz="1100"/>
+                    </a:p>
+                  </a:txBody>
+                  <a:tcPr/>
+                </a:tc>
+                <a:tc>
+                  <a:txBody>
+                    <a:bodyPr/>
+                    <a:lstStyle/>
+                    <a:p>
+                      <a:pPr latinLnBrk="1"/>
+                      <a:endParaRPr lang="ko-KR" altLang="en-US" sz="1100"/>
+                    </a:p>
+                  </a:txBody>
+                  <a:tcPr/>
+                </a:tc>
+                <a:tc>
+                  <a:txBody>
+                    <a:bodyPr/>
+                    <a:lstStyle/>
+                    <a:p>
+                      <a:pPr latinLnBrk="1"/>
+                      <a:endParaRPr lang="ko-KR" altLang="en-US" sz="1100"/>
+                    </a:p>
+                  </a:txBody>
+                  <a:tcPr/>
+                </a:tc>
+                <a:tc>
+                  <a:txBody>
+                    <a:bodyPr/>
+                    <a:lstStyle/>
+                    <a:p>
+                      <a:pPr latinLnBrk="1"/>
+                      <a:endParaRPr lang="ko-KR" altLang="en-US" sz="1100"/>
+                    </a:p>
+                  </a:txBody>
+                  <a:tcPr/>
+                </a:tc>
+                <a:tc>
+                  <a:txBody>
+                    <a:bodyPr/>
+                    <a:lstStyle/>
+                    <a:p>
+                      <a:pPr latinLnBrk="1"/>
+                      <a:endParaRPr lang="ko-KR" altLang="en-US" sz="1100" dirty="0"/>
+                    </a:p>
+                  </a:txBody>
+                  <a:tcPr/>
+                </a:tc>
+                <a:extLst>
+                  <a:ext uri="{0D108BD9-81ED-4DB2-BD59-A6C34878D82A}">
+                    <a16:rowId xmlns:a16="http://schemas.microsoft.com/office/drawing/2014/main" val="4142880173"/>
                   </a:ext>
                 </a:extLst>
               </a:tr>
@@ -9619,7 +11794,7 @@
     </p:spTree>
     <p:extLst>
       <p:ext uri="{BB962C8B-B14F-4D97-AF65-F5344CB8AC3E}">
-        <p14:creationId xmlns:p14="http://schemas.microsoft.com/office/powerpoint/2010/main" val="501297352"/>
+        <p14:creationId xmlns:p14="http://schemas.microsoft.com/office/powerpoint/2010/main" val="400577736"/>
       </p:ext>
     </p:extLst>
   </p:cSld>

</xml_diff>

<commit_message>
btn lamp ppt 정의 추가
</commit_message>
<xml_diff>
--- a/DsDotNet/src/UnitTest/UnitTest.Model/ImportOfficeExample/exportDS/testA/testMy/my.pptx
+++ b/DsDotNet/src/UnitTest/UnitTest.Model/ImportOfficeExample/exportDS/testA/testMy/my.pptx
@@ -11,7 +11,6 @@
     <p:sldId id="263" r:id="rId5"/>
     <p:sldId id="259" r:id="rId6"/>
     <p:sldId id="261" r:id="rId7"/>
-    <p:sldId id="264" r:id="rId8"/>
   </p:sldIdLst>
   <p:sldSz cx="12192000" cy="6858000"/>
   <p:notesSz cx="6858000" cy="9144000"/>
@@ -265,7 +264,7 @@
           <a:p>
             <a:fld id="{E31A602F-9409-4B9A-9D14-798E704D8577}" type="datetimeFigureOut">
               <a:rPr lang="ko-KR" altLang="en-US" smtClean="0"/>
-              <a:t>2023-11-17</a:t>
+              <a:t>2023-11-20</a:t>
             </a:fld>
             <a:endParaRPr lang="ko-KR" altLang="en-US"/>
           </a:p>
@@ -463,7 +462,7 @@
           <a:p>
             <a:fld id="{E31A602F-9409-4B9A-9D14-798E704D8577}" type="datetimeFigureOut">
               <a:rPr lang="ko-KR" altLang="en-US" smtClean="0"/>
-              <a:t>2023-11-17</a:t>
+              <a:t>2023-11-20</a:t>
             </a:fld>
             <a:endParaRPr lang="ko-KR" altLang="en-US"/>
           </a:p>
@@ -671,7 +670,7 @@
           <a:p>
             <a:fld id="{E31A602F-9409-4B9A-9D14-798E704D8577}" type="datetimeFigureOut">
               <a:rPr lang="ko-KR" altLang="en-US" smtClean="0"/>
-              <a:t>2023-11-17</a:t>
+              <a:t>2023-11-20</a:t>
             </a:fld>
             <a:endParaRPr lang="ko-KR" altLang="en-US"/>
           </a:p>
@@ -869,7 +868,7 @@
           <a:p>
             <a:fld id="{E31A602F-9409-4B9A-9D14-798E704D8577}" type="datetimeFigureOut">
               <a:rPr lang="ko-KR" altLang="en-US" smtClean="0"/>
-              <a:t>2023-11-17</a:t>
+              <a:t>2023-11-20</a:t>
             </a:fld>
             <a:endParaRPr lang="ko-KR" altLang="en-US"/>
           </a:p>
@@ -1144,7 +1143,7 @@
           <a:p>
             <a:fld id="{E31A602F-9409-4B9A-9D14-798E704D8577}" type="datetimeFigureOut">
               <a:rPr lang="ko-KR" altLang="en-US" smtClean="0"/>
-              <a:t>2023-11-17</a:t>
+              <a:t>2023-11-20</a:t>
             </a:fld>
             <a:endParaRPr lang="ko-KR" altLang="en-US"/>
           </a:p>
@@ -1409,7 +1408,7 @@
           <a:p>
             <a:fld id="{E31A602F-9409-4B9A-9D14-798E704D8577}" type="datetimeFigureOut">
               <a:rPr lang="ko-KR" altLang="en-US" smtClean="0"/>
-              <a:t>2023-11-17</a:t>
+              <a:t>2023-11-20</a:t>
             </a:fld>
             <a:endParaRPr lang="ko-KR" altLang="en-US"/>
           </a:p>
@@ -1821,7 +1820,7 @@
           <a:p>
             <a:fld id="{E31A602F-9409-4B9A-9D14-798E704D8577}" type="datetimeFigureOut">
               <a:rPr lang="ko-KR" altLang="en-US" smtClean="0"/>
-              <a:t>2023-11-17</a:t>
+              <a:t>2023-11-20</a:t>
             </a:fld>
             <a:endParaRPr lang="ko-KR" altLang="en-US"/>
           </a:p>
@@ -1962,7 +1961,7 @@
           <a:p>
             <a:fld id="{E31A602F-9409-4B9A-9D14-798E704D8577}" type="datetimeFigureOut">
               <a:rPr lang="ko-KR" altLang="en-US" smtClean="0"/>
-              <a:t>2023-11-17</a:t>
+              <a:t>2023-11-20</a:t>
             </a:fld>
             <a:endParaRPr lang="ko-KR" altLang="en-US"/>
           </a:p>
@@ -2075,7 +2074,7 @@
           <a:p>
             <a:fld id="{E31A602F-9409-4B9A-9D14-798E704D8577}" type="datetimeFigureOut">
               <a:rPr lang="ko-KR" altLang="en-US" smtClean="0"/>
-              <a:t>2023-11-17</a:t>
+              <a:t>2023-11-20</a:t>
             </a:fld>
             <a:endParaRPr lang="ko-KR" altLang="en-US"/>
           </a:p>
@@ -2386,7 +2385,7 @@
           <a:p>
             <a:fld id="{E31A602F-9409-4B9A-9D14-798E704D8577}" type="datetimeFigureOut">
               <a:rPr lang="ko-KR" altLang="en-US" smtClean="0"/>
-              <a:t>2023-11-17</a:t>
+              <a:t>2023-11-20</a:t>
             </a:fld>
             <a:endParaRPr lang="ko-KR" altLang="en-US"/>
           </a:p>
@@ -2674,7 +2673,7 @@
           <a:p>
             <a:fld id="{E31A602F-9409-4B9A-9D14-798E704D8577}" type="datetimeFigureOut">
               <a:rPr lang="ko-KR" altLang="en-US" smtClean="0"/>
-              <a:t>2023-11-17</a:t>
+              <a:t>2023-11-20</a:t>
             </a:fld>
             <a:endParaRPr lang="ko-KR" altLang="en-US"/>
           </a:p>
@@ -2915,7 +2914,7 @@
           <a:p>
             <a:fld id="{E31A602F-9409-4B9A-9D14-798E704D8577}" type="datetimeFigureOut">
               <a:rPr lang="ko-KR" altLang="en-US" smtClean="0"/>
-              <a:t>2023-11-17</a:t>
+              <a:t>2023-11-20</a:t>
             </a:fld>
             <a:endParaRPr lang="ko-KR" altLang="en-US"/>
           </a:p>
@@ -7315,4495 +7314,6 @@
 </p:sld>
 </file>
 
-<file path=ppt/slides/slide7.xml><?xml version="1.0" encoding="utf-8"?>
-<p:sld xmlns:a="http://schemas.openxmlformats.org/drawingml/2006/main" xmlns:r="http://schemas.openxmlformats.org/officeDocument/2006/relationships" xmlns:p="http://schemas.openxmlformats.org/presentationml/2006/main">
-  <p:cSld>
-    <p:bg>
-      <p:bgPr>
-        <a:solidFill>
-          <a:srgbClr val="FFFFFF"/>
-        </a:solidFill>
-        <a:effectLst/>
-      </p:bgPr>
-    </p:bg>
-    <p:spTree>
-      <p:nvGrpSpPr>
-        <p:cNvPr id="1" name=""/>
-        <p:cNvGrpSpPr/>
-        <p:nvPr/>
-      </p:nvGrpSpPr>
-      <p:grpSpPr>
-        <a:xfrm>
-          <a:off x="0" y="0"/>
-          <a:ext cx="0" cy="0"/>
-          <a:chOff x="0" y="0"/>
-          <a:chExt cx="0" cy="0"/>
-        </a:xfrm>
-      </p:grpSpPr>
-      <p:sp>
-        <p:nvSpPr>
-          <p:cNvPr id="2" name="TextBox 1">
-            <a:extLst>
-              <a:ext uri="{FF2B5EF4-FFF2-40B4-BE49-F238E27FC236}">
-                <a16:creationId xmlns:a16="http://schemas.microsoft.com/office/drawing/2014/main" id="{5D81B133-158A-D4F7-EB04-221C00289E33}"/>
-              </a:ext>
-            </a:extLst>
-          </p:cNvPr>
-          <p:cNvSpPr txBox="1"/>
-          <p:nvPr/>
-        </p:nvSpPr>
-        <p:spPr>
-          <a:xfrm>
-            <a:off x="254000" y="254000"/>
-            <a:ext cx="1270000" cy="381000"/>
-          </a:xfrm>
-          <a:prstGeom prst="rect">
-            <a:avLst/>
-          </a:prstGeom>
-          <a:noFill/>
-        </p:spPr>
-        <p:txBody>
-          <a:bodyPr vert="horz" rtlCol="0">
-            <a:spAutoFit/>
-          </a:bodyPr>
-          <a:lstStyle/>
-          <a:p>
-            <a:r>
-              <a:rPr lang="en-US" altLang="ko-KR"/>
-              <a:t>IO TABLE</a:t>
-            </a:r>
-            <a:endParaRPr lang="ko-KR" altLang="en-US"/>
-          </a:p>
-        </p:txBody>
-      </p:sp>
-      <p:graphicFrame>
-        <p:nvGraphicFramePr>
-          <p:cNvPr id="3" name="표 2">
-            <a:extLst>
-              <a:ext uri="{FF2B5EF4-FFF2-40B4-BE49-F238E27FC236}">
-                <a16:creationId xmlns:a16="http://schemas.microsoft.com/office/drawing/2014/main" id="{4303EC4C-3CF5-8F05-6B6B-0280B22C47A5}"/>
-              </a:ext>
-            </a:extLst>
-          </p:cNvPr>
-          <p:cNvGraphicFramePr>
-            <a:graphicFrameLocks noGrp="1"/>
-          </p:cNvGraphicFramePr>
-          <p:nvPr>
-            <p:extLst>
-              <p:ext uri="{D42A27DB-BD31-4B8C-83A1-F6EECF244321}">
-                <p14:modId xmlns:p14="http://schemas.microsoft.com/office/powerpoint/2010/main" val="4274237101"/>
-              </p:ext>
-            </p:extLst>
-          </p:nvPr>
-        </p:nvGraphicFramePr>
-        <p:xfrm>
-          <a:off x="254000" y="634999"/>
-          <a:ext cx="11684001" cy="11308080"/>
-        </p:xfrm>
-        <a:graphic>
-          <a:graphicData uri="http://schemas.openxmlformats.org/drawingml/2006/table">
-            <a:tbl>
-              <a:tblPr firstRow="1" bandRow="1">
-                <a:tableStyleId>{5C22544A-7EE6-4342-B048-85BDC9FD1C3A}</a:tableStyleId>
-              </a:tblPr>
-              <a:tblGrid>
-                <a:gridCol w="1669143">
-                  <a:extLst>
-                    <a:ext uri="{9D8B030D-6E8A-4147-A177-3AD203B41FA5}">
-                      <a16:colId xmlns:a16="http://schemas.microsoft.com/office/drawing/2014/main" val="2038811983"/>
-                    </a:ext>
-                  </a:extLst>
-                </a:gridCol>
-                <a:gridCol w="1669143">
-                  <a:extLst>
-                    <a:ext uri="{9D8B030D-6E8A-4147-A177-3AD203B41FA5}">
-                      <a16:colId xmlns:a16="http://schemas.microsoft.com/office/drawing/2014/main" val="2561100211"/>
-                    </a:ext>
-                  </a:extLst>
-                </a:gridCol>
-                <a:gridCol w="1669143">
-                  <a:extLst>
-                    <a:ext uri="{9D8B030D-6E8A-4147-A177-3AD203B41FA5}">
-                      <a16:colId xmlns:a16="http://schemas.microsoft.com/office/drawing/2014/main" val="3831195407"/>
-                    </a:ext>
-                  </a:extLst>
-                </a:gridCol>
-                <a:gridCol w="1669143">
-                  <a:extLst>
-                    <a:ext uri="{9D8B030D-6E8A-4147-A177-3AD203B41FA5}">
-                      <a16:colId xmlns:a16="http://schemas.microsoft.com/office/drawing/2014/main" val="2215095967"/>
-                    </a:ext>
-                  </a:extLst>
-                </a:gridCol>
-                <a:gridCol w="1669143">
-                  <a:extLst>
-                    <a:ext uri="{9D8B030D-6E8A-4147-A177-3AD203B41FA5}">
-                      <a16:colId xmlns:a16="http://schemas.microsoft.com/office/drawing/2014/main" val="1606623354"/>
-                    </a:ext>
-                  </a:extLst>
-                </a:gridCol>
-                <a:gridCol w="1669143">
-                  <a:extLst>
-                    <a:ext uri="{9D8B030D-6E8A-4147-A177-3AD203B41FA5}">
-                      <a16:colId xmlns:a16="http://schemas.microsoft.com/office/drawing/2014/main" val="245280265"/>
-                    </a:ext>
-                  </a:extLst>
-                </a:gridCol>
-                <a:gridCol w="1669143">
-                  <a:extLst>
-                    <a:ext uri="{9D8B030D-6E8A-4147-A177-3AD203B41FA5}">
-                      <a16:colId xmlns:a16="http://schemas.microsoft.com/office/drawing/2014/main" val="3009386370"/>
-                    </a:ext>
-                  </a:extLst>
-                </a:gridCol>
-              </a:tblGrid>
-              <a:tr h="138814">
-                <a:tc>
-                  <a:txBody>
-                    <a:bodyPr/>
-                    <a:lstStyle/>
-                    <a:p>
-                      <a:pPr latinLnBrk="1"/>
-                      <a:r>
-                        <a:rPr lang="en-US" altLang="ko-KR" sz="1100"/>
-                        <a:t>Case</a:t>
-                      </a:r>
-                      <a:endParaRPr lang="ko-KR" altLang="en-US" sz="1100"/>
-                    </a:p>
-                  </a:txBody>
-                  <a:tcPr/>
-                </a:tc>
-                <a:tc>
-                  <a:txBody>
-                    <a:bodyPr/>
-                    <a:lstStyle/>
-                    <a:p>
-                      <a:pPr latinLnBrk="1"/>
-                      <a:r>
-                        <a:rPr lang="en-US" altLang="ko-KR" sz="1100"/>
-                        <a:t>Name</a:t>
-                      </a:r>
-                      <a:endParaRPr lang="ko-KR" altLang="en-US" sz="1100"/>
-                    </a:p>
-                  </a:txBody>
-                  <a:tcPr/>
-                </a:tc>
-                <a:tc>
-                  <a:txBody>
-                    <a:bodyPr/>
-                    <a:lstStyle/>
-                    <a:p>
-                      <a:pPr latinLnBrk="1"/>
-                      <a:r>
-                        <a:rPr lang="en-US" altLang="ko-KR" sz="1100"/>
-                        <a:t>DataType</a:t>
-                      </a:r>
-                      <a:endParaRPr lang="ko-KR" altLang="en-US" sz="1100"/>
-                    </a:p>
-                  </a:txBody>
-                  <a:tcPr/>
-                </a:tc>
-                <a:tc>
-                  <a:txBody>
-                    <a:bodyPr/>
-                    <a:lstStyle/>
-                    <a:p>
-                      <a:pPr latinLnBrk="1"/>
-                      <a:r>
-                        <a:rPr lang="en-US" altLang="ko-KR" sz="1100"/>
-                        <a:t>Input</a:t>
-                      </a:r>
-                      <a:endParaRPr lang="ko-KR" altLang="en-US" sz="1100"/>
-                    </a:p>
-                  </a:txBody>
-                  <a:tcPr/>
-                </a:tc>
-                <a:tc>
-                  <a:txBody>
-                    <a:bodyPr/>
-                    <a:lstStyle/>
-                    <a:p>
-                      <a:pPr latinLnBrk="1"/>
-                      <a:r>
-                        <a:rPr lang="en-US" altLang="ko-KR" sz="1100"/>
-                        <a:t>Output</a:t>
-                      </a:r>
-                      <a:endParaRPr lang="ko-KR" altLang="en-US" sz="1100"/>
-                    </a:p>
-                  </a:txBody>
-                  <a:tcPr/>
-                </a:tc>
-                <a:tc>
-                  <a:txBody>
-                    <a:bodyPr/>
-                    <a:lstStyle/>
-                    <a:p>
-                      <a:pPr latinLnBrk="1"/>
-                      <a:r>
-                        <a:rPr lang="en-US" altLang="ko-KR" sz="1100"/>
-                        <a:t>Job</a:t>
-                      </a:r>
-                      <a:endParaRPr lang="ko-KR" altLang="en-US" sz="1100"/>
-                    </a:p>
-                  </a:txBody>
-                  <a:tcPr/>
-                </a:tc>
-                <a:tc>
-                  <a:txBody>
-                    <a:bodyPr/>
-                    <a:lstStyle/>
-                    <a:p>
-                      <a:pPr latinLnBrk="1"/>
-                      <a:r>
-                        <a:rPr lang="en-US" altLang="ko-KR" sz="1100"/>
-                        <a:t>Func</a:t>
-                      </a:r>
-                      <a:endParaRPr lang="ko-KR" altLang="en-US" sz="1100"/>
-                    </a:p>
-                  </a:txBody>
-                  <a:tcPr/>
-                </a:tc>
-                <a:extLst>
-                  <a:ext uri="{0D108BD9-81ED-4DB2-BD59-A6C34878D82A}">
-                    <a16:rowId xmlns:a16="http://schemas.microsoft.com/office/drawing/2014/main" val="812397399"/>
-                  </a:ext>
-                </a:extLst>
-              </a:tr>
-              <a:tr h="138814">
-                <a:tc>
-                  <a:txBody>
-                    <a:bodyPr/>
-                    <a:lstStyle/>
-                    <a:p>
-                      <a:pPr latinLnBrk="1"/>
-                      <a:r>
-                        <a:rPr lang="ko-KR" altLang="en-US" sz="1100"/>
-                        <a:t>외부주소</a:t>
-                      </a:r>
-                    </a:p>
-                  </a:txBody>
-                  <a:tcPr/>
-                </a:tc>
-                <a:tc>
-                  <a:txBody>
-                    <a:bodyPr/>
-                    <a:lstStyle/>
-                    <a:p>
-                      <a:pPr latinLnBrk="1"/>
-                      <a:r>
-                        <a:rPr lang="en-US" altLang="ko-KR" sz="1100"/>
-                        <a:t>STN01_Pin."+"</a:t>
-                      </a:r>
-                      <a:endParaRPr lang="ko-KR" altLang="en-US" sz="1100"/>
-                    </a:p>
-                  </a:txBody>
-                  <a:tcPr/>
-                </a:tc>
-                <a:tc>
-                  <a:txBody>
-                    <a:bodyPr/>
-                    <a:lstStyle/>
-                    <a:p>
-                      <a:pPr latinLnBrk="1"/>
-                      <a:r>
-                        <a:rPr lang="en-US" altLang="ko-KR" sz="1100"/>
-                        <a:t>bool</a:t>
-                      </a:r>
-                      <a:endParaRPr lang="ko-KR" altLang="en-US" sz="1100"/>
-                    </a:p>
-                  </a:txBody>
-                  <a:tcPr/>
-                </a:tc>
-                <a:tc>
-                  <a:txBody>
-                    <a:bodyPr/>
-                    <a:lstStyle/>
-                    <a:p>
-                      <a:pPr latinLnBrk="1"/>
-                      <a:r>
-                        <a:rPr lang="en-US" altLang="ko-KR" sz="1100"/>
-                        <a:t>%IX0.0.0</a:t>
-                      </a:r>
-                      <a:endParaRPr lang="ko-KR" altLang="en-US" sz="1100"/>
-                    </a:p>
-                  </a:txBody>
-                  <a:tcPr/>
-                </a:tc>
-                <a:tc>
-                  <a:txBody>
-                    <a:bodyPr/>
-                    <a:lstStyle/>
-                    <a:p>
-                      <a:pPr latinLnBrk="1"/>
-                      <a:r>
-                        <a:rPr lang="en-US" altLang="ko-KR" sz="1100"/>
-                        <a:t>%QX0.1.0</a:t>
-                      </a:r>
-                      <a:endParaRPr lang="ko-KR" altLang="en-US" sz="1100"/>
-                    </a:p>
-                  </a:txBody>
-                  <a:tcPr/>
-                </a:tc>
-                <a:tc>
-                  <a:txBody>
-                    <a:bodyPr/>
-                    <a:lstStyle/>
-                    <a:p>
-                      <a:pPr latinLnBrk="1"/>
-                      <a:r>
-                        <a:rPr lang="en-US" altLang="ko-KR" sz="1100"/>
-                        <a:t>STN01_Pin_+</a:t>
-                      </a:r>
-                      <a:endParaRPr lang="ko-KR" altLang="en-US" sz="1100"/>
-                    </a:p>
-                  </a:txBody>
-                  <a:tcPr/>
-                </a:tc>
-                <a:tc>
-                  <a:txBody>
-                    <a:bodyPr/>
-                    <a:lstStyle/>
-                    <a:p>
-                      <a:pPr latinLnBrk="1"/>
-                      <a:endParaRPr lang="ko-KR" altLang="en-US" sz="1100"/>
-                    </a:p>
-                  </a:txBody>
-                  <a:tcPr/>
-                </a:tc>
-                <a:extLst>
-                  <a:ext uri="{0D108BD9-81ED-4DB2-BD59-A6C34878D82A}">
-                    <a16:rowId xmlns:a16="http://schemas.microsoft.com/office/drawing/2014/main" val="4270558751"/>
-                  </a:ext>
-                </a:extLst>
-              </a:tr>
-              <a:tr h="138814">
-                <a:tc>
-                  <a:txBody>
-                    <a:bodyPr/>
-                    <a:lstStyle/>
-                    <a:p>
-                      <a:pPr latinLnBrk="1"/>
-                      <a:r>
-                        <a:rPr lang="ko-KR" altLang="en-US" sz="1100"/>
-                        <a:t>외부주소</a:t>
-                      </a:r>
-                    </a:p>
-                  </a:txBody>
-                  <a:tcPr/>
-                </a:tc>
-                <a:tc>
-                  <a:txBody>
-                    <a:bodyPr/>
-                    <a:lstStyle/>
-                    <a:p>
-                      <a:pPr latinLnBrk="1"/>
-                      <a:r>
-                        <a:rPr lang="en-US" altLang="ko-KR" sz="1100"/>
-                        <a:t>STN01_Pin."-"</a:t>
-                      </a:r>
-                      <a:endParaRPr lang="ko-KR" altLang="en-US" sz="1100"/>
-                    </a:p>
-                  </a:txBody>
-                  <a:tcPr/>
-                </a:tc>
-                <a:tc>
-                  <a:txBody>
-                    <a:bodyPr/>
-                    <a:lstStyle/>
-                    <a:p>
-                      <a:pPr latinLnBrk="1"/>
-                      <a:r>
-                        <a:rPr lang="en-US" altLang="ko-KR" sz="1100"/>
-                        <a:t>bool</a:t>
-                      </a:r>
-                      <a:endParaRPr lang="ko-KR" altLang="en-US" sz="1100"/>
-                    </a:p>
-                  </a:txBody>
-                  <a:tcPr/>
-                </a:tc>
-                <a:tc>
-                  <a:txBody>
-                    <a:bodyPr/>
-                    <a:lstStyle/>
-                    <a:p>
-                      <a:pPr latinLnBrk="1"/>
-                      <a:r>
-                        <a:rPr lang="en-US" altLang="ko-KR" sz="1100"/>
-                        <a:t>%IX0.0.1</a:t>
-                      </a:r>
-                      <a:endParaRPr lang="ko-KR" altLang="en-US" sz="1100"/>
-                    </a:p>
-                  </a:txBody>
-                  <a:tcPr/>
-                </a:tc>
-                <a:tc>
-                  <a:txBody>
-                    <a:bodyPr/>
-                    <a:lstStyle/>
-                    <a:p>
-                      <a:pPr latinLnBrk="1"/>
-                      <a:r>
-                        <a:rPr lang="en-US" altLang="ko-KR" sz="1100"/>
-                        <a:t>%QX0.1.1</a:t>
-                      </a:r>
-                      <a:endParaRPr lang="ko-KR" altLang="en-US" sz="1100"/>
-                    </a:p>
-                  </a:txBody>
-                  <a:tcPr/>
-                </a:tc>
-                <a:tc>
-                  <a:txBody>
-                    <a:bodyPr/>
-                    <a:lstStyle/>
-                    <a:p>
-                      <a:pPr latinLnBrk="1"/>
-                      <a:r>
-                        <a:rPr lang="en-US" altLang="ko-KR" sz="1100"/>
-                        <a:t>STN01_Pin_-</a:t>
-                      </a:r>
-                      <a:endParaRPr lang="ko-KR" altLang="en-US" sz="1100"/>
-                    </a:p>
-                  </a:txBody>
-                  <a:tcPr/>
-                </a:tc>
-                <a:tc>
-                  <a:txBody>
-                    <a:bodyPr/>
-                    <a:lstStyle/>
-                    <a:p>
-                      <a:pPr latinLnBrk="1"/>
-                      <a:endParaRPr lang="ko-KR" altLang="en-US" sz="1100"/>
-                    </a:p>
-                  </a:txBody>
-                  <a:tcPr/>
-                </a:tc>
-                <a:extLst>
-                  <a:ext uri="{0D108BD9-81ED-4DB2-BD59-A6C34878D82A}">
-                    <a16:rowId xmlns:a16="http://schemas.microsoft.com/office/drawing/2014/main" val="1906562655"/>
-                  </a:ext>
-                </a:extLst>
-              </a:tr>
-              <a:tr h="138814">
-                <a:tc>
-                  <a:txBody>
-                    <a:bodyPr/>
-                    <a:lstStyle/>
-                    <a:p>
-                      <a:pPr latinLnBrk="1"/>
-                      <a:r>
-                        <a:rPr lang="ko-KR" altLang="en-US" sz="1100"/>
-                        <a:t>외부주소</a:t>
-                      </a:r>
-                    </a:p>
-                  </a:txBody>
-                  <a:tcPr/>
-                </a:tc>
-                <a:tc>
-                  <a:txBody>
-                    <a:bodyPr/>
-                    <a:lstStyle/>
-                    <a:p>
-                      <a:pPr latinLnBrk="1"/>
-                      <a:r>
-                        <a:rPr lang="en-US" altLang="ko-KR" sz="1100"/>
-                        <a:t>STN01_UsingLIB2_1."+"</a:t>
-                      </a:r>
-                      <a:endParaRPr lang="ko-KR" altLang="en-US" sz="1100"/>
-                    </a:p>
-                  </a:txBody>
-                  <a:tcPr/>
-                </a:tc>
-                <a:tc>
-                  <a:txBody>
-                    <a:bodyPr/>
-                    <a:lstStyle/>
-                    <a:p>
-                      <a:pPr latinLnBrk="1"/>
-                      <a:r>
-                        <a:rPr lang="en-US" altLang="ko-KR" sz="1100"/>
-                        <a:t>bool</a:t>
-                      </a:r>
-                      <a:endParaRPr lang="ko-KR" altLang="en-US" sz="1100"/>
-                    </a:p>
-                  </a:txBody>
-                  <a:tcPr/>
-                </a:tc>
-                <a:tc>
-                  <a:txBody>
-                    <a:bodyPr/>
-                    <a:lstStyle/>
-                    <a:p>
-                      <a:pPr latinLnBrk="1"/>
-                      <a:r>
-                        <a:rPr lang="en-US" altLang="ko-KR" sz="1100"/>
-                        <a:t>%IX0.0.2</a:t>
-                      </a:r>
-                      <a:endParaRPr lang="ko-KR" altLang="en-US" sz="1100"/>
-                    </a:p>
-                  </a:txBody>
-                  <a:tcPr/>
-                </a:tc>
-                <a:tc>
-                  <a:txBody>
-                    <a:bodyPr/>
-                    <a:lstStyle/>
-                    <a:p>
-                      <a:pPr latinLnBrk="1"/>
-                      <a:r>
-                        <a:rPr lang="en-US" altLang="ko-KR" sz="1100"/>
-                        <a:t>%QX0.1.2</a:t>
-                      </a:r>
-                      <a:endParaRPr lang="ko-KR" altLang="en-US" sz="1100"/>
-                    </a:p>
-                  </a:txBody>
-                  <a:tcPr/>
-                </a:tc>
-                <a:tc>
-                  <a:txBody>
-                    <a:bodyPr/>
-                    <a:lstStyle/>
-                    <a:p>
-                      <a:pPr latinLnBrk="1"/>
-                      <a:r>
-                        <a:rPr lang="en-US" altLang="ko-KR" sz="1100"/>
-                        <a:t>STN01_UsingLIB2_1_+</a:t>
-                      </a:r>
-                      <a:endParaRPr lang="ko-KR" altLang="en-US" sz="1100"/>
-                    </a:p>
-                  </a:txBody>
-                  <a:tcPr/>
-                </a:tc>
-                <a:tc>
-                  <a:txBody>
-                    <a:bodyPr/>
-                    <a:lstStyle/>
-                    <a:p>
-                      <a:pPr latinLnBrk="1"/>
-                      <a:endParaRPr lang="ko-KR" altLang="en-US" sz="1100"/>
-                    </a:p>
-                  </a:txBody>
-                  <a:tcPr/>
-                </a:tc>
-                <a:extLst>
-                  <a:ext uri="{0D108BD9-81ED-4DB2-BD59-A6C34878D82A}">
-                    <a16:rowId xmlns:a16="http://schemas.microsoft.com/office/drawing/2014/main" val="2986716199"/>
-                  </a:ext>
-                </a:extLst>
-              </a:tr>
-              <a:tr h="138814">
-                <a:tc>
-                  <a:txBody>
-                    <a:bodyPr/>
-                    <a:lstStyle/>
-                    <a:p>
-                      <a:pPr latinLnBrk="1"/>
-                      <a:r>
-                        <a:rPr lang="ko-KR" altLang="en-US" sz="1100"/>
-                        <a:t>외부주소</a:t>
-                      </a:r>
-                    </a:p>
-                  </a:txBody>
-                  <a:tcPr/>
-                </a:tc>
-                <a:tc>
-                  <a:txBody>
-                    <a:bodyPr/>
-                    <a:lstStyle/>
-                    <a:p>
-                      <a:pPr latinLnBrk="1"/>
-                      <a:r>
-                        <a:rPr lang="en-US" altLang="ko-KR" sz="1100"/>
-                        <a:t>STN01_UsingLIB2_1."-"</a:t>
-                      </a:r>
-                      <a:endParaRPr lang="ko-KR" altLang="en-US" sz="1100"/>
-                    </a:p>
-                  </a:txBody>
-                  <a:tcPr/>
-                </a:tc>
-                <a:tc>
-                  <a:txBody>
-                    <a:bodyPr/>
-                    <a:lstStyle/>
-                    <a:p>
-                      <a:pPr latinLnBrk="1"/>
-                      <a:r>
-                        <a:rPr lang="en-US" altLang="ko-KR" sz="1100"/>
-                        <a:t>bool</a:t>
-                      </a:r>
-                      <a:endParaRPr lang="ko-KR" altLang="en-US" sz="1100"/>
-                    </a:p>
-                  </a:txBody>
-                  <a:tcPr/>
-                </a:tc>
-                <a:tc>
-                  <a:txBody>
-                    <a:bodyPr/>
-                    <a:lstStyle/>
-                    <a:p>
-                      <a:pPr latinLnBrk="1"/>
-                      <a:r>
-                        <a:rPr lang="en-US" altLang="ko-KR" sz="1100"/>
-                        <a:t>%IX0.0.3</a:t>
-                      </a:r>
-                      <a:endParaRPr lang="ko-KR" altLang="en-US" sz="1100"/>
-                    </a:p>
-                  </a:txBody>
-                  <a:tcPr/>
-                </a:tc>
-                <a:tc>
-                  <a:txBody>
-                    <a:bodyPr/>
-                    <a:lstStyle/>
-                    <a:p>
-                      <a:pPr latinLnBrk="1"/>
-                      <a:r>
-                        <a:rPr lang="en-US" altLang="ko-KR" sz="1100"/>
-                        <a:t>%QX0.1.3</a:t>
-                      </a:r>
-                      <a:endParaRPr lang="ko-KR" altLang="en-US" sz="1100"/>
-                    </a:p>
-                  </a:txBody>
-                  <a:tcPr/>
-                </a:tc>
-                <a:tc>
-                  <a:txBody>
-                    <a:bodyPr/>
-                    <a:lstStyle/>
-                    <a:p>
-                      <a:pPr latinLnBrk="1"/>
-                      <a:r>
-                        <a:rPr lang="en-US" altLang="ko-KR" sz="1100"/>
-                        <a:t>STN01_UsingLIB2_1_-</a:t>
-                      </a:r>
-                      <a:endParaRPr lang="ko-KR" altLang="en-US" sz="1100"/>
-                    </a:p>
-                  </a:txBody>
-                  <a:tcPr/>
-                </a:tc>
-                <a:tc>
-                  <a:txBody>
-                    <a:bodyPr/>
-                    <a:lstStyle/>
-                    <a:p>
-                      <a:pPr latinLnBrk="1"/>
-                      <a:endParaRPr lang="ko-KR" altLang="en-US" sz="1100"/>
-                    </a:p>
-                  </a:txBody>
-                  <a:tcPr/>
-                </a:tc>
-                <a:extLst>
-                  <a:ext uri="{0D108BD9-81ED-4DB2-BD59-A6C34878D82A}">
-                    <a16:rowId xmlns:a16="http://schemas.microsoft.com/office/drawing/2014/main" val="3589375858"/>
-                  </a:ext>
-                </a:extLst>
-              </a:tr>
-              <a:tr h="138814">
-                <a:tc>
-                  <a:txBody>
-                    <a:bodyPr/>
-                    <a:lstStyle/>
-                    <a:p>
-                      <a:pPr latinLnBrk="1"/>
-                      <a:r>
-                        <a:rPr lang="ko-KR" altLang="en-US" sz="1100"/>
-                        <a:t>외부주소</a:t>
-                      </a:r>
-                    </a:p>
-                  </a:txBody>
-                  <a:tcPr/>
-                </a:tc>
-                <a:tc>
-                  <a:txBody>
-                    <a:bodyPr/>
-                    <a:lstStyle/>
-                    <a:p>
-                      <a:pPr latinLnBrk="1"/>
-                      <a:r>
-                        <a:rPr lang="en-US" altLang="ko-KR" sz="1100"/>
-                        <a:t>STN01_UsingLIB2_2."+"</a:t>
-                      </a:r>
-                      <a:endParaRPr lang="ko-KR" altLang="en-US" sz="1100"/>
-                    </a:p>
-                  </a:txBody>
-                  <a:tcPr/>
-                </a:tc>
-                <a:tc>
-                  <a:txBody>
-                    <a:bodyPr/>
-                    <a:lstStyle/>
-                    <a:p>
-                      <a:pPr latinLnBrk="1"/>
-                      <a:r>
-                        <a:rPr lang="en-US" altLang="ko-KR" sz="1100"/>
-                        <a:t>bool</a:t>
-                      </a:r>
-                      <a:endParaRPr lang="ko-KR" altLang="en-US" sz="1100"/>
-                    </a:p>
-                  </a:txBody>
-                  <a:tcPr/>
-                </a:tc>
-                <a:tc>
-                  <a:txBody>
-                    <a:bodyPr/>
-                    <a:lstStyle/>
-                    <a:p>
-                      <a:pPr latinLnBrk="1"/>
-                      <a:r>
-                        <a:rPr lang="en-US" altLang="ko-KR" sz="1100"/>
-                        <a:t>%IX0.0.4</a:t>
-                      </a:r>
-                      <a:endParaRPr lang="ko-KR" altLang="en-US" sz="1100"/>
-                    </a:p>
-                  </a:txBody>
-                  <a:tcPr/>
-                </a:tc>
-                <a:tc>
-                  <a:txBody>
-                    <a:bodyPr/>
-                    <a:lstStyle/>
-                    <a:p>
-                      <a:pPr latinLnBrk="1"/>
-                      <a:r>
-                        <a:rPr lang="en-US" altLang="ko-KR" sz="1100"/>
-                        <a:t>%QX0.1.4</a:t>
-                      </a:r>
-                      <a:endParaRPr lang="ko-KR" altLang="en-US" sz="1100"/>
-                    </a:p>
-                  </a:txBody>
-                  <a:tcPr/>
-                </a:tc>
-                <a:tc>
-                  <a:txBody>
-                    <a:bodyPr/>
-                    <a:lstStyle/>
-                    <a:p>
-                      <a:pPr latinLnBrk="1"/>
-                      <a:r>
-                        <a:rPr lang="en-US" altLang="ko-KR" sz="1100"/>
-                        <a:t>STN01_UsingLIB2_2_+</a:t>
-                      </a:r>
-                      <a:endParaRPr lang="ko-KR" altLang="en-US" sz="1100"/>
-                    </a:p>
-                  </a:txBody>
-                  <a:tcPr/>
-                </a:tc>
-                <a:tc>
-                  <a:txBody>
-                    <a:bodyPr/>
-                    <a:lstStyle/>
-                    <a:p>
-                      <a:pPr latinLnBrk="1"/>
-                      <a:endParaRPr lang="ko-KR" altLang="en-US" sz="1100"/>
-                    </a:p>
-                  </a:txBody>
-                  <a:tcPr/>
-                </a:tc>
-                <a:extLst>
-                  <a:ext uri="{0D108BD9-81ED-4DB2-BD59-A6C34878D82A}">
-                    <a16:rowId xmlns:a16="http://schemas.microsoft.com/office/drawing/2014/main" val="4058582815"/>
-                  </a:ext>
-                </a:extLst>
-              </a:tr>
-              <a:tr h="138814">
-                <a:tc>
-                  <a:txBody>
-                    <a:bodyPr/>
-                    <a:lstStyle/>
-                    <a:p>
-                      <a:pPr latinLnBrk="1"/>
-                      <a:r>
-                        <a:rPr lang="ko-KR" altLang="en-US" sz="1100"/>
-                        <a:t>외부주소</a:t>
-                      </a:r>
-                    </a:p>
-                  </a:txBody>
-                  <a:tcPr/>
-                </a:tc>
-                <a:tc>
-                  <a:txBody>
-                    <a:bodyPr/>
-                    <a:lstStyle/>
-                    <a:p>
-                      <a:pPr latinLnBrk="1"/>
-                      <a:r>
-                        <a:rPr lang="en-US" altLang="ko-KR" sz="1100"/>
-                        <a:t>STN01_UsingLIB2_2."-"</a:t>
-                      </a:r>
-                      <a:endParaRPr lang="ko-KR" altLang="en-US" sz="1100"/>
-                    </a:p>
-                  </a:txBody>
-                  <a:tcPr/>
-                </a:tc>
-                <a:tc>
-                  <a:txBody>
-                    <a:bodyPr/>
-                    <a:lstStyle/>
-                    <a:p>
-                      <a:pPr latinLnBrk="1"/>
-                      <a:r>
-                        <a:rPr lang="en-US" altLang="ko-KR" sz="1100"/>
-                        <a:t>bool</a:t>
-                      </a:r>
-                      <a:endParaRPr lang="ko-KR" altLang="en-US" sz="1100"/>
-                    </a:p>
-                  </a:txBody>
-                  <a:tcPr/>
-                </a:tc>
-                <a:tc>
-                  <a:txBody>
-                    <a:bodyPr/>
-                    <a:lstStyle/>
-                    <a:p>
-                      <a:pPr latinLnBrk="1"/>
-                      <a:r>
-                        <a:rPr lang="en-US" altLang="ko-KR" sz="1100"/>
-                        <a:t>%IX0.0.5</a:t>
-                      </a:r>
-                      <a:endParaRPr lang="ko-KR" altLang="en-US" sz="1100"/>
-                    </a:p>
-                  </a:txBody>
-                  <a:tcPr/>
-                </a:tc>
-                <a:tc>
-                  <a:txBody>
-                    <a:bodyPr/>
-                    <a:lstStyle/>
-                    <a:p>
-                      <a:pPr latinLnBrk="1"/>
-                      <a:r>
-                        <a:rPr lang="en-US" altLang="ko-KR" sz="1100"/>
-                        <a:t>%QX0.1.5</a:t>
-                      </a:r>
-                      <a:endParaRPr lang="ko-KR" altLang="en-US" sz="1100"/>
-                    </a:p>
-                  </a:txBody>
-                  <a:tcPr/>
-                </a:tc>
-                <a:tc>
-                  <a:txBody>
-                    <a:bodyPr/>
-                    <a:lstStyle/>
-                    <a:p>
-                      <a:pPr latinLnBrk="1"/>
-                      <a:r>
-                        <a:rPr lang="en-US" altLang="ko-KR" sz="1100"/>
-                        <a:t>STN01_UsingLIB2_2_-</a:t>
-                      </a:r>
-                      <a:endParaRPr lang="ko-KR" altLang="en-US" sz="1100"/>
-                    </a:p>
-                  </a:txBody>
-                  <a:tcPr/>
-                </a:tc>
-                <a:tc>
-                  <a:txBody>
-                    <a:bodyPr/>
-                    <a:lstStyle/>
-                    <a:p>
-                      <a:pPr latinLnBrk="1"/>
-                      <a:endParaRPr lang="ko-KR" altLang="en-US" sz="1100"/>
-                    </a:p>
-                  </a:txBody>
-                  <a:tcPr/>
-                </a:tc>
-                <a:extLst>
-                  <a:ext uri="{0D108BD9-81ED-4DB2-BD59-A6C34878D82A}">
-                    <a16:rowId xmlns:a16="http://schemas.microsoft.com/office/drawing/2014/main" val="937170838"/>
-                  </a:ext>
-                </a:extLst>
-              </a:tr>
-              <a:tr h="138814">
-                <a:tc>
-                  <a:txBody>
-                    <a:bodyPr/>
-                    <a:lstStyle/>
-                    <a:p>
-                      <a:pPr latinLnBrk="1"/>
-                      <a:r>
-                        <a:rPr lang="ko-KR" altLang="en-US" sz="1100"/>
-                        <a:t>외부주소</a:t>
-                      </a:r>
-                    </a:p>
-                  </a:txBody>
-                  <a:tcPr/>
-                </a:tc>
-                <a:tc>
-                  <a:txBody>
-                    <a:bodyPr/>
-                    <a:lstStyle/>
-                    <a:p>
-                      <a:pPr latinLnBrk="1"/>
-                      <a:r>
-                        <a:rPr lang="en-US" altLang="ko-KR" sz="1100"/>
-                        <a:t>STN01_UsingLIB2_3."+"</a:t>
-                      </a:r>
-                      <a:endParaRPr lang="ko-KR" altLang="en-US" sz="1100"/>
-                    </a:p>
-                  </a:txBody>
-                  <a:tcPr/>
-                </a:tc>
-                <a:tc>
-                  <a:txBody>
-                    <a:bodyPr/>
-                    <a:lstStyle/>
-                    <a:p>
-                      <a:pPr latinLnBrk="1"/>
-                      <a:r>
-                        <a:rPr lang="en-US" altLang="ko-KR" sz="1100"/>
-                        <a:t>bool</a:t>
-                      </a:r>
-                      <a:endParaRPr lang="ko-KR" altLang="en-US" sz="1100"/>
-                    </a:p>
-                  </a:txBody>
-                  <a:tcPr/>
-                </a:tc>
-                <a:tc>
-                  <a:txBody>
-                    <a:bodyPr/>
-                    <a:lstStyle/>
-                    <a:p>
-                      <a:pPr latinLnBrk="1"/>
-                      <a:r>
-                        <a:rPr lang="en-US" altLang="ko-KR" sz="1100"/>
-                        <a:t>%IX0.0.6</a:t>
-                      </a:r>
-                      <a:endParaRPr lang="ko-KR" altLang="en-US" sz="1100"/>
-                    </a:p>
-                  </a:txBody>
-                  <a:tcPr/>
-                </a:tc>
-                <a:tc>
-                  <a:txBody>
-                    <a:bodyPr/>
-                    <a:lstStyle/>
-                    <a:p>
-                      <a:pPr latinLnBrk="1"/>
-                      <a:r>
-                        <a:rPr lang="en-US" altLang="ko-KR" sz="1100"/>
-                        <a:t>%QX0.1.6</a:t>
-                      </a:r>
-                      <a:endParaRPr lang="ko-KR" altLang="en-US" sz="1100"/>
-                    </a:p>
-                  </a:txBody>
-                  <a:tcPr/>
-                </a:tc>
-                <a:tc>
-                  <a:txBody>
-                    <a:bodyPr/>
-                    <a:lstStyle/>
-                    <a:p>
-                      <a:pPr latinLnBrk="1"/>
-                      <a:r>
-                        <a:rPr lang="en-US" altLang="ko-KR" sz="1100"/>
-                        <a:t>STN01_UsingLIB2_3_+</a:t>
-                      </a:r>
-                      <a:endParaRPr lang="ko-KR" altLang="en-US" sz="1100"/>
-                    </a:p>
-                  </a:txBody>
-                  <a:tcPr/>
-                </a:tc>
-                <a:tc>
-                  <a:txBody>
-                    <a:bodyPr/>
-                    <a:lstStyle/>
-                    <a:p>
-                      <a:pPr latinLnBrk="1"/>
-                      <a:endParaRPr lang="ko-KR" altLang="en-US" sz="1100"/>
-                    </a:p>
-                  </a:txBody>
-                  <a:tcPr/>
-                </a:tc>
-                <a:extLst>
-                  <a:ext uri="{0D108BD9-81ED-4DB2-BD59-A6C34878D82A}">
-                    <a16:rowId xmlns:a16="http://schemas.microsoft.com/office/drawing/2014/main" val="1668104212"/>
-                  </a:ext>
-                </a:extLst>
-              </a:tr>
-              <a:tr h="138814">
-                <a:tc>
-                  <a:txBody>
-                    <a:bodyPr/>
-                    <a:lstStyle/>
-                    <a:p>
-                      <a:pPr latinLnBrk="1"/>
-                      <a:r>
-                        <a:rPr lang="ko-KR" altLang="en-US" sz="1100"/>
-                        <a:t>외부주소</a:t>
-                      </a:r>
-                    </a:p>
-                  </a:txBody>
-                  <a:tcPr/>
-                </a:tc>
-                <a:tc>
-                  <a:txBody>
-                    <a:bodyPr/>
-                    <a:lstStyle/>
-                    <a:p>
-                      <a:pPr latinLnBrk="1"/>
-                      <a:r>
-                        <a:rPr lang="en-US" altLang="ko-KR" sz="1100"/>
-                        <a:t>STN01_UsingLIB2_3."-"</a:t>
-                      </a:r>
-                      <a:endParaRPr lang="ko-KR" altLang="en-US" sz="1100"/>
-                    </a:p>
-                  </a:txBody>
-                  <a:tcPr/>
-                </a:tc>
-                <a:tc>
-                  <a:txBody>
-                    <a:bodyPr/>
-                    <a:lstStyle/>
-                    <a:p>
-                      <a:pPr latinLnBrk="1"/>
-                      <a:r>
-                        <a:rPr lang="en-US" altLang="ko-KR" sz="1100"/>
-                        <a:t>bool</a:t>
-                      </a:r>
-                      <a:endParaRPr lang="ko-KR" altLang="en-US" sz="1100"/>
-                    </a:p>
-                  </a:txBody>
-                  <a:tcPr/>
-                </a:tc>
-                <a:tc>
-                  <a:txBody>
-                    <a:bodyPr/>
-                    <a:lstStyle/>
-                    <a:p>
-                      <a:pPr latinLnBrk="1"/>
-                      <a:r>
-                        <a:rPr lang="en-US" altLang="ko-KR" sz="1100"/>
-                        <a:t>%IX0.0.7</a:t>
-                      </a:r>
-                      <a:endParaRPr lang="ko-KR" altLang="en-US" sz="1100"/>
-                    </a:p>
-                  </a:txBody>
-                  <a:tcPr/>
-                </a:tc>
-                <a:tc>
-                  <a:txBody>
-                    <a:bodyPr/>
-                    <a:lstStyle/>
-                    <a:p>
-                      <a:pPr latinLnBrk="1"/>
-                      <a:r>
-                        <a:rPr lang="en-US" altLang="ko-KR" sz="1100"/>
-                        <a:t>%QX0.1.7</a:t>
-                      </a:r>
-                      <a:endParaRPr lang="ko-KR" altLang="en-US" sz="1100"/>
-                    </a:p>
-                  </a:txBody>
-                  <a:tcPr/>
-                </a:tc>
-                <a:tc>
-                  <a:txBody>
-                    <a:bodyPr/>
-                    <a:lstStyle/>
-                    <a:p>
-                      <a:pPr latinLnBrk="1"/>
-                      <a:r>
-                        <a:rPr lang="en-US" altLang="ko-KR" sz="1100"/>
-                        <a:t>STN01_UsingLIB2_3_-</a:t>
-                      </a:r>
-                      <a:endParaRPr lang="ko-KR" altLang="en-US" sz="1100"/>
-                    </a:p>
-                  </a:txBody>
-                  <a:tcPr/>
-                </a:tc>
-                <a:tc>
-                  <a:txBody>
-                    <a:bodyPr/>
-                    <a:lstStyle/>
-                    <a:p>
-                      <a:pPr latinLnBrk="1"/>
-                      <a:endParaRPr lang="ko-KR" altLang="en-US" sz="1100"/>
-                    </a:p>
-                  </a:txBody>
-                  <a:tcPr/>
-                </a:tc>
-                <a:extLst>
-                  <a:ext uri="{0D108BD9-81ED-4DB2-BD59-A6C34878D82A}">
-                    <a16:rowId xmlns:a16="http://schemas.microsoft.com/office/drawing/2014/main" val="3443340355"/>
-                  </a:ext>
-                </a:extLst>
-              </a:tr>
-              <a:tr h="138814">
-                <a:tc>
-                  <a:txBody>
-                    <a:bodyPr/>
-                    <a:lstStyle/>
-                    <a:p>
-                      <a:pPr latinLnBrk="1"/>
-                      <a:r>
-                        <a:rPr lang="ko-KR" altLang="en-US" sz="1100"/>
-                        <a:t>외부주소</a:t>
-                      </a:r>
-                    </a:p>
-                  </a:txBody>
-                  <a:tcPr/>
-                </a:tc>
-                <a:tc>
-                  <a:txBody>
-                    <a:bodyPr/>
-                    <a:lstStyle/>
-                    <a:p>
-                      <a:pPr latinLnBrk="1"/>
-                      <a:r>
-                        <a:rPr lang="en-US" altLang="ko-KR" sz="1100"/>
-                        <a:t>STN01_UsingLIB2_4."+"</a:t>
-                      </a:r>
-                      <a:endParaRPr lang="ko-KR" altLang="en-US" sz="1100"/>
-                    </a:p>
-                  </a:txBody>
-                  <a:tcPr/>
-                </a:tc>
-                <a:tc>
-                  <a:txBody>
-                    <a:bodyPr/>
-                    <a:lstStyle/>
-                    <a:p>
-                      <a:pPr latinLnBrk="1"/>
-                      <a:r>
-                        <a:rPr lang="en-US" altLang="ko-KR" sz="1100"/>
-                        <a:t>bool</a:t>
-                      </a:r>
-                      <a:endParaRPr lang="ko-KR" altLang="en-US" sz="1100"/>
-                    </a:p>
-                  </a:txBody>
-                  <a:tcPr/>
-                </a:tc>
-                <a:tc>
-                  <a:txBody>
-                    <a:bodyPr/>
-                    <a:lstStyle/>
-                    <a:p>
-                      <a:pPr latinLnBrk="1"/>
-                      <a:r>
-                        <a:rPr lang="en-US" altLang="ko-KR" sz="1100"/>
-                        <a:t>%IX0.0.8</a:t>
-                      </a:r>
-                      <a:endParaRPr lang="ko-KR" altLang="en-US" sz="1100"/>
-                    </a:p>
-                  </a:txBody>
-                  <a:tcPr/>
-                </a:tc>
-                <a:tc>
-                  <a:txBody>
-                    <a:bodyPr/>
-                    <a:lstStyle/>
-                    <a:p>
-                      <a:pPr latinLnBrk="1"/>
-                      <a:r>
-                        <a:rPr lang="en-US" altLang="ko-KR" sz="1100"/>
-                        <a:t>%QX0.1.8</a:t>
-                      </a:r>
-                      <a:endParaRPr lang="ko-KR" altLang="en-US" sz="1100"/>
-                    </a:p>
-                  </a:txBody>
-                  <a:tcPr/>
-                </a:tc>
-                <a:tc>
-                  <a:txBody>
-                    <a:bodyPr/>
-                    <a:lstStyle/>
-                    <a:p>
-                      <a:pPr latinLnBrk="1"/>
-                      <a:r>
-                        <a:rPr lang="en-US" altLang="ko-KR" sz="1100"/>
-                        <a:t>STN01_UsingLIB2_4_+</a:t>
-                      </a:r>
-                      <a:endParaRPr lang="ko-KR" altLang="en-US" sz="1100"/>
-                    </a:p>
-                  </a:txBody>
-                  <a:tcPr/>
-                </a:tc>
-                <a:tc>
-                  <a:txBody>
-                    <a:bodyPr/>
-                    <a:lstStyle/>
-                    <a:p>
-                      <a:pPr latinLnBrk="1"/>
-                      <a:endParaRPr lang="ko-KR" altLang="en-US" sz="1100"/>
-                    </a:p>
-                  </a:txBody>
-                  <a:tcPr/>
-                </a:tc>
-                <a:extLst>
-                  <a:ext uri="{0D108BD9-81ED-4DB2-BD59-A6C34878D82A}">
-                    <a16:rowId xmlns:a16="http://schemas.microsoft.com/office/drawing/2014/main" val="600427208"/>
-                  </a:ext>
-                </a:extLst>
-              </a:tr>
-              <a:tr h="138814">
-                <a:tc>
-                  <a:txBody>
-                    <a:bodyPr/>
-                    <a:lstStyle/>
-                    <a:p>
-                      <a:pPr latinLnBrk="1"/>
-                      <a:r>
-                        <a:rPr lang="ko-KR" altLang="en-US" sz="1100"/>
-                        <a:t>외부주소</a:t>
-                      </a:r>
-                    </a:p>
-                  </a:txBody>
-                  <a:tcPr/>
-                </a:tc>
-                <a:tc>
-                  <a:txBody>
-                    <a:bodyPr/>
-                    <a:lstStyle/>
-                    <a:p>
-                      <a:pPr latinLnBrk="1"/>
-                      <a:r>
-                        <a:rPr lang="en-US" altLang="ko-KR" sz="1100"/>
-                        <a:t>STN01_UsingLIB2_4."-"</a:t>
-                      </a:r>
-                      <a:endParaRPr lang="ko-KR" altLang="en-US" sz="1100"/>
-                    </a:p>
-                  </a:txBody>
-                  <a:tcPr/>
-                </a:tc>
-                <a:tc>
-                  <a:txBody>
-                    <a:bodyPr/>
-                    <a:lstStyle/>
-                    <a:p>
-                      <a:pPr latinLnBrk="1"/>
-                      <a:r>
-                        <a:rPr lang="en-US" altLang="ko-KR" sz="1100"/>
-                        <a:t>bool</a:t>
-                      </a:r>
-                      <a:endParaRPr lang="ko-KR" altLang="en-US" sz="1100"/>
-                    </a:p>
-                  </a:txBody>
-                  <a:tcPr/>
-                </a:tc>
-                <a:tc>
-                  <a:txBody>
-                    <a:bodyPr/>
-                    <a:lstStyle/>
-                    <a:p>
-                      <a:pPr latinLnBrk="1"/>
-                      <a:r>
-                        <a:rPr lang="en-US" altLang="ko-KR" sz="1100"/>
-                        <a:t>%IX0.0.9</a:t>
-                      </a:r>
-                      <a:endParaRPr lang="ko-KR" altLang="en-US" sz="1100"/>
-                    </a:p>
-                  </a:txBody>
-                  <a:tcPr/>
-                </a:tc>
-                <a:tc>
-                  <a:txBody>
-                    <a:bodyPr/>
-                    <a:lstStyle/>
-                    <a:p>
-                      <a:pPr latinLnBrk="1"/>
-                      <a:r>
-                        <a:rPr lang="en-US" altLang="ko-KR" sz="1100"/>
-                        <a:t>%QX0.1.9</a:t>
-                      </a:r>
-                      <a:endParaRPr lang="ko-KR" altLang="en-US" sz="1100"/>
-                    </a:p>
-                  </a:txBody>
-                  <a:tcPr/>
-                </a:tc>
-                <a:tc>
-                  <a:txBody>
-                    <a:bodyPr/>
-                    <a:lstStyle/>
-                    <a:p>
-                      <a:pPr latinLnBrk="1"/>
-                      <a:r>
-                        <a:rPr lang="en-US" altLang="ko-KR" sz="1100"/>
-                        <a:t>STN01_UsingLIB2_4_-</a:t>
-                      </a:r>
-                      <a:endParaRPr lang="ko-KR" altLang="en-US" sz="1100"/>
-                    </a:p>
-                  </a:txBody>
-                  <a:tcPr/>
-                </a:tc>
-                <a:tc>
-                  <a:txBody>
-                    <a:bodyPr/>
-                    <a:lstStyle/>
-                    <a:p>
-                      <a:pPr latinLnBrk="1"/>
-                      <a:endParaRPr lang="ko-KR" altLang="en-US" sz="1100"/>
-                    </a:p>
-                  </a:txBody>
-                  <a:tcPr/>
-                </a:tc>
-                <a:extLst>
-                  <a:ext uri="{0D108BD9-81ED-4DB2-BD59-A6C34878D82A}">
-                    <a16:rowId xmlns:a16="http://schemas.microsoft.com/office/drawing/2014/main" val="3294686593"/>
-                  </a:ext>
-                </a:extLst>
-              </a:tr>
-              <a:tr h="138814">
-                <a:tc>
-                  <a:txBody>
-                    <a:bodyPr/>
-                    <a:lstStyle/>
-                    <a:p>
-                      <a:pPr latinLnBrk="1"/>
-                      <a:r>
-                        <a:rPr lang="ko-KR" altLang="en-US" sz="1100"/>
-                        <a:t>외부주소</a:t>
-                      </a:r>
-                    </a:p>
-                  </a:txBody>
-                  <a:tcPr/>
-                </a:tc>
-                <a:tc>
-                  <a:txBody>
-                    <a:bodyPr/>
-                    <a:lstStyle/>
-                    <a:p>
-                      <a:pPr latinLnBrk="1"/>
-                      <a:r>
-                        <a:rPr lang="en-US" altLang="ko-KR" sz="1100"/>
-                        <a:t>STN01_UsingLIB_1."-"</a:t>
-                      </a:r>
-                      <a:endParaRPr lang="ko-KR" altLang="en-US" sz="1100"/>
-                    </a:p>
-                  </a:txBody>
-                  <a:tcPr/>
-                </a:tc>
-                <a:tc>
-                  <a:txBody>
-                    <a:bodyPr/>
-                    <a:lstStyle/>
-                    <a:p>
-                      <a:pPr latinLnBrk="1"/>
-                      <a:r>
-                        <a:rPr lang="en-US" altLang="ko-KR" sz="1100"/>
-                        <a:t>bool</a:t>
-                      </a:r>
-                      <a:endParaRPr lang="ko-KR" altLang="en-US" sz="1100"/>
-                    </a:p>
-                  </a:txBody>
-                  <a:tcPr/>
-                </a:tc>
-                <a:tc>
-                  <a:txBody>
-                    <a:bodyPr/>
-                    <a:lstStyle/>
-                    <a:p>
-                      <a:pPr latinLnBrk="1"/>
-                      <a:r>
-                        <a:rPr lang="en-US" altLang="ko-KR" sz="1100"/>
-                        <a:t>%IX0.0.10</a:t>
-                      </a:r>
-                      <a:endParaRPr lang="ko-KR" altLang="en-US" sz="1100"/>
-                    </a:p>
-                  </a:txBody>
-                  <a:tcPr/>
-                </a:tc>
-                <a:tc>
-                  <a:txBody>
-                    <a:bodyPr/>
-                    <a:lstStyle/>
-                    <a:p>
-                      <a:pPr latinLnBrk="1"/>
-                      <a:r>
-                        <a:rPr lang="en-US" altLang="ko-KR" sz="1100"/>
-                        <a:t>%QX0.1.10</a:t>
-                      </a:r>
-                      <a:endParaRPr lang="ko-KR" altLang="en-US" sz="1100"/>
-                    </a:p>
-                  </a:txBody>
-                  <a:tcPr/>
-                </a:tc>
-                <a:tc>
-                  <a:txBody>
-                    <a:bodyPr/>
-                    <a:lstStyle/>
-                    <a:p>
-                      <a:pPr latinLnBrk="1"/>
-                      <a:r>
-                        <a:rPr lang="en-US" altLang="ko-KR" sz="1100"/>
-                        <a:t>STN01_UsingLIB_1_-</a:t>
-                      </a:r>
-                      <a:endParaRPr lang="ko-KR" altLang="en-US" sz="1100"/>
-                    </a:p>
-                  </a:txBody>
-                  <a:tcPr/>
-                </a:tc>
-                <a:tc>
-                  <a:txBody>
-                    <a:bodyPr/>
-                    <a:lstStyle/>
-                    <a:p>
-                      <a:pPr latinLnBrk="1"/>
-                      <a:endParaRPr lang="ko-KR" altLang="en-US" sz="1100"/>
-                    </a:p>
-                  </a:txBody>
-                  <a:tcPr/>
-                </a:tc>
-                <a:extLst>
-                  <a:ext uri="{0D108BD9-81ED-4DB2-BD59-A6C34878D82A}">
-                    <a16:rowId xmlns:a16="http://schemas.microsoft.com/office/drawing/2014/main" val="3286884880"/>
-                  </a:ext>
-                </a:extLst>
-              </a:tr>
-              <a:tr h="138814">
-                <a:tc>
-                  <a:txBody>
-                    <a:bodyPr/>
-                    <a:lstStyle/>
-                    <a:p>
-                      <a:pPr latinLnBrk="1"/>
-                      <a:r>
-                        <a:rPr lang="ko-KR" altLang="en-US" sz="1100"/>
-                        <a:t>외부주소</a:t>
-                      </a:r>
-                    </a:p>
-                  </a:txBody>
-                  <a:tcPr/>
-                </a:tc>
-                <a:tc>
-                  <a:txBody>
-                    <a:bodyPr/>
-                    <a:lstStyle/>
-                    <a:p>
-                      <a:pPr latinLnBrk="1"/>
-                      <a:r>
-                        <a:rPr lang="en-US" altLang="ko-KR" sz="1100"/>
-                        <a:t>STN01_UsingLIB_1."FWD[P]"</a:t>
-                      </a:r>
-                      <a:endParaRPr lang="ko-KR" altLang="en-US" sz="1100"/>
-                    </a:p>
-                  </a:txBody>
-                  <a:tcPr/>
-                </a:tc>
-                <a:tc>
-                  <a:txBody>
-                    <a:bodyPr/>
-                    <a:lstStyle/>
-                    <a:p>
-                      <a:pPr latinLnBrk="1"/>
-                      <a:r>
-                        <a:rPr lang="en-US" altLang="ko-KR" sz="1100"/>
-                        <a:t>bool</a:t>
-                      </a:r>
-                      <a:endParaRPr lang="ko-KR" altLang="en-US" sz="1100"/>
-                    </a:p>
-                  </a:txBody>
-                  <a:tcPr/>
-                </a:tc>
-                <a:tc>
-                  <a:txBody>
-                    <a:bodyPr/>
-                    <a:lstStyle/>
-                    <a:p>
-                      <a:pPr latinLnBrk="1"/>
-                      <a:r>
-                        <a:rPr lang="en-US" altLang="ko-KR" sz="1100"/>
-                        <a:t>%IX0.0.11</a:t>
-                      </a:r>
-                      <a:endParaRPr lang="ko-KR" altLang="en-US" sz="1100"/>
-                    </a:p>
-                  </a:txBody>
-                  <a:tcPr/>
-                </a:tc>
-                <a:tc>
-                  <a:txBody>
-                    <a:bodyPr/>
-                    <a:lstStyle/>
-                    <a:p>
-                      <a:pPr latinLnBrk="1"/>
-                      <a:r>
-                        <a:rPr lang="en-US" altLang="ko-KR" sz="1100"/>
-                        <a:t>%QX0.1.11</a:t>
-                      </a:r>
-                      <a:endParaRPr lang="ko-KR" altLang="en-US" sz="1100"/>
-                    </a:p>
-                  </a:txBody>
-                  <a:tcPr/>
-                </a:tc>
-                <a:tc>
-                  <a:txBody>
-                    <a:bodyPr/>
-                    <a:lstStyle/>
-                    <a:p>
-                      <a:pPr latinLnBrk="1"/>
-                      <a:r>
-                        <a:rPr lang="en-US" altLang="ko-KR" sz="1100"/>
-                        <a:t>STN01_UsingLIB_1_FWD[P]</a:t>
-                      </a:r>
-                      <a:endParaRPr lang="ko-KR" altLang="en-US" sz="1100"/>
-                    </a:p>
-                  </a:txBody>
-                  <a:tcPr/>
-                </a:tc>
-                <a:tc>
-                  <a:txBody>
-                    <a:bodyPr/>
-                    <a:lstStyle/>
-                    <a:p>
-                      <a:pPr latinLnBrk="1"/>
-                      <a:endParaRPr lang="ko-KR" altLang="en-US" sz="1100"/>
-                    </a:p>
-                  </a:txBody>
-                  <a:tcPr/>
-                </a:tc>
-                <a:extLst>
-                  <a:ext uri="{0D108BD9-81ED-4DB2-BD59-A6C34878D82A}">
-                    <a16:rowId xmlns:a16="http://schemas.microsoft.com/office/drawing/2014/main" val="3438685920"/>
-                  </a:ext>
-                </a:extLst>
-              </a:tr>
-              <a:tr h="138814">
-                <a:tc>
-                  <a:txBody>
-                    <a:bodyPr/>
-                    <a:lstStyle/>
-                    <a:p>
-                      <a:pPr latinLnBrk="1"/>
-                      <a:r>
-                        <a:rPr lang="ko-KR" altLang="en-US" sz="1100"/>
-                        <a:t>외부주소</a:t>
-                      </a:r>
-                    </a:p>
-                  </a:txBody>
-                  <a:tcPr/>
-                </a:tc>
-                <a:tc>
-                  <a:txBody>
-                    <a:bodyPr/>
-                    <a:lstStyle/>
-                    <a:p>
-                      <a:pPr latinLnBrk="1"/>
-                      <a:r>
-                        <a:rPr lang="en-US" altLang="ko-KR" sz="1100"/>
-                        <a:t>STN01_UsingLIB_2."+"</a:t>
-                      </a:r>
-                      <a:endParaRPr lang="ko-KR" altLang="en-US" sz="1100"/>
-                    </a:p>
-                  </a:txBody>
-                  <a:tcPr/>
-                </a:tc>
-                <a:tc>
-                  <a:txBody>
-                    <a:bodyPr/>
-                    <a:lstStyle/>
-                    <a:p>
-                      <a:pPr latinLnBrk="1"/>
-                      <a:r>
-                        <a:rPr lang="en-US" altLang="ko-KR" sz="1100"/>
-                        <a:t>bool</a:t>
-                      </a:r>
-                      <a:endParaRPr lang="ko-KR" altLang="en-US" sz="1100"/>
-                    </a:p>
-                  </a:txBody>
-                  <a:tcPr/>
-                </a:tc>
-                <a:tc>
-                  <a:txBody>
-                    <a:bodyPr/>
-                    <a:lstStyle/>
-                    <a:p>
-                      <a:pPr latinLnBrk="1"/>
-                      <a:r>
-                        <a:rPr lang="en-US" altLang="ko-KR" sz="1100"/>
-                        <a:t>%IX0.0.12</a:t>
-                      </a:r>
-                      <a:endParaRPr lang="ko-KR" altLang="en-US" sz="1100"/>
-                    </a:p>
-                  </a:txBody>
-                  <a:tcPr/>
-                </a:tc>
-                <a:tc>
-                  <a:txBody>
-                    <a:bodyPr/>
-                    <a:lstStyle/>
-                    <a:p>
-                      <a:pPr latinLnBrk="1"/>
-                      <a:r>
-                        <a:rPr lang="en-US" altLang="ko-KR" sz="1100"/>
-                        <a:t>%QX0.1.12</a:t>
-                      </a:r>
-                      <a:endParaRPr lang="ko-KR" altLang="en-US" sz="1100"/>
-                    </a:p>
-                  </a:txBody>
-                  <a:tcPr/>
-                </a:tc>
-                <a:tc>
-                  <a:txBody>
-                    <a:bodyPr/>
-                    <a:lstStyle/>
-                    <a:p>
-                      <a:pPr latinLnBrk="1"/>
-                      <a:r>
-                        <a:rPr lang="en-US" altLang="ko-KR" sz="1100"/>
-                        <a:t>STN01_UsingLIB_2_+</a:t>
-                      </a:r>
-                      <a:endParaRPr lang="ko-KR" altLang="en-US" sz="1100"/>
-                    </a:p>
-                  </a:txBody>
-                  <a:tcPr/>
-                </a:tc>
-                <a:tc>
-                  <a:txBody>
-                    <a:bodyPr/>
-                    <a:lstStyle/>
-                    <a:p>
-                      <a:pPr latinLnBrk="1"/>
-                      <a:endParaRPr lang="ko-KR" altLang="en-US" sz="1100"/>
-                    </a:p>
-                  </a:txBody>
-                  <a:tcPr/>
-                </a:tc>
-                <a:extLst>
-                  <a:ext uri="{0D108BD9-81ED-4DB2-BD59-A6C34878D82A}">
-                    <a16:rowId xmlns:a16="http://schemas.microsoft.com/office/drawing/2014/main" val="3403601550"/>
-                  </a:ext>
-                </a:extLst>
-              </a:tr>
-              <a:tr h="138814">
-                <a:tc>
-                  <a:txBody>
-                    <a:bodyPr/>
-                    <a:lstStyle/>
-                    <a:p>
-                      <a:pPr latinLnBrk="1"/>
-                      <a:r>
-                        <a:rPr lang="ko-KR" altLang="en-US" sz="1100"/>
-                        <a:t>외부주소</a:t>
-                      </a:r>
-                    </a:p>
-                  </a:txBody>
-                  <a:tcPr/>
-                </a:tc>
-                <a:tc>
-                  <a:txBody>
-                    <a:bodyPr/>
-                    <a:lstStyle/>
-                    <a:p>
-                      <a:pPr latinLnBrk="1"/>
-                      <a:r>
-                        <a:rPr lang="en-US" altLang="ko-KR" sz="1100"/>
-                        <a:t>STN01_UsingLIB_2."-"</a:t>
-                      </a:r>
-                      <a:endParaRPr lang="ko-KR" altLang="en-US" sz="1100"/>
-                    </a:p>
-                  </a:txBody>
-                  <a:tcPr/>
-                </a:tc>
-                <a:tc>
-                  <a:txBody>
-                    <a:bodyPr/>
-                    <a:lstStyle/>
-                    <a:p>
-                      <a:pPr latinLnBrk="1"/>
-                      <a:r>
-                        <a:rPr lang="en-US" altLang="ko-KR" sz="1100"/>
-                        <a:t>bool</a:t>
-                      </a:r>
-                      <a:endParaRPr lang="ko-KR" altLang="en-US" sz="1100"/>
-                    </a:p>
-                  </a:txBody>
-                  <a:tcPr/>
-                </a:tc>
-                <a:tc>
-                  <a:txBody>
-                    <a:bodyPr/>
-                    <a:lstStyle/>
-                    <a:p>
-                      <a:pPr latinLnBrk="1"/>
-                      <a:r>
-                        <a:rPr lang="en-US" altLang="ko-KR" sz="1100"/>
-                        <a:t>%IX0.0.13</a:t>
-                      </a:r>
-                      <a:endParaRPr lang="ko-KR" altLang="en-US" sz="1100"/>
-                    </a:p>
-                  </a:txBody>
-                  <a:tcPr/>
-                </a:tc>
-                <a:tc>
-                  <a:txBody>
-                    <a:bodyPr/>
-                    <a:lstStyle/>
-                    <a:p>
-                      <a:pPr latinLnBrk="1"/>
-                      <a:r>
-                        <a:rPr lang="en-US" altLang="ko-KR" sz="1100"/>
-                        <a:t>%QX0.1.13</a:t>
-                      </a:r>
-                      <a:endParaRPr lang="ko-KR" altLang="en-US" sz="1100"/>
-                    </a:p>
-                  </a:txBody>
-                  <a:tcPr/>
-                </a:tc>
-                <a:tc>
-                  <a:txBody>
-                    <a:bodyPr/>
-                    <a:lstStyle/>
-                    <a:p>
-                      <a:pPr latinLnBrk="1"/>
-                      <a:r>
-                        <a:rPr lang="en-US" altLang="ko-KR" sz="1100"/>
-                        <a:t>STN01_UsingLIB_2_-</a:t>
-                      </a:r>
-                      <a:endParaRPr lang="ko-KR" altLang="en-US" sz="1100"/>
-                    </a:p>
-                  </a:txBody>
-                  <a:tcPr/>
-                </a:tc>
-                <a:tc>
-                  <a:txBody>
-                    <a:bodyPr/>
-                    <a:lstStyle/>
-                    <a:p>
-                      <a:pPr latinLnBrk="1"/>
-                      <a:endParaRPr lang="ko-KR" altLang="en-US" sz="1100"/>
-                    </a:p>
-                  </a:txBody>
-                  <a:tcPr/>
-                </a:tc>
-                <a:extLst>
-                  <a:ext uri="{0D108BD9-81ED-4DB2-BD59-A6C34878D82A}">
-                    <a16:rowId xmlns:a16="http://schemas.microsoft.com/office/drawing/2014/main" val="1666460496"/>
-                  </a:ext>
-                </a:extLst>
-              </a:tr>
-              <a:tr h="138814">
-                <a:tc>
-                  <a:txBody>
-                    <a:bodyPr/>
-                    <a:lstStyle/>
-                    <a:p>
-                      <a:pPr latinLnBrk="1"/>
-                      <a:r>
-                        <a:rPr lang="ko-KR" altLang="en-US" sz="1100"/>
-                        <a:t>외부주소</a:t>
-                      </a:r>
-                    </a:p>
-                  </a:txBody>
-                  <a:tcPr/>
-                </a:tc>
-                <a:tc>
-                  <a:txBody>
-                    <a:bodyPr/>
-                    <a:lstStyle/>
-                    <a:p>
-                      <a:pPr latinLnBrk="1"/>
-                      <a:r>
-                        <a:rPr lang="en-US" altLang="ko-KR" sz="1100"/>
-                        <a:t>STN02_Pin."+"</a:t>
-                      </a:r>
-                      <a:endParaRPr lang="ko-KR" altLang="en-US" sz="1100"/>
-                    </a:p>
-                  </a:txBody>
-                  <a:tcPr/>
-                </a:tc>
-                <a:tc>
-                  <a:txBody>
-                    <a:bodyPr/>
-                    <a:lstStyle/>
-                    <a:p>
-                      <a:pPr latinLnBrk="1"/>
-                      <a:r>
-                        <a:rPr lang="en-US" altLang="ko-KR" sz="1100"/>
-                        <a:t>bool</a:t>
-                      </a:r>
-                      <a:endParaRPr lang="ko-KR" altLang="en-US" sz="1100"/>
-                    </a:p>
-                  </a:txBody>
-                  <a:tcPr/>
-                </a:tc>
-                <a:tc>
-                  <a:txBody>
-                    <a:bodyPr/>
-                    <a:lstStyle/>
-                    <a:p>
-                      <a:pPr latinLnBrk="1"/>
-                      <a:r>
-                        <a:rPr lang="en-US" altLang="ko-KR" sz="1100"/>
-                        <a:t>%IX0.0.14</a:t>
-                      </a:r>
-                      <a:endParaRPr lang="ko-KR" altLang="en-US" sz="1100"/>
-                    </a:p>
-                  </a:txBody>
-                  <a:tcPr/>
-                </a:tc>
-                <a:tc>
-                  <a:txBody>
-                    <a:bodyPr/>
-                    <a:lstStyle/>
-                    <a:p>
-                      <a:pPr latinLnBrk="1"/>
-                      <a:r>
-                        <a:rPr lang="en-US" altLang="ko-KR" sz="1100"/>
-                        <a:t>%QX0.1.14</a:t>
-                      </a:r>
-                      <a:endParaRPr lang="ko-KR" altLang="en-US" sz="1100"/>
-                    </a:p>
-                  </a:txBody>
-                  <a:tcPr/>
-                </a:tc>
-                <a:tc>
-                  <a:txBody>
-                    <a:bodyPr/>
-                    <a:lstStyle/>
-                    <a:p>
-                      <a:pPr latinLnBrk="1"/>
-                      <a:r>
-                        <a:rPr lang="en-US" altLang="ko-KR" sz="1100"/>
-                        <a:t>STN02_Pin_+</a:t>
-                      </a:r>
-                      <a:endParaRPr lang="ko-KR" altLang="en-US" sz="1100"/>
-                    </a:p>
-                  </a:txBody>
-                  <a:tcPr/>
-                </a:tc>
-                <a:tc>
-                  <a:txBody>
-                    <a:bodyPr/>
-                    <a:lstStyle/>
-                    <a:p>
-                      <a:pPr latinLnBrk="1"/>
-                      <a:endParaRPr lang="ko-KR" altLang="en-US" sz="1100"/>
-                    </a:p>
-                  </a:txBody>
-                  <a:tcPr/>
-                </a:tc>
-                <a:extLst>
-                  <a:ext uri="{0D108BD9-81ED-4DB2-BD59-A6C34878D82A}">
-                    <a16:rowId xmlns:a16="http://schemas.microsoft.com/office/drawing/2014/main" val="2123559909"/>
-                  </a:ext>
-                </a:extLst>
-              </a:tr>
-              <a:tr h="138814">
-                <a:tc>
-                  <a:txBody>
-                    <a:bodyPr/>
-                    <a:lstStyle/>
-                    <a:p>
-                      <a:pPr latinLnBrk="1"/>
-                      <a:r>
-                        <a:rPr lang="ko-KR" altLang="en-US" sz="1100"/>
-                        <a:t>외부주소</a:t>
-                      </a:r>
-                    </a:p>
-                  </a:txBody>
-                  <a:tcPr/>
-                </a:tc>
-                <a:tc>
-                  <a:txBody>
-                    <a:bodyPr/>
-                    <a:lstStyle/>
-                    <a:p>
-                      <a:pPr latinLnBrk="1"/>
-                      <a:r>
-                        <a:rPr lang="en-US" altLang="ko-KR" sz="1100"/>
-                        <a:t>STN02_Pin."-"</a:t>
-                      </a:r>
-                      <a:endParaRPr lang="ko-KR" altLang="en-US" sz="1100"/>
-                    </a:p>
-                  </a:txBody>
-                  <a:tcPr/>
-                </a:tc>
-                <a:tc>
-                  <a:txBody>
-                    <a:bodyPr/>
-                    <a:lstStyle/>
-                    <a:p>
-                      <a:pPr latinLnBrk="1"/>
-                      <a:r>
-                        <a:rPr lang="en-US" altLang="ko-KR" sz="1100"/>
-                        <a:t>bool</a:t>
-                      </a:r>
-                      <a:endParaRPr lang="ko-KR" altLang="en-US" sz="1100"/>
-                    </a:p>
-                  </a:txBody>
-                  <a:tcPr/>
-                </a:tc>
-                <a:tc>
-                  <a:txBody>
-                    <a:bodyPr/>
-                    <a:lstStyle/>
-                    <a:p>
-                      <a:pPr latinLnBrk="1"/>
-                      <a:r>
-                        <a:rPr lang="en-US" altLang="ko-KR" sz="1100"/>
-                        <a:t>%IX0.0.15</a:t>
-                      </a:r>
-                      <a:endParaRPr lang="ko-KR" altLang="en-US" sz="1100"/>
-                    </a:p>
-                  </a:txBody>
-                  <a:tcPr/>
-                </a:tc>
-                <a:tc>
-                  <a:txBody>
-                    <a:bodyPr/>
-                    <a:lstStyle/>
-                    <a:p>
-                      <a:pPr latinLnBrk="1"/>
-                      <a:r>
-                        <a:rPr lang="en-US" altLang="ko-KR" sz="1100"/>
-                        <a:t>%QX0.1.15</a:t>
-                      </a:r>
-                      <a:endParaRPr lang="ko-KR" altLang="en-US" sz="1100"/>
-                    </a:p>
-                  </a:txBody>
-                  <a:tcPr/>
-                </a:tc>
-                <a:tc>
-                  <a:txBody>
-                    <a:bodyPr/>
-                    <a:lstStyle/>
-                    <a:p>
-                      <a:pPr latinLnBrk="1"/>
-                      <a:r>
-                        <a:rPr lang="en-US" altLang="ko-KR" sz="1100"/>
-                        <a:t>STN02_Pin_-</a:t>
-                      </a:r>
-                      <a:endParaRPr lang="ko-KR" altLang="en-US" sz="1100"/>
-                    </a:p>
-                  </a:txBody>
-                  <a:tcPr/>
-                </a:tc>
-                <a:tc>
-                  <a:txBody>
-                    <a:bodyPr/>
-                    <a:lstStyle/>
-                    <a:p>
-                      <a:pPr latinLnBrk="1"/>
-                      <a:endParaRPr lang="ko-KR" altLang="en-US" sz="1100"/>
-                    </a:p>
-                  </a:txBody>
-                  <a:tcPr/>
-                </a:tc>
-                <a:extLst>
-                  <a:ext uri="{0D108BD9-81ED-4DB2-BD59-A6C34878D82A}">
-                    <a16:rowId xmlns:a16="http://schemas.microsoft.com/office/drawing/2014/main" val="939270184"/>
-                  </a:ext>
-                </a:extLst>
-              </a:tr>
-              <a:tr h="138814">
-                <a:tc>
-                  <a:txBody>
-                    <a:bodyPr/>
-                    <a:lstStyle/>
-                    <a:p>
-                      <a:pPr latinLnBrk="1"/>
-                      <a:r>
-                        <a:rPr lang="ko-KR" altLang="en-US" sz="1100"/>
-                        <a:t>외부주소</a:t>
-                      </a:r>
-                    </a:p>
-                  </a:txBody>
-                  <a:tcPr/>
-                </a:tc>
-                <a:tc>
-                  <a:txBody>
-                    <a:bodyPr/>
-                    <a:lstStyle/>
-                    <a:p>
-                      <a:pPr latinLnBrk="1"/>
-                      <a:r>
-                        <a:rPr lang="en-US" altLang="ko-KR" sz="1100"/>
-                        <a:t>STN03_Pin."+"</a:t>
-                      </a:r>
-                      <a:endParaRPr lang="ko-KR" altLang="en-US" sz="1100"/>
-                    </a:p>
-                  </a:txBody>
-                  <a:tcPr/>
-                </a:tc>
-                <a:tc>
-                  <a:txBody>
-                    <a:bodyPr/>
-                    <a:lstStyle/>
-                    <a:p>
-                      <a:pPr latinLnBrk="1"/>
-                      <a:r>
-                        <a:rPr lang="en-US" altLang="ko-KR" sz="1100"/>
-                        <a:t>bool</a:t>
-                      </a:r>
-                      <a:endParaRPr lang="ko-KR" altLang="en-US" sz="1100"/>
-                    </a:p>
-                  </a:txBody>
-                  <a:tcPr/>
-                </a:tc>
-                <a:tc>
-                  <a:txBody>
-                    <a:bodyPr/>
-                    <a:lstStyle/>
-                    <a:p>
-                      <a:pPr latinLnBrk="1"/>
-                      <a:r>
-                        <a:rPr lang="en-US" altLang="ko-KR" sz="1100"/>
-                        <a:t>%IX0.0.16</a:t>
-                      </a:r>
-                      <a:endParaRPr lang="ko-KR" altLang="en-US" sz="1100"/>
-                    </a:p>
-                  </a:txBody>
-                  <a:tcPr/>
-                </a:tc>
-                <a:tc>
-                  <a:txBody>
-                    <a:bodyPr/>
-                    <a:lstStyle/>
-                    <a:p>
-                      <a:pPr latinLnBrk="1"/>
-                      <a:r>
-                        <a:rPr lang="en-US" altLang="ko-KR" sz="1100"/>
-                        <a:t>%QX0.1.16</a:t>
-                      </a:r>
-                      <a:endParaRPr lang="ko-KR" altLang="en-US" sz="1100"/>
-                    </a:p>
-                  </a:txBody>
-                  <a:tcPr/>
-                </a:tc>
-                <a:tc>
-                  <a:txBody>
-                    <a:bodyPr/>
-                    <a:lstStyle/>
-                    <a:p>
-                      <a:pPr latinLnBrk="1"/>
-                      <a:r>
-                        <a:rPr lang="en-US" altLang="ko-KR" sz="1100"/>
-                        <a:t>STN03_Pin_+</a:t>
-                      </a:r>
-                      <a:endParaRPr lang="ko-KR" altLang="en-US" sz="1100"/>
-                    </a:p>
-                  </a:txBody>
-                  <a:tcPr/>
-                </a:tc>
-                <a:tc>
-                  <a:txBody>
-                    <a:bodyPr/>
-                    <a:lstStyle/>
-                    <a:p>
-                      <a:pPr latinLnBrk="1"/>
-                      <a:endParaRPr lang="ko-KR" altLang="en-US" sz="1100"/>
-                    </a:p>
-                  </a:txBody>
-                  <a:tcPr/>
-                </a:tc>
-                <a:extLst>
-                  <a:ext uri="{0D108BD9-81ED-4DB2-BD59-A6C34878D82A}">
-                    <a16:rowId xmlns:a16="http://schemas.microsoft.com/office/drawing/2014/main" val="682822100"/>
-                  </a:ext>
-                </a:extLst>
-              </a:tr>
-              <a:tr h="138814">
-                <a:tc>
-                  <a:txBody>
-                    <a:bodyPr/>
-                    <a:lstStyle/>
-                    <a:p>
-                      <a:pPr latinLnBrk="1"/>
-                      <a:r>
-                        <a:rPr lang="ko-KR" altLang="en-US" sz="1100"/>
-                        <a:t>외부주소</a:t>
-                      </a:r>
-                    </a:p>
-                  </a:txBody>
-                  <a:tcPr/>
-                </a:tc>
-                <a:tc>
-                  <a:txBody>
-                    <a:bodyPr/>
-                    <a:lstStyle/>
-                    <a:p>
-                      <a:pPr latinLnBrk="1"/>
-                      <a:r>
-                        <a:rPr lang="en-US" altLang="ko-KR" sz="1100"/>
-                        <a:t>STN03_Pin."-"</a:t>
-                      </a:r>
-                      <a:endParaRPr lang="ko-KR" altLang="en-US" sz="1100"/>
-                    </a:p>
-                  </a:txBody>
-                  <a:tcPr/>
-                </a:tc>
-                <a:tc>
-                  <a:txBody>
-                    <a:bodyPr/>
-                    <a:lstStyle/>
-                    <a:p>
-                      <a:pPr latinLnBrk="1"/>
-                      <a:r>
-                        <a:rPr lang="en-US" altLang="ko-KR" sz="1100"/>
-                        <a:t>bool</a:t>
-                      </a:r>
-                      <a:endParaRPr lang="ko-KR" altLang="en-US" sz="1100"/>
-                    </a:p>
-                  </a:txBody>
-                  <a:tcPr/>
-                </a:tc>
-                <a:tc>
-                  <a:txBody>
-                    <a:bodyPr/>
-                    <a:lstStyle/>
-                    <a:p>
-                      <a:pPr latinLnBrk="1"/>
-                      <a:r>
-                        <a:rPr lang="en-US" altLang="ko-KR" sz="1100"/>
-                        <a:t>%IX0.0.17</a:t>
-                      </a:r>
-                      <a:endParaRPr lang="ko-KR" altLang="en-US" sz="1100"/>
-                    </a:p>
-                  </a:txBody>
-                  <a:tcPr/>
-                </a:tc>
-                <a:tc>
-                  <a:txBody>
-                    <a:bodyPr/>
-                    <a:lstStyle/>
-                    <a:p>
-                      <a:pPr latinLnBrk="1"/>
-                      <a:r>
-                        <a:rPr lang="en-US" altLang="ko-KR" sz="1100"/>
-                        <a:t>%QX0.1.17</a:t>
-                      </a:r>
-                      <a:endParaRPr lang="ko-KR" altLang="en-US" sz="1100"/>
-                    </a:p>
-                  </a:txBody>
-                  <a:tcPr/>
-                </a:tc>
-                <a:tc>
-                  <a:txBody>
-                    <a:bodyPr/>
-                    <a:lstStyle/>
-                    <a:p>
-                      <a:pPr latinLnBrk="1"/>
-                      <a:r>
-                        <a:rPr lang="en-US" altLang="ko-KR" sz="1100"/>
-                        <a:t>STN03_Pin_-</a:t>
-                      </a:r>
-                      <a:endParaRPr lang="ko-KR" altLang="en-US" sz="1100"/>
-                    </a:p>
-                  </a:txBody>
-                  <a:tcPr/>
-                </a:tc>
-                <a:tc>
-                  <a:txBody>
-                    <a:bodyPr/>
-                    <a:lstStyle/>
-                    <a:p>
-                      <a:pPr latinLnBrk="1"/>
-                      <a:endParaRPr lang="ko-KR" altLang="en-US" sz="1100"/>
-                    </a:p>
-                  </a:txBody>
-                  <a:tcPr/>
-                </a:tc>
-                <a:extLst>
-                  <a:ext uri="{0D108BD9-81ED-4DB2-BD59-A6C34878D82A}">
-                    <a16:rowId xmlns:a16="http://schemas.microsoft.com/office/drawing/2014/main" val="4129773005"/>
-                  </a:ext>
-                </a:extLst>
-              </a:tr>
-              <a:tr h="138814">
-                <a:tc>
-                  <a:txBody>
-                    <a:bodyPr/>
-                    <a:lstStyle/>
-                    <a:p>
-                      <a:pPr latinLnBrk="1"/>
-                      <a:endParaRPr lang="ko-KR" altLang="en-US" sz="1100"/>
-                    </a:p>
-                  </a:txBody>
-                  <a:tcPr/>
-                </a:tc>
-                <a:tc>
-                  <a:txBody>
-                    <a:bodyPr/>
-                    <a:lstStyle/>
-                    <a:p>
-                      <a:pPr latinLnBrk="1"/>
-                      <a:endParaRPr lang="ko-KR" altLang="en-US" sz="1100"/>
-                    </a:p>
-                  </a:txBody>
-                  <a:tcPr/>
-                </a:tc>
-                <a:tc>
-                  <a:txBody>
-                    <a:bodyPr/>
-                    <a:lstStyle/>
-                    <a:p>
-                      <a:pPr latinLnBrk="1"/>
-                      <a:endParaRPr lang="ko-KR" altLang="en-US" sz="1100"/>
-                    </a:p>
-                  </a:txBody>
-                  <a:tcPr/>
-                </a:tc>
-                <a:tc>
-                  <a:txBody>
-                    <a:bodyPr/>
-                    <a:lstStyle/>
-                    <a:p>
-                      <a:pPr latinLnBrk="1"/>
-                      <a:endParaRPr lang="ko-KR" altLang="en-US" sz="1100"/>
-                    </a:p>
-                  </a:txBody>
-                  <a:tcPr/>
-                </a:tc>
-                <a:tc>
-                  <a:txBody>
-                    <a:bodyPr/>
-                    <a:lstStyle/>
-                    <a:p>
-                      <a:pPr latinLnBrk="1"/>
-                      <a:endParaRPr lang="ko-KR" altLang="en-US" sz="1100"/>
-                    </a:p>
-                  </a:txBody>
-                  <a:tcPr/>
-                </a:tc>
-                <a:tc>
-                  <a:txBody>
-                    <a:bodyPr/>
-                    <a:lstStyle/>
-                    <a:p>
-                      <a:pPr latinLnBrk="1"/>
-                      <a:endParaRPr lang="ko-KR" altLang="en-US" sz="1100"/>
-                    </a:p>
-                  </a:txBody>
-                  <a:tcPr/>
-                </a:tc>
-                <a:tc>
-                  <a:txBody>
-                    <a:bodyPr/>
-                    <a:lstStyle/>
-                    <a:p>
-                      <a:pPr latinLnBrk="1"/>
-                      <a:endParaRPr lang="ko-KR" altLang="en-US" sz="1100"/>
-                    </a:p>
-                  </a:txBody>
-                  <a:tcPr/>
-                </a:tc>
-                <a:extLst>
-                  <a:ext uri="{0D108BD9-81ED-4DB2-BD59-A6C34878D82A}">
-                    <a16:rowId xmlns:a16="http://schemas.microsoft.com/office/drawing/2014/main" val="3635401287"/>
-                  </a:ext>
-                </a:extLst>
-              </a:tr>
-              <a:tr h="138814">
-                <a:tc>
-                  <a:txBody>
-                    <a:bodyPr/>
-                    <a:lstStyle/>
-                    <a:p>
-                      <a:pPr latinLnBrk="1"/>
-                      <a:endParaRPr lang="ko-KR" altLang="en-US" sz="1100"/>
-                    </a:p>
-                  </a:txBody>
-                  <a:tcPr/>
-                </a:tc>
-                <a:tc>
-                  <a:txBody>
-                    <a:bodyPr/>
-                    <a:lstStyle/>
-                    <a:p>
-                      <a:pPr latinLnBrk="1"/>
-                      <a:endParaRPr lang="ko-KR" altLang="en-US" sz="1100"/>
-                    </a:p>
-                  </a:txBody>
-                  <a:tcPr/>
-                </a:tc>
-                <a:tc>
-                  <a:txBody>
-                    <a:bodyPr/>
-                    <a:lstStyle/>
-                    <a:p>
-                      <a:pPr latinLnBrk="1"/>
-                      <a:endParaRPr lang="ko-KR" altLang="en-US" sz="1100"/>
-                    </a:p>
-                  </a:txBody>
-                  <a:tcPr/>
-                </a:tc>
-                <a:tc>
-                  <a:txBody>
-                    <a:bodyPr/>
-                    <a:lstStyle/>
-                    <a:p>
-                      <a:pPr latinLnBrk="1"/>
-                      <a:endParaRPr lang="ko-KR" altLang="en-US" sz="1100"/>
-                    </a:p>
-                  </a:txBody>
-                  <a:tcPr/>
-                </a:tc>
-                <a:tc>
-                  <a:txBody>
-                    <a:bodyPr/>
-                    <a:lstStyle/>
-                    <a:p>
-                      <a:pPr latinLnBrk="1"/>
-                      <a:endParaRPr lang="ko-KR" altLang="en-US" sz="1100"/>
-                    </a:p>
-                  </a:txBody>
-                  <a:tcPr/>
-                </a:tc>
-                <a:tc>
-                  <a:txBody>
-                    <a:bodyPr/>
-                    <a:lstStyle/>
-                    <a:p>
-                      <a:pPr latinLnBrk="1"/>
-                      <a:endParaRPr lang="ko-KR" altLang="en-US" sz="1100"/>
-                    </a:p>
-                  </a:txBody>
-                  <a:tcPr/>
-                </a:tc>
-                <a:tc>
-                  <a:txBody>
-                    <a:bodyPr/>
-                    <a:lstStyle/>
-                    <a:p>
-                      <a:pPr latinLnBrk="1"/>
-                      <a:endParaRPr lang="ko-KR" altLang="en-US" sz="1100"/>
-                    </a:p>
-                  </a:txBody>
-                  <a:tcPr/>
-                </a:tc>
-                <a:extLst>
-                  <a:ext uri="{0D108BD9-81ED-4DB2-BD59-A6C34878D82A}">
-                    <a16:rowId xmlns:a16="http://schemas.microsoft.com/office/drawing/2014/main" val="1979443432"/>
-                  </a:ext>
-                </a:extLst>
-              </a:tr>
-              <a:tr h="138814">
-                <a:tc>
-                  <a:txBody>
-                    <a:bodyPr/>
-                    <a:lstStyle/>
-                    <a:p>
-                      <a:pPr latinLnBrk="1"/>
-                      <a:r>
-                        <a:rPr lang="ko-KR" altLang="en-US" sz="1100"/>
-                        <a:t>자동선택</a:t>
-                      </a:r>
-                    </a:p>
-                  </a:txBody>
-                  <a:tcPr/>
-                </a:tc>
-                <a:tc>
-                  <a:txBody>
-                    <a:bodyPr/>
-                    <a:lstStyle/>
-                    <a:p>
-                      <a:pPr latinLnBrk="1"/>
-                      <a:r>
-                        <a:rPr lang="en-US" altLang="ko-KR" sz="1100"/>
-                        <a:t>autoSTN01_02</a:t>
-                      </a:r>
-                      <a:endParaRPr lang="ko-KR" altLang="en-US" sz="1100"/>
-                    </a:p>
-                  </a:txBody>
-                  <a:tcPr/>
-                </a:tc>
-                <a:tc>
-                  <a:txBody>
-                    <a:bodyPr/>
-                    <a:lstStyle/>
-                    <a:p>
-                      <a:pPr latinLnBrk="1"/>
-                      <a:r>
-                        <a:rPr lang="en-US" altLang="ko-KR" sz="1100"/>
-                        <a:t>bool</a:t>
-                      </a:r>
-                      <a:endParaRPr lang="ko-KR" altLang="en-US" sz="1100"/>
-                    </a:p>
-                  </a:txBody>
-                  <a:tcPr/>
-                </a:tc>
-                <a:tc>
-                  <a:txBody>
-                    <a:bodyPr/>
-                    <a:lstStyle/>
-                    <a:p>
-                      <a:pPr latinLnBrk="1"/>
-                      <a:r>
-                        <a:rPr lang="en-US" altLang="ko-KR" sz="1100"/>
-                        <a:t>%IX0.0.18</a:t>
-                      </a:r>
-                      <a:endParaRPr lang="ko-KR" altLang="en-US" sz="1100"/>
-                    </a:p>
-                  </a:txBody>
-                  <a:tcPr/>
-                </a:tc>
-                <a:tc>
-                  <a:txBody>
-                    <a:bodyPr/>
-                    <a:lstStyle/>
-                    <a:p>
-                      <a:pPr latinLnBrk="1"/>
-                      <a:r>
-                        <a:rPr lang="en-US" altLang="ko-KR" sz="1100"/>
-                        <a:t>%QX0.1.18</a:t>
-                      </a:r>
-                      <a:endParaRPr lang="ko-KR" altLang="en-US" sz="1100"/>
-                    </a:p>
-                  </a:txBody>
-                  <a:tcPr/>
-                </a:tc>
-                <a:tc>
-                  <a:txBody>
-                    <a:bodyPr/>
-                    <a:lstStyle/>
-                    <a:p>
-                      <a:pPr latinLnBrk="1"/>
-                      <a:endParaRPr lang="ko-KR" altLang="en-US" sz="1100"/>
-                    </a:p>
-                  </a:txBody>
-                  <a:tcPr/>
-                </a:tc>
-                <a:tc>
-                  <a:txBody>
-                    <a:bodyPr/>
-                    <a:lstStyle/>
-                    <a:p>
-                      <a:pPr latinLnBrk="1"/>
-                      <a:endParaRPr lang="ko-KR" altLang="en-US" sz="1100"/>
-                    </a:p>
-                  </a:txBody>
-                  <a:tcPr/>
-                </a:tc>
-                <a:extLst>
-                  <a:ext uri="{0D108BD9-81ED-4DB2-BD59-A6C34878D82A}">
-                    <a16:rowId xmlns:a16="http://schemas.microsoft.com/office/drawing/2014/main" val="3056882574"/>
-                  </a:ext>
-                </a:extLst>
-              </a:tr>
-              <a:tr h="138814">
-                <a:tc>
-                  <a:txBody>
-                    <a:bodyPr/>
-                    <a:lstStyle/>
-                    <a:p>
-                      <a:pPr latinLnBrk="1"/>
-                      <a:r>
-                        <a:rPr lang="ko-KR" altLang="en-US" sz="1100"/>
-                        <a:t>수동선택</a:t>
-                      </a:r>
-                    </a:p>
-                  </a:txBody>
-                  <a:tcPr/>
-                </a:tc>
-                <a:tc>
-                  <a:txBody>
-                    <a:bodyPr/>
-                    <a:lstStyle/>
-                    <a:p>
-                      <a:pPr latinLnBrk="1"/>
-                      <a:r>
-                        <a:rPr lang="en-US" altLang="ko-KR" sz="1100"/>
-                        <a:t>manualSTN01_02</a:t>
-                      </a:r>
-                      <a:endParaRPr lang="ko-KR" altLang="en-US" sz="1100"/>
-                    </a:p>
-                  </a:txBody>
-                  <a:tcPr/>
-                </a:tc>
-                <a:tc>
-                  <a:txBody>
-                    <a:bodyPr/>
-                    <a:lstStyle/>
-                    <a:p>
-                      <a:pPr latinLnBrk="1"/>
-                      <a:r>
-                        <a:rPr lang="en-US" altLang="ko-KR" sz="1100"/>
-                        <a:t>bool</a:t>
-                      </a:r>
-                      <a:endParaRPr lang="ko-KR" altLang="en-US" sz="1100"/>
-                    </a:p>
-                  </a:txBody>
-                  <a:tcPr/>
-                </a:tc>
-                <a:tc>
-                  <a:txBody>
-                    <a:bodyPr/>
-                    <a:lstStyle/>
-                    <a:p>
-                      <a:pPr latinLnBrk="1"/>
-                      <a:r>
-                        <a:rPr lang="en-US" altLang="ko-KR" sz="1100"/>
-                        <a:t>%IX0.0.19</a:t>
-                      </a:r>
-                      <a:endParaRPr lang="ko-KR" altLang="en-US" sz="1100"/>
-                    </a:p>
-                  </a:txBody>
-                  <a:tcPr/>
-                </a:tc>
-                <a:tc>
-                  <a:txBody>
-                    <a:bodyPr/>
-                    <a:lstStyle/>
-                    <a:p>
-                      <a:pPr latinLnBrk="1"/>
-                      <a:r>
-                        <a:rPr lang="en-US" altLang="ko-KR" sz="1100"/>
-                        <a:t>%QX0.1.19</a:t>
-                      </a:r>
-                      <a:endParaRPr lang="ko-KR" altLang="en-US" sz="1100"/>
-                    </a:p>
-                  </a:txBody>
-                  <a:tcPr/>
-                </a:tc>
-                <a:tc>
-                  <a:txBody>
-                    <a:bodyPr/>
-                    <a:lstStyle/>
-                    <a:p>
-                      <a:pPr latinLnBrk="1"/>
-                      <a:endParaRPr lang="ko-KR" altLang="en-US" sz="1100"/>
-                    </a:p>
-                  </a:txBody>
-                  <a:tcPr/>
-                </a:tc>
-                <a:tc>
-                  <a:txBody>
-                    <a:bodyPr/>
-                    <a:lstStyle/>
-                    <a:p>
-                      <a:pPr latinLnBrk="1"/>
-                      <a:endParaRPr lang="ko-KR" altLang="en-US" sz="1100"/>
-                    </a:p>
-                  </a:txBody>
-                  <a:tcPr/>
-                </a:tc>
-                <a:extLst>
-                  <a:ext uri="{0D108BD9-81ED-4DB2-BD59-A6C34878D82A}">
-                    <a16:rowId xmlns:a16="http://schemas.microsoft.com/office/drawing/2014/main" val="4089045705"/>
-                  </a:ext>
-                </a:extLst>
-              </a:tr>
-              <a:tr h="138814">
-                <a:tc>
-                  <a:txBody>
-                    <a:bodyPr/>
-                    <a:lstStyle/>
-                    <a:p>
-                      <a:pPr latinLnBrk="1"/>
-                      <a:r>
-                        <a:rPr lang="ko-KR" altLang="en-US" sz="1100"/>
-                        <a:t>운전푸쉬</a:t>
-                      </a:r>
-                    </a:p>
-                  </a:txBody>
-                  <a:tcPr/>
-                </a:tc>
-                <a:tc>
-                  <a:txBody>
-                    <a:bodyPr/>
-                    <a:lstStyle/>
-                    <a:p>
-                      <a:pPr latinLnBrk="1"/>
-                      <a:r>
-                        <a:rPr lang="en-US" altLang="ko-KR" sz="1100"/>
-                        <a:t>driveSTN01_02</a:t>
-                      </a:r>
-                      <a:endParaRPr lang="ko-KR" altLang="en-US" sz="1100"/>
-                    </a:p>
-                  </a:txBody>
-                  <a:tcPr/>
-                </a:tc>
-                <a:tc>
-                  <a:txBody>
-                    <a:bodyPr/>
-                    <a:lstStyle/>
-                    <a:p>
-                      <a:pPr latinLnBrk="1"/>
-                      <a:r>
-                        <a:rPr lang="en-US" altLang="ko-KR" sz="1100"/>
-                        <a:t>bool</a:t>
-                      </a:r>
-                      <a:endParaRPr lang="ko-KR" altLang="en-US" sz="1100"/>
-                    </a:p>
-                  </a:txBody>
-                  <a:tcPr/>
-                </a:tc>
-                <a:tc>
-                  <a:txBody>
-                    <a:bodyPr/>
-                    <a:lstStyle/>
-                    <a:p>
-                      <a:pPr latinLnBrk="1"/>
-                      <a:r>
-                        <a:rPr lang="en-US" altLang="ko-KR" sz="1100"/>
-                        <a:t>%IX0.0.20</a:t>
-                      </a:r>
-                      <a:endParaRPr lang="ko-KR" altLang="en-US" sz="1100"/>
-                    </a:p>
-                  </a:txBody>
-                  <a:tcPr/>
-                </a:tc>
-                <a:tc>
-                  <a:txBody>
-                    <a:bodyPr/>
-                    <a:lstStyle/>
-                    <a:p>
-                      <a:pPr latinLnBrk="1"/>
-                      <a:r>
-                        <a:rPr lang="en-US" altLang="ko-KR" sz="1100"/>
-                        <a:t>%QX0.1.20</a:t>
-                      </a:r>
-                      <a:endParaRPr lang="ko-KR" altLang="en-US" sz="1100"/>
-                    </a:p>
-                  </a:txBody>
-                  <a:tcPr/>
-                </a:tc>
-                <a:tc>
-                  <a:txBody>
-                    <a:bodyPr/>
-                    <a:lstStyle/>
-                    <a:p>
-                      <a:pPr latinLnBrk="1"/>
-                      <a:endParaRPr lang="ko-KR" altLang="en-US" sz="1100"/>
-                    </a:p>
-                  </a:txBody>
-                  <a:tcPr/>
-                </a:tc>
-                <a:tc>
-                  <a:txBody>
-                    <a:bodyPr/>
-                    <a:lstStyle/>
-                    <a:p>
-                      <a:pPr latinLnBrk="1"/>
-                      <a:endParaRPr lang="ko-KR" altLang="en-US" sz="1100"/>
-                    </a:p>
-                  </a:txBody>
-                  <a:tcPr/>
-                </a:tc>
-                <a:extLst>
-                  <a:ext uri="{0D108BD9-81ED-4DB2-BD59-A6C34878D82A}">
-                    <a16:rowId xmlns:a16="http://schemas.microsoft.com/office/drawing/2014/main" val="2046383628"/>
-                  </a:ext>
-                </a:extLst>
-              </a:tr>
-              <a:tr h="138814">
-                <a:tc>
-                  <a:txBody>
-                    <a:bodyPr/>
-                    <a:lstStyle/>
-                    <a:p>
-                      <a:pPr latinLnBrk="1"/>
-                      <a:r>
-                        <a:rPr lang="ko-KR" altLang="en-US" sz="1100"/>
-                        <a:t>정지푸쉬</a:t>
-                      </a:r>
-                    </a:p>
-                  </a:txBody>
-                  <a:tcPr/>
-                </a:tc>
-                <a:tc>
-                  <a:txBody>
-                    <a:bodyPr/>
-                    <a:lstStyle/>
-                    <a:p>
-                      <a:pPr latinLnBrk="1"/>
-                      <a:r>
-                        <a:rPr lang="en-US" altLang="ko-KR" sz="1100"/>
-                        <a:t>stopSTN01_02</a:t>
-                      </a:r>
-                      <a:endParaRPr lang="ko-KR" altLang="en-US" sz="1100"/>
-                    </a:p>
-                  </a:txBody>
-                  <a:tcPr/>
-                </a:tc>
-                <a:tc>
-                  <a:txBody>
-                    <a:bodyPr/>
-                    <a:lstStyle/>
-                    <a:p>
-                      <a:pPr latinLnBrk="1"/>
-                      <a:r>
-                        <a:rPr lang="en-US" altLang="ko-KR" sz="1100"/>
-                        <a:t>bool</a:t>
-                      </a:r>
-                      <a:endParaRPr lang="ko-KR" altLang="en-US" sz="1100"/>
-                    </a:p>
-                  </a:txBody>
-                  <a:tcPr/>
-                </a:tc>
-                <a:tc>
-                  <a:txBody>
-                    <a:bodyPr/>
-                    <a:lstStyle/>
-                    <a:p>
-                      <a:pPr latinLnBrk="1"/>
-                      <a:r>
-                        <a:rPr lang="en-US" altLang="ko-KR" sz="1100"/>
-                        <a:t>%IX0.0.21</a:t>
-                      </a:r>
-                      <a:endParaRPr lang="ko-KR" altLang="en-US" sz="1100"/>
-                    </a:p>
-                  </a:txBody>
-                  <a:tcPr/>
-                </a:tc>
-                <a:tc>
-                  <a:txBody>
-                    <a:bodyPr/>
-                    <a:lstStyle/>
-                    <a:p>
-                      <a:pPr latinLnBrk="1"/>
-                      <a:r>
-                        <a:rPr lang="en-US" altLang="ko-KR" sz="1100"/>
-                        <a:t>%QX0.1.21</a:t>
-                      </a:r>
-                      <a:endParaRPr lang="ko-KR" altLang="en-US" sz="1100"/>
-                    </a:p>
-                  </a:txBody>
-                  <a:tcPr/>
-                </a:tc>
-                <a:tc>
-                  <a:txBody>
-                    <a:bodyPr/>
-                    <a:lstStyle/>
-                    <a:p>
-                      <a:pPr latinLnBrk="1"/>
-                      <a:endParaRPr lang="ko-KR" altLang="en-US" sz="1100"/>
-                    </a:p>
-                  </a:txBody>
-                  <a:tcPr/>
-                </a:tc>
-                <a:tc>
-                  <a:txBody>
-                    <a:bodyPr/>
-                    <a:lstStyle/>
-                    <a:p>
-                      <a:pPr latinLnBrk="1"/>
-                      <a:endParaRPr lang="ko-KR" altLang="en-US" sz="1100"/>
-                    </a:p>
-                  </a:txBody>
-                  <a:tcPr/>
-                </a:tc>
-                <a:extLst>
-                  <a:ext uri="{0D108BD9-81ED-4DB2-BD59-A6C34878D82A}">
-                    <a16:rowId xmlns:a16="http://schemas.microsoft.com/office/drawing/2014/main" val="831549969"/>
-                  </a:ext>
-                </a:extLst>
-              </a:tr>
-              <a:tr h="138814">
-                <a:tc>
-                  <a:txBody>
-                    <a:bodyPr/>
-                    <a:lstStyle/>
-                    <a:p>
-                      <a:pPr latinLnBrk="1"/>
-                      <a:r>
-                        <a:rPr lang="ko-KR" altLang="en-US" sz="1100"/>
-                        <a:t>비상푸쉬</a:t>
-                      </a:r>
-                    </a:p>
-                  </a:txBody>
-                  <a:tcPr/>
-                </a:tc>
-                <a:tc>
-                  <a:txBody>
-                    <a:bodyPr/>
-                    <a:lstStyle/>
-                    <a:p>
-                      <a:pPr latinLnBrk="1"/>
-                      <a:r>
-                        <a:rPr lang="en-US" altLang="ko-KR" sz="1100"/>
-                        <a:t>emgSTN01_02</a:t>
-                      </a:r>
-                      <a:endParaRPr lang="ko-KR" altLang="en-US" sz="1100"/>
-                    </a:p>
-                  </a:txBody>
-                  <a:tcPr/>
-                </a:tc>
-                <a:tc>
-                  <a:txBody>
-                    <a:bodyPr/>
-                    <a:lstStyle/>
-                    <a:p>
-                      <a:pPr latinLnBrk="1"/>
-                      <a:r>
-                        <a:rPr lang="en-US" altLang="ko-KR" sz="1100"/>
-                        <a:t>bool</a:t>
-                      </a:r>
-                      <a:endParaRPr lang="ko-KR" altLang="en-US" sz="1100"/>
-                    </a:p>
-                  </a:txBody>
-                  <a:tcPr/>
-                </a:tc>
-                <a:tc>
-                  <a:txBody>
-                    <a:bodyPr/>
-                    <a:lstStyle/>
-                    <a:p>
-                      <a:pPr latinLnBrk="1"/>
-                      <a:r>
-                        <a:rPr lang="en-US" altLang="ko-KR" sz="1100"/>
-                        <a:t>%IX0.0.22</a:t>
-                      </a:r>
-                      <a:endParaRPr lang="ko-KR" altLang="en-US" sz="1100"/>
-                    </a:p>
-                  </a:txBody>
-                  <a:tcPr/>
-                </a:tc>
-                <a:tc>
-                  <a:txBody>
-                    <a:bodyPr/>
-                    <a:lstStyle/>
-                    <a:p>
-                      <a:pPr latinLnBrk="1"/>
-                      <a:r>
-                        <a:rPr lang="en-US" altLang="ko-KR" sz="1100"/>
-                        <a:t>%QX0.1.22</a:t>
-                      </a:r>
-                      <a:endParaRPr lang="ko-KR" altLang="en-US" sz="1100"/>
-                    </a:p>
-                  </a:txBody>
-                  <a:tcPr/>
-                </a:tc>
-                <a:tc>
-                  <a:txBody>
-                    <a:bodyPr/>
-                    <a:lstStyle/>
-                    <a:p>
-                      <a:pPr latinLnBrk="1"/>
-                      <a:endParaRPr lang="ko-KR" altLang="en-US" sz="1100"/>
-                    </a:p>
-                  </a:txBody>
-                  <a:tcPr/>
-                </a:tc>
-                <a:tc>
-                  <a:txBody>
-                    <a:bodyPr/>
-                    <a:lstStyle/>
-                    <a:p>
-                      <a:pPr latinLnBrk="1"/>
-                      <a:endParaRPr lang="ko-KR" altLang="en-US" sz="1100"/>
-                    </a:p>
-                  </a:txBody>
-                  <a:tcPr/>
-                </a:tc>
-                <a:extLst>
-                  <a:ext uri="{0D108BD9-81ED-4DB2-BD59-A6C34878D82A}">
-                    <a16:rowId xmlns:a16="http://schemas.microsoft.com/office/drawing/2014/main" val="2222945011"/>
-                  </a:ext>
-                </a:extLst>
-              </a:tr>
-              <a:tr h="138814">
-                <a:tc>
-                  <a:txBody>
-                    <a:bodyPr/>
-                    <a:lstStyle/>
-                    <a:p>
-                      <a:pPr latinLnBrk="1"/>
-                      <a:r>
-                        <a:rPr lang="ko-KR" altLang="en-US" sz="1100"/>
-                        <a:t>시운전푸쉬</a:t>
-                      </a:r>
-                    </a:p>
-                  </a:txBody>
-                  <a:tcPr/>
-                </a:tc>
-                <a:tc>
-                  <a:txBody>
-                    <a:bodyPr/>
-                    <a:lstStyle/>
-                    <a:p>
-                      <a:pPr latinLnBrk="1"/>
-                      <a:r>
-                        <a:rPr lang="en-US" altLang="ko-KR" sz="1100"/>
-                        <a:t>testrunSTN01_02</a:t>
-                      </a:r>
-                      <a:endParaRPr lang="ko-KR" altLang="en-US" sz="1100"/>
-                    </a:p>
-                  </a:txBody>
-                  <a:tcPr/>
-                </a:tc>
-                <a:tc>
-                  <a:txBody>
-                    <a:bodyPr/>
-                    <a:lstStyle/>
-                    <a:p>
-                      <a:pPr latinLnBrk="1"/>
-                      <a:r>
-                        <a:rPr lang="en-US" altLang="ko-KR" sz="1100"/>
-                        <a:t>bool</a:t>
-                      </a:r>
-                      <a:endParaRPr lang="ko-KR" altLang="en-US" sz="1100"/>
-                    </a:p>
-                  </a:txBody>
-                  <a:tcPr/>
-                </a:tc>
-                <a:tc>
-                  <a:txBody>
-                    <a:bodyPr/>
-                    <a:lstStyle/>
-                    <a:p>
-                      <a:pPr latinLnBrk="1"/>
-                      <a:r>
-                        <a:rPr lang="en-US" altLang="ko-KR" sz="1100"/>
-                        <a:t>%IX0.0.23</a:t>
-                      </a:r>
-                      <a:endParaRPr lang="ko-KR" altLang="en-US" sz="1100"/>
-                    </a:p>
-                  </a:txBody>
-                  <a:tcPr/>
-                </a:tc>
-                <a:tc>
-                  <a:txBody>
-                    <a:bodyPr/>
-                    <a:lstStyle/>
-                    <a:p>
-                      <a:pPr latinLnBrk="1"/>
-                      <a:r>
-                        <a:rPr lang="en-US" altLang="ko-KR" sz="1100"/>
-                        <a:t>%QX0.1.23</a:t>
-                      </a:r>
-                      <a:endParaRPr lang="ko-KR" altLang="en-US" sz="1100"/>
-                    </a:p>
-                  </a:txBody>
-                  <a:tcPr/>
-                </a:tc>
-                <a:tc>
-                  <a:txBody>
-                    <a:bodyPr/>
-                    <a:lstStyle/>
-                    <a:p>
-                      <a:pPr latinLnBrk="1"/>
-                      <a:endParaRPr lang="ko-KR" altLang="en-US" sz="1100"/>
-                    </a:p>
-                  </a:txBody>
-                  <a:tcPr/>
-                </a:tc>
-                <a:tc>
-                  <a:txBody>
-                    <a:bodyPr/>
-                    <a:lstStyle/>
-                    <a:p>
-                      <a:pPr latinLnBrk="1"/>
-                      <a:endParaRPr lang="ko-KR" altLang="en-US" sz="1100"/>
-                    </a:p>
-                  </a:txBody>
-                  <a:tcPr/>
-                </a:tc>
-                <a:extLst>
-                  <a:ext uri="{0D108BD9-81ED-4DB2-BD59-A6C34878D82A}">
-                    <a16:rowId xmlns:a16="http://schemas.microsoft.com/office/drawing/2014/main" val="1831564440"/>
-                  </a:ext>
-                </a:extLst>
-              </a:tr>
-              <a:tr h="138814">
-                <a:tc>
-                  <a:txBody>
-                    <a:bodyPr/>
-                    <a:lstStyle/>
-                    <a:p>
-                      <a:pPr latinLnBrk="1"/>
-                      <a:r>
-                        <a:rPr lang="ko-KR" altLang="en-US" sz="1100" dirty="0" err="1"/>
-                        <a:t>해지푸쉬</a:t>
-                      </a:r>
-                      <a:endParaRPr lang="ko-KR" altLang="en-US" sz="1100" dirty="0"/>
-                    </a:p>
-                  </a:txBody>
-                  <a:tcPr/>
-                </a:tc>
-                <a:tc>
-                  <a:txBody>
-                    <a:bodyPr/>
-                    <a:lstStyle/>
-                    <a:p>
-                      <a:pPr latinLnBrk="1"/>
-                      <a:r>
-                        <a:rPr lang="en-US" altLang="ko-KR" sz="1100"/>
-                        <a:t>clearSTN01_02</a:t>
-                      </a:r>
-                      <a:endParaRPr lang="ko-KR" altLang="en-US" sz="1100"/>
-                    </a:p>
-                  </a:txBody>
-                  <a:tcPr/>
-                </a:tc>
-                <a:tc>
-                  <a:txBody>
-                    <a:bodyPr/>
-                    <a:lstStyle/>
-                    <a:p>
-                      <a:pPr latinLnBrk="1"/>
-                      <a:r>
-                        <a:rPr lang="en-US" altLang="ko-KR" sz="1100"/>
-                        <a:t>bool</a:t>
-                      </a:r>
-                      <a:endParaRPr lang="ko-KR" altLang="en-US" sz="1100"/>
-                    </a:p>
-                  </a:txBody>
-                  <a:tcPr/>
-                </a:tc>
-                <a:tc>
-                  <a:txBody>
-                    <a:bodyPr/>
-                    <a:lstStyle/>
-                    <a:p>
-                      <a:pPr latinLnBrk="1"/>
-                      <a:r>
-                        <a:rPr lang="en-US" altLang="ko-KR" sz="1100"/>
-                        <a:t>%IX0.0.24</a:t>
-                      </a:r>
-                      <a:endParaRPr lang="ko-KR" altLang="en-US" sz="1100"/>
-                    </a:p>
-                  </a:txBody>
-                  <a:tcPr/>
-                </a:tc>
-                <a:tc>
-                  <a:txBody>
-                    <a:bodyPr/>
-                    <a:lstStyle/>
-                    <a:p>
-                      <a:pPr latinLnBrk="1"/>
-                      <a:r>
-                        <a:rPr lang="en-US" altLang="ko-KR" sz="1100"/>
-                        <a:t>%QX0.1.24</a:t>
-                      </a:r>
-                      <a:endParaRPr lang="ko-KR" altLang="en-US" sz="1100"/>
-                    </a:p>
-                  </a:txBody>
-                  <a:tcPr/>
-                </a:tc>
-                <a:tc>
-                  <a:txBody>
-                    <a:bodyPr/>
-                    <a:lstStyle/>
-                    <a:p>
-                      <a:pPr latinLnBrk="1"/>
-                      <a:endParaRPr lang="ko-KR" altLang="en-US" sz="1100"/>
-                    </a:p>
-                  </a:txBody>
-                  <a:tcPr/>
-                </a:tc>
-                <a:tc>
-                  <a:txBody>
-                    <a:bodyPr/>
-                    <a:lstStyle/>
-                    <a:p>
-                      <a:pPr latinLnBrk="1"/>
-                      <a:endParaRPr lang="ko-KR" altLang="en-US" sz="1100"/>
-                    </a:p>
-                  </a:txBody>
-                  <a:tcPr/>
-                </a:tc>
-                <a:extLst>
-                  <a:ext uri="{0D108BD9-81ED-4DB2-BD59-A6C34878D82A}">
-                    <a16:rowId xmlns:a16="http://schemas.microsoft.com/office/drawing/2014/main" val="3490263719"/>
-                  </a:ext>
-                </a:extLst>
-              </a:tr>
-              <a:tr h="138814">
-                <a:tc>
-                  <a:txBody>
-                    <a:bodyPr/>
-                    <a:lstStyle/>
-                    <a:p>
-                      <a:pPr latinLnBrk="1"/>
-                      <a:r>
-                        <a:rPr lang="ko-KR" altLang="en-US" sz="1100"/>
-                        <a:t>복귀푸쉬</a:t>
-                      </a:r>
-                    </a:p>
-                  </a:txBody>
-                  <a:tcPr/>
-                </a:tc>
-                <a:tc>
-                  <a:txBody>
-                    <a:bodyPr/>
-                    <a:lstStyle/>
-                    <a:p>
-                      <a:pPr latinLnBrk="1"/>
-                      <a:r>
-                        <a:rPr lang="en-US" altLang="ko-KR" sz="1100"/>
-                        <a:t>homeSTN01_02</a:t>
-                      </a:r>
-                      <a:endParaRPr lang="ko-KR" altLang="en-US" sz="1100"/>
-                    </a:p>
-                  </a:txBody>
-                  <a:tcPr/>
-                </a:tc>
-                <a:tc>
-                  <a:txBody>
-                    <a:bodyPr/>
-                    <a:lstStyle/>
-                    <a:p>
-                      <a:pPr latinLnBrk="1"/>
-                      <a:r>
-                        <a:rPr lang="en-US" altLang="ko-KR" sz="1100"/>
-                        <a:t>bool</a:t>
-                      </a:r>
-                      <a:endParaRPr lang="ko-KR" altLang="en-US" sz="1100"/>
-                    </a:p>
-                  </a:txBody>
-                  <a:tcPr/>
-                </a:tc>
-                <a:tc>
-                  <a:txBody>
-                    <a:bodyPr/>
-                    <a:lstStyle/>
-                    <a:p>
-                      <a:pPr latinLnBrk="1"/>
-                      <a:r>
-                        <a:rPr lang="en-US" altLang="ko-KR" sz="1100"/>
-                        <a:t>%IX0.0.25</a:t>
-                      </a:r>
-                      <a:endParaRPr lang="ko-KR" altLang="en-US" sz="1100"/>
-                    </a:p>
-                  </a:txBody>
-                  <a:tcPr/>
-                </a:tc>
-                <a:tc>
-                  <a:txBody>
-                    <a:bodyPr/>
-                    <a:lstStyle/>
-                    <a:p>
-                      <a:pPr latinLnBrk="1"/>
-                      <a:r>
-                        <a:rPr lang="en-US" altLang="ko-KR" sz="1100"/>
-                        <a:t>%QX0.1.25</a:t>
-                      </a:r>
-                      <a:endParaRPr lang="ko-KR" altLang="en-US" sz="1100"/>
-                    </a:p>
-                  </a:txBody>
-                  <a:tcPr/>
-                </a:tc>
-                <a:tc>
-                  <a:txBody>
-                    <a:bodyPr/>
-                    <a:lstStyle/>
-                    <a:p>
-                      <a:pPr latinLnBrk="1"/>
-                      <a:endParaRPr lang="ko-KR" altLang="en-US" sz="1100"/>
-                    </a:p>
-                  </a:txBody>
-                  <a:tcPr/>
-                </a:tc>
-                <a:tc>
-                  <a:txBody>
-                    <a:bodyPr/>
-                    <a:lstStyle/>
-                    <a:p>
-                      <a:pPr latinLnBrk="1"/>
-                      <a:endParaRPr lang="ko-KR" altLang="en-US" sz="1100"/>
-                    </a:p>
-                  </a:txBody>
-                  <a:tcPr/>
-                </a:tc>
-                <a:extLst>
-                  <a:ext uri="{0D108BD9-81ED-4DB2-BD59-A6C34878D82A}">
-                    <a16:rowId xmlns:a16="http://schemas.microsoft.com/office/drawing/2014/main" val="1074727233"/>
-                  </a:ext>
-                </a:extLst>
-              </a:tr>
-              <a:tr h="138814">
-                <a:tc>
-                  <a:txBody>
-                    <a:bodyPr/>
-                    <a:lstStyle/>
-                    <a:p>
-                      <a:pPr latinLnBrk="1"/>
-                      <a:endParaRPr lang="ko-KR" altLang="en-US" sz="1100"/>
-                    </a:p>
-                  </a:txBody>
-                  <a:tcPr/>
-                </a:tc>
-                <a:tc>
-                  <a:txBody>
-                    <a:bodyPr/>
-                    <a:lstStyle/>
-                    <a:p>
-                      <a:pPr latinLnBrk="1"/>
-                      <a:endParaRPr lang="ko-KR" altLang="en-US" sz="1100"/>
-                    </a:p>
-                  </a:txBody>
-                  <a:tcPr/>
-                </a:tc>
-                <a:tc>
-                  <a:txBody>
-                    <a:bodyPr/>
-                    <a:lstStyle/>
-                    <a:p>
-                      <a:pPr latinLnBrk="1"/>
-                      <a:endParaRPr lang="ko-KR" altLang="en-US" sz="1100"/>
-                    </a:p>
-                  </a:txBody>
-                  <a:tcPr/>
-                </a:tc>
-                <a:tc>
-                  <a:txBody>
-                    <a:bodyPr/>
-                    <a:lstStyle/>
-                    <a:p>
-                      <a:pPr latinLnBrk="1"/>
-                      <a:endParaRPr lang="ko-KR" altLang="en-US" sz="1100"/>
-                    </a:p>
-                  </a:txBody>
-                  <a:tcPr/>
-                </a:tc>
-                <a:tc>
-                  <a:txBody>
-                    <a:bodyPr/>
-                    <a:lstStyle/>
-                    <a:p>
-                      <a:pPr latinLnBrk="1"/>
-                      <a:endParaRPr lang="ko-KR" altLang="en-US" sz="1100"/>
-                    </a:p>
-                  </a:txBody>
-                  <a:tcPr/>
-                </a:tc>
-                <a:tc>
-                  <a:txBody>
-                    <a:bodyPr/>
-                    <a:lstStyle/>
-                    <a:p>
-                      <a:pPr latinLnBrk="1"/>
-                      <a:endParaRPr lang="ko-KR" altLang="en-US" sz="1100"/>
-                    </a:p>
-                  </a:txBody>
-                  <a:tcPr/>
-                </a:tc>
-                <a:tc>
-                  <a:txBody>
-                    <a:bodyPr/>
-                    <a:lstStyle/>
-                    <a:p>
-                      <a:pPr latinLnBrk="1"/>
-                      <a:endParaRPr lang="ko-KR" altLang="en-US" sz="1100"/>
-                    </a:p>
-                  </a:txBody>
-                  <a:tcPr/>
-                </a:tc>
-                <a:extLst>
-                  <a:ext uri="{0D108BD9-81ED-4DB2-BD59-A6C34878D82A}">
-                    <a16:rowId xmlns:a16="http://schemas.microsoft.com/office/drawing/2014/main" val="1792484229"/>
-                  </a:ext>
-                </a:extLst>
-              </a:tr>
-              <a:tr h="138814">
-                <a:tc>
-                  <a:txBody>
-                    <a:bodyPr/>
-                    <a:lstStyle/>
-                    <a:p>
-                      <a:pPr latinLnBrk="1"/>
-                      <a:endParaRPr lang="ko-KR" altLang="en-US" sz="1100"/>
-                    </a:p>
-                  </a:txBody>
-                  <a:tcPr/>
-                </a:tc>
-                <a:tc>
-                  <a:txBody>
-                    <a:bodyPr/>
-                    <a:lstStyle/>
-                    <a:p>
-                      <a:pPr latinLnBrk="1"/>
-                      <a:endParaRPr lang="ko-KR" altLang="en-US" sz="1100"/>
-                    </a:p>
-                  </a:txBody>
-                  <a:tcPr/>
-                </a:tc>
-                <a:tc>
-                  <a:txBody>
-                    <a:bodyPr/>
-                    <a:lstStyle/>
-                    <a:p>
-                      <a:pPr latinLnBrk="1"/>
-                      <a:endParaRPr lang="ko-KR" altLang="en-US" sz="1100"/>
-                    </a:p>
-                  </a:txBody>
-                  <a:tcPr/>
-                </a:tc>
-                <a:tc>
-                  <a:txBody>
-                    <a:bodyPr/>
-                    <a:lstStyle/>
-                    <a:p>
-                      <a:pPr latinLnBrk="1"/>
-                      <a:endParaRPr lang="ko-KR" altLang="en-US" sz="1100"/>
-                    </a:p>
-                  </a:txBody>
-                  <a:tcPr/>
-                </a:tc>
-                <a:tc>
-                  <a:txBody>
-                    <a:bodyPr/>
-                    <a:lstStyle/>
-                    <a:p>
-                      <a:pPr latinLnBrk="1"/>
-                      <a:endParaRPr lang="ko-KR" altLang="en-US" sz="1100"/>
-                    </a:p>
-                  </a:txBody>
-                  <a:tcPr/>
-                </a:tc>
-                <a:tc>
-                  <a:txBody>
-                    <a:bodyPr/>
-                    <a:lstStyle/>
-                    <a:p>
-                      <a:pPr latinLnBrk="1"/>
-                      <a:endParaRPr lang="ko-KR" altLang="en-US" sz="1100"/>
-                    </a:p>
-                  </a:txBody>
-                  <a:tcPr/>
-                </a:tc>
-                <a:tc>
-                  <a:txBody>
-                    <a:bodyPr/>
-                    <a:lstStyle/>
-                    <a:p>
-                      <a:pPr latinLnBrk="1"/>
-                      <a:endParaRPr lang="ko-KR" altLang="en-US" sz="1100"/>
-                    </a:p>
-                  </a:txBody>
-                  <a:tcPr/>
-                </a:tc>
-                <a:extLst>
-                  <a:ext uri="{0D108BD9-81ED-4DB2-BD59-A6C34878D82A}">
-                    <a16:rowId xmlns:a16="http://schemas.microsoft.com/office/drawing/2014/main" val="1730575481"/>
-                  </a:ext>
-                </a:extLst>
-              </a:tr>
-              <a:tr h="138814">
-                <a:tc>
-                  <a:txBody>
-                    <a:bodyPr/>
-                    <a:lstStyle/>
-                    <a:p>
-                      <a:pPr latinLnBrk="1"/>
-                      <a:r>
-                        <a:rPr lang="ko-KR" altLang="en-US" sz="1100"/>
-                        <a:t>운전램프</a:t>
-                      </a:r>
-                    </a:p>
-                  </a:txBody>
-                  <a:tcPr/>
-                </a:tc>
-                <a:tc>
-                  <a:txBody>
-                    <a:bodyPr/>
-                    <a:lstStyle/>
-                    <a:p>
-                      <a:pPr latinLnBrk="1"/>
-                      <a:r>
-                        <a:rPr lang="en-US" altLang="ko-KR" sz="1100"/>
-                        <a:t>driveLamp</a:t>
-                      </a:r>
-                      <a:endParaRPr lang="ko-KR" altLang="en-US" sz="1100"/>
-                    </a:p>
-                  </a:txBody>
-                  <a:tcPr/>
-                </a:tc>
-                <a:tc>
-                  <a:txBody>
-                    <a:bodyPr/>
-                    <a:lstStyle/>
-                    <a:p>
-                      <a:pPr latinLnBrk="1"/>
-                      <a:r>
-                        <a:rPr lang="en-US" altLang="ko-KR" sz="1100"/>
-                        <a:t>bool</a:t>
-                      </a:r>
-                      <a:endParaRPr lang="ko-KR" altLang="en-US" sz="1100"/>
-                    </a:p>
-                  </a:txBody>
-                  <a:tcPr/>
-                </a:tc>
-                <a:tc>
-                  <a:txBody>
-                    <a:bodyPr/>
-                    <a:lstStyle/>
-                    <a:p>
-                      <a:pPr latinLnBrk="1"/>
-                      <a:endParaRPr lang="ko-KR" altLang="en-US" sz="1100"/>
-                    </a:p>
-                  </a:txBody>
-                  <a:tcPr/>
-                </a:tc>
-                <a:tc>
-                  <a:txBody>
-                    <a:bodyPr/>
-                    <a:lstStyle/>
-                    <a:p>
-                      <a:pPr latinLnBrk="1"/>
-                      <a:r>
-                        <a:rPr lang="en-US" altLang="ko-KR" sz="1100"/>
-                        <a:t>%QX0.1.26</a:t>
-                      </a:r>
-                      <a:endParaRPr lang="ko-KR" altLang="en-US" sz="1100"/>
-                    </a:p>
-                  </a:txBody>
-                  <a:tcPr/>
-                </a:tc>
-                <a:tc>
-                  <a:txBody>
-                    <a:bodyPr/>
-                    <a:lstStyle/>
-                    <a:p>
-                      <a:pPr latinLnBrk="1"/>
-                      <a:endParaRPr lang="ko-KR" altLang="en-US" sz="1100"/>
-                    </a:p>
-                  </a:txBody>
-                  <a:tcPr/>
-                </a:tc>
-                <a:tc>
-                  <a:txBody>
-                    <a:bodyPr/>
-                    <a:lstStyle/>
-                    <a:p>
-                      <a:pPr latinLnBrk="1"/>
-                      <a:endParaRPr lang="ko-KR" altLang="en-US" sz="1100"/>
-                    </a:p>
-                  </a:txBody>
-                  <a:tcPr/>
-                </a:tc>
-                <a:extLst>
-                  <a:ext uri="{0D108BD9-81ED-4DB2-BD59-A6C34878D82A}">
-                    <a16:rowId xmlns:a16="http://schemas.microsoft.com/office/drawing/2014/main" val="818321908"/>
-                  </a:ext>
-                </a:extLst>
-              </a:tr>
-              <a:tr h="138814">
-                <a:tc>
-                  <a:txBody>
-                    <a:bodyPr/>
-                    <a:lstStyle/>
-                    <a:p>
-                      <a:pPr latinLnBrk="1"/>
-                      <a:r>
-                        <a:rPr lang="ko-KR" altLang="en-US" sz="1100"/>
-                        <a:t>자동램프</a:t>
-                      </a:r>
-                    </a:p>
-                  </a:txBody>
-                  <a:tcPr/>
-                </a:tc>
-                <a:tc>
-                  <a:txBody>
-                    <a:bodyPr/>
-                    <a:lstStyle/>
-                    <a:p>
-                      <a:pPr latinLnBrk="1"/>
-                      <a:r>
-                        <a:rPr lang="en-US" altLang="ko-KR" sz="1100"/>
-                        <a:t>autoLamp</a:t>
-                      </a:r>
-                      <a:endParaRPr lang="ko-KR" altLang="en-US" sz="1100"/>
-                    </a:p>
-                  </a:txBody>
-                  <a:tcPr/>
-                </a:tc>
-                <a:tc>
-                  <a:txBody>
-                    <a:bodyPr/>
-                    <a:lstStyle/>
-                    <a:p>
-                      <a:pPr latinLnBrk="1"/>
-                      <a:r>
-                        <a:rPr lang="en-US" altLang="ko-KR" sz="1100"/>
-                        <a:t>bool</a:t>
-                      </a:r>
-                      <a:endParaRPr lang="ko-KR" altLang="en-US" sz="1100"/>
-                    </a:p>
-                  </a:txBody>
-                  <a:tcPr/>
-                </a:tc>
-                <a:tc>
-                  <a:txBody>
-                    <a:bodyPr/>
-                    <a:lstStyle/>
-                    <a:p>
-                      <a:pPr latinLnBrk="1"/>
-                      <a:endParaRPr lang="ko-KR" altLang="en-US" sz="1100"/>
-                    </a:p>
-                  </a:txBody>
-                  <a:tcPr/>
-                </a:tc>
-                <a:tc>
-                  <a:txBody>
-                    <a:bodyPr/>
-                    <a:lstStyle/>
-                    <a:p>
-                      <a:pPr latinLnBrk="1"/>
-                      <a:r>
-                        <a:rPr lang="en-US" altLang="ko-KR" sz="1100"/>
-                        <a:t>%QX0.1.27</a:t>
-                      </a:r>
-                      <a:endParaRPr lang="ko-KR" altLang="en-US" sz="1100"/>
-                    </a:p>
-                  </a:txBody>
-                  <a:tcPr/>
-                </a:tc>
-                <a:tc>
-                  <a:txBody>
-                    <a:bodyPr/>
-                    <a:lstStyle/>
-                    <a:p>
-                      <a:pPr latinLnBrk="1"/>
-                      <a:endParaRPr lang="ko-KR" altLang="en-US" sz="1100"/>
-                    </a:p>
-                  </a:txBody>
-                  <a:tcPr/>
-                </a:tc>
-                <a:tc>
-                  <a:txBody>
-                    <a:bodyPr/>
-                    <a:lstStyle/>
-                    <a:p>
-                      <a:pPr latinLnBrk="1"/>
-                      <a:endParaRPr lang="ko-KR" altLang="en-US" sz="1100"/>
-                    </a:p>
-                  </a:txBody>
-                  <a:tcPr/>
-                </a:tc>
-                <a:extLst>
-                  <a:ext uri="{0D108BD9-81ED-4DB2-BD59-A6C34878D82A}">
-                    <a16:rowId xmlns:a16="http://schemas.microsoft.com/office/drawing/2014/main" val="3194479050"/>
-                  </a:ext>
-                </a:extLst>
-              </a:tr>
-              <a:tr h="138814">
-                <a:tc>
-                  <a:txBody>
-                    <a:bodyPr/>
-                    <a:lstStyle/>
-                    <a:p>
-                      <a:pPr latinLnBrk="1"/>
-                      <a:r>
-                        <a:rPr lang="ko-KR" altLang="en-US" sz="1100"/>
-                        <a:t>수동램프</a:t>
-                      </a:r>
-                    </a:p>
-                  </a:txBody>
-                  <a:tcPr/>
-                </a:tc>
-                <a:tc>
-                  <a:txBody>
-                    <a:bodyPr/>
-                    <a:lstStyle/>
-                    <a:p>
-                      <a:pPr latinLnBrk="1"/>
-                      <a:r>
-                        <a:rPr lang="en-US" altLang="ko-KR" sz="1100"/>
-                        <a:t>manualLamp</a:t>
-                      </a:r>
-                      <a:endParaRPr lang="ko-KR" altLang="en-US" sz="1100"/>
-                    </a:p>
-                  </a:txBody>
-                  <a:tcPr/>
-                </a:tc>
-                <a:tc>
-                  <a:txBody>
-                    <a:bodyPr/>
-                    <a:lstStyle/>
-                    <a:p>
-                      <a:pPr latinLnBrk="1"/>
-                      <a:r>
-                        <a:rPr lang="en-US" altLang="ko-KR" sz="1100"/>
-                        <a:t>bool</a:t>
-                      </a:r>
-                      <a:endParaRPr lang="ko-KR" altLang="en-US" sz="1100"/>
-                    </a:p>
-                  </a:txBody>
-                  <a:tcPr/>
-                </a:tc>
-                <a:tc>
-                  <a:txBody>
-                    <a:bodyPr/>
-                    <a:lstStyle/>
-                    <a:p>
-                      <a:pPr latinLnBrk="1"/>
-                      <a:endParaRPr lang="ko-KR" altLang="en-US" sz="1100"/>
-                    </a:p>
-                  </a:txBody>
-                  <a:tcPr/>
-                </a:tc>
-                <a:tc>
-                  <a:txBody>
-                    <a:bodyPr/>
-                    <a:lstStyle/>
-                    <a:p>
-                      <a:pPr latinLnBrk="1"/>
-                      <a:r>
-                        <a:rPr lang="en-US" altLang="ko-KR" sz="1100"/>
-                        <a:t>%QX0.1.28</a:t>
-                      </a:r>
-                      <a:endParaRPr lang="ko-KR" altLang="en-US" sz="1100"/>
-                    </a:p>
-                  </a:txBody>
-                  <a:tcPr/>
-                </a:tc>
-                <a:tc>
-                  <a:txBody>
-                    <a:bodyPr/>
-                    <a:lstStyle/>
-                    <a:p>
-                      <a:pPr latinLnBrk="1"/>
-                      <a:endParaRPr lang="ko-KR" altLang="en-US" sz="1100"/>
-                    </a:p>
-                  </a:txBody>
-                  <a:tcPr/>
-                </a:tc>
-                <a:tc>
-                  <a:txBody>
-                    <a:bodyPr/>
-                    <a:lstStyle/>
-                    <a:p>
-                      <a:pPr latinLnBrk="1"/>
-                      <a:endParaRPr lang="ko-KR" altLang="en-US" sz="1100"/>
-                    </a:p>
-                  </a:txBody>
-                  <a:tcPr/>
-                </a:tc>
-                <a:extLst>
-                  <a:ext uri="{0D108BD9-81ED-4DB2-BD59-A6C34878D82A}">
-                    <a16:rowId xmlns:a16="http://schemas.microsoft.com/office/drawing/2014/main" val="555306716"/>
-                  </a:ext>
-                </a:extLst>
-              </a:tr>
-              <a:tr h="138814">
-                <a:tc>
-                  <a:txBody>
-                    <a:bodyPr/>
-                    <a:lstStyle/>
-                    <a:p>
-                      <a:pPr latinLnBrk="1"/>
-                      <a:r>
-                        <a:rPr lang="ko-KR" altLang="en-US" sz="1100"/>
-                        <a:t>시운전램프</a:t>
-                      </a:r>
-                    </a:p>
-                  </a:txBody>
-                  <a:tcPr/>
-                </a:tc>
-                <a:tc>
-                  <a:txBody>
-                    <a:bodyPr/>
-                    <a:lstStyle/>
-                    <a:p>
-                      <a:pPr latinLnBrk="1"/>
-                      <a:r>
-                        <a:rPr lang="en-US" altLang="ko-KR" sz="1100"/>
-                        <a:t>testrunLamp</a:t>
-                      </a:r>
-                      <a:endParaRPr lang="ko-KR" altLang="en-US" sz="1100"/>
-                    </a:p>
-                  </a:txBody>
-                  <a:tcPr/>
-                </a:tc>
-                <a:tc>
-                  <a:txBody>
-                    <a:bodyPr/>
-                    <a:lstStyle/>
-                    <a:p>
-                      <a:pPr latinLnBrk="1"/>
-                      <a:r>
-                        <a:rPr lang="en-US" altLang="ko-KR" sz="1100"/>
-                        <a:t>bool</a:t>
-                      </a:r>
-                      <a:endParaRPr lang="ko-KR" altLang="en-US" sz="1100"/>
-                    </a:p>
-                  </a:txBody>
-                  <a:tcPr/>
-                </a:tc>
-                <a:tc>
-                  <a:txBody>
-                    <a:bodyPr/>
-                    <a:lstStyle/>
-                    <a:p>
-                      <a:pPr latinLnBrk="1"/>
-                      <a:endParaRPr lang="ko-KR" altLang="en-US" sz="1100"/>
-                    </a:p>
-                  </a:txBody>
-                  <a:tcPr/>
-                </a:tc>
-                <a:tc>
-                  <a:txBody>
-                    <a:bodyPr/>
-                    <a:lstStyle/>
-                    <a:p>
-                      <a:pPr latinLnBrk="1"/>
-                      <a:r>
-                        <a:rPr lang="en-US" altLang="ko-KR" sz="1100"/>
-                        <a:t>%QX0.1.29</a:t>
-                      </a:r>
-                      <a:endParaRPr lang="ko-KR" altLang="en-US" sz="1100"/>
-                    </a:p>
-                  </a:txBody>
-                  <a:tcPr/>
-                </a:tc>
-                <a:tc>
-                  <a:txBody>
-                    <a:bodyPr/>
-                    <a:lstStyle/>
-                    <a:p>
-                      <a:pPr latinLnBrk="1"/>
-                      <a:endParaRPr lang="ko-KR" altLang="en-US" sz="1100"/>
-                    </a:p>
-                  </a:txBody>
-                  <a:tcPr/>
-                </a:tc>
-                <a:tc>
-                  <a:txBody>
-                    <a:bodyPr/>
-                    <a:lstStyle/>
-                    <a:p>
-                      <a:pPr latinLnBrk="1"/>
-                      <a:endParaRPr lang="ko-KR" altLang="en-US" sz="1100"/>
-                    </a:p>
-                  </a:txBody>
-                  <a:tcPr/>
-                </a:tc>
-                <a:extLst>
-                  <a:ext uri="{0D108BD9-81ED-4DB2-BD59-A6C34878D82A}">
-                    <a16:rowId xmlns:a16="http://schemas.microsoft.com/office/drawing/2014/main" val="2398931908"/>
-                  </a:ext>
-                </a:extLst>
-              </a:tr>
-              <a:tr h="138814">
-                <a:tc>
-                  <a:txBody>
-                    <a:bodyPr/>
-                    <a:lstStyle/>
-                    <a:p>
-                      <a:pPr latinLnBrk="1"/>
-                      <a:r>
-                        <a:rPr lang="ko-KR" altLang="en-US" sz="1100"/>
-                        <a:t>정지램프</a:t>
-                      </a:r>
-                    </a:p>
-                  </a:txBody>
-                  <a:tcPr/>
-                </a:tc>
-                <a:tc>
-                  <a:txBody>
-                    <a:bodyPr/>
-                    <a:lstStyle/>
-                    <a:p>
-                      <a:pPr latinLnBrk="1"/>
-                      <a:r>
-                        <a:rPr lang="en-US" altLang="ko-KR" sz="1100"/>
-                        <a:t>stopLamp</a:t>
-                      </a:r>
-                      <a:endParaRPr lang="ko-KR" altLang="en-US" sz="1100"/>
-                    </a:p>
-                  </a:txBody>
-                  <a:tcPr/>
-                </a:tc>
-                <a:tc>
-                  <a:txBody>
-                    <a:bodyPr/>
-                    <a:lstStyle/>
-                    <a:p>
-                      <a:pPr latinLnBrk="1"/>
-                      <a:r>
-                        <a:rPr lang="en-US" altLang="ko-KR" sz="1100"/>
-                        <a:t>bool</a:t>
-                      </a:r>
-                      <a:endParaRPr lang="ko-KR" altLang="en-US" sz="1100"/>
-                    </a:p>
-                  </a:txBody>
-                  <a:tcPr/>
-                </a:tc>
-                <a:tc>
-                  <a:txBody>
-                    <a:bodyPr/>
-                    <a:lstStyle/>
-                    <a:p>
-                      <a:pPr latinLnBrk="1"/>
-                      <a:endParaRPr lang="ko-KR" altLang="en-US" sz="1100"/>
-                    </a:p>
-                  </a:txBody>
-                  <a:tcPr/>
-                </a:tc>
-                <a:tc>
-                  <a:txBody>
-                    <a:bodyPr/>
-                    <a:lstStyle/>
-                    <a:p>
-                      <a:pPr latinLnBrk="1"/>
-                      <a:r>
-                        <a:rPr lang="en-US" altLang="ko-KR" sz="1100"/>
-                        <a:t>%QX0.1.30</a:t>
-                      </a:r>
-                      <a:endParaRPr lang="ko-KR" altLang="en-US" sz="1100"/>
-                    </a:p>
-                  </a:txBody>
-                  <a:tcPr/>
-                </a:tc>
-                <a:tc>
-                  <a:txBody>
-                    <a:bodyPr/>
-                    <a:lstStyle/>
-                    <a:p>
-                      <a:pPr latinLnBrk="1"/>
-                      <a:endParaRPr lang="ko-KR" altLang="en-US" sz="1100"/>
-                    </a:p>
-                  </a:txBody>
-                  <a:tcPr/>
-                </a:tc>
-                <a:tc>
-                  <a:txBody>
-                    <a:bodyPr/>
-                    <a:lstStyle/>
-                    <a:p>
-                      <a:pPr latinLnBrk="1"/>
-                      <a:endParaRPr lang="ko-KR" altLang="en-US" sz="1100"/>
-                    </a:p>
-                  </a:txBody>
-                  <a:tcPr/>
-                </a:tc>
-                <a:extLst>
-                  <a:ext uri="{0D108BD9-81ED-4DB2-BD59-A6C34878D82A}">
-                    <a16:rowId xmlns:a16="http://schemas.microsoft.com/office/drawing/2014/main" val="2205839795"/>
-                  </a:ext>
-                </a:extLst>
-              </a:tr>
-              <a:tr h="138814">
-                <a:tc>
-                  <a:txBody>
-                    <a:bodyPr/>
-                    <a:lstStyle/>
-                    <a:p>
-                      <a:pPr latinLnBrk="1"/>
-                      <a:r>
-                        <a:rPr lang="ko-KR" altLang="en-US" sz="1100"/>
-                        <a:t>준비램프</a:t>
-                      </a:r>
-                    </a:p>
-                  </a:txBody>
-                  <a:tcPr/>
-                </a:tc>
-                <a:tc>
-                  <a:txBody>
-                    <a:bodyPr/>
-                    <a:lstStyle/>
-                    <a:p>
-                      <a:pPr latinLnBrk="1"/>
-                      <a:r>
-                        <a:rPr lang="en-US" altLang="ko-KR" sz="1100"/>
-                        <a:t>readyLamp</a:t>
-                      </a:r>
-                      <a:endParaRPr lang="ko-KR" altLang="en-US" sz="1100"/>
-                    </a:p>
-                  </a:txBody>
-                  <a:tcPr/>
-                </a:tc>
-                <a:tc>
-                  <a:txBody>
-                    <a:bodyPr/>
-                    <a:lstStyle/>
-                    <a:p>
-                      <a:pPr latinLnBrk="1"/>
-                      <a:r>
-                        <a:rPr lang="en-US" altLang="ko-KR" sz="1100"/>
-                        <a:t>bool</a:t>
-                      </a:r>
-                      <a:endParaRPr lang="ko-KR" altLang="en-US" sz="1100"/>
-                    </a:p>
-                  </a:txBody>
-                  <a:tcPr/>
-                </a:tc>
-                <a:tc>
-                  <a:txBody>
-                    <a:bodyPr/>
-                    <a:lstStyle/>
-                    <a:p>
-                      <a:pPr latinLnBrk="1"/>
-                      <a:endParaRPr lang="ko-KR" altLang="en-US" sz="1100"/>
-                    </a:p>
-                  </a:txBody>
-                  <a:tcPr/>
-                </a:tc>
-                <a:tc>
-                  <a:txBody>
-                    <a:bodyPr/>
-                    <a:lstStyle/>
-                    <a:p>
-                      <a:pPr latinLnBrk="1"/>
-                      <a:r>
-                        <a:rPr lang="en-US" altLang="ko-KR" sz="1100"/>
-                        <a:t>%QX0.1.31</a:t>
-                      </a:r>
-                      <a:endParaRPr lang="ko-KR" altLang="en-US" sz="1100"/>
-                    </a:p>
-                  </a:txBody>
-                  <a:tcPr/>
-                </a:tc>
-                <a:tc>
-                  <a:txBody>
-                    <a:bodyPr/>
-                    <a:lstStyle/>
-                    <a:p>
-                      <a:pPr latinLnBrk="1"/>
-                      <a:endParaRPr lang="ko-KR" altLang="en-US" sz="1100"/>
-                    </a:p>
-                  </a:txBody>
-                  <a:tcPr/>
-                </a:tc>
-                <a:tc>
-                  <a:txBody>
-                    <a:bodyPr/>
-                    <a:lstStyle/>
-                    <a:p>
-                      <a:pPr latinLnBrk="1"/>
-                      <a:endParaRPr lang="ko-KR" altLang="en-US" sz="1100"/>
-                    </a:p>
-                  </a:txBody>
-                  <a:tcPr/>
-                </a:tc>
-                <a:extLst>
-                  <a:ext uri="{0D108BD9-81ED-4DB2-BD59-A6C34878D82A}">
-                    <a16:rowId xmlns:a16="http://schemas.microsoft.com/office/drawing/2014/main" val="761613937"/>
-                  </a:ext>
-                </a:extLst>
-              </a:tr>
-              <a:tr h="138814">
-                <a:tc>
-                  <a:txBody>
-                    <a:bodyPr/>
-                    <a:lstStyle/>
-                    <a:p>
-                      <a:pPr latinLnBrk="1"/>
-                      <a:r>
-                        <a:rPr lang="ko-KR" altLang="en-US" sz="1100"/>
-                        <a:t>대기램프</a:t>
-                      </a:r>
-                    </a:p>
-                  </a:txBody>
-                  <a:tcPr/>
-                </a:tc>
-                <a:tc>
-                  <a:txBody>
-                    <a:bodyPr/>
-                    <a:lstStyle/>
-                    <a:p>
-                      <a:pPr latinLnBrk="1"/>
-                      <a:r>
-                        <a:rPr lang="en-US" altLang="ko-KR" sz="1100"/>
-                        <a:t>idleLamp</a:t>
-                      </a:r>
-                      <a:endParaRPr lang="ko-KR" altLang="en-US" sz="1100"/>
-                    </a:p>
-                  </a:txBody>
-                  <a:tcPr/>
-                </a:tc>
-                <a:tc>
-                  <a:txBody>
-                    <a:bodyPr/>
-                    <a:lstStyle/>
-                    <a:p>
-                      <a:pPr latinLnBrk="1"/>
-                      <a:r>
-                        <a:rPr lang="en-US" altLang="ko-KR" sz="1100"/>
-                        <a:t>bool</a:t>
-                      </a:r>
-                      <a:endParaRPr lang="ko-KR" altLang="en-US" sz="1100"/>
-                    </a:p>
-                  </a:txBody>
-                  <a:tcPr/>
-                </a:tc>
-                <a:tc>
-                  <a:txBody>
-                    <a:bodyPr/>
-                    <a:lstStyle/>
-                    <a:p>
-                      <a:pPr latinLnBrk="1"/>
-                      <a:endParaRPr lang="ko-KR" altLang="en-US" sz="1100"/>
-                    </a:p>
-                  </a:txBody>
-                  <a:tcPr/>
-                </a:tc>
-                <a:tc>
-                  <a:txBody>
-                    <a:bodyPr/>
-                    <a:lstStyle/>
-                    <a:p>
-                      <a:pPr latinLnBrk="1"/>
-                      <a:r>
-                        <a:rPr lang="en-US" altLang="ko-KR" sz="1100"/>
-                        <a:t>%QX0.1.32</a:t>
-                      </a:r>
-                      <a:endParaRPr lang="ko-KR" altLang="en-US" sz="1100"/>
-                    </a:p>
-                  </a:txBody>
-                  <a:tcPr/>
-                </a:tc>
-                <a:tc>
-                  <a:txBody>
-                    <a:bodyPr/>
-                    <a:lstStyle/>
-                    <a:p>
-                      <a:pPr latinLnBrk="1"/>
-                      <a:endParaRPr lang="ko-KR" altLang="en-US" sz="1100"/>
-                    </a:p>
-                  </a:txBody>
-                  <a:tcPr/>
-                </a:tc>
-                <a:tc>
-                  <a:txBody>
-                    <a:bodyPr/>
-                    <a:lstStyle/>
-                    <a:p>
-                      <a:pPr latinLnBrk="1"/>
-                      <a:endParaRPr lang="ko-KR" altLang="en-US" sz="1100"/>
-                    </a:p>
-                  </a:txBody>
-                  <a:tcPr/>
-                </a:tc>
-                <a:extLst>
-                  <a:ext uri="{0D108BD9-81ED-4DB2-BD59-A6C34878D82A}">
-                    <a16:rowId xmlns:a16="http://schemas.microsoft.com/office/drawing/2014/main" val="1356383543"/>
-                  </a:ext>
-                </a:extLst>
-              </a:tr>
-              <a:tr h="138814">
-                <a:tc>
-                  <a:txBody>
-                    <a:bodyPr/>
-                    <a:lstStyle/>
-                    <a:p>
-                      <a:pPr latinLnBrk="1"/>
-                      <a:r>
-                        <a:rPr lang="ko-KR" altLang="en-US" sz="1100"/>
-                        <a:t>비상램프</a:t>
-                      </a:r>
-                    </a:p>
-                  </a:txBody>
-                  <a:tcPr/>
-                </a:tc>
-                <a:tc>
-                  <a:txBody>
-                    <a:bodyPr/>
-                    <a:lstStyle/>
-                    <a:p>
-                      <a:pPr latinLnBrk="1"/>
-                      <a:r>
-                        <a:rPr lang="en-US" altLang="ko-KR" sz="1100"/>
-                        <a:t>emgLamp</a:t>
-                      </a:r>
-                      <a:endParaRPr lang="ko-KR" altLang="en-US" sz="1100"/>
-                    </a:p>
-                  </a:txBody>
-                  <a:tcPr/>
-                </a:tc>
-                <a:tc>
-                  <a:txBody>
-                    <a:bodyPr/>
-                    <a:lstStyle/>
-                    <a:p>
-                      <a:pPr latinLnBrk="1"/>
-                      <a:r>
-                        <a:rPr lang="en-US" altLang="ko-KR" sz="1100"/>
-                        <a:t>bool</a:t>
-                      </a:r>
-                      <a:endParaRPr lang="ko-KR" altLang="en-US" sz="1100"/>
-                    </a:p>
-                  </a:txBody>
-                  <a:tcPr/>
-                </a:tc>
-                <a:tc>
-                  <a:txBody>
-                    <a:bodyPr/>
-                    <a:lstStyle/>
-                    <a:p>
-                      <a:pPr latinLnBrk="1"/>
-                      <a:endParaRPr lang="ko-KR" altLang="en-US" sz="1100"/>
-                    </a:p>
-                  </a:txBody>
-                  <a:tcPr/>
-                </a:tc>
-                <a:tc>
-                  <a:txBody>
-                    <a:bodyPr/>
-                    <a:lstStyle/>
-                    <a:p>
-                      <a:pPr latinLnBrk="1"/>
-                      <a:r>
-                        <a:rPr lang="en-US" altLang="ko-KR" sz="1100"/>
-                        <a:t>%QX0.1.33</a:t>
-                      </a:r>
-                      <a:endParaRPr lang="ko-KR" altLang="en-US" sz="1100"/>
-                    </a:p>
-                  </a:txBody>
-                  <a:tcPr/>
-                </a:tc>
-                <a:tc>
-                  <a:txBody>
-                    <a:bodyPr/>
-                    <a:lstStyle/>
-                    <a:p>
-                      <a:pPr latinLnBrk="1"/>
-                      <a:endParaRPr lang="ko-KR" altLang="en-US" sz="1100"/>
-                    </a:p>
-                  </a:txBody>
-                  <a:tcPr/>
-                </a:tc>
-                <a:tc>
-                  <a:txBody>
-                    <a:bodyPr/>
-                    <a:lstStyle/>
-                    <a:p>
-                      <a:pPr latinLnBrk="1"/>
-                      <a:endParaRPr lang="ko-KR" altLang="en-US" sz="1100"/>
-                    </a:p>
-                  </a:txBody>
-                  <a:tcPr/>
-                </a:tc>
-                <a:extLst>
-                  <a:ext uri="{0D108BD9-81ED-4DB2-BD59-A6C34878D82A}">
-                    <a16:rowId xmlns:a16="http://schemas.microsoft.com/office/drawing/2014/main" val="1426315911"/>
-                  </a:ext>
-                </a:extLst>
-              </a:tr>
-              <a:tr h="138814">
-                <a:tc>
-                  <a:txBody>
-                    <a:bodyPr/>
-                    <a:lstStyle/>
-                    <a:p>
-                      <a:pPr latinLnBrk="1"/>
-                      <a:endParaRPr lang="ko-KR" altLang="en-US" sz="1100"/>
-                    </a:p>
-                  </a:txBody>
-                  <a:tcPr/>
-                </a:tc>
-                <a:tc>
-                  <a:txBody>
-                    <a:bodyPr/>
-                    <a:lstStyle/>
-                    <a:p>
-                      <a:pPr latinLnBrk="1"/>
-                      <a:endParaRPr lang="ko-KR" altLang="en-US" sz="1100"/>
-                    </a:p>
-                  </a:txBody>
-                  <a:tcPr/>
-                </a:tc>
-                <a:tc>
-                  <a:txBody>
-                    <a:bodyPr/>
-                    <a:lstStyle/>
-                    <a:p>
-                      <a:pPr latinLnBrk="1"/>
-                      <a:endParaRPr lang="ko-KR" altLang="en-US" sz="1100"/>
-                    </a:p>
-                  </a:txBody>
-                  <a:tcPr/>
-                </a:tc>
-                <a:tc>
-                  <a:txBody>
-                    <a:bodyPr/>
-                    <a:lstStyle/>
-                    <a:p>
-                      <a:pPr latinLnBrk="1"/>
-                      <a:endParaRPr lang="ko-KR" altLang="en-US" sz="1100"/>
-                    </a:p>
-                  </a:txBody>
-                  <a:tcPr/>
-                </a:tc>
-                <a:tc>
-                  <a:txBody>
-                    <a:bodyPr/>
-                    <a:lstStyle/>
-                    <a:p>
-                      <a:pPr latinLnBrk="1"/>
-                      <a:endParaRPr lang="ko-KR" altLang="en-US" sz="1100"/>
-                    </a:p>
-                  </a:txBody>
-                  <a:tcPr/>
-                </a:tc>
-                <a:tc>
-                  <a:txBody>
-                    <a:bodyPr/>
-                    <a:lstStyle/>
-                    <a:p>
-                      <a:pPr latinLnBrk="1"/>
-                      <a:endParaRPr lang="ko-KR" altLang="en-US" sz="1100"/>
-                    </a:p>
-                  </a:txBody>
-                  <a:tcPr/>
-                </a:tc>
-                <a:tc>
-                  <a:txBody>
-                    <a:bodyPr/>
-                    <a:lstStyle/>
-                    <a:p>
-                      <a:pPr latinLnBrk="1"/>
-                      <a:endParaRPr lang="ko-KR" altLang="en-US" sz="1100"/>
-                    </a:p>
-                  </a:txBody>
-                  <a:tcPr/>
-                </a:tc>
-                <a:extLst>
-                  <a:ext uri="{0D108BD9-81ED-4DB2-BD59-A6C34878D82A}">
-                    <a16:rowId xmlns:a16="http://schemas.microsoft.com/office/drawing/2014/main" val="2818206697"/>
-                  </a:ext>
-                </a:extLst>
-              </a:tr>
-              <a:tr h="138814">
-                <a:tc>
-                  <a:txBody>
-                    <a:bodyPr/>
-                    <a:lstStyle/>
-                    <a:p>
-                      <a:pPr latinLnBrk="1"/>
-                      <a:endParaRPr lang="ko-KR" altLang="en-US" sz="1100"/>
-                    </a:p>
-                  </a:txBody>
-                  <a:tcPr/>
-                </a:tc>
-                <a:tc>
-                  <a:txBody>
-                    <a:bodyPr/>
-                    <a:lstStyle/>
-                    <a:p>
-                      <a:pPr latinLnBrk="1"/>
-                      <a:endParaRPr lang="ko-KR" altLang="en-US" sz="1100"/>
-                    </a:p>
-                  </a:txBody>
-                  <a:tcPr/>
-                </a:tc>
-                <a:tc>
-                  <a:txBody>
-                    <a:bodyPr/>
-                    <a:lstStyle/>
-                    <a:p>
-                      <a:pPr latinLnBrk="1"/>
-                      <a:endParaRPr lang="ko-KR" altLang="en-US" sz="1100"/>
-                    </a:p>
-                  </a:txBody>
-                  <a:tcPr/>
-                </a:tc>
-                <a:tc>
-                  <a:txBody>
-                    <a:bodyPr/>
-                    <a:lstStyle/>
-                    <a:p>
-                      <a:pPr latinLnBrk="1"/>
-                      <a:endParaRPr lang="ko-KR" altLang="en-US" sz="1100"/>
-                    </a:p>
-                  </a:txBody>
-                  <a:tcPr/>
-                </a:tc>
-                <a:tc>
-                  <a:txBody>
-                    <a:bodyPr/>
-                    <a:lstStyle/>
-                    <a:p>
-                      <a:pPr latinLnBrk="1"/>
-                      <a:endParaRPr lang="ko-KR" altLang="en-US" sz="1100"/>
-                    </a:p>
-                  </a:txBody>
-                  <a:tcPr/>
-                </a:tc>
-                <a:tc>
-                  <a:txBody>
-                    <a:bodyPr/>
-                    <a:lstStyle/>
-                    <a:p>
-                      <a:pPr latinLnBrk="1"/>
-                      <a:endParaRPr lang="ko-KR" altLang="en-US" sz="1100"/>
-                    </a:p>
-                  </a:txBody>
-                  <a:tcPr/>
-                </a:tc>
-                <a:tc>
-                  <a:txBody>
-                    <a:bodyPr/>
-                    <a:lstStyle/>
-                    <a:p>
-                      <a:pPr latinLnBrk="1"/>
-                      <a:endParaRPr lang="ko-KR" altLang="en-US" sz="1100"/>
-                    </a:p>
-                  </a:txBody>
-                  <a:tcPr/>
-                </a:tc>
-                <a:extLst>
-                  <a:ext uri="{0D108BD9-81ED-4DB2-BD59-A6C34878D82A}">
-                    <a16:rowId xmlns:a16="http://schemas.microsoft.com/office/drawing/2014/main" val="3014727132"/>
-                  </a:ext>
-                </a:extLst>
-              </a:tr>
-              <a:tr h="138814">
-                <a:tc>
-                  <a:txBody>
-                    <a:bodyPr/>
-                    <a:lstStyle/>
-                    <a:p>
-                      <a:pPr latinLnBrk="1"/>
-                      <a:r>
-                        <a:rPr lang="ko-KR" altLang="en-US" sz="1100"/>
-                        <a:t>내부변수</a:t>
-                      </a:r>
-                    </a:p>
-                  </a:txBody>
-                  <a:tcPr/>
-                </a:tc>
-                <a:tc>
-                  <a:txBody>
-                    <a:bodyPr/>
-                    <a:lstStyle/>
-                    <a:p>
-                      <a:pPr latinLnBrk="1"/>
-                      <a:endParaRPr lang="ko-KR" altLang="en-US" sz="1100"/>
-                    </a:p>
-                  </a:txBody>
-                  <a:tcPr/>
-                </a:tc>
-                <a:tc>
-                  <a:txBody>
-                    <a:bodyPr/>
-                    <a:lstStyle/>
-                    <a:p>
-                      <a:pPr latinLnBrk="1"/>
-                      <a:endParaRPr lang="ko-KR" altLang="en-US" sz="1100"/>
-                    </a:p>
-                  </a:txBody>
-                  <a:tcPr/>
-                </a:tc>
-                <a:tc>
-                  <a:txBody>
-                    <a:bodyPr/>
-                    <a:lstStyle/>
-                    <a:p>
-                      <a:pPr latinLnBrk="1"/>
-                      <a:endParaRPr lang="ko-KR" altLang="en-US" sz="1100"/>
-                    </a:p>
-                  </a:txBody>
-                  <a:tcPr/>
-                </a:tc>
-                <a:tc>
-                  <a:txBody>
-                    <a:bodyPr/>
-                    <a:lstStyle/>
-                    <a:p>
-                      <a:pPr latinLnBrk="1"/>
-                      <a:endParaRPr lang="ko-KR" altLang="en-US" sz="1100"/>
-                    </a:p>
-                  </a:txBody>
-                  <a:tcPr/>
-                </a:tc>
-                <a:tc>
-                  <a:txBody>
-                    <a:bodyPr/>
-                    <a:lstStyle/>
-                    <a:p>
-                      <a:pPr latinLnBrk="1"/>
-                      <a:endParaRPr lang="ko-KR" altLang="en-US" sz="1100"/>
-                    </a:p>
-                  </a:txBody>
-                  <a:tcPr/>
-                </a:tc>
-                <a:tc>
-                  <a:txBody>
-                    <a:bodyPr/>
-                    <a:lstStyle/>
-                    <a:p>
-                      <a:pPr latinLnBrk="1"/>
-                      <a:endParaRPr lang="ko-KR" altLang="en-US" sz="1100"/>
-                    </a:p>
-                  </a:txBody>
-                  <a:tcPr/>
-                </a:tc>
-                <a:extLst>
-                  <a:ext uri="{0D108BD9-81ED-4DB2-BD59-A6C34878D82A}">
-                    <a16:rowId xmlns:a16="http://schemas.microsoft.com/office/drawing/2014/main" val="266361049"/>
-                  </a:ext>
-                </a:extLst>
-              </a:tr>
-              <a:tr h="138814">
-                <a:tc>
-                  <a:txBody>
-                    <a:bodyPr/>
-                    <a:lstStyle/>
-                    <a:p>
-                      <a:pPr latinLnBrk="1"/>
-                      <a:endParaRPr lang="ko-KR" altLang="en-US" sz="1100"/>
-                    </a:p>
-                  </a:txBody>
-                  <a:tcPr/>
-                </a:tc>
-                <a:tc>
-                  <a:txBody>
-                    <a:bodyPr/>
-                    <a:lstStyle/>
-                    <a:p>
-                      <a:pPr latinLnBrk="1"/>
-                      <a:endParaRPr lang="ko-KR" altLang="en-US" sz="1100"/>
-                    </a:p>
-                  </a:txBody>
-                  <a:tcPr/>
-                </a:tc>
-                <a:tc>
-                  <a:txBody>
-                    <a:bodyPr/>
-                    <a:lstStyle/>
-                    <a:p>
-                      <a:pPr latinLnBrk="1"/>
-                      <a:endParaRPr lang="ko-KR" altLang="en-US" sz="1100"/>
-                    </a:p>
-                  </a:txBody>
-                  <a:tcPr/>
-                </a:tc>
-                <a:tc>
-                  <a:txBody>
-                    <a:bodyPr/>
-                    <a:lstStyle/>
-                    <a:p>
-                      <a:pPr latinLnBrk="1"/>
-                      <a:endParaRPr lang="ko-KR" altLang="en-US" sz="1100"/>
-                    </a:p>
-                  </a:txBody>
-                  <a:tcPr/>
-                </a:tc>
-                <a:tc>
-                  <a:txBody>
-                    <a:bodyPr/>
-                    <a:lstStyle/>
-                    <a:p>
-                      <a:pPr latinLnBrk="1"/>
-                      <a:endParaRPr lang="ko-KR" altLang="en-US" sz="1100"/>
-                    </a:p>
-                  </a:txBody>
-                  <a:tcPr/>
-                </a:tc>
-                <a:tc>
-                  <a:txBody>
-                    <a:bodyPr/>
-                    <a:lstStyle/>
-                    <a:p>
-                      <a:pPr latinLnBrk="1"/>
-                      <a:endParaRPr lang="ko-KR" altLang="en-US" sz="1100"/>
-                    </a:p>
-                  </a:txBody>
-                  <a:tcPr/>
-                </a:tc>
-                <a:tc>
-                  <a:txBody>
-                    <a:bodyPr/>
-                    <a:lstStyle/>
-                    <a:p>
-                      <a:pPr latinLnBrk="1"/>
-                      <a:endParaRPr lang="ko-KR" altLang="en-US" sz="1100" dirty="0"/>
-                    </a:p>
-                  </a:txBody>
-                  <a:tcPr/>
-                </a:tc>
-                <a:extLst>
-                  <a:ext uri="{0D108BD9-81ED-4DB2-BD59-A6C34878D82A}">
-                    <a16:rowId xmlns:a16="http://schemas.microsoft.com/office/drawing/2014/main" val="4142880173"/>
-                  </a:ext>
-                </a:extLst>
-              </a:tr>
-            </a:tbl>
-          </a:graphicData>
-        </a:graphic>
-      </p:graphicFrame>
-    </p:spTree>
-    <p:extLst>
-      <p:ext uri="{BB962C8B-B14F-4D97-AF65-F5344CB8AC3E}">
-        <p14:creationId xmlns:p14="http://schemas.microsoft.com/office/powerpoint/2010/main" val="400577736"/>
-      </p:ext>
-    </p:extLst>
-  </p:cSld>
-  <p:clrMapOvr>
-    <a:masterClrMapping/>
-  </p:clrMapOvr>
-</p:sld>
-</file>
-
 <file path=ppt/theme/theme1.xml><?xml version="1.0" encoding="utf-8"?>
 <a:theme xmlns:a="http://schemas.openxmlformats.org/drawingml/2006/main" name="Office 테마">
   <a:themeElements>

</xml_diff>

<commit_message>
api xywh 삭제 dev만 사용
</commit_message>
<xml_diff>
--- a/DsDotNet/src/UnitTest/UnitTest.Model/ImportOfficeExample/exportDS/testA/testMy/my.pptx
+++ b/DsDotNet/src/UnitTest/UnitTest.Model/ImportOfficeExample/exportDS/testA/testMy/my.pptx
@@ -5,7 +5,7 @@
     <p:sldMasterId id="2147483648" r:id="rId1"/>
   </p:sldMasterIdLst>
   <p:notesMasterIdLst>
-    <p:notesMasterId r:id="rId13"/>
+    <p:notesMasterId r:id="rId14"/>
   </p:notesMasterIdLst>
   <p:sldIdLst>
     <p:sldId id="258" r:id="rId2"/>
@@ -19,6 +19,7 @@
     <p:sldId id="737" r:id="rId10"/>
     <p:sldId id="734" r:id="rId11"/>
     <p:sldId id="735" r:id="rId12"/>
+    <p:sldId id="738" r:id="rId13"/>
   </p:sldIdLst>
   <p:sldSz cx="12192000" cy="6858000"/>
   <p:notesSz cx="6858000" cy="9144000"/>
@@ -207,7 +208,7 @@
           <a:p>
             <a:fld id="{42AE086C-D417-4A5A-8992-3959005D13E6}" type="datetimeFigureOut">
               <a:rPr lang="ko-KR" altLang="en-US" smtClean="0"/>
-              <a:t>2024-01-06</a:t>
+              <a:t>2024-01-07</a:t>
             </a:fld>
             <a:endParaRPr lang="ko-KR" altLang="en-US"/>
           </a:p>
@@ -789,7 +790,7 @@
           <a:p>
             <a:fld id="{E31A602F-9409-4B9A-9D14-798E704D8577}" type="datetimeFigureOut">
               <a:rPr lang="ko-KR" altLang="en-US" smtClean="0"/>
-              <a:t>2024-01-06</a:t>
+              <a:t>2024-01-07</a:t>
             </a:fld>
             <a:endParaRPr lang="ko-KR" altLang="en-US"/>
           </a:p>
@@ -987,7 +988,7 @@
           <a:p>
             <a:fld id="{E31A602F-9409-4B9A-9D14-798E704D8577}" type="datetimeFigureOut">
               <a:rPr lang="ko-KR" altLang="en-US" smtClean="0"/>
-              <a:t>2024-01-06</a:t>
+              <a:t>2024-01-07</a:t>
             </a:fld>
             <a:endParaRPr lang="ko-KR" altLang="en-US"/>
           </a:p>
@@ -1195,7 +1196,7 @@
           <a:p>
             <a:fld id="{E31A602F-9409-4B9A-9D14-798E704D8577}" type="datetimeFigureOut">
               <a:rPr lang="ko-KR" altLang="en-US" smtClean="0"/>
-              <a:t>2024-01-06</a:t>
+              <a:t>2024-01-07</a:t>
             </a:fld>
             <a:endParaRPr lang="ko-KR" altLang="en-US"/>
           </a:p>
@@ -1393,7 +1394,7 @@
           <a:p>
             <a:fld id="{E31A602F-9409-4B9A-9D14-798E704D8577}" type="datetimeFigureOut">
               <a:rPr lang="ko-KR" altLang="en-US" smtClean="0"/>
-              <a:t>2024-01-06</a:t>
+              <a:t>2024-01-07</a:t>
             </a:fld>
             <a:endParaRPr lang="ko-KR" altLang="en-US"/>
           </a:p>
@@ -1668,7 +1669,7 @@
           <a:p>
             <a:fld id="{E31A602F-9409-4B9A-9D14-798E704D8577}" type="datetimeFigureOut">
               <a:rPr lang="ko-KR" altLang="en-US" smtClean="0"/>
-              <a:t>2024-01-06</a:t>
+              <a:t>2024-01-07</a:t>
             </a:fld>
             <a:endParaRPr lang="ko-KR" altLang="en-US"/>
           </a:p>
@@ -1933,7 +1934,7 @@
           <a:p>
             <a:fld id="{E31A602F-9409-4B9A-9D14-798E704D8577}" type="datetimeFigureOut">
               <a:rPr lang="ko-KR" altLang="en-US" smtClean="0"/>
-              <a:t>2024-01-06</a:t>
+              <a:t>2024-01-07</a:t>
             </a:fld>
             <a:endParaRPr lang="ko-KR" altLang="en-US"/>
           </a:p>
@@ -2345,7 +2346,7 @@
           <a:p>
             <a:fld id="{E31A602F-9409-4B9A-9D14-798E704D8577}" type="datetimeFigureOut">
               <a:rPr lang="ko-KR" altLang="en-US" smtClean="0"/>
-              <a:t>2024-01-06</a:t>
+              <a:t>2024-01-07</a:t>
             </a:fld>
             <a:endParaRPr lang="ko-KR" altLang="en-US"/>
           </a:p>
@@ -2486,7 +2487,7 @@
           <a:p>
             <a:fld id="{E31A602F-9409-4B9A-9D14-798E704D8577}" type="datetimeFigureOut">
               <a:rPr lang="ko-KR" altLang="en-US" smtClean="0"/>
-              <a:t>2024-01-06</a:t>
+              <a:t>2024-01-07</a:t>
             </a:fld>
             <a:endParaRPr lang="ko-KR" altLang="en-US"/>
           </a:p>
@@ -2599,7 +2600,7 @@
           <a:p>
             <a:fld id="{E31A602F-9409-4B9A-9D14-798E704D8577}" type="datetimeFigureOut">
               <a:rPr lang="ko-KR" altLang="en-US" smtClean="0"/>
-              <a:t>2024-01-06</a:t>
+              <a:t>2024-01-07</a:t>
             </a:fld>
             <a:endParaRPr lang="ko-KR" altLang="en-US"/>
           </a:p>
@@ -2910,7 +2911,7 @@
           <a:p>
             <a:fld id="{E31A602F-9409-4B9A-9D14-798E704D8577}" type="datetimeFigureOut">
               <a:rPr lang="ko-KR" altLang="en-US" smtClean="0"/>
-              <a:t>2024-01-06</a:t>
+              <a:t>2024-01-07</a:t>
             </a:fld>
             <a:endParaRPr lang="ko-KR" altLang="en-US"/>
           </a:p>
@@ -3198,7 +3199,7 @@
           <a:p>
             <a:fld id="{E31A602F-9409-4B9A-9D14-798E704D8577}" type="datetimeFigureOut">
               <a:rPr lang="ko-KR" altLang="en-US" smtClean="0"/>
-              <a:t>2024-01-06</a:t>
+              <a:t>2024-01-07</a:t>
             </a:fld>
             <a:endParaRPr lang="ko-KR" altLang="en-US"/>
           </a:p>
@@ -3439,7 +3440,7 @@
           <a:p>
             <a:fld id="{E31A602F-9409-4B9A-9D14-798E704D8577}" type="datetimeFigureOut">
               <a:rPr lang="ko-KR" altLang="en-US" smtClean="0"/>
-              <a:t>2024-01-06</a:t>
+              <a:t>2024-01-07</a:t>
             </a:fld>
             <a:endParaRPr lang="ko-KR" altLang="en-US"/>
           </a:p>
@@ -4053,10 +4054,10 @@
       </p:sp>
       <p:grpSp>
         <p:nvGrpSpPr>
-          <p:cNvPr id="18" name="그룹 17">
+          <p:cNvPr id="5" name="그룹 4">
             <a:extLst>
               <a:ext uri="{FF2B5EF4-FFF2-40B4-BE49-F238E27FC236}">
-                <a16:creationId xmlns:a16="http://schemas.microsoft.com/office/drawing/2014/main" id="{2ABB5941-19ED-A19A-CBDA-64CD5E6E8F07}"/>
+                <a16:creationId xmlns:a16="http://schemas.microsoft.com/office/drawing/2014/main" id="{CCBE3000-BBB8-6FCA-2B0C-ADA7FB68F266}"/>
               </a:ext>
             </a:extLst>
           </p:cNvPr>
@@ -5453,10 +5454,10 @@
       </p:sp>
       <p:grpSp>
         <p:nvGrpSpPr>
-          <p:cNvPr id="17" name="그룹 16">
+          <p:cNvPr id="4" name="그룹 3">
             <a:extLst>
               <a:ext uri="{FF2B5EF4-FFF2-40B4-BE49-F238E27FC236}">
-                <a16:creationId xmlns:a16="http://schemas.microsoft.com/office/drawing/2014/main" id="{EB25DA85-FA78-38FC-AA94-8EF230DDE516}"/>
+                <a16:creationId xmlns:a16="http://schemas.microsoft.com/office/drawing/2014/main" id="{A44F3AFC-8CBC-6858-5209-5AF033728971}"/>
               </a:ext>
             </a:extLst>
           </p:cNvPr>
@@ -7780,10 +7781,10 @@
       </p:sp>
       <p:grpSp>
         <p:nvGrpSpPr>
-          <p:cNvPr id="16" name="그룹 15">
+          <p:cNvPr id="3" name="그룹 2">
             <a:extLst>
               <a:ext uri="{FF2B5EF4-FFF2-40B4-BE49-F238E27FC236}">
-                <a16:creationId xmlns:a16="http://schemas.microsoft.com/office/drawing/2014/main" id="{5096CF01-3616-9E94-5037-A1B6A57EE851}"/>
+                <a16:creationId xmlns:a16="http://schemas.microsoft.com/office/drawing/2014/main" id="{559B561B-B73D-802B-266B-A12CD128F383}"/>
               </a:ext>
             </a:extLst>
           </p:cNvPr>
@@ -8954,10 +8955,10 @@
       </p:sp>
       <p:grpSp>
         <p:nvGrpSpPr>
-          <p:cNvPr id="21" name="그룹 20">
+          <p:cNvPr id="17" name="그룹 16">
             <a:extLst>
               <a:ext uri="{FF2B5EF4-FFF2-40B4-BE49-F238E27FC236}">
-                <a16:creationId xmlns:a16="http://schemas.microsoft.com/office/drawing/2014/main" id="{FDD65E47-C46C-9328-EE23-3CA70257E56A}"/>
+                <a16:creationId xmlns:a16="http://schemas.microsoft.com/office/drawing/2014/main" id="{79ECCD60-34E0-CE7A-D2AE-31E4B1AFD640}"/>
               </a:ext>
             </a:extLst>
           </p:cNvPr>
@@ -9731,6 +9732,3178 @@
     <p:extLst>
       <p:ext uri="{BB962C8B-B14F-4D97-AF65-F5344CB8AC3E}">
         <p14:creationId xmlns:p14="http://schemas.microsoft.com/office/powerpoint/2010/main" val="3348884962"/>
+      </p:ext>
+    </p:extLst>
+  </p:cSld>
+  <p:clrMapOvr>
+    <a:masterClrMapping/>
+  </p:clrMapOvr>
+</p:sld>
+</file>
+
+<file path=ppt/slides/slide12.xml><?xml version="1.0" encoding="utf-8"?>
+<p:sld xmlns:a="http://schemas.openxmlformats.org/drawingml/2006/main" xmlns:r="http://schemas.openxmlformats.org/officeDocument/2006/relationships" xmlns:p="http://schemas.openxmlformats.org/presentationml/2006/main">
+  <p:cSld>
+    <p:bg>
+      <p:bgPr>
+        <a:solidFill>
+          <a:srgbClr val="2F4F4F"/>
+        </a:solidFill>
+        <a:effectLst/>
+      </p:bgPr>
+    </p:bg>
+    <p:spTree>
+      <p:nvGrpSpPr>
+        <p:cNvPr id="1" name=""/>
+        <p:cNvGrpSpPr/>
+        <p:nvPr/>
+      </p:nvGrpSpPr>
+      <p:grpSpPr>
+        <a:xfrm>
+          <a:off x="0" y="0"/>
+          <a:ext cx="0" cy="0"/>
+          <a:chOff x="0" y="0"/>
+          <a:chExt cx="0" cy="0"/>
+        </a:xfrm>
+      </p:grpSpPr>
+      <p:sp>
+        <p:nvSpPr>
+          <p:cNvPr id="2" name="TextBox 1">
+            <a:extLst>
+              <a:ext uri="{FF2B5EF4-FFF2-40B4-BE49-F238E27FC236}">
+                <a16:creationId xmlns:a16="http://schemas.microsoft.com/office/drawing/2014/main" id="{83B7434B-4C6F-7821-D5D2-CE3DBB8661DE}"/>
+              </a:ext>
+            </a:extLst>
+          </p:cNvPr>
+          <p:cNvSpPr txBox="1"/>
+          <p:nvPr/>
+        </p:nvSpPr>
+        <p:spPr>
+          <a:xfrm>
+            <a:off x="254000" y="254000"/>
+            <a:ext cx="3810000" cy="646331"/>
+          </a:xfrm>
+          <a:prstGeom prst="rect">
+            <a:avLst/>
+          </a:prstGeom>
+          <a:noFill/>
+        </p:spPr>
+        <p:txBody>
+          <a:bodyPr vert="horz" rtlCol="0">
+            <a:spAutoFit/>
+          </a:bodyPr>
+          <a:lstStyle/>
+          <a:p>
+            <a:r>
+              <a:rPr lang="en-US" altLang="ko-KR"/>
+              <a:t>Time Chart Flow KIT1 </a:t>
+            </a:r>
+            <a:br>
+              <a:rPr lang="en-US" altLang="ko-KR"/>
+            </a:br>
+            <a:r>
+              <a:rPr lang="en-US" altLang="ko-KR"/>
+              <a:t>(Work : 1Work)</a:t>
+            </a:r>
+            <a:endParaRPr lang="ko-KR" altLang="en-US"/>
+          </a:p>
+        </p:txBody>
+      </p:sp>
+      <p:sp>
+        <p:nvSpPr>
+          <p:cNvPr id="3" name="TextBox 2">
+            <a:extLst>
+              <a:ext uri="{FF2B5EF4-FFF2-40B4-BE49-F238E27FC236}">
+                <a16:creationId xmlns:a16="http://schemas.microsoft.com/office/drawing/2014/main" id="{6E130DBA-9BE7-6A93-720C-C1E85F835F17}"/>
+              </a:ext>
+            </a:extLst>
+          </p:cNvPr>
+          <p:cNvSpPr txBox="1"/>
+          <p:nvPr/>
+        </p:nvSpPr>
+        <p:spPr>
+          <a:xfrm>
+            <a:off x="9652000" y="254000"/>
+            <a:ext cx="2540000" cy="381000"/>
+          </a:xfrm>
+          <a:prstGeom prst="rect">
+            <a:avLst/>
+          </a:prstGeom>
+          <a:noFill/>
+        </p:spPr>
+        <p:txBody>
+          <a:bodyPr vert="horz" rtlCol="0">
+            <a:spAutoFit/>
+          </a:bodyPr>
+          <a:lstStyle/>
+          <a:p>
+            <a:r>
+              <a:rPr lang="en-US" altLang="ko-KR"/>
+              <a:t>Device </a:t>
+            </a:r>
+            <a:r>
+              <a:rPr lang="ko-KR" altLang="en-US"/>
+              <a:t>일반 표시</a:t>
+            </a:r>
+          </a:p>
+        </p:txBody>
+      </p:sp>
+      <p:sp>
+        <p:nvSpPr>
+          <p:cNvPr id="4" name="TextBox 3">
+            <a:extLst>
+              <a:ext uri="{FF2B5EF4-FFF2-40B4-BE49-F238E27FC236}">
+                <a16:creationId xmlns:a16="http://schemas.microsoft.com/office/drawing/2014/main" id="{D6624C21-F7E6-EDF8-4126-5A074ADCD93E}"/>
+              </a:ext>
+            </a:extLst>
+          </p:cNvPr>
+          <p:cNvSpPr txBox="1"/>
+          <p:nvPr/>
+        </p:nvSpPr>
+        <p:spPr>
+          <a:xfrm>
+            <a:off x="9652000" y="635000"/>
+            <a:ext cx="2540000" cy="381000"/>
+          </a:xfrm>
+          <a:prstGeom prst="rect">
+            <a:avLst/>
+          </a:prstGeom>
+          <a:noFill/>
+        </p:spPr>
+        <p:txBody>
+          <a:bodyPr vert="horz" rtlCol="0">
+            <a:spAutoFit/>
+          </a:bodyPr>
+          <a:lstStyle/>
+          <a:p>
+            <a:r>
+              <a:rPr lang="en-US" altLang="ko-KR">
+                <a:solidFill>
+                  <a:srgbClr val="00FFFF"/>
+                </a:solidFill>
+              </a:rPr>
+              <a:t>Device </a:t>
+            </a:r>
+            <a:r>
+              <a:rPr lang="ko-KR" altLang="en-US">
+                <a:solidFill>
+                  <a:srgbClr val="00FFFF"/>
+                </a:solidFill>
+              </a:rPr>
+              <a:t>원위치 표시</a:t>
+            </a:r>
+          </a:p>
+        </p:txBody>
+      </p:sp>
+      <p:grpSp>
+        <p:nvGrpSpPr>
+          <p:cNvPr id="67" name="그룹 66">
+            <a:extLst>
+              <a:ext uri="{FF2B5EF4-FFF2-40B4-BE49-F238E27FC236}">
+                <a16:creationId xmlns:a16="http://schemas.microsoft.com/office/drawing/2014/main" id="{33185E7F-BE27-D674-97F2-EC76C74ECBBA}"/>
+              </a:ext>
+            </a:extLst>
+          </p:cNvPr>
+          <p:cNvGrpSpPr/>
+          <p:nvPr/>
+        </p:nvGrpSpPr>
+        <p:grpSpPr>
+          <a:xfrm>
+            <a:off x="952500" y="1079500"/>
+            <a:ext cx="10287001" cy="5334000"/>
+            <a:chOff x="952500" y="1079500"/>
+            <a:chExt cx="10287001" cy="5334000"/>
+          </a:xfrm>
+        </p:grpSpPr>
+        <p:sp>
+          <p:nvSpPr>
+            <p:cNvPr id="5" name="TextBox 4">
+              <a:extLst>
+                <a:ext uri="{FF2B5EF4-FFF2-40B4-BE49-F238E27FC236}">
+                  <a16:creationId xmlns:a16="http://schemas.microsoft.com/office/drawing/2014/main" id="{4A942959-A9F6-0E5C-9ED9-B541ECB3B9DC}"/>
+                </a:ext>
+              </a:extLst>
+            </p:cNvPr>
+            <p:cNvSpPr txBox="1"/>
+            <p:nvPr/>
+          </p:nvSpPr>
+          <p:spPr>
+            <a:xfrm>
+              <a:off x="952500" y="1079500"/>
+              <a:ext cx="1773621" cy="269304"/>
+            </a:xfrm>
+            <a:prstGeom prst="rect">
+              <a:avLst/>
+            </a:prstGeom>
+            <a:noFill/>
+          </p:spPr>
+          <p:txBody>
+            <a:bodyPr vert="horz" rtlCol="0">
+              <a:spAutoFit/>
+            </a:bodyPr>
+            <a:lstStyle/>
+            <a:p>
+              <a:pPr algn="r"/>
+              <a:r>
+                <a:rPr lang="en-US" altLang="ko-KR" sz="900"/>
+                <a:t>Cv_Frt.MOVE</a:t>
+              </a:r>
+              <a:endParaRPr lang="ko-KR" altLang="en-US" sz="900"/>
+            </a:p>
+          </p:txBody>
+        </p:sp>
+        <p:sp>
+          <p:nvSpPr>
+            <p:cNvPr id="6" name="TextBox 5">
+              <a:extLst>
+                <a:ext uri="{FF2B5EF4-FFF2-40B4-BE49-F238E27FC236}">
+                  <a16:creationId xmlns:a16="http://schemas.microsoft.com/office/drawing/2014/main" id="{3304A975-D425-E12D-C213-C6838A5CD443}"/>
+                </a:ext>
+              </a:extLst>
+            </p:cNvPr>
+            <p:cNvSpPr txBox="1"/>
+            <p:nvPr/>
+          </p:nvSpPr>
+          <p:spPr>
+            <a:xfrm>
+              <a:off x="952500" y="1375833"/>
+              <a:ext cx="1773621" cy="269304"/>
+            </a:xfrm>
+            <a:prstGeom prst="rect">
+              <a:avLst/>
+            </a:prstGeom>
+            <a:noFill/>
+          </p:spPr>
+          <p:txBody>
+            <a:bodyPr vert="horz" rtlCol="0">
+              <a:spAutoFit/>
+            </a:bodyPr>
+            <a:lstStyle/>
+            <a:p>
+              <a:pPr algn="r"/>
+              <a:r>
+                <a:rPr lang="en-US" altLang="ko-KR" sz="900"/>
+                <a:t>Cv_Frt.REMOVE</a:t>
+              </a:r>
+              <a:endParaRPr lang="ko-KR" altLang="en-US" sz="900"/>
+            </a:p>
+          </p:txBody>
+        </p:sp>
+        <p:sp>
+          <p:nvSpPr>
+            <p:cNvPr id="7" name="TextBox 6">
+              <a:extLst>
+                <a:ext uri="{FF2B5EF4-FFF2-40B4-BE49-F238E27FC236}">
+                  <a16:creationId xmlns:a16="http://schemas.microsoft.com/office/drawing/2014/main" id="{760B9950-05B7-C975-98B8-A23DACC47A2E}"/>
+                </a:ext>
+              </a:extLst>
+            </p:cNvPr>
+            <p:cNvSpPr txBox="1"/>
+            <p:nvPr/>
+          </p:nvSpPr>
+          <p:spPr>
+            <a:xfrm>
+              <a:off x="952500" y="1672167"/>
+              <a:ext cx="1773621" cy="269304"/>
+            </a:xfrm>
+            <a:prstGeom prst="rect">
+              <a:avLst/>
+            </a:prstGeom>
+            <a:noFill/>
+          </p:spPr>
+          <p:txBody>
+            <a:bodyPr vert="horz" rtlCol="0">
+              <a:spAutoFit/>
+            </a:bodyPr>
+            <a:lstStyle/>
+            <a:p>
+              <a:pPr algn="r"/>
+              <a:r>
+                <a:rPr lang="en-US" altLang="ko-KR" sz="900"/>
+                <a:t>1st_usb.ADV</a:t>
+              </a:r>
+              <a:endParaRPr lang="ko-KR" altLang="en-US" sz="900"/>
+            </a:p>
+          </p:txBody>
+        </p:sp>
+        <p:sp>
+          <p:nvSpPr>
+            <p:cNvPr id="8" name="TextBox 7">
+              <a:extLst>
+                <a:ext uri="{FF2B5EF4-FFF2-40B4-BE49-F238E27FC236}">
+                  <a16:creationId xmlns:a16="http://schemas.microsoft.com/office/drawing/2014/main" id="{55A97619-EE3C-C372-DB34-CFAD1601497E}"/>
+                </a:ext>
+              </a:extLst>
+            </p:cNvPr>
+            <p:cNvSpPr txBox="1"/>
+            <p:nvPr/>
+          </p:nvSpPr>
+          <p:spPr>
+            <a:xfrm>
+              <a:off x="952500" y="1968500"/>
+              <a:ext cx="1773621" cy="269304"/>
+            </a:xfrm>
+            <a:prstGeom prst="rect">
+              <a:avLst/>
+            </a:prstGeom>
+            <a:noFill/>
+          </p:spPr>
+          <p:txBody>
+            <a:bodyPr vert="horz" rtlCol="0">
+              <a:spAutoFit/>
+            </a:bodyPr>
+            <a:lstStyle/>
+            <a:p>
+              <a:pPr algn="r"/>
+              <a:r>
+                <a:rPr lang="en-US" altLang="ko-KR" sz="900">
+                  <a:solidFill>
+                    <a:srgbClr val="00FFFF"/>
+                  </a:solidFill>
+                </a:rPr>
+                <a:t>1st_usb.RET</a:t>
+              </a:r>
+              <a:endParaRPr lang="ko-KR" altLang="en-US" sz="900">
+                <a:solidFill>
+                  <a:srgbClr val="00FFFF"/>
+                </a:solidFill>
+              </a:endParaRPr>
+            </a:p>
+          </p:txBody>
+        </p:sp>
+        <p:sp>
+          <p:nvSpPr>
+            <p:cNvPr id="9" name="TextBox 8">
+              <a:extLst>
+                <a:ext uri="{FF2B5EF4-FFF2-40B4-BE49-F238E27FC236}">
+                  <a16:creationId xmlns:a16="http://schemas.microsoft.com/office/drawing/2014/main" id="{7647CBC2-1D78-C684-2815-506EBDACED6F}"/>
+                </a:ext>
+              </a:extLst>
+            </p:cNvPr>
+            <p:cNvSpPr txBox="1"/>
+            <p:nvPr/>
+          </p:nvSpPr>
+          <p:spPr>
+            <a:xfrm>
+              <a:off x="952500" y="2264833"/>
+              <a:ext cx="1773621" cy="269304"/>
+            </a:xfrm>
+            <a:prstGeom prst="rect">
+              <a:avLst/>
+            </a:prstGeom>
+            <a:noFill/>
+          </p:spPr>
+          <p:txBody>
+            <a:bodyPr vert="horz" rtlCol="0">
+              <a:spAutoFit/>
+            </a:bodyPr>
+            <a:lstStyle/>
+            <a:p>
+              <a:pPr algn="r"/>
+              <a:r>
+                <a:rPr lang="en-US" altLang="ko-KR" sz="900"/>
+                <a:t>2nd_usb.ADV</a:t>
+              </a:r>
+              <a:endParaRPr lang="ko-KR" altLang="en-US" sz="900"/>
+            </a:p>
+          </p:txBody>
+        </p:sp>
+        <p:sp>
+          <p:nvSpPr>
+            <p:cNvPr id="10" name="TextBox 9">
+              <a:extLst>
+                <a:ext uri="{FF2B5EF4-FFF2-40B4-BE49-F238E27FC236}">
+                  <a16:creationId xmlns:a16="http://schemas.microsoft.com/office/drawing/2014/main" id="{00486E6B-B5F3-BE1E-19BD-96F136EB3EE9}"/>
+                </a:ext>
+              </a:extLst>
+            </p:cNvPr>
+            <p:cNvSpPr txBox="1"/>
+            <p:nvPr/>
+          </p:nvSpPr>
+          <p:spPr>
+            <a:xfrm>
+              <a:off x="952500" y="2561167"/>
+              <a:ext cx="1773621" cy="269304"/>
+            </a:xfrm>
+            <a:prstGeom prst="rect">
+              <a:avLst/>
+            </a:prstGeom>
+            <a:noFill/>
+          </p:spPr>
+          <p:txBody>
+            <a:bodyPr vert="horz" rtlCol="0">
+              <a:spAutoFit/>
+            </a:bodyPr>
+            <a:lstStyle/>
+            <a:p>
+              <a:pPr algn="r"/>
+              <a:r>
+                <a:rPr lang="en-US" altLang="ko-KR" sz="900">
+                  <a:solidFill>
+                    <a:srgbClr val="00FFFF"/>
+                  </a:solidFill>
+                </a:rPr>
+                <a:t>2nd_usb.RET</a:t>
+              </a:r>
+              <a:endParaRPr lang="ko-KR" altLang="en-US" sz="900">
+                <a:solidFill>
+                  <a:srgbClr val="00FFFF"/>
+                </a:solidFill>
+              </a:endParaRPr>
+            </a:p>
+          </p:txBody>
+        </p:sp>
+        <p:sp>
+          <p:nvSpPr>
+            <p:cNvPr id="11" name="TextBox 10">
+              <a:extLst>
+                <a:ext uri="{FF2B5EF4-FFF2-40B4-BE49-F238E27FC236}">
+                  <a16:creationId xmlns:a16="http://schemas.microsoft.com/office/drawing/2014/main" id="{2DAEB6A6-F8EE-81F6-2731-21843A66E0E6}"/>
+                </a:ext>
+              </a:extLst>
+            </p:cNvPr>
+            <p:cNvSpPr txBox="1"/>
+            <p:nvPr/>
+          </p:nvSpPr>
+          <p:spPr>
+            <a:xfrm>
+              <a:off x="952500" y="2857500"/>
+              <a:ext cx="1773621" cy="269304"/>
+            </a:xfrm>
+            <a:prstGeom prst="rect">
+              <a:avLst/>
+            </a:prstGeom>
+            <a:noFill/>
+          </p:spPr>
+          <p:txBody>
+            <a:bodyPr vert="horz" rtlCol="0">
+              <a:spAutoFit/>
+            </a:bodyPr>
+            <a:lstStyle/>
+            <a:p>
+              <a:pPr algn="r"/>
+              <a:r>
+                <a:rPr lang="en-US" altLang="ko-KR" sz="900"/>
+                <a:t>3rd_usb.ADV</a:t>
+              </a:r>
+              <a:endParaRPr lang="ko-KR" altLang="en-US" sz="900"/>
+            </a:p>
+          </p:txBody>
+        </p:sp>
+        <p:sp>
+          <p:nvSpPr>
+            <p:cNvPr id="12" name="TextBox 11">
+              <a:extLst>
+                <a:ext uri="{FF2B5EF4-FFF2-40B4-BE49-F238E27FC236}">
+                  <a16:creationId xmlns:a16="http://schemas.microsoft.com/office/drawing/2014/main" id="{76FF6FB6-849D-A126-A84C-26181009A191}"/>
+                </a:ext>
+              </a:extLst>
+            </p:cNvPr>
+            <p:cNvSpPr txBox="1"/>
+            <p:nvPr/>
+          </p:nvSpPr>
+          <p:spPr>
+            <a:xfrm>
+              <a:off x="952500" y="3153833"/>
+              <a:ext cx="1773621" cy="269304"/>
+            </a:xfrm>
+            <a:prstGeom prst="rect">
+              <a:avLst/>
+            </a:prstGeom>
+            <a:noFill/>
+          </p:spPr>
+          <p:txBody>
+            <a:bodyPr vert="horz" rtlCol="0">
+              <a:spAutoFit/>
+            </a:bodyPr>
+            <a:lstStyle/>
+            <a:p>
+              <a:pPr algn="r"/>
+              <a:r>
+                <a:rPr lang="en-US" altLang="ko-KR" sz="900">
+                  <a:solidFill>
+                    <a:srgbClr val="00FFFF"/>
+                  </a:solidFill>
+                </a:rPr>
+                <a:t>3rd_usb.RET</a:t>
+              </a:r>
+              <a:endParaRPr lang="ko-KR" altLang="en-US" sz="900">
+                <a:solidFill>
+                  <a:srgbClr val="00FFFF"/>
+                </a:solidFill>
+              </a:endParaRPr>
+            </a:p>
+          </p:txBody>
+        </p:sp>
+        <p:sp>
+          <p:nvSpPr>
+            <p:cNvPr id="13" name="TextBox 12">
+              <a:extLst>
+                <a:ext uri="{FF2B5EF4-FFF2-40B4-BE49-F238E27FC236}">
+                  <a16:creationId xmlns:a16="http://schemas.microsoft.com/office/drawing/2014/main" id="{8305F638-D103-57C0-5CD3-88057B54A5D9}"/>
+                </a:ext>
+              </a:extLst>
+            </p:cNvPr>
+            <p:cNvSpPr txBox="1"/>
+            <p:nvPr/>
+          </p:nvSpPr>
+          <p:spPr>
+            <a:xfrm>
+              <a:off x="952500" y="3450167"/>
+              <a:ext cx="1773621" cy="269304"/>
+            </a:xfrm>
+            <a:prstGeom prst="rect">
+              <a:avLst/>
+            </a:prstGeom>
+            <a:noFill/>
+          </p:spPr>
+          <p:txBody>
+            <a:bodyPr vert="horz" rtlCol="0">
+              <a:spAutoFit/>
+            </a:bodyPr>
+            <a:lstStyle/>
+            <a:p>
+              <a:pPr algn="r"/>
+              <a:r>
+                <a:rPr lang="en-US" altLang="ko-KR" sz="900"/>
+                <a:t>4th_usb.ADV</a:t>
+              </a:r>
+              <a:endParaRPr lang="ko-KR" altLang="en-US" sz="900"/>
+            </a:p>
+          </p:txBody>
+        </p:sp>
+        <p:sp>
+          <p:nvSpPr>
+            <p:cNvPr id="14" name="TextBox 13">
+              <a:extLst>
+                <a:ext uri="{FF2B5EF4-FFF2-40B4-BE49-F238E27FC236}">
+                  <a16:creationId xmlns:a16="http://schemas.microsoft.com/office/drawing/2014/main" id="{ACE4135F-9E9C-F013-3299-2C8C26B8E888}"/>
+                </a:ext>
+              </a:extLst>
+            </p:cNvPr>
+            <p:cNvSpPr txBox="1"/>
+            <p:nvPr/>
+          </p:nvSpPr>
+          <p:spPr>
+            <a:xfrm>
+              <a:off x="952500" y="3746500"/>
+              <a:ext cx="1773621" cy="269304"/>
+            </a:xfrm>
+            <a:prstGeom prst="rect">
+              <a:avLst/>
+            </a:prstGeom>
+            <a:noFill/>
+          </p:spPr>
+          <p:txBody>
+            <a:bodyPr vert="horz" rtlCol="0">
+              <a:spAutoFit/>
+            </a:bodyPr>
+            <a:lstStyle/>
+            <a:p>
+              <a:pPr algn="r"/>
+              <a:r>
+                <a:rPr lang="en-US" altLang="ko-KR" sz="900">
+                  <a:solidFill>
+                    <a:srgbClr val="00FFFF"/>
+                  </a:solidFill>
+                </a:rPr>
+                <a:t>4th_usb.RET</a:t>
+              </a:r>
+              <a:endParaRPr lang="ko-KR" altLang="en-US" sz="900">
+                <a:solidFill>
+                  <a:srgbClr val="00FFFF"/>
+                </a:solidFill>
+              </a:endParaRPr>
+            </a:p>
+          </p:txBody>
+        </p:sp>
+        <p:sp>
+          <p:nvSpPr>
+            <p:cNvPr id="15" name="TextBox 14">
+              <a:extLst>
+                <a:ext uri="{FF2B5EF4-FFF2-40B4-BE49-F238E27FC236}">
+                  <a16:creationId xmlns:a16="http://schemas.microsoft.com/office/drawing/2014/main" id="{2674C8F9-751B-D62A-D6B3-73E06A8F7EF5}"/>
+                </a:ext>
+              </a:extLst>
+            </p:cNvPr>
+            <p:cNvSpPr txBox="1"/>
+            <p:nvPr/>
+          </p:nvSpPr>
+          <p:spPr>
+            <a:xfrm>
+              <a:off x="952500" y="4042833"/>
+              <a:ext cx="1773621" cy="269304"/>
+            </a:xfrm>
+            <a:prstGeom prst="rect">
+              <a:avLst/>
+            </a:prstGeom>
+            <a:noFill/>
+          </p:spPr>
+          <p:txBody>
+            <a:bodyPr vert="horz" rtlCol="0">
+              <a:spAutoFit/>
+            </a:bodyPr>
+            <a:lstStyle/>
+            <a:p>
+              <a:pPr algn="r"/>
+              <a:r>
+                <a:rPr lang="en-US" altLang="ko-KR" sz="900"/>
+                <a:t>3rd_stp.RET</a:t>
+              </a:r>
+              <a:endParaRPr lang="ko-KR" altLang="en-US" sz="900"/>
+            </a:p>
+          </p:txBody>
+        </p:sp>
+        <p:sp>
+          <p:nvSpPr>
+            <p:cNvPr id="16" name="TextBox 15">
+              <a:extLst>
+                <a:ext uri="{FF2B5EF4-FFF2-40B4-BE49-F238E27FC236}">
+                  <a16:creationId xmlns:a16="http://schemas.microsoft.com/office/drawing/2014/main" id="{2E8C3843-211B-AF1A-EC85-327CF951BEBF}"/>
+                </a:ext>
+              </a:extLst>
+            </p:cNvPr>
+            <p:cNvSpPr txBox="1"/>
+            <p:nvPr/>
+          </p:nvSpPr>
+          <p:spPr>
+            <a:xfrm>
+              <a:off x="952500" y="4339167"/>
+              <a:ext cx="1773621" cy="269304"/>
+            </a:xfrm>
+            <a:prstGeom prst="rect">
+              <a:avLst/>
+            </a:prstGeom>
+            <a:noFill/>
+          </p:spPr>
+          <p:txBody>
+            <a:bodyPr vert="horz" rtlCol="0">
+              <a:spAutoFit/>
+            </a:bodyPr>
+            <a:lstStyle/>
+            <a:p>
+              <a:pPr algn="r"/>
+              <a:r>
+                <a:rPr lang="en-US" altLang="ko-KR" sz="900">
+                  <a:solidFill>
+                    <a:srgbClr val="00FFFF"/>
+                  </a:solidFill>
+                </a:rPr>
+                <a:t>3rd_stp.ADV</a:t>
+              </a:r>
+              <a:endParaRPr lang="ko-KR" altLang="en-US" sz="900">
+                <a:solidFill>
+                  <a:srgbClr val="00FFFF"/>
+                </a:solidFill>
+              </a:endParaRPr>
+            </a:p>
+          </p:txBody>
+        </p:sp>
+        <p:sp>
+          <p:nvSpPr>
+            <p:cNvPr id="17" name="TextBox 16">
+              <a:extLst>
+                <a:ext uri="{FF2B5EF4-FFF2-40B4-BE49-F238E27FC236}">
+                  <a16:creationId xmlns:a16="http://schemas.microsoft.com/office/drawing/2014/main" id="{46D711FC-06D5-6A37-C866-E5EA50B0A039}"/>
+                </a:ext>
+              </a:extLst>
+            </p:cNvPr>
+            <p:cNvSpPr txBox="1"/>
+            <p:nvPr/>
+          </p:nvSpPr>
+          <p:spPr>
+            <a:xfrm>
+              <a:off x="952500" y="4635500"/>
+              <a:ext cx="1773621" cy="269304"/>
+            </a:xfrm>
+            <a:prstGeom prst="rect">
+              <a:avLst/>
+            </a:prstGeom>
+            <a:noFill/>
+          </p:spPr>
+          <p:txBody>
+            <a:bodyPr vert="horz" rtlCol="0">
+              <a:spAutoFit/>
+            </a:bodyPr>
+            <a:lstStyle/>
+            <a:p>
+              <a:pPr algn="r"/>
+              <a:r>
+                <a:rPr lang="en-US" altLang="ko-KR" sz="900"/>
+                <a:t>4th_stp.RET</a:t>
+              </a:r>
+              <a:endParaRPr lang="ko-KR" altLang="en-US" sz="900"/>
+            </a:p>
+          </p:txBody>
+        </p:sp>
+        <p:sp>
+          <p:nvSpPr>
+            <p:cNvPr id="18" name="TextBox 17">
+              <a:extLst>
+                <a:ext uri="{FF2B5EF4-FFF2-40B4-BE49-F238E27FC236}">
+                  <a16:creationId xmlns:a16="http://schemas.microsoft.com/office/drawing/2014/main" id="{FACA739A-884A-67BD-C72F-69DFB5DBCFF0}"/>
+                </a:ext>
+              </a:extLst>
+            </p:cNvPr>
+            <p:cNvSpPr txBox="1"/>
+            <p:nvPr/>
+          </p:nvSpPr>
+          <p:spPr>
+            <a:xfrm>
+              <a:off x="952500" y="4931833"/>
+              <a:ext cx="1773621" cy="269304"/>
+            </a:xfrm>
+            <a:prstGeom prst="rect">
+              <a:avLst/>
+            </a:prstGeom>
+            <a:noFill/>
+          </p:spPr>
+          <p:txBody>
+            <a:bodyPr vert="horz" rtlCol="0">
+              <a:spAutoFit/>
+            </a:bodyPr>
+            <a:lstStyle/>
+            <a:p>
+              <a:pPr algn="r"/>
+              <a:r>
+                <a:rPr lang="en-US" altLang="ko-KR" sz="900">
+                  <a:solidFill>
+                    <a:srgbClr val="00FFFF"/>
+                  </a:solidFill>
+                </a:rPr>
+                <a:t>4th_stp.ADV</a:t>
+              </a:r>
+              <a:endParaRPr lang="ko-KR" altLang="en-US" sz="900">
+                <a:solidFill>
+                  <a:srgbClr val="00FFFF"/>
+                </a:solidFill>
+              </a:endParaRPr>
+            </a:p>
+          </p:txBody>
+        </p:sp>
+        <p:sp>
+          <p:nvSpPr>
+            <p:cNvPr id="19" name="TextBox 18">
+              <a:extLst>
+                <a:ext uri="{FF2B5EF4-FFF2-40B4-BE49-F238E27FC236}">
+                  <a16:creationId xmlns:a16="http://schemas.microsoft.com/office/drawing/2014/main" id="{4FDFA200-1654-6734-3A1C-7EBD8EED77BA}"/>
+                </a:ext>
+              </a:extLst>
+            </p:cNvPr>
+            <p:cNvSpPr txBox="1"/>
+            <p:nvPr/>
+          </p:nvSpPr>
+          <p:spPr>
+            <a:xfrm>
+              <a:off x="952500" y="5228167"/>
+              <a:ext cx="1773621" cy="269304"/>
+            </a:xfrm>
+            <a:prstGeom prst="rect">
+              <a:avLst/>
+            </a:prstGeom>
+            <a:noFill/>
+          </p:spPr>
+          <p:txBody>
+            <a:bodyPr vert="horz" rtlCol="0">
+              <a:spAutoFit/>
+            </a:bodyPr>
+            <a:lstStyle/>
+            <a:p>
+              <a:pPr algn="r"/>
+              <a:r>
+                <a:rPr lang="en-US" altLang="ko-KR" sz="900"/>
+                <a:t>2nd_stp.RET</a:t>
+              </a:r>
+              <a:endParaRPr lang="ko-KR" altLang="en-US" sz="900"/>
+            </a:p>
+          </p:txBody>
+        </p:sp>
+        <p:sp>
+          <p:nvSpPr>
+            <p:cNvPr id="20" name="TextBox 19">
+              <a:extLst>
+                <a:ext uri="{FF2B5EF4-FFF2-40B4-BE49-F238E27FC236}">
+                  <a16:creationId xmlns:a16="http://schemas.microsoft.com/office/drawing/2014/main" id="{AD3DC3EB-A2C2-3E90-182D-924B7BC42335}"/>
+                </a:ext>
+              </a:extLst>
+            </p:cNvPr>
+            <p:cNvSpPr txBox="1"/>
+            <p:nvPr/>
+          </p:nvSpPr>
+          <p:spPr>
+            <a:xfrm>
+              <a:off x="952500" y="5524500"/>
+              <a:ext cx="1773621" cy="269304"/>
+            </a:xfrm>
+            <a:prstGeom prst="rect">
+              <a:avLst/>
+            </a:prstGeom>
+            <a:noFill/>
+          </p:spPr>
+          <p:txBody>
+            <a:bodyPr vert="horz" rtlCol="0">
+              <a:spAutoFit/>
+            </a:bodyPr>
+            <a:lstStyle/>
+            <a:p>
+              <a:pPr algn="r"/>
+              <a:r>
+                <a:rPr lang="en-US" altLang="ko-KR" sz="900">
+                  <a:solidFill>
+                    <a:srgbClr val="00FFFF"/>
+                  </a:solidFill>
+                </a:rPr>
+                <a:t>2nd_stp.ADV</a:t>
+              </a:r>
+              <a:endParaRPr lang="ko-KR" altLang="en-US" sz="900">
+                <a:solidFill>
+                  <a:srgbClr val="00FFFF"/>
+                </a:solidFill>
+              </a:endParaRPr>
+            </a:p>
+          </p:txBody>
+        </p:sp>
+        <p:sp>
+          <p:nvSpPr>
+            <p:cNvPr id="21" name="TextBox 20">
+              <a:extLst>
+                <a:ext uri="{FF2B5EF4-FFF2-40B4-BE49-F238E27FC236}">
+                  <a16:creationId xmlns:a16="http://schemas.microsoft.com/office/drawing/2014/main" id="{EB44BB22-9DB0-58D7-55CF-0B524213E0A6}"/>
+                </a:ext>
+              </a:extLst>
+            </p:cNvPr>
+            <p:cNvSpPr txBox="1"/>
+            <p:nvPr/>
+          </p:nvSpPr>
+          <p:spPr>
+            <a:xfrm>
+              <a:off x="952500" y="5820833"/>
+              <a:ext cx="1773621" cy="269304"/>
+            </a:xfrm>
+            <a:prstGeom prst="rect">
+              <a:avLst/>
+            </a:prstGeom>
+            <a:noFill/>
+          </p:spPr>
+          <p:txBody>
+            <a:bodyPr vert="horz" rtlCol="0">
+              <a:spAutoFit/>
+            </a:bodyPr>
+            <a:lstStyle/>
+            <a:p>
+              <a:pPr algn="r"/>
+              <a:r>
+                <a:rPr lang="en-US" altLang="ko-KR" sz="900"/>
+                <a:t>1st_stp.RET</a:t>
+              </a:r>
+              <a:endParaRPr lang="ko-KR" altLang="en-US" sz="900"/>
+            </a:p>
+          </p:txBody>
+        </p:sp>
+        <p:sp>
+          <p:nvSpPr>
+            <p:cNvPr id="22" name="TextBox 21">
+              <a:extLst>
+                <a:ext uri="{FF2B5EF4-FFF2-40B4-BE49-F238E27FC236}">
+                  <a16:creationId xmlns:a16="http://schemas.microsoft.com/office/drawing/2014/main" id="{7F74BC99-DC05-C4F9-5070-E8E3351A5BA4}"/>
+                </a:ext>
+              </a:extLst>
+            </p:cNvPr>
+            <p:cNvSpPr txBox="1"/>
+            <p:nvPr/>
+          </p:nvSpPr>
+          <p:spPr>
+            <a:xfrm>
+              <a:off x="952500" y="6117167"/>
+              <a:ext cx="1773621" cy="269304"/>
+            </a:xfrm>
+            <a:prstGeom prst="rect">
+              <a:avLst/>
+            </a:prstGeom>
+            <a:noFill/>
+          </p:spPr>
+          <p:txBody>
+            <a:bodyPr vert="horz" rtlCol="0">
+              <a:spAutoFit/>
+            </a:bodyPr>
+            <a:lstStyle/>
+            <a:p>
+              <a:pPr algn="r"/>
+              <a:r>
+                <a:rPr lang="en-US" altLang="ko-KR" sz="900">
+                  <a:solidFill>
+                    <a:srgbClr val="00FFFF"/>
+                  </a:solidFill>
+                </a:rPr>
+                <a:t>1st_stp.ADV</a:t>
+              </a:r>
+              <a:endParaRPr lang="ko-KR" altLang="en-US" sz="900">
+                <a:solidFill>
+                  <a:srgbClr val="00FFFF"/>
+                </a:solidFill>
+              </a:endParaRPr>
+            </a:p>
+          </p:txBody>
+        </p:sp>
+        <p:sp>
+          <p:nvSpPr>
+            <p:cNvPr id="23" name="직사각형 22">
+              <a:extLst>
+                <a:ext uri="{FF2B5EF4-FFF2-40B4-BE49-F238E27FC236}">
+                  <a16:creationId xmlns:a16="http://schemas.microsoft.com/office/drawing/2014/main" id="{C2B7938D-D0DD-6262-30CE-84CC2119F1EA}"/>
+                </a:ext>
+              </a:extLst>
+            </p:cNvPr>
+            <p:cNvSpPr/>
+            <p:nvPr/>
+          </p:nvSpPr>
+          <p:spPr>
+            <a:xfrm>
+              <a:off x="2726121" y="1079500"/>
+              <a:ext cx="1418897" cy="296333"/>
+            </a:xfrm>
+            <a:prstGeom prst="rect">
+              <a:avLst/>
+            </a:prstGeom>
+            <a:solidFill>
+              <a:srgbClr val="000000"/>
+            </a:solidFill>
+            <a:ln w="12700" cap="flat" cmpd="sng" algn="ctr">
+              <a:noFill/>
+              <a:prstDash val="solid"/>
+              <a:miter lim="800000"/>
+            </a:ln>
+            <a:effectLst/>
+          </p:spPr>
+          <p:style>
+            <a:lnRef idx="2">
+              <a:schemeClr val="accent1">
+                <a:shade val="15000"/>
+              </a:schemeClr>
+            </a:lnRef>
+            <a:fillRef idx="1">
+              <a:schemeClr val="accent1"/>
+            </a:fillRef>
+            <a:effectRef idx="0">
+              <a:schemeClr val="accent1"/>
+            </a:effectRef>
+            <a:fontRef idx="minor">
+              <a:schemeClr val="lt1"/>
+            </a:fontRef>
+          </p:style>
+          <p:txBody>
+            <a:bodyPr rtlCol="0" anchor="ctr"/>
+            <a:lstStyle/>
+            <a:p>
+              <a:pPr algn="ctr"/>
+              <a:r>
+                <a:rPr lang="en-US" altLang="ko-KR" sz="700"/>
+                <a:t>Cv_Frt</a:t>
+              </a:r>
+              <a:br>
+                <a:rPr lang="en-US" altLang="ko-KR" sz="700"/>
+              </a:br>
+              <a:r>
+                <a:rPr lang="en-US" altLang="ko-KR" sz="700"/>
+                <a:t>MOVE</a:t>
+              </a:r>
+              <a:endParaRPr lang="ko-KR" altLang="en-US" sz="700"/>
+            </a:p>
+          </p:txBody>
+        </p:sp>
+        <p:sp>
+          <p:nvSpPr>
+            <p:cNvPr id="24" name="직사각형 23">
+              <a:extLst>
+                <a:ext uri="{FF2B5EF4-FFF2-40B4-BE49-F238E27FC236}">
+                  <a16:creationId xmlns:a16="http://schemas.microsoft.com/office/drawing/2014/main" id="{CCCBE268-E5B4-71BA-D451-7D1CAE0CDF2C}"/>
+                </a:ext>
+              </a:extLst>
+            </p:cNvPr>
+            <p:cNvSpPr/>
+            <p:nvPr/>
+          </p:nvSpPr>
+          <p:spPr>
+            <a:xfrm>
+              <a:off x="4145018" y="1672167"/>
+              <a:ext cx="1418897" cy="296333"/>
+            </a:xfrm>
+            <a:prstGeom prst="rect">
+              <a:avLst/>
+            </a:prstGeom>
+            <a:solidFill>
+              <a:srgbClr val="000000"/>
+            </a:solidFill>
+            <a:ln w="12700" cap="flat" cmpd="sng" algn="ctr">
+              <a:noFill/>
+              <a:prstDash val="solid"/>
+              <a:miter lim="800000"/>
+            </a:ln>
+            <a:effectLst/>
+          </p:spPr>
+          <p:style>
+            <a:lnRef idx="2">
+              <a:schemeClr val="accent1">
+                <a:shade val="15000"/>
+              </a:schemeClr>
+            </a:lnRef>
+            <a:fillRef idx="1">
+              <a:schemeClr val="accent1"/>
+            </a:fillRef>
+            <a:effectRef idx="0">
+              <a:schemeClr val="accent1"/>
+            </a:effectRef>
+            <a:fontRef idx="minor">
+              <a:schemeClr val="lt1"/>
+            </a:fontRef>
+          </p:style>
+          <p:txBody>
+            <a:bodyPr rtlCol="0" anchor="ctr"/>
+            <a:lstStyle/>
+            <a:p>
+              <a:pPr algn="ctr"/>
+              <a:r>
+                <a:rPr lang="en-US" altLang="ko-KR" sz="700"/>
+                <a:t>1st_usb</a:t>
+              </a:r>
+              <a:br>
+                <a:rPr lang="en-US" altLang="ko-KR" sz="700"/>
+              </a:br>
+              <a:r>
+                <a:rPr lang="en-US" altLang="ko-KR" sz="700"/>
+                <a:t>ADV</a:t>
+              </a:r>
+              <a:endParaRPr lang="ko-KR" altLang="en-US" sz="700"/>
+            </a:p>
+          </p:txBody>
+        </p:sp>
+        <p:sp>
+          <p:nvSpPr>
+            <p:cNvPr id="25" name="직사각형 24">
+              <a:extLst>
+                <a:ext uri="{FF2B5EF4-FFF2-40B4-BE49-F238E27FC236}">
+                  <a16:creationId xmlns:a16="http://schemas.microsoft.com/office/drawing/2014/main" id="{242C7ABB-11D3-6C10-0C14-6ECB38CEE9E9}"/>
+                </a:ext>
+              </a:extLst>
+            </p:cNvPr>
+            <p:cNvSpPr/>
+            <p:nvPr/>
+          </p:nvSpPr>
+          <p:spPr>
+            <a:xfrm>
+              <a:off x="4145018" y="2264833"/>
+              <a:ext cx="1418897" cy="296333"/>
+            </a:xfrm>
+            <a:prstGeom prst="rect">
+              <a:avLst/>
+            </a:prstGeom>
+            <a:solidFill>
+              <a:srgbClr val="000000"/>
+            </a:solidFill>
+            <a:ln w="12700" cap="flat" cmpd="sng" algn="ctr">
+              <a:noFill/>
+              <a:prstDash val="solid"/>
+              <a:miter lim="800000"/>
+            </a:ln>
+            <a:effectLst/>
+          </p:spPr>
+          <p:style>
+            <a:lnRef idx="2">
+              <a:schemeClr val="accent1">
+                <a:shade val="15000"/>
+              </a:schemeClr>
+            </a:lnRef>
+            <a:fillRef idx="1">
+              <a:schemeClr val="accent1"/>
+            </a:fillRef>
+            <a:effectRef idx="0">
+              <a:schemeClr val="accent1"/>
+            </a:effectRef>
+            <a:fontRef idx="minor">
+              <a:schemeClr val="lt1"/>
+            </a:fontRef>
+          </p:style>
+          <p:txBody>
+            <a:bodyPr rtlCol="0" anchor="ctr"/>
+            <a:lstStyle/>
+            <a:p>
+              <a:pPr algn="ctr"/>
+              <a:r>
+                <a:rPr lang="en-US" altLang="ko-KR" sz="700"/>
+                <a:t>2nd_usb</a:t>
+              </a:r>
+              <a:br>
+                <a:rPr lang="en-US" altLang="ko-KR" sz="700"/>
+              </a:br>
+              <a:r>
+                <a:rPr lang="en-US" altLang="ko-KR" sz="700"/>
+                <a:t>ADV</a:t>
+              </a:r>
+              <a:endParaRPr lang="ko-KR" altLang="en-US" sz="700"/>
+            </a:p>
+          </p:txBody>
+        </p:sp>
+        <p:sp>
+          <p:nvSpPr>
+            <p:cNvPr id="26" name="직사각형 25">
+              <a:extLst>
+                <a:ext uri="{FF2B5EF4-FFF2-40B4-BE49-F238E27FC236}">
+                  <a16:creationId xmlns:a16="http://schemas.microsoft.com/office/drawing/2014/main" id="{33E71866-3785-C179-70CD-A04B292B987C}"/>
+                </a:ext>
+              </a:extLst>
+            </p:cNvPr>
+            <p:cNvSpPr/>
+            <p:nvPr/>
+          </p:nvSpPr>
+          <p:spPr>
+            <a:xfrm>
+              <a:off x="4145018" y="2857500"/>
+              <a:ext cx="1418897" cy="296333"/>
+            </a:xfrm>
+            <a:prstGeom prst="rect">
+              <a:avLst/>
+            </a:prstGeom>
+            <a:solidFill>
+              <a:srgbClr val="000000"/>
+            </a:solidFill>
+            <a:ln w="12700" cap="flat" cmpd="sng" algn="ctr">
+              <a:noFill/>
+              <a:prstDash val="solid"/>
+              <a:miter lim="800000"/>
+            </a:ln>
+            <a:effectLst/>
+          </p:spPr>
+          <p:style>
+            <a:lnRef idx="2">
+              <a:schemeClr val="accent1">
+                <a:shade val="15000"/>
+              </a:schemeClr>
+            </a:lnRef>
+            <a:fillRef idx="1">
+              <a:schemeClr val="accent1"/>
+            </a:fillRef>
+            <a:effectRef idx="0">
+              <a:schemeClr val="accent1"/>
+            </a:effectRef>
+            <a:fontRef idx="minor">
+              <a:schemeClr val="lt1"/>
+            </a:fontRef>
+          </p:style>
+          <p:txBody>
+            <a:bodyPr rtlCol="0" anchor="ctr"/>
+            <a:lstStyle/>
+            <a:p>
+              <a:pPr algn="ctr"/>
+              <a:r>
+                <a:rPr lang="en-US" altLang="ko-KR" sz="700"/>
+                <a:t>3rd_usb</a:t>
+              </a:r>
+              <a:br>
+                <a:rPr lang="en-US" altLang="ko-KR" sz="700"/>
+              </a:br>
+              <a:r>
+                <a:rPr lang="en-US" altLang="ko-KR" sz="700"/>
+                <a:t>ADV</a:t>
+              </a:r>
+              <a:endParaRPr lang="ko-KR" altLang="en-US" sz="700"/>
+            </a:p>
+          </p:txBody>
+        </p:sp>
+        <p:sp>
+          <p:nvSpPr>
+            <p:cNvPr id="27" name="직사각형 26">
+              <a:extLst>
+                <a:ext uri="{FF2B5EF4-FFF2-40B4-BE49-F238E27FC236}">
+                  <a16:creationId xmlns:a16="http://schemas.microsoft.com/office/drawing/2014/main" id="{0EA8ADD9-3862-FC8A-5BF2-DDC21746C3D5}"/>
+                </a:ext>
+              </a:extLst>
+            </p:cNvPr>
+            <p:cNvSpPr/>
+            <p:nvPr/>
+          </p:nvSpPr>
+          <p:spPr>
+            <a:xfrm>
+              <a:off x="4145018" y="3450167"/>
+              <a:ext cx="1418897" cy="296333"/>
+            </a:xfrm>
+            <a:prstGeom prst="rect">
+              <a:avLst/>
+            </a:prstGeom>
+            <a:solidFill>
+              <a:srgbClr val="000000"/>
+            </a:solidFill>
+            <a:ln w="12700" cap="flat" cmpd="sng" algn="ctr">
+              <a:noFill/>
+              <a:prstDash val="solid"/>
+              <a:miter lim="800000"/>
+            </a:ln>
+            <a:effectLst/>
+          </p:spPr>
+          <p:style>
+            <a:lnRef idx="2">
+              <a:schemeClr val="accent1">
+                <a:shade val="15000"/>
+              </a:schemeClr>
+            </a:lnRef>
+            <a:fillRef idx="1">
+              <a:schemeClr val="accent1"/>
+            </a:fillRef>
+            <a:effectRef idx="0">
+              <a:schemeClr val="accent1"/>
+            </a:effectRef>
+            <a:fontRef idx="minor">
+              <a:schemeClr val="lt1"/>
+            </a:fontRef>
+          </p:style>
+          <p:txBody>
+            <a:bodyPr rtlCol="0" anchor="ctr"/>
+            <a:lstStyle/>
+            <a:p>
+              <a:pPr algn="ctr"/>
+              <a:r>
+                <a:rPr lang="en-US" altLang="ko-KR" sz="700"/>
+                <a:t>4th_usb</a:t>
+              </a:r>
+              <a:br>
+                <a:rPr lang="en-US" altLang="ko-KR" sz="700"/>
+              </a:br>
+              <a:r>
+                <a:rPr lang="en-US" altLang="ko-KR" sz="700"/>
+                <a:t>ADV</a:t>
+              </a:r>
+              <a:endParaRPr lang="ko-KR" altLang="en-US" sz="700"/>
+            </a:p>
+          </p:txBody>
+        </p:sp>
+        <p:sp>
+          <p:nvSpPr>
+            <p:cNvPr id="28" name="직사각형 27">
+              <a:extLst>
+                <a:ext uri="{FF2B5EF4-FFF2-40B4-BE49-F238E27FC236}">
+                  <a16:creationId xmlns:a16="http://schemas.microsoft.com/office/drawing/2014/main" id="{55D84312-89B2-850B-EAC1-333CD4B0AEF1}"/>
+                </a:ext>
+              </a:extLst>
+            </p:cNvPr>
+            <p:cNvSpPr/>
+            <p:nvPr/>
+          </p:nvSpPr>
+          <p:spPr>
+            <a:xfrm>
+              <a:off x="5563914" y="1968500"/>
+              <a:ext cx="1418897" cy="296333"/>
+            </a:xfrm>
+            <a:prstGeom prst="rect">
+              <a:avLst/>
+            </a:prstGeom>
+            <a:solidFill>
+              <a:srgbClr val="000000"/>
+            </a:solidFill>
+            <a:ln w="12700" cap="flat" cmpd="sng" algn="ctr">
+              <a:noFill/>
+              <a:prstDash val="solid"/>
+              <a:miter lim="800000"/>
+            </a:ln>
+            <a:effectLst/>
+          </p:spPr>
+          <p:style>
+            <a:lnRef idx="2">
+              <a:schemeClr val="accent1">
+                <a:shade val="15000"/>
+              </a:schemeClr>
+            </a:lnRef>
+            <a:fillRef idx="1">
+              <a:schemeClr val="accent1"/>
+            </a:fillRef>
+            <a:effectRef idx="0">
+              <a:schemeClr val="accent1"/>
+            </a:effectRef>
+            <a:fontRef idx="minor">
+              <a:schemeClr val="lt1"/>
+            </a:fontRef>
+          </p:style>
+          <p:txBody>
+            <a:bodyPr rtlCol="0" anchor="ctr"/>
+            <a:lstStyle/>
+            <a:p>
+              <a:pPr algn="ctr"/>
+              <a:r>
+                <a:rPr lang="en-US" altLang="ko-KR" sz="700"/>
+                <a:t>1st_usb</a:t>
+              </a:r>
+              <a:br>
+                <a:rPr lang="en-US" altLang="ko-KR" sz="700"/>
+              </a:br>
+              <a:r>
+                <a:rPr lang="en-US" altLang="ko-KR" sz="700"/>
+                <a:t>RET</a:t>
+              </a:r>
+              <a:endParaRPr lang="ko-KR" altLang="en-US" sz="700"/>
+            </a:p>
+          </p:txBody>
+        </p:sp>
+        <p:sp>
+          <p:nvSpPr>
+            <p:cNvPr id="29" name="직사각형 28">
+              <a:extLst>
+                <a:ext uri="{FF2B5EF4-FFF2-40B4-BE49-F238E27FC236}">
+                  <a16:creationId xmlns:a16="http://schemas.microsoft.com/office/drawing/2014/main" id="{DA6C0BB0-DEAD-B453-2211-B96D969864F5}"/>
+                </a:ext>
+              </a:extLst>
+            </p:cNvPr>
+            <p:cNvSpPr/>
+            <p:nvPr/>
+          </p:nvSpPr>
+          <p:spPr>
+            <a:xfrm>
+              <a:off x="5563914" y="2561167"/>
+              <a:ext cx="1418897" cy="296333"/>
+            </a:xfrm>
+            <a:prstGeom prst="rect">
+              <a:avLst/>
+            </a:prstGeom>
+            <a:solidFill>
+              <a:srgbClr val="000000"/>
+            </a:solidFill>
+            <a:ln w="12700" cap="flat" cmpd="sng" algn="ctr">
+              <a:noFill/>
+              <a:prstDash val="solid"/>
+              <a:miter lim="800000"/>
+            </a:ln>
+            <a:effectLst/>
+          </p:spPr>
+          <p:style>
+            <a:lnRef idx="2">
+              <a:schemeClr val="accent1">
+                <a:shade val="15000"/>
+              </a:schemeClr>
+            </a:lnRef>
+            <a:fillRef idx="1">
+              <a:schemeClr val="accent1"/>
+            </a:fillRef>
+            <a:effectRef idx="0">
+              <a:schemeClr val="accent1"/>
+            </a:effectRef>
+            <a:fontRef idx="minor">
+              <a:schemeClr val="lt1"/>
+            </a:fontRef>
+          </p:style>
+          <p:txBody>
+            <a:bodyPr rtlCol="0" anchor="ctr"/>
+            <a:lstStyle/>
+            <a:p>
+              <a:pPr algn="ctr"/>
+              <a:r>
+                <a:rPr lang="en-US" altLang="ko-KR" sz="700"/>
+                <a:t>2nd_usb</a:t>
+              </a:r>
+              <a:br>
+                <a:rPr lang="en-US" altLang="ko-KR" sz="700"/>
+              </a:br>
+              <a:r>
+                <a:rPr lang="en-US" altLang="ko-KR" sz="700"/>
+                <a:t>RET</a:t>
+              </a:r>
+              <a:endParaRPr lang="ko-KR" altLang="en-US" sz="700"/>
+            </a:p>
+          </p:txBody>
+        </p:sp>
+        <p:sp>
+          <p:nvSpPr>
+            <p:cNvPr id="30" name="직사각형 29">
+              <a:extLst>
+                <a:ext uri="{FF2B5EF4-FFF2-40B4-BE49-F238E27FC236}">
+                  <a16:creationId xmlns:a16="http://schemas.microsoft.com/office/drawing/2014/main" id="{378EDD41-07B3-3B80-65A1-44F46C2894DC}"/>
+                </a:ext>
+              </a:extLst>
+            </p:cNvPr>
+            <p:cNvSpPr/>
+            <p:nvPr/>
+          </p:nvSpPr>
+          <p:spPr>
+            <a:xfrm>
+              <a:off x="5563914" y="3153833"/>
+              <a:ext cx="1418897" cy="296333"/>
+            </a:xfrm>
+            <a:prstGeom prst="rect">
+              <a:avLst/>
+            </a:prstGeom>
+            <a:solidFill>
+              <a:srgbClr val="000000"/>
+            </a:solidFill>
+            <a:ln w="12700" cap="flat" cmpd="sng" algn="ctr">
+              <a:noFill/>
+              <a:prstDash val="solid"/>
+              <a:miter lim="800000"/>
+            </a:ln>
+            <a:effectLst/>
+          </p:spPr>
+          <p:style>
+            <a:lnRef idx="2">
+              <a:schemeClr val="accent1">
+                <a:shade val="15000"/>
+              </a:schemeClr>
+            </a:lnRef>
+            <a:fillRef idx="1">
+              <a:schemeClr val="accent1"/>
+            </a:fillRef>
+            <a:effectRef idx="0">
+              <a:schemeClr val="accent1"/>
+            </a:effectRef>
+            <a:fontRef idx="minor">
+              <a:schemeClr val="lt1"/>
+            </a:fontRef>
+          </p:style>
+          <p:txBody>
+            <a:bodyPr rtlCol="0" anchor="ctr"/>
+            <a:lstStyle/>
+            <a:p>
+              <a:pPr algn="ctr"/>
+              <a:r>
+                <a:rPr lang="en-US" altLang="ko-KR" sz="700"/>
+                <a:t>3rd_usb</a:t>
+              </a:r>
+              <a:br>
+                <a:rPr lang="en-US" altLang="ko-KR" sz="700"/>
+              </a:br>
+              <a:r>
+                <a:rPr lang="en-US" altLang="ko-KR" sz="700"/>
+                <a:t>RET</a:t>
+              </a:r>
+              <a:endParaRPr lang="ko-KR" altLang="en-US" sz="700"/>
+            </a:p>
+          </p:txBody>
+        </p:sp>
+        <p:sp>
+          <p:nvSpPr>
+            <p:cNvPr id="31" name="직사각형 30">
+              <a:extLst>
+                <a:ext uri="{FF2B5EF4-FFF2-40B4-BE49-F238E27FC236}">
+                  <a16:creationId xmlns:a16="http://schemas.microsoft.com/office/drawing/2014/main" id="{00BAA47A-A774-99AE-A1A5-98A294905D6D}"/>
+                </a:ext>
+              </a:extLst>
+            </p:cNvPr>
+            <p:cNvSpPr/>
+            <p:nvPr/>
+          </p:nvSpPr>
+          <p:spPr>
+            <a:xfrm>
+              <a:off x="5563914" y="3746500"/>
+              <a:ext cx="1418897" cy="296333"/>
+            </a:xfrm>
+            <a:prstGeom prst="rect">
+              <a:avLst/>
+            </a:prstGeom>
+            <a:solidFill>
+              <a:srgbClr val="000000"/>
+            </a:solidFill>
+            <a:ln w="12700" cap="flat" cmpd="sng" algn="ctr">
+              <a:noFill/>
+              <a:prstDash val="solid"/>
+              <a:miter lim="800000"/>
+            </a:ln>
+            <a:effectLst/>
+          </p:spPr>
+          <p:style>
+            <a:lnRef idx="2">
+              <a:schemeClr val="accent1">
+                <a:shade val="15000"/>
+              </a:schemeClr>
+            </a:lnRef>
+            <a:fillRef idx="1">
+              <a:schemeClr val="accent1"/>
+            </a:fillRef>
+            <a:effectRef idx="0">
+              <a:schemeClr val="accent1"/>
+            </a:effectRef>
+            <a:fontRef idx="minor">
+              <a:schemeClr val="lt1"/>
+            </a:fontRef>
+          </p:style>
+          <p:txBody>
+            <a:bodyPr rtlCol="0" anchor="ctr"/>
+            <a:lstStyle/>
+            <a:p>
+              <a:pPr algn="ctr"/>
+              <a:r>
+                <a:rPr lang="en-US" altLang="ko-KR" sz="700"/>
+                <a:t>4th_usb</a:t>
+              </a:r>
+              <a:br>
+                <a:rPr lang="en-US" altLang="ko-KR" sz="700"/>
+              </a:br>
+              <a:r>
+                <a:rPr lang="en-US" altLang="ko-KR" sz="700"/>
+                <a:t>RET</a:t>
+              </a:r>
+              <a:endParaRPr lang="ko-KR" altLang="en-US" sz="700"/>
+            </a:p>
+          </p:txBody>
+        </p:sp>
+        <p:sp>
+          <p:nvSpPr>
+            <p:cNvPr id="32" name="직사각형 31">
+              <a:extLst>
+                <a:ext uri="{FF2B5EF4-FFF2-40B4-BE49-F238E27FC236}">
+                  <a16:creationId xmlns:a16="http://schemas.microsoft.com/office/drawing/2014/main" id="{A5BB43FF-F7B6-E451-9247-044B75204C55}"/>
+                </a:ext>
+              </a:extLst>
+            </p:cNvPr>
+            <p:cNvSpPr/>
+            <p:nvPr/>
+          </p:nvSpPr>
+          <p:spPr>
+            <a:xfrm>
+              <a:off x="6982811" y="4042833"/>
+              <a:ext cx="1418897" cy="296333"/>
+            </a:xfrm>
+            <a:prstGeom prst="rect">
+              <a:avLst/>
+            </a:prstGeom>
+            <a:solidFill>
+              <a:srgbClr val="000000"/>
+            </a:solidFill>
+            <a:ln w="12700" cap="flat" cmpd="sng" algn="ctr">
+              <a:noFill/>
+              <a:prstDash val="solid"/>
+              <a:miter lim="800000"/>
+            </a:ln>
+            <a:effectLst/>
+          </p:spPr>
+          <p:style>
+            <a:lnRef idx="2">
+              <a:schemeClr val="accent1">
+                <a:shade val="15000"/>
+              </a:schemeClr>
+            </a:lnRef>
+            <a:fillRef idx="1">
+              <a:schemeClr val="accent1"/>
+            </a:fillRef>
+            <a:effectRef idx="0">
+              <a:schemeClr val="accent1"/>
+            </a:effectRef>
+            <a:fontRef idx="minor">
+              <a:schemeClr val="lt1"/>
+            </a:fontRef>
+          </p:style>
+          <p:txBody>
+            <a:bodyPr rtlCol="0" anchor="ctr"/>
+            <a:lstStyle/>
+            <a:p>
+              <a:pPr algn="ctr"/>
+              <a:r>
+                <a:rPr lang="en-US" altLang="ko-KR" sz="700"/>
+                <a:t>3rd_stp</a:t>
+              </a:r>
+              <a:br>
+                <a:rPr lang="en-US" altLang="ko-KR" sz="700"/>
+              </a:br>
+              <a:r>
+                <a:rPr lang="en-US" altLang="ko-KR" sz="700"/>
+                <a:t>RET</a:t>
+              </a:r>
+              <a:endParaRPr lang="ko-KR" altLang="en-US" sz="700"/>
+            </a:p>
+          </p:txBody>
+        </p:sp>
+        <p:sp>
+          <p:nvSpPr>
+            <p:cNvPr id="33" name="직사각형 32">
+              <a:extLst>
+                <a:ext uri="{FF2B5EF4-FFF2-40B4-BE49-F238E27FC236}">
+                  <a16:creationId xmlns:a16="http://schemas.microsoft.com/office/drawing/2014/main" id="{2E603297-293A-05CA-9A2D-E881005BE087}"/>
+                </a:ext>
+              </a:extLst>
+            </p:cNvPr>
+            <p:cNvSpPr/>
+            <p:nvPr/>
+          </p:nvSpPr>
+          <p:spPr>
+            <a:xfrm>
+              <a:off x="6982811" y="4635500"/>
+              <a:ext cx="1418897" cy="296333"/>
+            </a:xfrm>
+            <a:prstGeom prst="rect">
+              <a:avLst/>
+            </a:prstGeom>
+            <a:solidFill>
+              <a:srgbClr val="000000"/>
+            </a:solidFill>
+            <a:ln w="12700" cap="flat" cmpd="sng" algn="ctr">
+              <a:noFill/>
+              <a:prstDash val="solid"/>
+              <a:miter lim="800000"/>
+            </a:ln>
+            <a:effectLst/>
+          </p:spPr>
+          <p:style>
+            <a:lnRef idx="2">
+              <a:schemeClr val="accent1">
+                <a:shade val="15000"/>
+              </a:schemeClr>
+            </a:lnRef>
+            <a:fillRef idx="1">
+              <a:schemeClr val="accent1"/>
+            </a:fillRef>
+            <a:effectRef idx="0">
+              <a:schemeClr val="accent1"/>
+            </a:effectRef>
+            <a:fontRef idx="minor">
+              <a:schemeClr val="lt1"/>
+            </a:fontRef>
+          </p:style>
+          <p:txBody>
+            <a:bodyPr rtlCol="0" anchor="ctr"/>
+            <a:lstStyle/>
+            <a:p>
+              <a:pPr algn="ctr"/>
+              <a:r>
+                <a:rPr lang="en-US" altLang="ko-KR" sz="700"/>
+                <a:t>4th_stp</a:t>
+              </a:r>
+              <a:br>
+                <a:rPr lang="en-US" altLang="ko-KR" sz="700"/>
+              </a:br>
+              <a:r>
+                <a:rPr lang="en-US" altLang="ko-KR" sz="700"/>
+                <a:t>RET</a:t>
+              </a:r>
+              <a:endParaRPr lang="ko-KR" altLang="en-US" sz="700"/>
+            </a:p>
+          </p:txBody>
+        </p:sp>
+        <p:sp>
+          <p:nvSpPr>
+            <p:cNvPr id="34" name="직사각형 33">
+              <a:extLst>
+                <a:ext uri="{FF2B5EF4-FFF2-40B4-BE49-F238E27FC236}">
+                  <a16:creationId xmlns:a16="http://schemas.microsoft.com/office/drawing/2014/main" id="{17E3E59A-5693-5C9F-3044-3891A894359B}"/>
+                </a:ext>
+              </a:extLst>
+            </p:cNvPr>
+            <p:cNvSpPr/>
+            <p:nvPr/>
+          </p:nvSpPr>
+          <p:spPr>
+            <a:xfrm>
+              <a:off x="6982811" y="5228167"/>
+              <a:ext cx="1418897" cy="296333"/>
+            </a:xfrm>
+            <a:prstGeom prst="rect">
+              <a:avLst/>
+            </a:prstGeom>
+            <a:solidFill>
+              <a:srgbClr val="000000"/>
+            </a:solidFill>
+            <a:ln w="12700" cap="flat" cmpd="sng" algn="ctr">
+              <a:noFill/>
+              <a:prstDash val="solid"/>
+              <a:miter lim="800000"/>
+            </a:ln>
+            <a:effectLst/>
+          </p:spPr>
+          <p:style>
+            <a:lnRef idx="2">
+              <a:schemeClr val="accent1">
+                <a:shade val="15000"/>
+              </a:schemeClr>
+            </a:lnRef>
+            <a:fillRef idx="1">
+              <a:schemeClr val="accent1"/>
+            </a:fillRef>
+            <a:effectRef idx="0">
+              <a:schemeClr val="accent1"/>
+            </a:effectRef>
+            <a:fontRef idx="minor">
+              <a:schemeClr val="lt1"/>
+            </a:fontRef>
+          </p:style>
+          <p:txBody>
+            <a:bodyPr rtlCol="0" anchor="ctr"/>
+            <a:lstStyle/>
+            <a:p>
+              <a:pPr algn="ctr"/>
+              <a:r>
+                <a:rPr lang="en-US" altLang="ko-KR" sz="700"/>
+                <a:t>2nd_stp</a:t>
+              </a:r>
+              <a:br>
+                <a:rPr lang="en-US" altLang="ko-KR" sz="700"/>
+              </a:br>
+              <a:r>
+                <a:rPr lang="en-US" altLang="ko-KR" sz="700"/>
+                <a:t>RET</a:t>
+              </a:r>
+              <a:endParaRPr lang="ko-KR" altLang="en-US" sz="700"/>
+            </a:p>
+          </p:txBody>
+        </p:sp>
+        <p:sp>
+          <p:nvSpPr>
+            <p:cNvPr id="35" name="직사각형 34">
+              <a:extLst>
+                <a:ext uri="{FF2B5EF4-FFF2-40B4-BE49-F238E27FC236}">
+                  <a16:creationId xmlns:a16="http://schemas.microsoft.com/office/drawing/2014/main" id="{C3E498D9-D322-1DC1-0D10-BA4192F72BA8}"/>
+                </a:ext>
+              </a:extLst>
+            </p:cNvPr>
+            <p:cNvSpPr/>
+            <p:nvPr/>
+          </p:nvSpPr>
+          <p:spPr>
+            <a:xfrm>
+              <a:off x="6982811" y="5820833"/>
+              <a:ext cx="1418897" cy="296333"/>
+            </a:xfrm>
+            <a:prstGeom prst="rect">
+              <a:avLst/>
+            </a:prstGeom>
+            <a:solidFill>
+              <a:srgbClr val="000000"/>
+            </a:solidFill>
+            <a:ln w="12700" cap="flat" cmpd="sng" algn="ctr">
+              <a:noFill/>
+              <a:prstDash val="solid"/>
+              <a:miter lim="800000"/>
+            </a:ln>
+            <a:effectLst/>
+          </p:spPr>
+          <p:style>
+            <a:lnRef idx="2">
+              <a:schemeClr val="accent1">
+                <a:shade val="15000"/>
+              </a:schemeClr>
+            </a:lnRef>
+            <a:fillRef idx="1">
+              <a:schemeClr val="accent1"/>
+            </a:fillRef>
+            <a:effectRef idx="0">
+              <a:schemeClr val="accent1"/>
+            </a:effectRef>
+            <a:fontRef idx="minor">
+              <a:schemeClr val="lt1"/>
+            </a:fontRef>
+          </p:style>
+          <p:txBody>
+            <a:bodyPr rtlCol="0" anchor="ctr"/>
+            <a:lstStyle/>
+            <a:p>
+              <a:pPr algn="ctr"/>
+              <a:r>
+                <a:rPr lang="en-US" altLang="ko-KR" sz="700"/>
+                <a:t>1st_stp</a:t>
+              </a:r>
+              <a:br>
+                <a:rPr lang="en-US" altLang="ko-KR" sz="700"/>
+              </a:br>
+              <a:r>
+                <a:rPr lang="en-US" altLang="ko-KR" sz="700"/>
+                <a:t>RET</a:t>
+              </a:r>
+              <a:endParaRPr lang="ko-KR" altLang="en-US" sz="700"/>
+            </a:p>
+          </p:txBody>
+        </p:sp>
+        <p:sp>
+          <p:nvSpPr>
+            <p:cNvPr id="36" name="직사각형 35">
+              <a:extLst>
+                <a:ext uri="{FF2B5EF4-FFF2-40B4-BE49-F238E27FC236}">
+                  <a16:creationId xmlns:a16="http://schemas.microsoft.com/office/drawing/2014/main" id="{FF455934-03AD-BEAA-3426-D8A1A46CE62F}"/>
+                </a:ext>
+              </a:extLst>
+            </p:cNvPr>
+            <p:cNvSpPr/>
+            <p:nvPr/>
+          </p:nvSpPr>
+          <p:spPr>
+            <a:xfrm>
+              <a:off x="8401708" y="1375833"/>
+              <a:ext cx="1418897" cy="296333"/>
+            </a:xfrm>
+            <a:prstGeom prst="rect">
+              <a:avLst/>
+            </a:prstGeom>
+            <a:solidFill>
+              <a:srgbClr val="000000"/>
+            </a:solidFill>
+            <a:ln w="12700" cap="flat" cmpd="sng" algn="ctr">
+              <a:noFill/>
+              <a:prstDash val="solid"/>
+              <a:miter lim="800000"/>
+            </a:ln>
+            <a:effectLst/>
+          </p:spPr>
+          <p:style>
+            <a:lnRef idx="2">
+              <a:schemeClr val="accent1">
+                <a:shade val="15000"/>
+              </a:schemeClr>
+            </a:lnRef>
+            <a:fillRef idx="1">
+              <a:schemeClr val="accent1"/>
+            </a:fillRef>
+            <a:effectRef idx="0">
+              <a:schemeClr val="accent1"/>
+            </a:effectRef>
+            <a:fontRef idx="minor">
+              <a:schemeClr val="lt1"/>
+            </a:fontRef>
+          </p:style>
+          <p:txBody>
+            <a:bodyPr rtlCol="0" anchor="ctr"/>
+            <a:lstStyle/>
+            <a:p>
+              <a:pPr algn="ctr"/>
+              <a:r>
+                <a:rPr lang="en-US" altLang="ko-KR" sz="700"/>
+                <a:t>Cv_Frt</a:t>
+              </a:r>
+              <a:br>
+                <a:rPr lang="en-US" altLang="ko-KR" sz="700"/>
+              </a:br>
+              <a:r>
+                <a:rPr lang="en-US" altLang="ko-KR" sz="700"/>
+                <a:t>REMOVE</a:t>
+              </a:r>
+              <a:endParaRPr lang="ko-KR" altLang="en-US" sz="700"/>
+            </a:p>
+          </p:txBody>
+        </p:sp>
+        <p:sp>
+          <p:nvSpPr>
+            <p:cNvPr id="37" name="직사각형 36">
+              <a:extLst>
+                <a:ext uri="{FF2B5EF4-FFF2-40B4-BE49-F238E27FC236}">
+                  <a16:creationId xmlns:a16="http://schemas.microsoft.com/office/drawing/2014/main" id="{15D3E57A-6573-9EBB-9CA2-67523FEC7561}"/>
+                </a:ext>
+              </a:extLst>
+            </p:cNvPr>
+            <p:cNvSpPr/>
+            <p:nvPr/>
+          </p:nvSpPr>
+          <p:spPr>
+            <a:xfrm>
+              <a:off x="9820604" y="6117167"/>
+              <a:ext cx="1418897" cy="296333"/>
+            </a:xfrm>
+            <a:prstGeom prst="rect">
+              <a:avLst/>
+            </a:prstGeom>
+            <a:solidFill>
+              <a:srgbClr val="000000"/>
+            </a:solidFill>
+            <a:ln w="12700" cap="flat" cmpd="sng" algn="ctr">
+              <a:noFill/>
+              <a:prstDash val="solid"/>
+              <a:miter lim="800000"/>
+            </a:ln>
+            <a:effectLst/>
+          </p:spPr>
+          <p:style>
+            <a:lnRef idx="2">
+              <a:schemeClr val="accent1">
+                <a:shade val="15000"/>
+              </a:schemeClr>
+            </a:lnRef>
+            <a:fillRef idx="1">
+              <a:schemeClr val="accent1"/>
+            </a:fillRef>
+            <a:effectRef idx="0">
+              <a:schemeClr val="accent1"/>
+            </a:effectRef>
+            <a:fontRef idx="minor">
+              <a:schemeClr val="lt1"/>
+            </a:fontRef>
+          </p:style>
+          <p:txBody>
+            <a:bodyPr rtlCol="0" anchor="ctr"/>
+            <a:lstStyle/>
+            <a:p>
+              <a:pPr algn="ctr"/>
+              <a:r>
+                <a:rPr lang="en-US" altLang="ko-KR" sz="700"/>
+                <a:t>1st_stp</a:t>
+              </a:r>
+              <a:br>
+                <a:rPr lang="en-US" altLang="ko-KR" sz="700"/>
+              </a:br>
+              <a:r>
+                <a:rPr lang="en-US" altLang="ko-KR" sz="700"/>
+                <a:t>ADV</a:t>
+              </a:r>
+              <a:endParaRPr lang="ko-KR" altLang="en-US" sz="700"/>
+            </a:p>
+          </p:txBody>
+        </p:sp>
+        <p:sp>
+          <p:nvSpPr>
+            <p:cNvPr id="38" name="직사각형 37">
+              <a:extLst>
+                <a:ext uri="{FF2B5EF4-FFF2-40B4-BE49-F238E27FC236}">
+                  <a16:creationId xmlns:a16="http://schemas.microsoft.com/office/drawing/2014/main" id="{C388C004-E356-E25B-5D54-48DC5A8C6DC1}"/>
+                </a:ext>
+              </a:extLst>
+            </p:cNvPr>
+            <p:cNvSpPr/>
+            <p:nvPr/>
+          </p:nvSpPr>
+          <p:spPr>
+            <a:xfrm>
+              <a:off x="9820604" y="5524500"/>
+              <a:ext cx="1418897" cy="296333"/>
+            </a:xfrm>
+            <a:prstGeom prst="rect">
+              <a:avLst/>
+            </a:prstGeom>
+            <a:solidFill>
+              <a:srgbClr val="000000"/>
+            </a:solidFill>
+            <a:ln w="12700" cap="flat" cmpd="sng" algn="ctr">
+              <a:noFill/>
+              <a:prstDash val="solid"/>
+              <a:miter lim="800000"/>
+            </a:ln>
+            <a:effectLst/>
+          </p:spPr>
+          <p:style>
+            <a:lnRef idx="2">
+              <a:schemeClr val="accent1">
+                <a:shade val="15000"/>
+              </a:schemeClr>
+            </a:lnRef>
+            <a:fillRef idx="1">
+              <a:schemeClr val="accent1"/>
+            </a:fillRef>
+            <a:effectRef idx="0">
+              <a:schemeClr val="accent1"/>
+            </a:effectRef>
+            <a:fontRef idx="minor">
+              <a:schemeClr val="lt1"/>
+            </a:fontRef>
+          </p:style>
+          <p:txBody>
+            <a:bodyPr rtlCol="0" anchor="ctr"/>
+            <a:lstStyle/>
+            <a:p>
+              <a:pPr algn="ctr"/>
+              <a:r>
+                <a:rPr lang="en-US" altLang="ko-KR" sz="700"/>
+                <a:t>2nd_stp</a:t>
+              </a:r>
+              <a:br>
+                <a:rPr lang="en-US" altLang="ko-KR" sz="700"/>
+              </a:br>
+              <a:r>
+                <a:rPr lang="en-US" altLang="ko-KR" sz="700"/>
+                <a:t>ADV</a:t>
+              </a:r>
+              <a:endParaRPr lang="ko-KR" altLang="en-US" sz="700"/>
+            </a:p>
+          </p:txBody>
+        </p:sp>
+        <p:sp>
+          <p:nvSpPr>
+            <p:cNvPr id="39" name="직사각형 38">
+              <a:extLst>
+                <a:ext uri="{FF2B5EF4-FFF2-40B4-BE49-F238E27FC236}">
+                  <a16:creationId xmlns:a16="http://schemas.microsoft.com/office/drawing/2014/main" id="{499B07B3-2E63-C000-A219-C48F8D94DA1F}"/>
+                </a:ext>
+              </a:extLst>
+            </p:cNvPr>
+            <p:cNvSpPr/>
+            <p:nvPr/>
+          </p:nvSpPr>
+          <p:spPr>
+            <a:xfrm>
+              <a:off x="9820604" y="4339167"/>
+              <a:ext cx="1418897" cy="296333"/>
+            </a:xfrm>
+            <a:prstGeom prst="rect">
+              <a:avLst/>
+            </a:prstGeom>
+            <a:solidFill>
+              <a:srgbClr val="000000"/>
+            </a:solidFill>
+            <a:ln w="12700" cap="flat" cmpd="sng" algn="ctr">
+              <a:noFill/>
+              <a:prstDash val="solid"/>
+              <a:miter lim="800000"/>
+            </a:ln>
+            <a:effectLst/>
+          </p:spPr>
+          <p:style>
+            <a:lnRef idx="2">
+              <a:schemeClr val="accent1">
+                <a:shade val="15000"/>
+              </a:schemeClr>
+            </a:lnRef>
+            <a:fillRef idx="1">
+              <a:schemeClr val="accent1"/>
+            </a:fillRef>
+            <a:effectRef idx="0">
+              <a:schemeClr val="accent1"/>
+            </a:effectRef>
+            <a:fontRef idx="minor">
+              <a:schemeClr val="lt1"/>
+            </a:fontRef>
+          </p:style>
+          <p:txBody>
+            <a:bodyPr rtlCol="0" anchor="ctr"/>
+            <a:lstStyle/>
+            <a:p>
+              <a:pPr algn="ctr"/>
+              <a:r>
+                <a:rPr lang="en-US" altLang="ko-KR" sz="700"/>
+                <a:t>3rd_stp</a:t>
+              </a:r>
+              <a:br>
+                <a:rPr lang="en-US" altLang="ko-KR" sz="700"/>
+              </a:br>
+              <a:r>
+                <a:rPr lang="en-US" altLang="ko-KR" sz="700"/>
+                <a:t>ADV</a:t>
+              </a:r>
+              <a:endParaRPr lang="ko-KR" altLang="en-US" sz="700"/>
+            </a:p>
+          </p:txBody>
+        </p:sp>
+        <p:sp>
+          <p:nvSpPr>
+            <p:cNvPr id="40" name="직사각형 39">
+              <a:extLst>
+                <a:ext uri="{FF2B5EF4-FFF2-40B4-BE49-F238E27FC236}">
+                  <a16:creationId xmlns:a16="http://schemas.microsoft.com/office/drawing/2014/main" id="{B15C895C-3084-DAB5-BFE2-1CB46831663F}"/>
+                </a:ext>
+              </a:extLst>
+            </p:cNvPr>
+            <p:cNvSpPr/>
+            <p:nvPr/>
+          </p:nvSpPr>
+          <p:spPr>
+            <a:xfrm>
+              <a:off x="9820604" y="4931833"/>
+              <a:ext cx="1418897" cy="296333"/>
+            </a:xfrm>
+            <a:prstGeom prst="rect">
+              <a:avLst/>
+            </a:prstGeom>
+            <a:solidFill>
+              <a:srgbClr val="000000"/>
+            </a:solidFill>
+            <a:ln w="12700" cap="flat" cmpd="sng" algn="ctr">
+              <a:noFill/>
+              <a:prstDash val="solid"/>
+              <a:miter lim="800000"/>
+            </a:ln>
+            <a:effectLst/>
+          </p:spPr>
+          <p:style>
+            <a:lnRef idx="2">
+              <a:schemeClr val="accent1">
+                <a:shade val="15000"/>
+              </a:schemeClr>
+            </a:lnRef>
+            <a:fillRef idx="1">
+              <a:schemeClr val="accent1"/>
+            </a:fillRef>
+            <a:effectRef idx="0">
+              <a:schemeClr val="accent1"/>
+            </a:effectRef>
+            <a:fontRef idx="minor">
+              <a:schemeClr val="lt1"/>
+            </a:fontRef>
+          </p:style>
+          <p:txBody>
+            <a:bodyPr rtlCol="0" anchor="ctr"/>
+            <a:lstStyle/>
+            <a:p>
+              <a:pPr algn="ctr"/>
+              <a:r>
+                <a:rPr lang="en-US" altLang="ko-KR" sz="700"/>
+                <a:t>4th_stp</a:t>
+              </a:r>
+              <a:br>
+                <a:rPr lang="en-US" altLang="ko-KR" sz="700"/>
+              </a:br>
+              <a:r>
+                <a:rPr lang="en-US" altLang="ko-KR" sz="700"/>
+                <a:t>ADV</a:t>
+              </a:r>
+              <a:endParaRPr lang="ko-KR" altLang="en-US" sz="700"/>
+            </a:p>
+          </p:txBody>
+        </p:sp>
+        <p:cxnSp>
+          <p:nvCxnSpPr>
+            <p:cNvPr id="41" name="직선 연결선 40">
+              <a:extLst>
+                <a:ext uri="{FF2B5EF4-FFF2-40B4-BE49-F238E27FC236}">
+                  <a16:creationId xmlns:a16="http://schemas.microsoft.com/office/drawing/2014/main" id="{2FCBBB48-CE18-492A-8B61-0128EBBEC76B}"/>
+                </a:ext>
+              </a:extLst>
+            </p:cNvPr>
+            <p:cNvCxnSpPr/>
+            <p:nvPr/>
+          </p:nvCxnSpPr>
+          <p:spPr>
+            <a:xfrm>
+              <a:off x="2726121" y="1079500"/>
+              <a:ext cx="8513380" cy="0"/>
+            </a:xfrm>
+            <a:prstGeom prst="line">
+              <a:avLst/>
+            </a:prstGeom>
+            <a:ln>
+              <a:solidFill>
+                <a:srgbClr val="000000"/>
+              </a:solidFill>
+            </a:ln>
+          </p:spPr>
+          <p:style>
+            <a:lnRef idx="1">
+              <a:schemeClr val="accent1"/>
+            </a:lnRef>
+            <a:fillRef idx="0">
+              <a:schemeClr val="accent1"/>
+            </a:fillRef>
+            <a:effectRef idx="0">
+              <a:schemeClr val="accent1"/>
+            </a:effectRef>
+            <a:fontRef idx="minor">
+              <a:schemeClr val="tx1"/>
+            </a:fontRef>
+          </p:style>
+        </p:cxnSp>
+        <p:cxnSp>
+          <p:nvCxnSpPr>
+            <p:cNvPr id="42" name="직선 연결선 41">
+              <a:extLst>
+                <a:ext uri="{FF2B5EF4-FFF2-40B4-BE49-F238E27FC236}">
+                  <a16:creationId xmlns:a16="http://schemas.microsoft.com/office/drawing/2014/main" id="{395F4D94-79B2-6039-484E-BEABB23548B9}"/>
+                </a:ext>
+              </a:extLst>
+            </p:cNvPr>
+            <p:cNvCxnSpPr/>
+            <p:nvPr/>
+          </p:nvCxnSpPr>
+          <p:spPr>
+            <a:xfrm>
+              <a:off x="2726121" y="1375833"/>
+              <a:ext cx="8513380" cy="0"/>
+            </a:xfrm>
+            <a:prstGeom prst="line">
+              <a:avLst/>
+            </a:prstGeom>
+            <a:ln>
+              <a:solidFill>
+                <a:srgbClr val="000000"/>
+              </a:solidFill>
+            </a:ln>
+          </p:spPr>
+          <p:style>
+            <a:lnRef idx="1">
+              <a:schemeClr val="accent1"/>
+            </a:lnRef>
+            <a:fillRef idx="0">
+              <a:schemeClr val="accent1"/>
+            </a:fillRef>
+            <a:effectRef idx="0">
+              <a:schemeClr val="accent1"/>
+            </a:effectRef>
+            <a:fontRef idx="minor">
+              <a:schemeClr val="tx1"/>
+            </a:fontRef>
+          </p:style>
+        </p:cxnSp>
+        <p:cxnSp>
+          <p:nvCxnSpPr>
+            <p:cNvPr id="43" name="직선 연결선 42">
+              <a:extLst>
+                <a:ext uri="{FF2B5EF4-FFF2-40B4-BE49-F238E27FC236}">
+                  <a16:creationId xmlns:a16="http://schemas.microsoft.com/office/drawing/2014/main" id="{4D94E696-04A2-DEF4-5214-CA18141A2274}"/>
+                </a:ext>
+              </a:extLst>
+            </p:cNvPr>
+            <p:cNvCxnSpPr/>
+            <p:nvPr/>
+          </p:nvCxnSpPr>
+          <p:spPr>
+            <a:xfrm>
+              <a:off x="2726121" y="1672167"/>
+              <a:ext cx="8513380" cy="0"/>
+            </a:xfrm>
+            <a:prstGeom prst="line">
+              <a:avLst/>
+            </a:prstGeom>
+            <a:ln>
+              <a:solidFill>
+                <a:srgbClr val="000000"/>
+              </a:solidFill>
+            </a:ln>
+          </p:spPr>
+          <p:style>
+            <a:lnRef idx="1">
+              <a:schemeClr val="accent1"/>
+            </a:lnRef>
+            <a:fillRef idx="0">
+              <a:schemeClr val="accent1"/>
+            </a:fillRef>
+            <a:effectRef idx="0">
+              <a:schemeClr val="accent1"/>
+            </a:effectRef>
+            <a:fontRef idx="minor">
+              <a:schemeClr val="tx1"/>
+            </a:fontRef>
+          </p:style>
+        </p:cxnSp>
+        <p:cxnSp>
+          <p:nvCxnSpPr>
+            <p:cNvPr id="44" name="직선 연결선 43">
+              <a:extLst>
+                <a:ext uri="{FF2B5EF4-FFF2-40B4-BE49-F238E27FC236}">
+                  <a16:creationId xmlns:a16="http://schemas.microsoft.com/office/drawing/2014/main" id="{022F314F-8772-0112-813C-42030C52A77B}"/>
+                </a:ext>
+              </a:extLst>
+            </p:cNvPr>
+            <p:cNvCxnSpPr/>
+            <p:nvPr/>
+          </p:nvCxnSpPr>
+          <p:spPr>
+            <a:xfrm>
+              <a:off x="2726121" y="1968500"/>
+              <a:ext cx="8513380" cy="0"/>
+            </a:xfrm>
+            <a:prstGeom prst="line">
+              <a:avLst/>
+            </a:prstGeom>
+            <a:ln>
+              <a:solidFill>
+                <a:srgbClr val="000000"/>
+              </a:solidFill>
+            </a:ln>
+          </p:spPr>
+          <p:style>
+            <a:lnRef idx="1">
+              <a:schemeClr val="accent1"/>
+            </a:lnRef>
+            <a:fillRef idx="0">
+              <a:schemeClr val="accent1"/>
+            </a:fillRef>
+            <a:effectRef idx="0">
+              <a:schemeClr val="accent1"/>
+            </a:effectRef>
+            <a:fontRef idx="minor">
+              <a:schemeClr val="tx1"/>
+            </a:fontRef>
+          </p:style>
+        </p:cxnSp>
+        <p:cxnSp>
+          <p:nvCxnSpPr>
+            <p:cNvPr id="45" name="직선 연결선 44">
+              <a:extLst>
+                <a:ext uri="{FF2B5EF4-FFF2-40B4-BE49-F238E27FC236}">
+                  <a16:creationId xmlns:a16="http://schemas.microsoft.com/office/drawing/2014/main" id="{F6B13664-23BC-2EE0-B571-739FB5065589}"/>
+                </a:ext>
+              </a:extLst>
+            </p:cNvPr>
+            <p:cNvCxnSpPr/>
+            <p:nvPr/>
+          </p:nvCxnSpPr>
+          <p:spPr>
+            <a:xfrm>
+              <a:off x="2726121" y="2264833"/>
+              <a:ext cx="8513380" cy="0"/>
+            </a:xfrm>
+            <a:prstGeom prst="line">
+              <a:avLst/>
+            </a:prstGeom>
+            <a:ln>
+              <a:solidFill>
+                <a:srgbClr val="000000"/>
+              </a:solidFill>
+            </a:ln>
+          </p:spPr>
+          <p:style>
+            <a:lnRef idx="1">
+              <a:schemeClr val="accent1"/>
+            </a:lnRef>
+            <a:fillRef idx="0">
+              <a:schemeClr val="accent1"/>
+            </a:fillRef>
+            <a:effectRef idx="0">
+              <a:schemeClr val="accent1"/>
+            </a:effectRef>
+            <a:fontRef idx="minor">
+              <a:schemeClr val="tx1"/>
+            </a:fontRef>
+          </p:style>
+        </p:cxnSp>
+        <p:cxnSp>
+          <p:nvCxnSpPr>
+            <p:cNvPr id="46" name="직선 연결선 45">
+              <a:extLst>
+                <a:ext uri="{FF2B5EF4-FFF2-40B4-BE49-F238E27FC236}">
+                  <a16:creationId xmlns:a16="http://schemas.microsoft.com/office/drawing/2014/main" id="{FBFC07B3-D147-9696-3188-F38A921A316E}"/>
+                </a:ext>
+              </a:extLst>
+            </p:cNvPr>
+            <p:cNvCxnSpPr/>
+            <p:nvPr/>
+          </p:nvCxnSpPr>
+          <p:spPr>
+            <a:xfrm>
+              <a:off x="2726121" y="2561167"/>
+              <a:ext cx="8513380" cy="0"/>
+            </a:xfrm>
+            <a:prstGeom prst="line">
+              <a:avLst/>
+            </a:prstGeom>
+            <a:ln>
+              <a:solidFill>
+                <a:srgbClr val="000000"/>
+              </a:solidFill>
+            </a:ln>
+          </p:spPr>
+          <p:style>
+            <a:lnRef idx="1">
+              <a:schemeClr val="accent1"/>
+            </a:lnRef>
+            <a:fillRef idx="0">
+              <a:schemeClr val="accent1"/>
+            </a:fillRef>
+            <a:effectRef idx="0">
+              <a:schemeClr val="accent1"/>
+            </a:effectRef>
+            <a:fontRef idx="minor">
+              <a:schemeClr val="tx1"/>
+            </a:fontRef>
+          </p:style>
+        </p:cxnSp>
+        <p:cxnSp>
+          <p:nvCxnSpPr>
+            <p:cNvPr id="47" name="직선 연결선 46">
+              <a:extLst>
+                <a:ext uri="{FF2B5EF4-FFF2-40B4-BE49-F238E27FC236}">
+                  <a16:creationId xmlns:a16="http://schemas.microsoft.com/office/drawing/2014/main" id="{FCC95DAC-061D-874F-E971-505E2D2822DC}"/>
+                </a:ext>
+              </a:extLst>
+            </p:cNvPr>
+            <p:cNvCxnSpPr/>
+            <p:nvPr/>
+          </p:nvCxnSpPr>
+          <p:spPr>
+            <a:xfrm>
+              <a:off x="2726121" y="2857500"/>
+              <a:ext cx="8513380" cy="0"/>
+            </a:xfrm>
+            <a:prstGeom prst="line">
+              <a:avLst/>
+            </a:prstGeom>
+            <a:ln>
+              <a:solidFill>
+                <a:srgbClr val="000000"/>
+              </a:solidFill>
+            </a:ln>
+          </p:spPr>
+          <p:style>
+            <a:lnRef idx="1">
+              <a:schemeClr val="accent1"/>
+            </a:lnRef>
+            <a:fillRef idx="0">
+              <a:schemeClr val="accent1"/>
+            </a:fillRef>
+            <a:effectRef idx="0">
+              <a:schemeClr val="accent1"/>
+            </a:effectRef>
+            <a:fontRef idx="minor">
+              <a:schemeClr val="tx1"/>
+            </a:fontRef>
+          </p:style>
+        </p:cxnSp>
+        <p:cxnSp>
+          <p:nvCxnSpPr>
+            <p:cNvPr id="48" name="직선 연결선 47">
+              <a:extLst>
+                <a:ext uri="{FF2B5EF4-FFF2-40B4-BE49-F238E27FC236}">
+                  <a16:creationId xmlns:a16="http://schemas.microsoft.com/office/drawing/2014/main" id="{0937AE09-984D-937E-3406-B0D92F59210C}"/>
+                </a:ext>
+              </a:extLst>
+            </p:cNvPr>
+            <p:cNvCxnSpPr/>
+            <p:nvPr/>
+          </p:nvCxnSpPr>
+          <p:spPr>
+            <a:xfrm>
+              <a:off x="2726121" y="3153833"/>
+              <a:ext cx="8513380" cy="0"/>
+            </a:xfrm>
+            <a:prstGeom prst="line">
+              <a:avLst/>
+            </a:prstGeom>
+            <a:ln>
+              <a:solidFill>
+                <a:srgbClr val="000000"/>
+              </a:solidFill>
+            </a:ln>
+          </p:spPr>
+          <p:style>
+            <a:lnRef idx="1">
+              <a:schemeClr val="accent1"/>
+            </a:lnRef>
+            <a:fillRef idx="0">
+              <a:schemeClr val="accent1"/>
+            </a:fillRef>
+            <a:effectRef idx="0">
+              <a:schemeClr val="accent1"/>
+            </a:effectRef>
+            <a:fontRef idx="minor">
+              <a:schemeClr val="tx1"/>
+            </a:fontRef>
+          </p:style>
+        </p:cxnSp>
+        <p:cxnSp>
+          <p:nvCxnSpPr>
+            <p:cNvPr id="49" name="직선 연결선 48">
+              <a:extLst>
+                <a:ext uri="{FF2B5EF4-FFF2-40B4-BE49-F238E27FC236}">
+                  <a16:creationId xmlns:a16="http://schemas.microsoft.com/office/drawing/2014/main" id="{8FE203FE-0EB1-A1FC-54E8-3640C2F1821A}"/>
+                </a:ext>
+              </a:extLst>
+            </p:cNvPr>
+            <p:cNvCxnSpPr/>
+            <p:nvPr/>
+          </p:nvCxnSpPr>
+          <p:spPr>
+            <a:xfrm>
+              <a:off x="2726121" y="3450167"/>
+              <a:ext cx="8513380" cy="0"/>
+            </a:xfrm>
+            <a:prstGeom prst="line">
+              <a:avLst/>
+            </a:prstGeom>
+            <a:ln>
+              <a:solidFill>
+                <a:srgbClr val="000000"/>
+              </a:solidFill>
+            </a:ln>
+          </p:spPr>
+          <p:style>
+            <a:lnRef idx="1">
+              <a:schemeClr val="accent1"/>
+            </a:lnRef>
+            <a:fillRef idx="0">
+              <a:schemeClr val="accent1"/>
+            </a:fillRef>
+            <a:effectRef idx="0">
+              <a:schemeClr val="accent1"/>
+            </a:effectRef>
+            <a:fontRef idx="minor">
+              <a:schemeClr val="tx1"/>
+            </a:fontRef>
+          </p:style>
+        </p:cxnSp>
+        <p:cxnSp>
+          <p:nvCxnSpPr>
+            <p:cNvPr id="50" name="직선 연결선 49">
+              <a:extLst>
+                <a:ext uri="{FF2B5EF4-FFF2-40B4-BE49-F238E27FC236}">
+                  <a16:creationId xmlns:a16="http://schemas.microsoft.com/office/drawing/2014/main" id="{C406D27B-3108-D573-D911-D4C40E5AA2BA}"/>
+                </a:ext>
+              </a:extLst>
+            </p:cNvPr>
+            <p:cNvCxnSpPr/>
+            <p:nvPr/>
+          </p:nvCxnSpPr>
+          <p:spPr>
+            <a:xfrm>
+              <a:off x="2726121" y="3746500"/>
+              <a:ext cx="8513380" cy="0"/>
+            </a:xfrm>
+            <a:prstGeom prst="line">
+              <a:avLst/>
+            </a:prstGeom>
+            <a:ln>
+              <a:solidFill>
+                <a:srgbClr val="000000"/>
+              </a:solidFill>
+            </a:ln>
+          </p:spPr>
+          <p:style>
+            <a:lnRef idx="1">
+              <a:schemeClr val="accent1"/>
+            </a:lnRef>
+            <a:fillRef idx="0">
+              <a:schemeClr val="accent1"/>
+            </a:fillRef>
+            <a:effectRef idx="0">
+              <a:schemeClr val="accent1"/>
+            </a:effectRef>
+            <a:fontRef idx="minor">
+              <a:schemeClr val="tx1"/>
+            </a:fontRef>
+          </p:style>
+        </p:cxnSp>
+        <p:cxnSp>
+          <p:nvCxnSpPr>
+            <p:cNvPr id="51" name="직선 연결선 50">
+              <a:extLst>
+                <a:ext uri="{FF2B5EF4-FFF2-40B4-BE49-F238E27FC236}">
+                  <a16:creationId xmlns:a16="http://schemas.microsoft.com/office/drawing/2014/main" id="{158F7C33-E9D1-3562-CF26-B237A7AE21BA}"/>
+                </a:ext>
+              </a:extLst>
+            </p:cNvPr>
+            <p:cNvCxnSpPr/>
+            <p:nvPr/>
+          </p:nvCxnSpPr>
+          <p:spPr>
+            <a:xfrm>
+              <a:off x="2726121" y="4042833"/>
+              <a:ext cx="8513380" cy="0"/>
+            </a:xfrm>
+            <a:prstGeom prst="line">
+              <a:avLst/>
+            </a:prstGeom>
+            <a:ln>
+              <a:solidFill>
+                <a:srgbClr val="000000"/>
+              </a:solidFill>
+            </a:ln>
+          </p:spPr>
+          <p:style>
+            <a:lnRef idx="1">
+              <a:schemeClr val="accent1"/>
+            </a:lnRef>
+            <a:fillRef idx="0">
+              <a:schemeClr val="accent1"/>
+            </a:fillRef>
+            <a:effectRef idx="0">
+              <a:schemeClr val="accent1"/>
+            </a:effectRef>
+            <a:fontRef idx="minor">
+              <a:schemeClr val="tx1"/>
+            </a:fontRef>
+          </p:style>
+        </p:cxnSp>
+        <p:cxnSp>
+          <p:nvCxnSpPr>
+            <p:cNvPr id="52" name="직선 연결선 51">
+              <a:extLst>
+                <a:ext uri="{FF2B5EF4-FFF2-40B4-BE49-F238E27FC236}">
+                  <a16:creationId xmlns:a16="http://schemas.microsoft.com/office/drawing/2014/main" id="{8E0D06D7-576F-F9F3-279D-161D058AB8DE}"/>
+                </a:ext>
+              </a:extLst>
+            </p:cNvPr>
+            <p:cNvCxnSpPr/>
+            <p:nvPr/>
+          </p:nvCxnSpPr>
+          <p:spPr>
+            <a:xfrm>
+              <a:off x="2726121" y="4339167"/>
+              <a:ext cx="8513380" cy="0"/>
+            </a:xfrm>
+            <a:prstGeom prst="line">
+              <a:avLst/>
+            </a:prstGeom>
+            <a:ln>
+              <a:solidFill>
+                <a:srgbClr val="000000"/>
+              </a:solidFill>
+            </a:ln>
+          </p:spPr>
+          <p:style>
+            <a:lnRef idx="1">
+              <a:schemeClr val="accent1"/>
+            </a:lnRef>
+            <a:fillRef idx="0">
+              <a:schemeClr val="accent1"/>
+            </a:fillRef>
+            <a:effectRef idx="0">
+              <a:schemeClr val="accent1"/>
+            </a:effectRef>
+            <a:fontRef idx="minor">
+              <a:schemeClr val="tx1"/>
+            </a:fontRef>
+          </p:style>
+        </p:cxnSp>
+        <p:cxnSp>
+          <p:nvCxnSpPr>
+            <p:cNvPr id="53" name="직선 연결선 52">
+              <a:extLst>
+                <a:ext uri="{FF2B5EF4-FFF2-40B4-BE49-F238E27FC236}">
+                  <a16:creationId xmlns:a16="http://schemas.microsoft.com/office/drawing/2014/main" id="{5EC835F0-BDDE-04EA-101B-56AC90CBABEA}"/>
+                </a:ext>
+              </a:extLst>
+            </p:cNvPr>
+            <p:cNvCxnSpPr/>
+            <p:nvPr/>
+          </p:nvCxnSpPr>
+          <p:spPr>
+            <a:xfrm>
+              <a:off x="2726121" y="4635500"/>
+              <a:ext cx="8513380" cy="0"/>
+            </a:xfrm>
+            <a:prstGeom prst="line">
+              <a:avLst/>
+            </a:prstGeom>
+            <a:ln>
+              <a:solidFill>
+                <a:srgbClr val="000000"/>
+              </a:solidFill>
+            </a:ln>
+          </p:spPr>
+          <p:style>
+            <a:lnRef idx="1">
+              <a:schemeClr val="accent1"/>
+            </a:lnRef>
+            <a:fillRef idx="0">
+              <a:schemeClr val="accent1"/>
+            </a:fillRef>
+            <a:effectRef idx="0">
+              <a:schemeClr val="accent1"/>
+            </a:effectRef>
+            <a:fontRef idx="minor">
+              <a:schemeClr val="tx1"/>
+            </a:fontRef>
+          </p:style>
+        </p:cxnSp>
+        <p:cxnSp>
+          <p:nvCxnSpPr>
+            <p:cNvPr id="54" name="직선 연결선 53">
+              <a:extLst>
+                <a:ext uri="{FF2B5EF4-FFF2-40B4-BE49-F238E27FC236}">
+                  <a16:creationId xmlns:a16="http://schemas.microsoft.com/office/drawing/2014/main" id="{336C4B76-0B38-F8EA-825D-A034D30954F4}"/>
+                </a:ext>
+              </a:extLst>
+            </p:cNvPr>
+            <p:cNvCxnSpPr/>
+            <p:nvPr/>
+          </p:nvCxnSpPr>
+          <p:spPr>
+            <a:xfrm>
+              <a:off x="2726121" y="4931833"/>
+              <a:ext cx="8513380" cy="0"/>
+            </a:xfrm>
+            <a:prstGeom prst="line">
+              <a:avLst/>
+            </a:prstGeom>
+            <a:ln>
+              <a:solidFill>
+                <a:srgbClr val="000000"/>
+              </a:solidFill>
+            </a:ln>
+          </p:spPr>
+          <p:style>
+            <a:lnRef idx="1">
+              <a:schemeClr val="accent1"/>
+            </a:lnRef>
+            <a:fillRef idx="0">
+              <a:schemeClr val="accent1"/>
+            </a:fillRef>
+            <a:effectRef idx="0">
+              <a:schemeClr val="accent1"/>
+            </a:effectRef>
+            <a:fontRef idx="minor">
+              <a:schemeClr val="tx1"/>
+            </a:fontRef>
+          </p:style>
+        </p:cxnSp>
+        <p:cxnSp>
+          <p:nvCxnSpPr>
+            <p:cNvPr id="55" name="직선 연결선 54">
+              <a:extLst>
+                <a:ext uri="{FF2B5EF4-FFF2-40B4-BE49-F238E27FC236}">
+                  <a16:creationId xmlns:a16="http://schemas.microsoft.com/office/drawing/2014/main" id="{30A2D645-1AC7-F173-73F6-3DC8531B481F}"/>
+                </a:ext>
+              </a:extLst>
+            </p:cNvPr>
+            <p:cNvCxnSpPr/>
+            <p:nvPr/>
+          </p:nvCxnSpPr>
+          <p:spPr>
+            <a:xfrm>
+              <a:off x="2726121" y="5228167"/>
+              <a:ext cx="8513380" cy="0"/>
+            </a:xfrm>
+            <a:prstGeom prst="line">
+              <a:avLst/>
+            </a:prstGeom>
+            <a:ln>
+              <a:solidFill>
+                <a:srgbClr val="000000"/>
+              </a:solidFill>
+            </a:ln>
+          </p:spPr>
+          <p:style>
+            <a:lnRef idx="1">
+              <a:schemeClr val="accent1"/>
+            </a:lnRef>
+            <a:fillRef idx="0">
+              <a:schemeClr val="accent1"/>
+            </a:fillRef>
+            <a:effectRef idx="0">
+              <a:schemeClr val="accent1"/>
+            </a:effectRef>
+            <a:fontRef idx="minor">
+              <a:schemeClr val="tx1"/>
+            </a:fontRef>
+          </p:style>
+        </p:cxnSp>
+        <p:cxnSp>
+          <p:nvCxnSpPr>
+            <p:cNvPr id="56" name="직선 연결선 55">
+              <a:extLst>
+                <a:ext uri="{FF2B5EF4-FFF2-40B4-BE49-F238E27FC236}">
+                  <a16:creationId xmlns:a16="http://schemas.microsoft.com/office/drawing/2014/main" id="{65DDD739-EDAB-189D-1C41-0DEDBFB790AE}"/>
+                </a:ext>
+              </a:extLst>
+            </p:cNvPr>
+            <p:cNvCxnSpPr/>
+            <p:nvPr/>
+          </p:nvCxnSpPr>
+          <p:spPr>
+            <a:xfrm>
+              <a:off x="2726121" y="5524500"/>
+              <a:ext cx="8513380" cy="0"/>
+            </a:xfrm>
+            <a:prstGeom prst="line">
+              <a:avLst/>
+            </a:prstGeom>
+            <a:ln>
+              <a:solidFill>
+                <a:srgbClr val="000000"/>
+              </a:solidFill>
+            </a:ln>
+          </p:spPr>
+          <p:style>
+            <a:lnRef idx="1">
+              <a:schemeClr val="accent1"/>
+            </a:lnRef>
+            <a:fillRef idx="0">
+              <a:schemeClr val="accent1"/>
+            </a:fillRef>
+            <a:effectRef idx="0">
+              <a:schemeClr val="accent1"/>
+            </a:effectRef>
+            <a:fontRef idx="minor">
+              <a:schemeClr val="tx1"/>
+            </a:fontRef>
+          </p:style>
+        </p:cxnSp>
+        <p:cxnSp>
+          <p:nvCxnSpPr>
+            <p:cNvPr id="57" name="직선 연결선 56">
+              <a:extLst>
+                <a:ext uri="{FF2B5EF4-FFF2-40B4-BE49-F238E27FC236}">
+                  <a16:creationId xmlns:a16="http://schemas.microsoft.com/office/drawing/2014/main" id="{85E49239-2C6C-B1D1-5A31-EA9D8DED012C}"/>
+                </a:ext>
+              </a:extLst>
+            </p:cNvPr>
+            <p:cNvCxnSpPr/>
+            <p:nvPr/>
+          </p:nvCxnSpPr>
+          <p:spPr>
+            <a:xfrm>
+              <a:off x="2726121" y="5820833"/>
+              <a:ext cx="8513380" cy="0"/>
+            </a:xfrm>
+            <a:prstGeom prst="line">
+              <a:avLst/>
+            </a:prstGeom>
+            <a:ln>
+              <a:solidFill>
+                <a:srgbClr val="000000"/>
+              </a:solidFill>
+            </a:ln>
+          </p:spPr>
+          <p:style>
+            <a:lnRef idx="1">
+              <a:schemeClr val="accent1"/>
+            </a:lnRef>
+            <a:fillRef idx="0">
+              <a:schemeClr val="accent1"/>
+            </a:fillRef>
+            <a:effectRef idx="0">
+              <a:schemeClr val="accent1"/>
+            </a:effectRef>
+            <a:fontRef idx="minor">
+              <a:schemeClr val="tx1"/>
+            </a:fontRef>
+          </p:style>
+        </p:cxnSp>
+        <p:cxnSp>
+          <p:nvCxnSpPr>
+            <p:cNvPr id="58" name="직선 연결선 57">
+              <a:extLst>
+                <a:ext uri="{FF2B5EF4-FFF2-40B4-BE49-F238E27FC236}">
+                  <a16:creationId xmlns:a16="http://schemas.microsoft.com/office/drawing/2014/main" id="{353C0A64-7C73-18B2-B0B0-90110127834F}"/>
+                </a:ext>
+              </a:extLst>
+            </p:cNvPr>
+            <p:cNvCxnSpPr/>
+            <p:nvPr/>
+          </p:nvCxnSpPr>
+          <p:spPr>
+            <a:xfrm>
+              <a:off x="2726121" y="6117167"/>
+              <a:ext cx="8513380" cy="0"/>
+            </a:xfrm>
+            <a:prstGeom prst="line">
+              <a:avLst/>
+            </a:prstGeom>
+            <a:ln>
+              <a:solidFill>
+                <a:srgbClr val="000000"/>
+              </a:solidFill>
+            </a:ln>
+          </p:spPr>
+          <p:style>
+            <a:lnRef idx="1">
+              <a:schemeClr val="accent1"/>
+            </a:lnRef>
+            <a:fillRef idx="0">
+              <a:schemeClr val="accent1"/>
+            </a:fillRef>
+            <a:effectRef idx="0">
+              <a:schemeClr val="accent1"/>
+            </a:effectRef>
+            <a:fontRef idx="minor">
+              <a:schemeClr val="tx1"/>
+            </a:fontRef>
+          </p:style>
+        </p:cxnSp>
+        <p:cxnSp>
+          <p:nvCxnSpPr>
+            <p:cNvPr id="59" name="직선 연결선 58">
+              <a:extLst>
+                <a:ext uri="{FF2B5EF4-FFF2-40B4-BE49-F238E27FC236}">
+                  <a16:creationId xmlns:a16="http://schemas.microsoft.com/office/drawing/2014/main" id="{8AA26414-74D9-882C-2A57-C5F297182298}"/>
+                </a:ext>
+              </a:extLst>
+            </p:cNvPr>
+            <p:cNvCxnSpPr/>
+            <p:nvPr/>
+          </p:nvCxnSpPr>
+          <p:spPr>
+            <a:xfrm>
+              <a:off x="2726121" y="6413500"/>
+              <a:ext cx="8513380" cy="0"/>
+            </a:xfrm>
+            <a:prstGeom prst="line">
+              <a:avLst/>
+            </a:prstGeom>
+            <a:ln>
+              <a:solidFill>
+                <a:srgbClr val="000000"/>
+              </a:solidFill>
+            </a:ln>
+          </p:spPr>
+          <p:style>
+            <a:lnRef idx="1">
+              <a:schemeClr val="accent1"/>
+            </a:lnRef>
+            <a:fillRef idx="0">
+              <a:schemeClr val="accent1"/>
+            </a:fillRef>
+            <a:effectRef idx="0">
+              <a:schemeClr val="accent1"/>
+            </a:effectRef>
+            <a:fontRef idx="minor">
+              <a:schemeClr val="tx1"/>
+            </a:fontRef>
+          </p:style>
+        </p:cxnSp>
+        <p:cxnSp>
+          <p:nvCxnSpPr>
+            <p:cNvPr id="60" name="직선 연결선 59">
+              <a:extLst>
+                <a:ext uri="{FF2B5EF4-FFF2-40B4-BE49-F238E27FC236}">
+                  <a16:creationId xmlns:a16="http://schemas.microsoft.com/office/drawing/2014/main" id="{017B1CAB-67C2-F5E2-EDDA-9E0302690086}"/>
+                </a:ext>
+              </a:extLst>
+            </p:cNvPr>
+            <p:cNvCxnSpPr/>
+            <p:nvPr/>
+          </p:nvCxnSpPr>
+          <p:spPr>
+            <a:xfrm>
+              <a:off x="2726121" y="1079500"/>
+              <a:ext cx="0" cy="5334000"/>
+            </a:xfrm>
+            <a:prstGeom prst="line">
+              <a:avLst/>
+            </a:prstGeom>
+            <a:ln>
+              <a:solidFill>
+                <a:srgbClr val="000000"/>
+              </a:solidFill>
+            </a:ln>
+          </p:spPr>
+          <p:style>
+            <a:lnRef idx="1">
+              <a:schemeClr val="accent1"/>
+            </a:lnRef>
+            <a:fillRef idx="0">
+              <a:schemeClr val="accent1"/>
+            </a:fillRef>
+            <a:effectRef idx="0">
+              <a:schemeClr val="accent1"/>
+            </a:effectRef>
+            <a:fontRef idx="minor">
+              <a:schemeClr val="tx1"/>
+            </a:fontRef>
+          </p:style>
+        </p:cxnSp>
+        <p:cxnSp>
+          <p:nvCxnSpPr>
+            <p:cNvPr id="61" name="직선 연결선 60">
+              <a:extLst>
+                <a:ext uri="{FF2B5EF4-FFF2-40B4-BE49-F238E27FC236}">
+                  <a16:creationId xmlns:a16="http://schemas.microsoft.com/office/drawing/2014/main" id="{459548E8-43C7-2700-7AE2-0512CE55E292}"/>
+                </a:ext>
+              </a:extLst>
+            </p:cNvPr>
+            <p:cNvCxnSpPr/>
+            <p:nvPr/>
+          </p:nvCxnSpPr>
+          <p:spPr>
+            <a:xfrm>
+              <a:off x="4145018" y="1079500"/>
+              <a:ext cx="0" cy="5334000"/>
+            </a:xfrm>
+            <a:prstGeom prst="line">
+              <a:avLst/>
+            </a:prstGeom>
+            <a:ln>
+              <a:solidFill>
+                <a:srgbClr val="000000"/>
+              </a:solidFill>
+            </a:ln>
+          </p:spPr>
+          <p:style>
+            <a:lnRef idx="1">
+              <a:schemeClr val="accent1"/>
+            </a:lnRef>
+            <a:fillRef idx="0">
+              <a:schemeClr val="accent1"/>
+            </a:fillRef>
+            <a:effectRef idx="0">
+              <a:schemeClr val="accent1"/>
+            </a:effectRef>
+            <a:fontRef idx="minor">
+              <a:schemeClr val="tx1"/>
+            </a:fontRef>
+          </p:style>
+        </p:cxnSp>
+        <p:cxnSp>
+          <p:nvCxnSpPr>
+            <p:cNvPr id="62" name="직선 연결선 61">
+              <a:extLst>
+                <a:ext uri="{FF2B5EF4-FFF2-40B4-BE49-F238E27FC236}">
+                  <a16:creationId xmlns:a16="http://schemas.microsoft.com/office/drawing/2014/main" id="{D5D9C7EB-A78F-785A-00A3-B54BA60983CD}"/>
+                </a:ext>
+              </a:extLst>
+            </p:cNvPr>
+            <p:cNvCxnSpPr/>
+            <p:nvPr/>
+          </p:nvCxnSpPr>
+          <p:spPr>
+            <a:xfrm>
+              <a:off x="5563914" y="1079500"/>
+              <a:ext cx="0" cy="5334000"/>
+            </a:xfrm>
+            <a:prstGeom prst="line">
+              <a:avLst/>
+            </a:prstGeom>
+            <a:ln>
+              <a:solidFill>
+                <a:srgbClr val="000000"/>
+              </a:solidFill>
+            </a:ln>
+          </p:spPr>
+          <p:style>
+            <a:lnRef idx="1">
+              <a:schemeClr val="accent1"/>
+            </a:lnRef>
+            <a:fillRef idx="0">
+              <a:schemeClr val="accent1"/>
+            </a:fillRef>
+            <a:effectRef idx="0">
+              <a:schemeClr val="accent1"/>
+            </a:effectRef>
+            <a:fontRef idx="minor">
+              <a:schemeClr val="tx1"/>
+            </a:fontRef>
+          </p:style>
+        </p:cxnSp>
+        <p:cxnSp>
+          <p:nvCxnSpPr>
+            <p:cNvPr id="63" name="직선 연결선 62">
+              <a:extLst>
+                <a:ext uri="{FF2B5EF4-FFF2-40B4-BE49-F238E27FC236}">
+                  <a16:creationId xmlns:a16="http://schemas.microsoft.com/office/drawing/2014/main" id="{50B0FBF2-C8EF-271C-26CD-F1FE0722F08E}"/>
+                </a:ext>
+              </a:extLst>
+            </p:cNvPr>
+            <p:cNvCxnSpPr/>
+            <p:nvPr/>
+          </p:nvCxnSpPr>
+          <p:spPr>
+            <a:xfrm>
+              <a:off x="6982811" y="1079500"/>
+              <a:ext cx="0" cy="5334000"/>
+            </a:xfrm>
+            <a:prstGeom prst="line">
+              <a:avLst/>
+            </a:prstGeom>
+            <a:ln>
+              <a:solidFill>
+                <a:srgbClr val="000000"/>
+              </a:solidFill>
+            </a:ln>
+          </p:spPr>
+          <p:style>
+            <a:lnRef idx="1">
+              <a:schemeClr val="accent1"/>
+            </a:lnRef>
+            <a:fillRef idx="0">
+              <a:schemeClr val="accent1"/>
+            </a:fillRef>
+            <a:effectRef idx="0">
+              <a:schemeClr val="accent1"/>
+            </a:effectRef>
+            <a:fontRef idx="minor">
+              <a:schemeClr val="tx1"/>
+            </a:fontRef>
+          </p:style>
+        </p:cxnSp>
+        <p:cxnSp>
+          <p:nvCxnSpPr>
+            <p:cNvPr id="64" name="직선 연결선 63">
+              <a:extLst>
+                <a:ext uri="{FF2B5EF4-FFF2-40B4-BE49-F238E27FC236}">
+                  <a16:creationId xmlns:a16="http://schemas.microsoft.com/office/drawing/2014/main" id="{562F63A4-F255-B3C2-24B9-515897B95966}"/>
+                </a:ext>
+              </a:extLst>
+            </p:cNvPr>
+            <p:cNvCxnSpPr/>
+            <p:nvPr/>
+          </p:nvCxnSpPr>
+          <p:spPr>
+            <a:xfrm>
+              <a:off x="8401708" y="1079500"/>
+              <a:ext cx="0" cy="5334000"/>
+            </a:xfrm>
+            <a:prstGeom prst="line">
+              <a:avLst/>
+            </a:prstGeom>
+            <a:ln>
+              <a:solidFill>
+                <a:srgbClr val="000000"/>
+              </a:solidFill>
+            </a:ln>
+          </p:spPr>
+          <p:style>
+            <a:lnRef idx="1">
+              <a:schemeClr val="accent1"/>
+            </a:lnRef>
+            <a:fillRef idx="0">
+              <a:schemeClr val="accent1"/>
+            </a:fillRef>
+            <a:effectRef idx="0">
+              <a:schemeClr val="accent1"/>
+            </a:effectRef>
+            <a:fontRef idx="minor">
+              <a:schemeClr val="tx1"/>
+            </a:fontRef>
+          </p:style>
+        </p:cxnSp>
+        <p:cxnSp>
+          <p:nvCxnSpPr>
+            <p:cNvPr id="65" name="직선 연결선 64">
+              <a:extLst>
+                <a:ext uri="{FF2B5EF4-FFF2-40B4-BE49-F238E27FC236}">
+                  <a16:creationId xmlns:a16="http://schemas.microsoft.com/office/drawing/2014/main" id="{A9C5F626-1C71-256A-198E-4928768DA2F6}"/>
+                </a:ext>
+              </a:extLst>
+            </p:cNvPr>
+            <p:cNvCxnSpPr/>
+            <p:nvPr/>
+          </p:nvCxnSpPr>
+          <p:spPr>
+            <a:xfrm>
+              <a:off x="9820604" y="1079500"/>
+              <a:ext cx="0" cy="5334000"/>
+            </a:xfrm>
+            <a:prstGeom prst="line">
+              <a:avLst/>
+            </a:prstGeom>
+            <a:ln>
+              <a:solidFill>
+                <a:srgbClr val="000000"/>
+              </a:solidFill>
+            </a:ln>
+          </p:spPr>
+          <p:style>
+            <a:lnRef idx="1">
+              <a:schemeClr val="accent1"/>
+            </a:lnRef>
+            <a:fillRef idx="0">
+              <a:schemeClr val="accent1"/>
+            </a:fillRef>
+            <a:effectRef idx="0">
+              <a:schemeClr val="accent1"/>
+            </a:effectRef>
+            <a:fontRef idx="minor">
+              <a:schemeClr val="tx1"/>
+            </a:fontRef>
+          </p:style>
+        </p:cxnSp>
+        <p:cxnSp>
+          <p:nvCxnSpPr>
+            <p:cNvPr id="66" name="직선 연결선 65">
+              <a:extLst>
+                <a:ext uri="{FF2B5EF4-FFF2-40B4-BE49-F238E27FC236}">
+                  <a16:creationId xmlns:a16="http://schemas.microsoft.com/office/drawing/2014/main" id="{9F993E05-174A-3B98-428C-156F4A429FE6}"/>
+                </a:ext>
+              </a:extLst>
+            </p:cNvPr>
+            <p:cNvCxnSpPr/>
+            <p:nvPr/>
+          </p:nvCxnSpPr>
+          <p:spPr>
+            <a:xfrm>
+              <a:off x="11239501" y="1079500"/>
+              <a:ext cx="0" cy="5334000"/>
+            </a:xfrm>
+            <a:prstGeom prst="line">
+              <a:avLst/>
+            </a:prstGeom>
+            <a:ln>
+              <a:solidFill>
+                <a:srgbClr val="000000"/>
+              </a:solidFill>
+            </a:ln>
+          </p:spPr>
+          <p:style>
+            <a:lnRef idx="1">
+              <a:schemeClr val="accent1"/>
+            </a:lnRef>
+            <a:fillRef idx="0">
+              <a:schemeClr val="accent1"/>
+            </a:fillRef>
+            <a:effectRef idx="0">
+              <a:schemeClr val="accent1"/>
+            </a:effectRef>
+            <a:fontRef idx="minor">
+              <a:schemeClr val="tx1"/>
+            </a:fontRef>
+          </p:style>
+        </p:cxnSp>
+      </p:grpSp>
+    </p:spTree>
+    <p:extLst>
+      <p:ext uri="{BB962C8B-B14F-4D97-AF65-F5344CB8AC3E}">
+        <p14:creationId xmlns:p14="http://schemas.microsoft.com/office/powerpoint/2010/main" val="3909377473"/>
       </p:ext>
     </p:extLst>
   </p:cSld>
@@ -9793,10 +12966,10 @@
       </p:sp>
       <p:grpSp>
         <p:nvGrpSpPr>
-          <p:cNvPr id="29" name="그룹 28">
+          <p:cNvPr id="4" name="그룹 3">
             <a:extLst>
               <a:ext uri="{FF2B5EF4-FFF2-40B4-BE49-F238E27FC236}">
-                <a16:creationId xmlns:a16="http://schemas.microsoft.com/office/drawing/2014/main" id="{B209E5F0-F6B9-2AA6-5413-CA349C378BD6}"/>
+                <a16:creationId xmlns:a16="http://schemas.microsoft.com/office/drawing/2014/main" id="{42A738DF-2586-A1F9-6EB4-765FAEAD058C}"/>
               </a:ext>
             </a:extLst>
           </p:cNvPr>
@@ -10239,10 +13412,10 @@
       </p:grpSp>
       <p:grpSp>
         <p:nvGrpSpPr>
-          <p:cNvPr id="28" name="그룹 27">
+          <p:cNvPr id="3" name="그룹 2">
             <a:extLst>
               <a:ext uri="{FF2B5EF4-FFF2-40B4-BE49-F238E27FC236}">
-                <a16:creationId xmlns:a16="http://schemas.microsoft.com/office/drawing/2014/main" id="{AAC4ACBD-E596-7E2F-43B1-04EB5E4D07A0}"/>
+                <a16:creationId xmlns:a16="http://schemas.microsoft.com/office/drawing/2014/main" id="{2B82B612-BC4B-9A05-2230-2B8BC40A6EE2}"/>
               </a:ext>
             </a:extLst>
           </p:cNvPr>
@@ -10840,10 +14013,10 @@
       </p:sp>
       <p:grpSp>
         <p:nvGrpSpPr>
-          <p:cNvPr id="8" name="그룹 7">
+          <p:cNvPr id="3" name="그룹 2">
             <a:extLst>
               <a:ext uri="{FF2B5EF4-FFF2-40B4-BE49-F238E27FC236}">
-                <a16:creationId xmlns:a16="http://schemas.microsoft.com/office/drawing/2014/main" id="{D7A1A40E-91DE-A4F8-83D5-08E4C304C78F}"/>
+                <a16:creationId xmlns:a16="http://schemas.microsoft.com/office/drawing/2014/main" id="{07FBFED3-13A5-F5F4-E185-3DBB8FF55CEF}"/>
               </a:ext>
             </a:extLst>
           </p:cNvPr>
@@ -11917,10 +15090,10 @@
       </p:sp>
       <p:grpSp>
         <p:nvGrpSpPr>
-          <p:cNvPr id="8" name="그룹 7">
+          <p:cNvPr id="3" name="그룹 2">
             <a:extLst>
               <a:ext uri="{FF2B5EF4-FFF2-40B4-BE49-F238E27FC236}">
-                <a16:creationId xmlns:a16="http://schemas.microsoft.com/office/drawing/2014/main" id="{29F10551-785C-9B54-01B0-DB0F913619FE}"/>
+                <a16:creationId xmlns:a16="http://schemas.microsoft.com/office/drawing/2014/main" id="{E4DE64BF-E66D-B7BC-2D8A-766234323950}"/>
               </a:ext>
             </a:extLst>
           </p:cNvPr>
@@ -12508,10 +15681,10 @@
       </p:sp>
       <p:grpSp>
         <p:nvGrpSpPr>
-          <p:cNvPr id="8" name="그룹 7">
+          <p:cNvPr id="3" name="그룹 2">
             <a:extLst>
               <a:ext uri="{FF2B5EF4-FFF2-40B4-BE49-F238E27FC236}">
-                <a16:creationId xmlns:a16="http://schemas.microsoft.com/office/drawing/2014/main" id="{69D0153F-1AAD-7D0E-385D-36DA69921721}"/>
+                <a16:creationId xmlns:a16="http://schemas.microsoft.com/office/drawing/2014/main" id="{4A068B6F-D57A-00D2-C46A-DF12212EFF09}"/>
               </a:ext>
             </a:extLst>
           </p:cNvPr>
@@ -13099,10 +16272,10 @@
       </p:sp>
       <p:grpSp>
         <p:nvGrpSpPr>
-          <p:cNvPr id="8" name="그룹 7">
+          <p:cNvPr id="3" name="그룹 2">
             <a:extLst>
               <a:ext uri="{FF2B5EF4-FFF2-40B4-BE49-F238E27FC236}">
-                <a16:creationId xmlns:a16="http://schemas.microsoft.com/office/drawing/2014/main" id="{8CBDADFA-600E-19CC-391D-238C94DDE2E8}"/>
+                <a16:creationId xmlns:a16="http://schemas.microsoft.com/office/drawing/2014/main" id="{E89BEB1A-A2E2-A2B2-F9B6-F344DBD9B0B2}"/>
               </a:ext>
             </a:extLst>
           </p:cNvPr>
@@ -13453,10 +16626,10 @@
       </p:sp>
       <p:grpSp>
         <p:nvGrpSpPr>
-          <p:cNvPr id="18" name="그룹 17">
+          <p:cNvPr id="5" name="그룹 4">
             <a:extLst>
               <a:ext uri="{FF2B5EF4-FFF2-40B4-BE49-F238E27FC236}">
-                <a16:creationId xmlns:a16="http://schemas.microsoft.com/office/drawing/2014/main" id="{F63E5630-E7BC-711B-90D2-1F92E2F661B1}"/>
+                <a16:creationId xmlns:a16="http://schemas.microsoft.com/office/drawing/2014/main" id="{D7EFFE04-813D-433E-66F8-86D47690BE36}"/>
               </a:ext>
             </a:extLst>
           </p:cNvPr>
@@ -14853,10 +18026,10 @@
       </p:sp>
       <p:grpSp>
         <p:nvGrpSpPr>
-          <p:cNvPr id="17" name="그룹 16">
+          <p:cNvPr id="4" name="그룹 3">
             <a:extLst>
               <a:ext uri="{FF2B5EF4-FFF2-40B4-BE49-F238E27FC236}">
-                <a16:creationId xmlns:a16="http://schemas.microsoft.com/office/drawing/2014/main" id="{9EFBE2B7-C46A-1327-3FFC-96446EE89DDA}"/>
+                <a16:creationId xmlns:a16="http://schemas.microsoft.com/office/drawing/2014/main" id="{3B9E143B-05E8-E9A8-AB73-D9EEDAC81D3D}"/>
               </a:ext>
             </a:extLst>
           </p:cNvPr>
@@ -17180,10 +20353,10 @@
       </p:sp>
       <p:grpSp>
         <p:nvGrpSpPr>
-          <p:cNvPr id="16" name="그룹 15">
+          <p:cNvPr id="3" name="그룹 2">
             <a:extLst>
               <a:ext uri="{FF2B5EF4-FFF2-40B4-BE49-F238E27FC236}">
-                <a16:creationId xmlns:a16="http://schemas.microsoft.com/office/drawing/2014/main" id="{75079497-F2C4-F793-B5E9-9CECAD910550}"/>
+                <a16:creationId xmlns:a16="http://schemas.microsoft.com/office/drawing/2014/main" id="{71B403A9-FE14-F062-9AB4-65F67C9A18F3}"/>
               </a:ext>
             </a:extLst>
           </p:cNvPr>
@@ -19274,10 +22447,10 @@
       </p:sp>
       <p:grpSp>
         <p:nvGrpSpPr>
-          <p:cNvPr id="21" name="그룹 20">
+          <p:cNvPr id="17" name="그룹 16">
             <a:extLst>
               <a:ext uri="{FF2B5EF4-FFF2-40B4-BE49-F238E27FC236}">
-                <a16:creationId xmlns:a16="http://schemas.microsoft.com/office/drawing/2014/main" id="{58E41976-2680-753A-2D8B-E37223625410}"/>
+                <a16:creationId xmlns:a16="http://schemas.microsoft.com/office/drawing/2014/main" id="{71853407-DDF4-5BCF-F088-B4C896A2E3B4}"/>
               </a:ext>
             </a:extLst>
           </p:cNvPr>

</xml_diff>